<commit_message>
#2130 updated cheatsheet with new functions and deprecations for 1.0
</commit_message>
<xml_diff>
--- a/inst/cheatsheet/admiral_cheatsheet.pptx
+++ b/inst/cheatsheet/admiral_cheatsheet.pptx
@@ -6560,7 +6560,7 @@
                 <a:cs typeface="Roboto"/>
                 <a:sym typeface="Roboto"/>
               </a:rPr>
-              <a:t>(dataset, dataset_add, new_vars,filter_add, order, mode…)</a:t>
+              <a:t>(dataset, dataset_add, new_vars, join_type, filter_add, order, mode…)</a:t>
             </a:r>
             <a:r>
               <a:rPr lang="en" sz="900">
@@ -6768,6 +6768,38 @@
                 <a:sym typeface="Roboto"/>
               </a:rPr>
               <a:t>  join_vars = exprs(APERSDT, APEREDT),</a:t>
+            </a:r>
+            <a:endParaRPr i="1" sz="900">
+              <a:solidFill>
+                <a:schemeClr val="dk1"/>
+              </a:solidFill>
+              <a:latin typeface="Roboto"/>
+              <a:ea typeface="Roboto"/>
+              <a:cs typeface="Roboto"/>
+              <a:sym typeface="Roboto"/>
+            </a:endParaRPr>
+          </a:p>
+          <a:p>
+            <a:pPr indent="0" lvl="0" marL="0" rtl="0" algn="l">
+              <a:spcBef>
+                <a:spcPts val="0"/>
+              </a:spcBef>
+              <a:spcAft>
+                <a:spcPts val="0"/>
+              </a:spcAft>
+              <a:buNone/>
+            </a:pPr>
+            <a:r>
+              <a:rPr i="1" lang="en" sz="900">
+                <a:solidFill>
+                  <a:schemeClr val="dk1"/>
+                </a:solidFill>
+                <a:latin typeface="Roboto"/>
+                <a:ea typeface="Roboto"/>
+                <a:cs typeface="Roboto"/>
+                <a:sym typeface="Roboto"/>
+              </a:rPr>
+              <a:t>  join_type = “all”,</a:t>
             </a:r>
             <a:endParaRPr i="1" sz="900">
               <a:solidFill>
@@ -7750,7 +7782,7 @@
         </p:nvSpPr>
         <p:spPr>
           <a:xfrm>
-            <a:off x="4324575" y="3867084"/>
+            <a:off x="4324575" y="3831947"/>
             <a:ext cx="2580600" cy="1974000"/>
           </a:xfrm>
           <a:prstGeom prst="rect">
@@ -7983,7 +8015,39 @@
                 <a:cs typeface="Roboto"/>
                 <a:sym typeface="Roboto"/>
               </a:rPr>
-              <a:t>  dataset = adlb, by_vars = exprs(USUBJID),</a:t>
+              <a:t>  dataset = adlb,  dataset_add = “adlb”,</a:t>
+            </a:r>
+            <a:endParaRPr i="1" sz="900">
+              <a:solidFill>
+                <a:schemeClr val="dk1"/>
+              </a:solidFill>
+              <a:latin typeface="Roboto"/>
+              <a:ea typeface="Roboto"/>
+              <a:cs typeface="Roboto"/>
+              <a:sym typeface="Roboto"/>
+            </a:endParaRPr>
+          </a:p>
+          <a:p>
+            <a:pPr indent="0" lvl="0" marL="0" rtl="0" algn="l">
+              <a:spcBef>
+                <a:spcPts val="0"/>
+              </a:spcBef>
+              <a:spcAft>
+                <a:spcPts val="0"/>
+              </a:spcAft>
+              <a:buNone/>
+            </a:pPr>
+            <a:r>
+              <a:rPr i="1" lang="en" sz="900">
+                <a:solidFill>
+                  <a:schemeClr val="dk1"/>
+                </a:solidFill>
+                <a:latin typeface="Roboto"/>
+                <a:ea typeface="Roboto"/>
+                <a:cs typeface="Roboto"/>
+                <a:sym typeface="Roboto"/>
+              </a:rPr>
+              <a:t>  by_vars = exprs(USUBJID),</a:t>
             </a:r>
             <a:endParaRPr i="1" sz="900">
               <a:solidFill>
@@ -8248,8 +8312,8 @@
         </p:nvSpPr>
         <p:spPr>
           <a:xfrm>
-            <a:off x="4324575" y="5858300"/>
-            <a:ext cx="1860600" cy="956400"/>
+            <a:off x="3718275" y="6170350"/>
+            <a:ext cx="3186900" cy="840900"/>
           </a:xfrm>
           <a:prstGeom prst="rect">
             <a:avLst/>
@@ -8311,12 +8375,68 @@
                 <a:solidFill>
                   <a:schemeClr val="dk1"/>
                 </a:solidFill>
-                <a:latin typeface="Roboto"/>
-                <a:ea typeface="Roboto"/>
-                <a:cs typeface="Roboto"/>
-                <a:sym typeface="Roboto"/>
-              </a:rPr>
-              <a:t>derive_expected_records()</a:t>
+                <a:uFill>
+                  <a:noFill/>
+                </a:uFill>
+                <a:latin typeface="Roboto"/>
+                <a:ea typeface="Roboto"/>
+                <a:cs typeface="Roboto"/>
+                <a:sym typeface="Roboto"/>
+                <a:hlinkClick r:id="rId9">
+                  <a:extLst>
+                    <a:ext uri="{A12FA001-AC4F-418D-AE19-62706E023703}">
+                      <ahyp:hlinkClr val="tx"/>
+                    </a:ext>
+                  </a:extLst>
+                </a:hlinkClick>
+              </a:rPr>
+              <a:t>derive_expected_records</a:t>
+            </a:r>
+            <a:r>
+              <a:rPr b="1" lang="en" sz="900">
+                <a:solidFill>
+                  <a:schemeClr val="dk1"/>
+                </a:solidFill>
+                <a:latin typeface="Roboto"/>
+                <a:ea typeface="Roboto"/>
+                <a:cs typeface="Roboto"/>
+                <a:sym typeface="Roboto"/>
+              </a:rPr>
+              <a:t>(), </a:t>
+            </a:r>
+            <a:r>
+              <a:rPr b="1" lang="en" sz="900">
+                <a:solidFill>
+                  <a:schemeClr val="dk1"/>
+                </a:solidFill>
+                <a:uFill>
+                  <a:noFill/>
+                </a:uFill>
+                <a:latin typeface="Roboto"/>
+                <a:ea typeface="Roboto"/>
+                <a:cs typeface="Roboto"/>
+                <a:sym typeface="Roboto"/>
+                <a:hlinkClick r:id="rId10">
+                  <a:extLst>
+                    <a:ext uri="{A12FA001-AC4F-418D-AE19-62706E023703}">
+                      <ahyp:hlinkClr val="tx"/>
+                    </a:ext>
+                  </a:extLst>
+                </a:hlinkClick>
+              </a:rPr>
+              <a:t>derive_locf_records</a:t>
+            </a:r>
+            <a:r>
+              <a:rPr b="1" lang="en" sz="900">
+                <a:solidFill>
+                  <a:schemeClr val="dk1"/>
+                </a:solidFill>
+                <a:latin typeface="Roboto"/>
+                <a:ea typeface="Roboto"/>
+                <a:cs typeface="Roboto"/>
+                <a:sym typeface="Roboto"/>
+              </a:rPr>
+              <a:t>()</a:t>
             </a:r>
             <a:endParaRPr b="1" sz="900">
               <a:solidFill>
@@ -8343,10 +8463,20 @@
                 <a:solidFill>
                   <a:schemeClr val="dk1"/>
                 </a:solidFill>
-                <a:latin typeface="Roboto"/>
-                <a:ea typeface="Roboto"/>
-                <a:cs typeface="Roboto"/>
-                <a:sym typeface="Roboto"/>
+                <a:uFill>
+                  <a:noFill/>
+                </a:uFill>
+                <a:latin typeface="Roboto"/>
+                <a:ea typeface="Roboto"/>
+                <a:cs typeface="Roboto"/>
+                <a:sym typeface="Roboto"/>
+                <a:hlinkClick r:id="rId11">
+                  <a:extLst>
+                    <a:ext uri="{A12FA001-AC4F-418D-AE19-62706E023703}">
+                      <ahyp:hlinkClr val="tx"/>
+                    </a:ext>
+                  </a:extLst>
+                </a:hlinkClick>
               </a:rPr>
               <a:t>d</a:t>
             </a:r>
@@ -8355,12 +8485,68 @@
                 <a:solidFill>
                   <a:schemeClr val="dk1"/>
                 </a:solidFill>
-                <a:latin typeface="Roboto"/>
-                <a:ea typeface="Roboto"/>
-                <a:cs typeface="Roboto"/>
-                <a:sym typeface="Roboto"/>
-              </a:rPr>
-              <a:t>erive_extreme_event()</a:t>
+                <a:uFill>
+                  <a:noFill/>
+                </a:uFill>
+                <a:latin typeface="Roboto"/>
+                <a:ea typeface="Roboto"/>
+                <a:cs typeface="Roboto"/>
+                <a:sym typeface="Roboto"/>
+                <a:hlinkClick r:id="rId12">
+                  <a:extLst>
+                    <a:ext uri="{A12FA001-AC4F-418D-AE19-62706E023703}">
+                      <ahyp:hlinkClr val="tx"/>
+                    </a:ext>
+                  </a:extLst>
+                </a:hlinkClick>
+              </a:rPr>
+              <a:t>erive_extreme_event</a:t>
+            </a:r>
+            <a:r>
+              <a:rPr b="1" lang="en" sz="900">
+                <a:solidFill>
+                  <a:schemeClr val="dk1"/>
+                </a:solidFill>
+                <a:latin typeface="Roboto"/>
+                <a:ea typeface="Roboto"/>
+                <a:cs typeface="Roboto"/>
+                <a:sym typeface="Roboto"/>
+              </a:rPr>
+              <a:t>(), </a:t>
+            </a:r>
+            <a:r>
+              <a:rPr b="1" lang="en" sz="900">
+                <a:solidFill>
+                  <a:schemeClr val="dk1"/>
+                </a:solidFill>
+                <a:uFill>
+                  <a:noFill/>
+                </a:uFill>
+                <a:latin typeface="Roboto"/>
+                <a:ea typeface="Roboto"/>
+                <a:cs typeface="Roboto"/>
+                <a:sym typeface="Roboto"/>
+                <a:hlinkClick r:id="rId13">
+                  <a:extLst>
+                    <a:ext uri="{A12FA001-AC4F-418D-AE19-62706E023703}">
+                      <ahyp:hlinkClr val="tx"/>
+                    </a:ext>
+                  </a:extLst>
+                </a:hlinkClick>
+              </a:rPr>
+              <a:t>derive_param_exposure</a:t>
+            </a:r>
+            <a:r>
+              <a:rPr b="1" lang="en" sz="900">
+                <a:solidFill>
+                  <a:schemeClr val="dk1"/>
+                </a:solidFill>
+                <a:latin typeface="Roboto"/>
+                <a:ea typeface="Roboto"/>
+                <a:cs typeface="Roboto"/>
+                <a:sym typeface="Roboto"/>
+              </a:rPr>
+              <a:t>(),</a:t>
             </a:r>
             <a:endParaRPr b="1" sz="900">
               <a:solidFill>
@@ -8380,6 +8566,11 @@
               <a:spcAft>
                 <a:spcPts val="0"/>
               </a:spcAft>
+              <a:buClr>
+                <a:schemeClr val="dk1"/>
+              </a:buClr>
+              <a:buSzPts val="1100"/>
+              <a:buFont typeface="Arial"/>
               <a:buNone/>
             </a:pPr>
             <a:r>
@@ -8387,33 +8578,23 @@
                 <a:solidFill>
                   <a:schemeClr val="dk1"/>
                 </a:solidFill>
-                <a:latin typeface="Roboto"/>
-                <a:ea typeface="Roboto"/>
-                <a:cs typeface="Roboto"/>
-                <a:sym typeface="Roboto"/>
-              </a:rPr>
-              <a:t>derive_locf_records()</a:t>
-            </a:r>
-            <a:endParaRPr b="1" sz="900">
-              <a:solidFill>
-                <a:schemeClr val="dk1"/>
-              </a:solidFill>
-              <a:latin typeface="Roboto"/>
-              <a:ea typeface="Roboto"/>
-              <a:cs typeface="Roboto"/>
-              <a:sym typeface="Roboto"/>
-            </a:endParaRPr>
-          </a:p>
-          <a:p>
-            <a:pPr indent="0" lvl="0" marL="0" rtl="0" algn="l">
-              <a:spcBef>
-                <a:spcPts val="0"/>
-              </a:spcBef>
-              <a:spcAft>
-                <a:spcPts val="0"/>
-              </a:spcAft>
-              <a:buNone/>
-            </a:pPr>
+                <a:uFill>
+                  <a:noFill/>
+                </a:uFill>
+                <a:latin typeface="Roboto"/>
+                <a:ea typeface="Roboto"/>
+                <a:cs typeface="Roboto"/>
+                <a:sym typeface="Roboto"/>
+                <a:hlinkClick r:id="rId14">
+                  <a:extLst>
+                    <a:ext uri="{A12FA001-AC4F-418D-AE19-62706E023703}">
+                      <ahyp:hlinkClr val="tx"/>
+                    </a:ext>
+                  </a:extLst>
+                </a:hlinkClick>
+              </a:rPr>
+              <a:t>derive_summary_records</a:t>
+            </a:r>
             <a:r>
               <a:rPr b="1" lang="en" sz="900">
                 <a:solidFill>
@@ -8424,39 +8605,7 @@
                 <a:cs typeface="Roboto"/>
                 <a:sym typeface="Roboto"/>
               </a:rPr>
-              <a:t>derive_param_exposure()</a:t>
-            </a:r>
-            <a:endParaRPr b="1" sz="900">
-              <a:solidFill>
-                <a:schemeClr val="dk1"/>
-              </a:solidFill>
-              <a:latin typeface="Roboto"/>
-              <a:ea typeface="Roboto"/>
-              <a:cs typeface="Roboto"/>
-              <a:sym typeface="Roboto"/>
-            </a:endParaRPr>
-          </a:p>
-          <a:p>
-            <a:pPr indent="0" lvl="0" marL="0" rtl="0" algn="l">
-              <a:spcBef>
-                <a:spcPts val="0"/>
-              </a:spcBef>
-              <a:spcAft>
-                <a:spcPts val="0"/>
-              </a:spcAft>
-              <a:buNone/>
-            </a:pPr>
-            <a:r>
-              <a:rPr b="1" lang="en" sz="900">
-                <a:solidFill>
-                  <a:schemeClr val="dk1"/>
-                </a:solidFill>
-                <a:latin typeface="Roboto"/>
-                <a:ea typeface="Roboto"/>
-                <a:cs typeface="Roboto"/>
-                <a:sym typeface="Roboto"/>
-              </a:rPr>
-              <a:t>derive_summary_records()</a:t>
+              <a:t>()</a:t>
             </a:r>
             <a:endParaRPr b="1" sz="900">
               <a:solidFill>
@@ -8570,8 +8719,8 @@
         </p:nvSpPr>
         <p:spPr>
           <a:xfrm>
-            <a:off x="1059875" y="6773550"/>
-            <a:ext cx="2361900" cy="600300"/>
+            <a:off x="354550" y="6785250"/>
+            <a:ext cx="3114600" cy="738900"/>
           </a:xfrm>
           <a:prstGeom prst="rect">
             <a:avLst/>
@@ -8606,7 +8755,7 @@
                 <a:cs typeface="Roboto"/>
                 <a:sym typeface="Roboto"/>
               </a:rPr>
-              <a:t>Notable others:</a:t>
+              <a:t>Notable others</a:t>
             </a:r>
             <a:endParaRPr sz="900" u="sng">
               <a:solidFill>
@@ -8640,7 +8789,7 @@
                 <a:ea typeface="Roboto"/>
                 <a:cs typeface="Roboto"/>
                 <a:sym typeface="Roboto"/>
-                <a:hlinkClick r:id="rId9">
+                <a:hlinkClick r:id="rId15">
                   <a:extLst>
                     <a:ext uri="{A12FA001-AC4F-418D-AE19-62706E023703}">
                       <ahyp:hlinkClr val="tx"/>
@@ -8662,7 +8811,7 @@
                 <a:ea typeface="Roboto"/>
                 <a:cs typeface="Roboto"/>
                 <a:sym typeface="Roboto"/>
-                <a:hlinkClick r:id="rId10">
+                <a:hlinkClick r:id="rId16">
                   <a:extLst>
                     <a:ext uri="{A12FA001-AC4F-418D-AE19-62706E023703}">
                       <ahyp:hlinkClr val="tx"/>
@@ -8682,28 +8831,8 @@
                 <a:cs typeface="Roboto"/>
                 <a:sym typeface="Roboto"/>
               </a:rPr>
-              <a:t>()</a:t>
-            </a:r>
-            <a:endParaRPr b="1" sz="900">
-              <a:solidFill>
-                <a:schemeClr val="dk1"/>
-              </a:solidFill>
-              <a:latin typeface="Roboto"/>
-              <a:ea typeface="Roboto"/>
-              <a:cs typeface="Roboto"/>
-              <a:sym typeface="Roboto"/>
-            </a:endParaRPr>
-          </a:p>
-          <a:p>
-            <a:pPr indent="0" lvl="0" marL="0" rtl="0" algn="l">
-              <a:spcBef>
-                <a:spcPts val="0"/>
-              </a:spcBef>
-              <a:spcAft>
-                <a:spcPts val="0"/>
-              </a:spcAft>
-              <a:buNone/>
-            </a:pPr>
+              <a:t>(), </a:t>
+            </a:r>
             <a:r>
               <a:rPr b="1" lang="en" sz="900">
                 <a:solidFill>
@@ -8716,7 +8845,7 @@
                 <a:ea typeface="Roboto"/>
                 <a:cs typeface="Roboto"/>
                 <a:sym typeface="Roboto"/>
-                <a:hlinkClick r:id="rId11">
+                <a:hlinkClick r:id="rId17">
                   <a:extLst>
                     <a:ext uri="{A12FA001-AC4F-418D-AE19-62706E023703}">
                       <ahyp:hlinkClr val="tx"/>
@@ -8724,8 +8853,40 @@
                   </a:extLst>
                 </a:hlinkClick>
               </a:rPr>
-              <a:t>d</a:t>
-            </a:r>
+              <a:t>derive_var_merged_ef_msrc</a:t>
+            </a:r>
+            <a:r>
+              <a:rPr b="1" lang="en" sz="900">
+                <a:solidFill>
+                  <a:schemeClr val="dk1"/>
+                </a:solidFill>
+                <a:latin typeface="Roboto"/>
+                <a:ea typeface="Roboto"/>
+                <a:cs typeface="Roboto"/>
+                <a:sym typeface="Roboto"/>
+              </a:rPr>
+              <a:t>()</a:t>
+            </a:r>
+            <a:endParaRPr b="1" sz="900">
+              <a:solidFill>
+                <a:schemeClr val="dk1"/>
+              </a:solidFill>
+              <a:latin typeface="Roboto"/>
+              <a:ea typeface="Roboto"/>
+              <a:cs typeface="Roboto"/>
+              <a:sym typeface="Roboto"/>
+            </a:endParaRPr>
+          </a:p>
+          <a:p>
+            <a:pPr indent="0" lvl="0" marL="0" rtl="0" algn="l">
+              <a:spcBef>
+                <a:spcPts val="0"/>
+              </a:spcBef>
+              <a:spcAft>
+                <a:spcPts val="0"/>
+              </a:spcAft>
+              <a:buNone/>
+            </a:pPr>
             <a:r>
               <a:rPr b="1" lang="en" sz="900">
                 <a:solidFill>
@@ -8738,7 +8899,7 @@
                 <a:ea typeface="Roboto"/>
                 <a:cs typeface="Roboto"/>
                 <a:sym typeface="Roboto"/>
-                <a:hlinkClick r:id="rId12">
+                <a:hlinkClick r:id="rId18">
                   <a:extLst>
                     <a:ext uri="{A12FA001-AC4F-418D-AE19-62706E023703}">
                       <ahyp:hlinkClr val="tx"/>
@@ -8746,7 +8907,151 @@
                   </a:extLst>
                 </a:hlinkClick>
               </a:rPr>
+              <a:t>d</a:t>
+            </a:r>
+            <a:r>
+              <a:rPr b="1" lang="en" sz="900">
+                <a:solidFill>
+                  <a:schemeClr val="dk1"/>
+                </a:solidFill>
+                <a:uFill>
+                  <a:noFill/>
+                </a:uFill>
+                <a:latin typeface="Roboto"/>
+                <a:ea typeface="Roboto"/>
+                <a:cs typeface="Roboto"/>
+                <a:sym typeface="Roboto"/>
+                <a:hlinkClick r:id="rId19">
+                  <a:extLst>
+                    <a:ext uri="{A12FA001-AC4F-418D-AE19-62706E023703}">
+                      <ahyp:hlinkClr val="tx"/>
+                    </a:ext>
+                  </a:extLst>
+                </a:hlinkClick>
+              </a:rPr>
+              <a:t>erive_vars_computed</a:t>
+            </a:r>
+            <a:r>
+              <a:rPr b="1" lang="en" sz="900">
+                <a:solidFill>
+                  <a:schemeClr val="dk1"/>
+                </a:solidFill>
+                <a:latin typeface="Roboto"/>
+                <a:ea typeface="Roboto"/>
+                <a:cs typeface="Roboto"/>
+                <a:sym typeface="Roboto"/>
+              </a:rPr>
+              <a:t>(), </a:t>
+            </a:r>
+            <a:r>
+              <a:rPr b="1" lang="en" sz="900">
+                <a:solidFill>
+                  <a:schemeClr val="dk1"/>
+                </a:solidFill>
+                <a:uFill>
+                  <a:noFill/>
+                </a:uFill>
+                <a:latin typeface="Roboto"/>
+                <a:ea typeface="Roboto"/>
+                <a:cs typeface="Roboto"/>
+                <a:sym typeface="Roboto"/>
+                <a:hlinkClick r:id="rId20">
+                  <a:extLst>
+                    <a:ext uri="{A12FA001-AC4F-418D-AE19-62706E023703}">
+                      <ahyp:hlinkClr val="tx"/>
+                    </a:ext>
+                  </a:extLst>
+                </a:hlinkClick>
+              </a:rPr>
+              <a:t>d</a:t>
+            </a:r>
+            <a:r>
+              <a:rPr b="1" lang="en" sz="900">
+                <a:solidFill>
+                  <a:schemeClr val="dk1"/>
+                </a:solidFill>
+                <a:uFill>
+                  <a:noFill/>
+                </a:uFill>
+                <a:latin typeface="Roboto"/>
+                <a:ea typeface="Roboto"/>
+                <a:cs typeface="Roboto"/>
+                <a:sym typeface="Roboto"/>
+                <a:hlinkClick r:id="rId21">
+                  <a:extLst>
+                    <a:ext uri="{A12FA001-AC4F-418D-AE19-62706E023703}">
+                      <ahyp:hlinkClr val="tx"/>
+                    </a:ext>
+                  </a:extLst>
+                </a:hlinkClick>
+              </a:rPr>
               <a:t>erive_var_merged_summary</a:t>
+            </a:r>
+            <a:r>
+              <a:rPr b="1" lang="en" sz="900">
+                <a:solidFill>
+                  <a:schemeClr val="dk1"/>
+                </a:solidFill>
+                <a:latin typeface="Roboto"/>
+                <a:ea typeface="Roboto"/>
+                <a:cs typeface="Roboto"/>
+                <a:sym typeface="Roboto"/>
+              </a:rPr>
+              <a:t>()</a:t>
+            </a:r>
+            <a:endParaRPr b="1" sz="900">
+              <a:solidFill>
+                <a:schemeClr val="dk1"/>
+              </a:solidFill>
+              <a:latin typeface="Roboto"/>
+              <a:ea typeface="Roboto"/>
+              <a:cs typeface="Roboto"/>
+              <a:sym typeface="Roboto"/>
+            </a:endParaRPr>
+          </a:p>
+          <a:p>
+            <a:pPr indent="0" lvl="0" marL="0" rtl="0" algn="l">
+              <a:spcBef>
+                <a:spcPts val="0"/>
+              </a:spcBef>
+              <a:spcAft>
+                <a:spcPts val="0"/>
+              </a:spcAft>
+              <a:buNone/>
+            </a:pPr>
+            <a:r>
+              <a:rPr b="1" lang="en" sz="900">
+                <a:solidFill>
+                  <a:schemeClr val="dk1"/>
+                </a:solidFill>
+                <a:latin typeface="Roboto"/>
+                <a:ea typeface="Roboto"/>
+                <a:cs typeface="Roboto"/>
+                <a:sym typeface="Roboto"/>
+              </a:rPr>
+              <a:t>                             </a:t>
+            </a:r>
+            <a:r>
+              <a:rPr b="1" lang="en" sz="900">
+                <a:solidFill>
+                  <a:schemeClr val="dk1"/>
+                </a:solidFill>
+                <a:uFill>
+                  <a:noFill/>
+                </a:uFill>
+                <a:latin typeface="Roboto"/>
+                <a:ea typeface="Roboto"/>
+                <a:cs typeface="Roboto"/>
+                <a:sym typeface="Roboto"/>
+                <a:hlinkClick r:id="rId22">
+                  <a:extLst>
+                    <a:ext uri="{A12FA001-AC4F-418D-AE19-62706E023703}">
+                      <ahyp:hlinkClr val="tx"/>
+                    </a:ext>
+                  </a:extLst>
+                </a:hlinkClick>
+              </a:rPr>
+              <a:t>derive_vars_extreme_event</a:t>
             </a:r>
             <a:r>
               <a:rPr b="1" lang="en" sz="900">
@@ -8779,7 +9084,7 @@
           <p:nvPr/>
         </p:nvPicPr>
         <p:blipFill>
-          <a:blip r:embed="rId13">
+          <a:blip r:embed="rId23">
             <a:alphaModFix/>
           </a:blip>
           <a:stretch>
@@ -8807,7 +9112,7 @@
           <p:nvPr/>
         </p:nvPicPr>
         <p:blipFill>
-          <a:blip r:embed="rId14">
+          <a:blip r:embed="rId24">
             <a:alphaModFix/>
           </a:blip>
           <a:stretch>
@@ -8835,7 +9140,7 @@
           <p:nvPr/>
         </p:nvPicPr>
         <p:blipFill>
-          <a:blip r:embed="rId15">
+          <a:blip r:embed="rId25">
             <a:alphaModFix/>
           </a:blip>
           <a:stretch>
@@ -8844,7 +9149,7 @@
         </p:blipFill>
         <p:spPr>
           <a:xfrm>
-            <a:off x="3732750" y="3962149"/>
+            <a:off x="3732750" y="3903588"/>
             <a:ext cx="660878" cy="2289926"/>
           </a:xfrm>
           <a:prstGeom prst="rect">
@@ -8908,7 +9213,7 @@
                 <a:ea typeface="Roboto"/>
                 <a:cs typeface="Roboto"/>
                 <a:sym typeface="Roboto"/>
-                <a:hlinkClick r:id="rId16"/>
+                <a:hlinkClick r:id="rId26"/>
               </a:rPr>
               <a:t>Github Repo</a:t>
             </a:r>
@@ -8930,7 +9235,7 @@
                 <a:ea typeface="Roboto"/>
                 <a:cs typeface="Roboto"/>
                 <a:sym typeface="Roboto"/>
-                <a:hlinkClick r:id="rId17"/>
+                <a:hlinkClick r:id="rId27"/>
               </a:rPr>
               <a:t>Documentation</a:t>
             </a:r>
@@ -8952,7 +9257,7 @@
                 <a:ea typeface="Roboto"/>
                 <a:cs typeface="Roboto"/>
                 <a:sym typeface="Roboto"/>
-                <a:hlinkClick r:id="rId18"/>
+                <a:hlinkClick r:id="rId28"/>
               </a:rPr>
               <a:t>Join the Pharmaverse Slack</a:t>
             </a:r>
@@ -8981,7 +9286,7 @@
           <p:nvPr/>
         </p:nvPicPr>
         <p:blipFill>
-          <a:blip r:embed="rId19">
+          <a:blip r:embed="rId29">
             <a:alphaModFix/>
           </a:blip>
           <a:stretch>
@@ -9206,7 +9511,7 @@
                 <a:ea typeface="Roboto"/>
                 <a:cs typeface="Roboto"/>
                 <a:sym typeface="Roboto"/>
-                <a:hlinkClick r:id="rId20">
+                <a:hlinkClick r:id="rId30">
                   <a:extLst>
                     <a:ext uri="{A12FA001-AC4F-418D-AE19-62706E023703}">
                       <ahyp:hlinkClr val="tx"/>
@@ -9447,7 +9752,7 @@
                 <a:ea typeface="Roboto"/>
                 <a:cs typeface="Roboto"/>
                 <a:sym typeface="Roboto"/>
-                <a:hlinkClick r:id="rId21">
+                <a:hlinkClick r:id="rId31">
                   <a:extLst>
                     <a:ext uri="{A12FA001-AC4F-418D-AE19-62706E023703}">
                       <ahyp:hlinkClr val="tx"/>
@@ -9779,7 +10084,7 @@
                 <a:ea typeface="Roboto"/>
                 <a:cs typeface="Roboto"/>
                 <a:sym typeface="Roboto"/>
-                <a:hlinkClick r:id="rId22">
+                <a:hlinkClick r:id="rId32">
                   <a:extLst>
                     <a:ext uri="{A12FA001-AC4F-418D-AE19-62706E023703}">
                       <ahyp:hlinkClr val="tx"/>
@@ -10129,7 +10434,7 @@
                 <a:ea typeface="Roboto"/>
                 <a:cs typeface="Roboto"/>
                 <a:sym typeface="Roboto"/>
-                <a:hlinkClick r:id="rId23">
+                <a:hlinkClick r:id="rId33">
                   <a:extLst>
                     <a:ext uri="{A12FA001-AC4F-418D-AE19-62706E023703}">
                       <ahyp:hlinkClr val="tx"/>
@@ -10390,7 +10695,7 @@
           <p:nvPr/>
         </p:nvPicPr>
         <p:blipFill>
-          <a:blip r:embed="rId24">
+          <a:blip r:embed="rId34">
             <a:alphaModFix/>
           </a:blip>
           <a:stretch>
@@ -10631,7 +10936,7 @@
                 <a:ea typeface="Roboto"/>
                 <a:cs typeface="Roboto"/>
                 <a:sym typeface="Roboto"/>
-                <a:hlinkClick r:id="rId25">
+                <a:hlinkClick r:id="rId35">
                   <a:extLst>
                     <a:ext uri="{A12FA001-AC4F-418D-AE19-62706E023703}">
                       <ahyp:hlinkClr val="tx"/>
@@ -10685,7 +10990,7 @@
                 <a:ea typeface="Roboto"/>
                 <a:cs typeface="Roboto"/>
                 <a:sym typeface="Roboto"/>
-                <a:hlinkClick r:id="rId26">
+                <a:hlinkClick r:id="rId36">
                   <a:extLst>
                     <a:ext uri="{A12FA001-AC4F-418D-AE19-62706E023703}">
                       <ahyp:hlinkClr val="tx"/>
@@ -10739,7 +11044,7 @@
                 <a:ea typeface="Roboto"/>
                 <a:cs typeface="Roboto"/>
                 <a:sym typeface="Roboto"/>
-                <a:hlinkClick r:id="rId27">
+                <a:hlinkClick r:id="rId37">
                   <a:extLst>
                     <a:ext uri="{A12FA001-AC4F-418D-AE19-62706E023703}">
                       <ahyp:hlinkClr val="tx"/>
@@ -10793,7 +11098,7 @@
                 <a:ea typeface="Roboto"/>
                 <a:cs typeface="Roboto"/>
                 <a:sym typeface="Roboto"/>
-                <a:hlinkClick r:id="rId28">
+                <a:hlinkClick r:id="rId38">
                   <a:extLst>
                     <a:ext uri="{A12FA001-AC4F-418D-AE19-62706E023703}">
                       <ahyp:hlinkClr val="tx"/>
@@ -10847,7 +11152,7 @@
                 <a:ea typeface="Roboto"/>
                 <a:cs typeface="Roboto"/>
                 <a:sym typeface="Roboto"/>
-                <a:hlinkClick r:id="rId29">
+                <a:hlinkClick r:id="rId39">
                   <a:extLst>
                     <a:ext uri="{A12FA001-AC4F-418D-AE19-62706E023703}">
                       <ahyp:hlinkClr val="tx"/>
@@ -10996,7 +11301,7 @@
                 <a:ea typeface="Roboto"/>
                 <a:cs typeface="Roboto"/>
                 <a:sym typeface="Roboto"/>
-                <a:hlinkClick r:id="rId30">
+                <a:hlinkClick r:id="rId40">
                   <a:extLst>
                     <a:ext uri="{A12FA001-AC4F-418D-AE19-62706E023703}">
                       <ahyp:hlinkClr val="tx"/>
@@ -11050,7 +11355,7 @@
                 <a:ea typeface="Roboto"/>
                 <a:cs typeface="Roboto"/>
                 <a:sym typeface="Roboto"/>
-                <a:hlinkClick r:id="rId31">
+                <a:hlinkClick r:id="rId41">
                   <a:extLst>
                     <a:ext uri="{A12FA001-AC4F-418D-AE19-62706E023703}">
                       <ahyp:hlinkClr val="tx"/>
@@ -11104,7 +11409,7 @@
                 <a:ea typeface="Roboto"/>
                 <a:cs typeface="Roboto"/>
                 <a:sym typeface="Roboto"/>
-                <a:hlinkClick r:id="rId32">
+                <a:hlinkClick r:id="rId42">
                   <a:extLst>
                     <a:ext uri="{A12FA001-AC4F-418D-AE19-62706E023703}">
                       <ahyp:hlinkClr val="tx"/>
@@ -11126,7 +11431,7 @@
                 <a:ea typeface="Roboto"/>
                 <a:cs typeface="Roboto"/>
                 <a:sym typeface="Roboto"/>
-                <a:hlinkClick r:id="rId33">
+                <a:hlinkClick r:id="rId43">
                   <a:extLst>
                     <a:ext uri="{A12FA001-AC4F-418D-AE19-62706E023703}">
                       <ahyp:hlinkClr val="tx"/>
@@ -11148,7 +11453,7 @@
                 <a:ea typeface="Roboto"/>
                 <a:cs typeface="Roboto"/>
                 <a:sym typeface="Roboto"/>
-                <a:hlinkClick r:id="rId34">
+                <a:hlinkClick r:id="rId44">
                   <a:extLst>
                     <a:ext uri="{A12FA001-AC4F-418D-AE19-62706E023703}">
                       <ahyp:hlinkClr val="tx"/>
@@ -11202,7 +11507,7 @@
                 <a:ea typeface="Roboto"/>
                 <a:cs typeface="Roboto"/>
                 <a:sym typeface="Roboto"/>
-                <a:hlinkClick r:id="rId35">
+                <a:hlinkClick r:id="rId45">
                   <a:extLst>
                     <a:ext uri="{A12FA001-AC4F-418D-AE19-62706E023703}">
                       <ahyp:hlinkClr val="tx"/>
@@ -11313,7 +11618,7 @@
         </p:nvSpPr>
         <p:spPr>
           <a:xfrm>
-            <a:off x="3896513" y="6796193"/>
+            <a:off x="3896513" y="6807905"/>
             <a:ext cx="2851200" cy="555000"/>
           </a:xfrm>
           <a:prstGeom prst="rect">
@@ -11357,7 +11662,7 @@
                 <a:ea typeface="Roboto"/>
                 <a:cs typeface="Roboto"/>
                 <a:sym typeface="Roboto"/>
-                <a:hlinkClick r:id="rId36"/>
+                <a:hlinkClick r:id="rId46"/>
               </a:rPr>
               <a:t>reference page</a:t>
             </a:r>
@@ -14790,231 +15095,7 @@
         </p:nvSpPr>
         <p:spPr>
           <a:xfrm>
-            <a:off x="319900" y="1053725"/>
-            <a:ext cx="3209700" cy="593400"/>
-          </a:xfrm>
-          <a:prstGeom prst="rect">
-            <a:avLst/>
-          </a:prstGeom>
-          <a:noFill/>
-          <a:ln>
-            <a:noFill/>
-          </a:ln>
-        </p:spPr>
-        <p:txBody>
-          <a:bodyPr anchorCtr="0" anchor="t" bIns="91425" lIns="91425" spcFirstLastPara="1" rIns="91425" wrap="square" tIns="91425">
-            <a:noAutofit/>
-          </a:bodyPr>
-          <a:lstStyle/>
-          <a:p>
-            <a:pPr indent="0" lvl="0" marL="0" rtl="0" algn="l">
-              <a:spcBef>
-                <a:spcPts val="0"/>
-              </a:spcBef>
-              <a:spcAft>
-                <a:spcPts val="0"/>
-              </a:spcAft>
-              <a:buNone/>
-            </a:pPr>
-            <a:r>
-              <a:rPr b="1" lang="en" sz="900">
-                <a:solidFill>
-                  <a:schemeClr val="dk1"/>
-                </a:solidFill>
-                <a:uFill>
-                  <a:noFill/>
-                </a:uFill>
-                <a:latin typeface="Roboto"/>
-                <a:ea typeface="Roboto"/>
-                <a:cs typeface="Roboto"/>
-                <a:sym typeface="Roboto"/>
-                <a:hlinkClick r:id="rId21">
-                  <a:extLst>
-                    <a:ext uri="{A12FA001-AC4F-418D-AE19-62706E023703}">
-                      <ahyp:hlinkClr val="tx"/>
-                    </a:ext>
-                  </a:extLst>
-                </a:hlinkClick>
-              </a:rPr>
-              <a:t>derive_var_dthcaus</a:t>
-            </a:r>
-            <a:r>
-              <a:rPr lang="en" sz="900">
-                <a:solidFill>
-                  <a:srgbClr val="9E9E9E"/>
-                </a:solidFill>
-                <a:latin typeface="Roboto"/>
-                <a:ea typeface="Roboto"/>
-                <a:cs typeface="Roboto"/>
-                <a:sym typeface="Roboto"/>
-              </a:rPr>
-              <a:t>(dataset, source_datasets, …)</a:t>
-            </a:r>
-            <a:endParaRPr sz="900">
-              <a:solidFill>
-                <a:srgbClr val="9E9E9E"/>
-              </a:solidFill>
-              <a:latin typeface="Roboto"/>
-              <a:ea typeface="Roboto"/>
-              <a:cs typeface="Roboto"/>
-              <a:sym typeface="Roboto"/>
-            </a:endParaRPr>
-          </a:p>
-          <a:p>
-            <a:pPr indent="0" lvl="0" marL="0" rtl="0" algn="l">
-              <a:spcBef>
-                <a:spcPts val="0"/>
-              </a:spcBef>
-              <a:spcAft>
-                <a:spcPts val="0"/>
-              </a:spcAft>
-              <a:buNone/>
-            </a:pPr>
-            <a:r>
-              <a:rPr lang="en" sz="900">
-                <a:solidFill>
-                  <a:schemeClr val="dk1"/>
-                </a:solidFill>
-                <a:latin typeface="Roboto"/>
-                <a:ea typeface="Roboto"/>
-                <a:cs typeface="Roboto"/>
-                <a:sym typeface="Roboto"/>
-              </a:rPr>
-              <a:t>Derive death cause (DTHCAUS) and traceability variables if required.</a:t>
-            </a:r>
-            <a:endParaRPr sz="900">
-              <a:solidFill>
-                <a:schemeClr val="dk1"/>
-              </a:solidFill>
-              <a:latin typeface="Roboto"/>
-              <a:ea typeface="Roboto"/>
-              <a:cs typeface="Roboto"/>
-              <a:sym typeface="Roboto"/>
-            </a:endParaRPr>
-          </a:p>
-        </p:txBody>
-      </p:sp>
-      <p:sp>
-        <p:nvSpPr>
-          <p:cNvPr id="117" name="Google Shape;117;p14"/>
-          <p:cNvSpPr txBox="1"/>
-          <p:nvPr/>
-        </p:nvSpPr>
-        <p:spPr>
-          <a:xfrm>
-            <a:off x="319900" y="1508775"/>
-            <a:ext cx="3209700" cy="593400"/>
-          </a:xfrm>
-          <a:prstGeom prst="rect">
-            <a:avLst/>
-          </a:prstGeom>
-          <a:noFill/>
-          <a:ln>
-            <a:noFill/>
-          </a:ln>
-        </p:spPr>
-        <p:txBody>
-          <a:bodyPr anchorCtr="0" anchor="t" bIns="91425" lIns="91425" spcFirstLastPara="1" rIns="91425" wrap="square" tIns="91425">
-            <a:noAutofit/>
-          </a:bodyPr>
-          <a:lstStyle/>
-          <a:p>
-            <a:pPr indent="0" lvl="0" marL="0" rtl="0" algn="l">
-              <a:spcBef>
-                <a:spcPts val="0"/>
-              </a:spcBef>
-              <a:spcAft>
-                <a:spcPts val="0"/>
-              </a:spcAft>
-              <a:buNone/>
-            </a:pPr>
-            <a:r>
-              <a:rPr b="1" lang="en" sz="900">
-                <a:solidFill>
-                  <a:schemeClr val="dk1"/>
-                </a:solidFill>
-                <a:uFill>
-                  <a:noFill/>
-                </a:uFill>
-                <a:latin typeface="Roboto"/>
-                <a:ea typeface="Roboto"/>
-                <a:cs typeface="Roboto"/>
-                <a:sym typeface="Roboto"/>
-                <a:hlinkClick r:id="rId22">
-                  <a:extLst>
-                    <a:ext uri="{A12FA001-AC4F-418D-AE19-62706E023703}">
-                      <ahyp:hlinkClr val="tx"/>
-                    </a:ext>
-                  </a:extLst>
-                </a:hlinkClick>
-              </a:rPr>
-              <a:t>derive_var_extreme_dt/dtm</a:t>
-            </a:r>
-            <a:r>
-              <a:rPr lang="en" sz="900">
-                <a:solidFill>
-                  <a:srgbClr val="9E9E9E"/>
-                </a:solidFill>
-                <a:latin typeface="Roboto"/>
-                <a:ea typeface="Roboto"/>
-                <a:cs typeface="Roboto"/>
-                <a:sym typeface="Roboto"/>
-              </a:rPr>
-              <a:t>(dataset, new_var, source_datasets, mode, …)</a:t>
-            </a:r>
-            <a:endParaRPr sz="900">
-              <a:solidFill>
-                <a:srgbClr val="9E9E9E"/>
-              </a:solidFill>
-              <a:latin typeface="Roboto"/>
-              <a:ea typeface="Roboto"/>
-              <a:cs typeface="Roboto"/>
-              <a:sym typeface="Roboto"/>
-            </a:endParaRPr>
-          </a:p>
-          <a:p>
-            <a:pPr indent="0" lvl="0" marL="0" rtl="0" algn="l">
-              <a:spcBef>
-                <a:spcPts val="0"/>
-              </a:spcBef>
-              <a:spcAft>
-                <a:spcPts val="0"/>
-              </a:spcAft>
-              <a:buNone/>
-            </a:pPr>
-            <a:r>
-              <a:rPr lang="en" sz="900">
-                <a:solidFill>
-                  <a:schemeClr val="dk1"/>
-                </a:solidFill>
-                <a:latin typeface="Roboto"/>
-                <a:ea typeface="Roboto"/>
-                <a:cs typeface="Roboto"/>
-                <a:sym typeface="Roboto"/>
-              </a:rPr>
-              <a:t>Derive the first or last date from multiple sources to the dataset, e.g., the last known alive date/datetime.</a:t>
-            </a:r>
-            <a:endParaRPr sz="900">
-              <a:solidFill>
-                <a:schemeClr val="dk1"/>
-              </a:solidFill>
-              <a:latin typeface="Roboto"/>
-              <a:ea typeface="Roboto"/>
-              <a:cs typeface="Roboto"/>
-              <a:sym typeface="Roboto"/>
-            </a:endParaRPr>
-          </a:p>
-        </p:txBody>
-      </p:sp>
-      <p:sp>
-        <p:nvSpPr>
-          <p:cNvPr id="118" name="Google Shape;118;p14"/>
-          <p:cNvSpPr txBox="1"/>
-          <p:nvPr/>
-        </p:nvSpPr>
-        <p:spPr>
-          <a:xfrm>
-            <a:off x="319900" y="2137636"/>
+            <a:off x="319900" y="1083535"/>
             <a:ext cx="3209700" cy="476400"/>
           </a:xfrm>
           <a:prstGeom prst="rect">
@@ -15052,7 +15133,7 @@
                 <a:ea typeface="Roboto"/>
                 <a:cs typeface="Roboto"/>
                 <a:sym typeface="Roboto"/>
-                <a:hlinkClick r:id="rId23">
+                <a:hlinkClick r:id="rId21">
                   <a:extLst>
                     <a:ext uri="{A12FA001-AC4F-418D-AE19-62706E023703}">
                       <ahyp:hlinkClr val="tx"/>
@@ -15120,13 +15201,13 @@
       </p:sp>
       <p:sp>
         <p:nvSpPr>
-          <p:cNvPr id="119" name="Google Shape;119;p14"/>
+          <p:cNvPr id="117" name="Google Shape;117;p14"/>
           <p:cNvSpPr txBox="1"/>
           <p:nvPr/>
         </p:nvSpPr>
         <p:spPr>
           <a:xfrm>
-            <a:off x="319900" y="2471475"/>
+            <a:off x="319900" y="1785675"/>
             <a:ext cx="3209700" cy="400200"/>
           </a:xfrm>
           <a:prstGeom prst="rect">
@@ -15164,7 +15245,7 @@
                 <a:ea typeface="Roboto"/>
                 <a:cs typeface="Roboto"/>
                 <a:sym typeface="Roboto"/>
-                <a:hlinkClick r:id="rId24">
+                <a:hlinkClick r:id="rId22">
                   <a:extLst>
                     <a:ext uri="{A12FA001-AC4F-418D-AE19-62706E023703}">
                       <ahyp:hlinkClr val="tx"/>
@@ -15264,13 +15345,13 @@
       </p:sp>
       <p:sp>
         <p:nvSpPr>
-          <p:cNvPr id="120" name="Google Shape;120;p14"/>
+          <p:cNvPr id="118" name="Google Shape;118;p14"/>
           <p:cNvSpPr txBox="1"/>
           <p:nvPr/>
         </p:nvSpPr>
         <p:spPr>
           <a:xfrm>
-            <a:off x="315400" y="3110875"/>
+            <a:off x="315400" y="2425075"/>
             <a:ext cx="3209700" cy="400200"/>
           </a:xfrm>
           <a:prstGeom prst="rect">
@@ -15308,7 +15389,7 @@
                 <a:ea typeface="Roboto"/>
                 <a:cs typeface="Roboto"/>
                 <a:sym typeface="Roboto"/>
-                <a:hlinkClick r:id="rId25">
+                <a:hlinkClick r:id="rId23">
                   <a:extLst>
                     <a:ext uri="{A12FA001-AC4F-418D-AE19-62706E023703}">
                       <ahyp:hlinkClr val="tx"/>
@@ -15376,13 +15457,13 @@
       </p:sp>
       <p:sp>
         <p:nvSpPr>
-          <p:cNvPr id="121" name="Google Shape;121;p14"/>
+          <p:cNvPr id="119" name="Google Shape;119;p14"/>
           <p:cNvSpPr txBox="1"/>
           <p:nvPr/>
         </p:nvSpPr>
         <p:spPr>
           <a:xfrm>
-            <a:off x="315400" y="3434875"/>
+            <a:off x="315400" y="2749075"/>
             <a:ext cx="3209700" cy="724200"/>
           </a:xfrm>
           <a:prstGeom prst="rect">
@@ -15420,7 +15501,7 @@
                 <a:ea typeface="Roboto"/>
                 <a:cs typeface="Roboto"/>
                 <a:sym typeface="Roboto"/>
-                <a:hlinkClick r:id="rId26">
+                <a:hlinkClick r:id="rId24">
                   <a:extLst>
                     <a:ext uri="{A12FA001-AC4F-418D-AE19-62706E023703}">
                       <ahyp:hlinkClr val="tx"/>
@@ -15488,13 +15569,13 @@
       </p:sp>
       <p:sp>
         <p:nvSpPr>
-          <p:cNvPr id="122" name="Google Shape;122;p14"/>
+          <p:cNvPr id="120" name="Google Shape;120;p14"/>
           <p:cNvSpPr txBox="1"/>
           <p:nvPr/>
         </p:nvSpPr>
         <p:spPr>
           <a:xfrm>
-            <a:off x="315400" y="4203275"/>
+            <a:off x="315400" y="3517475"/>
             <a:ext cx="3209700" cy="555000"/>
           </a:xfrm>
           <a:prstGeom prst="rect">
@@ -15532,7 +15613,7 @@
                 <a:ea typeface="Roboto"/>
                 <a:cs typeface="Roboto"/>
                 <a:sym typeface="Roboto"/>
-                <a:hlinkClick r:id="rId27">
+                <a:hlinkClick r:id="rId25">
                   <a:extLst>
                     <a:ext uri="{A12FA001-AC4F-418D-AE19-62706E023703}">
                       <ahyp:hlinkClr val="tx"/>
@@ -15600,13 +15681,13 @@
       </p:sp>
       <p:sp>
         <p:nvSpPr>
-          <p:cNvPr id="123" name="Google Shape;123;p14"/>
+          <p:cNvPr id="121" name="Google Shape;121;p14"/>
           <p:cNvSpPr txBox="1"/>
           <p:nvPr/>
         </p:nvSpPr>
         <p:spPr>
           <a:xfrm>
-            <a:off x="288250" y="4669831"/>
+            <a:off x="288250" y="4681543"/>
             <a:ext cx="3241200" cy="398100"/>
           </a:xfrm>
           <a:prstGeom prst="rect">
@@ -15704,13 +15785,13 @@
       </p:sp>
       <p:sp>
         <p:nvSpPr>
-          <p:cNvPr id="124" name="Google Shape;124;p14"/>
+          <p:cNvPr id="122" name="Google Shape;122;p14"/>
           <p:cNvSpPr txBox="1"/>
           <p:nvPr/>
         </p:nvSpPr>
         <p:spPr>
           <a:xfrm>
-            <a:off x="322022" y="4930758"/>
+            <a:off x="322022" y="4954182"/>
             <a:ext cx="3241200" cy="398100"/>
           </a:xfrm>
           <a:prstGeom prst="rect">
@@ -15760,7 +15841,7 @@
                 <a:ea typeface="Roboto"/>
                 <a:cs typeface="Roboto"/>
                 <a:sym typeface="Roboto"/>
-                <a:hlinkClick r:id="rId28">
+                <a:hlinkClick r:id="rId26">
                   <a:extLst>
                     <a:ext uri="{A12FA001-AC4F-418D-AE19-62706E023703}">
                       <ahyp:hlinkClr val="tx"/>
@@ -15851,13 +15932,13 @@
       </p:sp>
       <p:sp>
         <p:nvSpPr>
-          <p:cNvPr id="125" name="Google Shape;125;p14"/>
+          <p:cNvPr id="123" name="Google Shape;123;p14"/>
           <p:cNvSpPr txBox="1"/>
           <p:nvPr/>
         </p:nvSpPr>
         <p:spPr>
           <a:xfrm>
-            <a:off x="321872" y="5276108"/>
+            <a:off x="321872" y="5299532"/>
             <a:ext cx="3241200" cy="398100"/>
           </a:xfrm>
           <a:prstGeom prst="rect">
@@ -15907,7 +15988,7 @@
                 <a:ea typeface="Roboto"/>
                 <a:cs typeface="Roboto"/>
                 <a:sym typeface="Roboto"/>
-                <a:hlinkClick r:id="rId29">
+                <a:hlinkClick r:id="rId27">
                   <a:extLst>
                     <a:ext uri="{A12FA001-AC4F-418D-AE19-62706E023703}">
                       <ahyp:hlinkClr val="tx"/>
@@ -15975,13 +16056,13 @@
       </p:sp>
       <p:sp>
         <p:nvSpPr>
-          <p:cNvPr id="126" name="Google Shape;126;p14"/>
+          <p:cNvPr id="124" name="Google Shape;124;p14"/>
           <p:cNvSpPr txBox="1"/>
           <p:nvPr/>
         </p:nvSpPr>
         <p:spPr>
           <a:xfrm>
-            <a:off x="299897" y="5608108"/>
+            <a:off x="299897" y="5631532"/>
             <a:ext cx="3241200" cy="398100"/>
           </a:xfrm>
           <a:prstGeom prst="rect">
@@ -16031,7 +16112,7 @@
                 <a:ea typeface="Roboto"/>
                 <a:cs typeface="Roboto"/>
                 <a:sym typeface="Roboto"/>
-                <a:hlinkClick r:id="rId30">
+                <a:hlinkClick r:id="rId28">
                   <a:extLst>
                     <a:ext uri="{A12FA001-AC4F-418D-AE19-62706E023703}">
                       <ahyp:hlinkClr val="tx"/>
@@ -16099,13 +16180,13 @@
       </p:sp>
       <p:sp>
         <p:nvSpPr>
-          <p:cNvPr id="127" name="Google Shape;127;p14"/>
+          <p:cNvPr id="125" name="Google Shape;125;p14"/>
           <p:cNvSpPr txBox="1"/>
           <p:nvPr/>
         </p:nvSpPr>
         <p:spPr>
           <a:xfrm>
-            <a:off x="290372" y="5966971"/>
+            <a:off x="290372" y="5990395"/>
             <a:ext cx="3241200" cy="398100"/>
           </a:xfrm>
           <a:prstGeom prst="rect">
@@ -16143,7 +16224,7 @@
                 <a:ea typeface="Roboto"/>
                 <a:cs typeface="Roboto"/>
                 <a:sym typeface="Roboto"/>
-                <a:hlinkClick r:id="rId31">
+                <a:hlinkClick r:id="rId29">
                   <a:extLst>
                     <a:ext uri="{A12FA001-AC4F-418D-AE19-62706E023703}">
                       <ahyp:hlinkClr val="tx"/>
@@ -16235,13 +16316,13 @@
       </p:sp>
       <p:sp>
         <p:nvSpPr>
-          <p:cNvPr id="128" name="Google Shape;128;p14"/>
+          <p:cNvPr id="126" name="Google Shape;126;p14"/>
           <p:cNvSpPr txBox="1"/>
           <p:nvPr/>
         </p:nvSpPr>
         <p:spPr>
           <a:xfrm>
-            <a:off x="310861" y="6286468"/>
+            <a:off x="310861" y="6309892"/>
             <a:ext cx="3241200" cy="593400"/>
           </a:xfrm>
           <a:prstGeom prst="rect">
@@ -16279,7 +16360,7 @@
                 <a:ea typeface="Roboto"/>
                 <a:cs typeface="Roboto"/>
                 <a:sym typeface="Roboto"/>
-                <a:hlinkClick r:id="rId32">
+                <a:hlinkClick r:id="rId30">
                   <a:extLst>
                     <a:ext uri="{A12FA001-AC4F-418D-AE19-62706E023703}">
                       <ahyp:hlinkClr val="tx"/>
@@ -16347,7 +16428,7 @@
       </p:sp>
       <p:sp>
         <p:nvSpPr>
-          <p:cNvPr id="129" name="Google Shape;129;p14"/>
+          <p:cNvPr id="127" name="Google Shape;127;p14"/>
           <p:cNvSpPr txBox="1"/>
           <p:nvPr/>
         </p:nvSpPr>
@@ -16429,7 +16510,7 @@
       </p:sp>
       <p:sp>
         <p:nvSpPr>
-          <p:cNvPr id="130" name="Google Shape;130;p14"/>
+          <p:cNvPr id="128" name="Google Shape;128;p14"/>
           <p:cNvSpPr txBox="1"/>
           <p:nvPr/>
         </p:nvSpPr>
@@ -16481,7 +16562,7 @@
       </p:sp>
       <p:sp>
         <p:nvSpPr>
-          <p:cNvPr id="131" name="Google Shape;131;p14"/>
+          <p:cNvPr id="129" name="Google Shape;129;p14"/>
           <p:cNvSpPr txBox="1"/>
           <p:nvPr/>
         </p:nvSpPr>
@@ -16549,7 +16630,7 @@
                 <a:ea typeface="Roboto"/>
                 <a:cs typeface="Roboto"/>
                 <a:sym typeface="Roboto"/>
-                <a:hlinkClick r:id="rId33"/>
+                <a:hlinkClick r:id="rId31"/>
               </a:rPr>
               <a:t>reference page</a:t>
             </a:r>
@@ -16573,7 +16654,7 @@
       </p:sp>
       <p:sp>
         <p:nvSpPr>
-          <p:cNvPr id="132" name="Google Shape;132;p14"/>
+          <p:cNvPr id="130" name="Google Shape;130;p14"/>
           <p:cNvSpPr txBox="1"/>
           <p:nvPr/>
         </p:nvSpPr>
@@ -16623,9 +16704,53 @@
                 <a:ea typeface="Roboto"/>
                 <a:cs typeface="Roboto"/>
                 <a:sym typeface="Roboto"/>
+                <a:hlinkClick r:id="rId32"/>
+              </a:rPr>
+              <a:t>Github Repo</a:t>
+            </a:r>
+            <a:r>
+              <a:rPr lang="en" sz="800">
+                <a:latin typeface="Roboto"/>
+                <a:ea typeface="Roboto"/>
+                <a:cs typeface="Roboto"/>
+                <a:sym typeface="Roboto"/>
+              </a:rPr>
+              <a:t> - </a:t>
+            </a:r>
+            <a:r>
+              <a:rPr lang="en" sz="800" u="sng">
+                <a:solidFill>
+                  <a:schemeClr val="hlink"/>
+                </a:solidFill>
+                <a:latin typeface="Roboto"/>
+                <a:ea typeface="Roboto"/>
+                <a:cs typeface="Roboto"/>
+                <a:sym typeface="Roboto"/>
+                <a:hlinkClick r:id="rId33"/>
+              </a:rPr>
+              <a:t>Documentation</a:t>
+            </a:r>
+            <a:r>
+              <a:rPr lang="en" sz="800">
+                <a:latin typeface="Roboto"/>
+                <a:ea typeface="Roboto"/>
+                <a:cs typeface="Roboto"/>
+                <a:sym typeface="Roboto"/>
+              </a:rPr>
+              <a:t> - </a:t>
+            </a:r>
+            <a:r>
+              <a:rPr lang="en" sz="800" u="sng">
+                <a:solidFill>
+                  <a:schemeClr val="hlink"/>
+                </a:solidFill>
+                <a:latin typeface="Roboto"/>
+                <a:ea typeface="Roboto"/>
+                <a:cs typeface="Roboto"/>
+                <a:sym typeface="Roboto"/>
                 <a:hlinkClick r:id="rId34"/>
               </a:rPr>
-              <a:t>Github Repo</a:t>
+              <a:t>Join the Pharmaverse Slack</a:t>
             </a:r>
             <a:r>
               <a:rPr lang="en" sz="800">
@@ -16634,53 +16759,379 @@
                 <a:cs typeface="Roboto"/>
                 <a:sym typeface="Roboto"/>
               </a:rPr>
-              <a:t> - </a:t>
-            </a:r>
-            <a:r>
-              <a:rPr lang="en" sz="800" u="sng">
-                <a:solidFill>
-                  <a:schemeClr val="hlink"/>
-                </a:solidFill>
-                <a:latin typeface="Roboto"/>
-                <a:ea typeface="Roboto"/>
-                <a:cs typeface="Roboto"/>
-                <a:sym typeface="Roboto"/>
-                <a:hlinkClick r:id="rId35"/>
-              </a:rPr>
-              <a:t>Documentation</a:t>
-            </a:r>
-            <a:r>
-              <a:rPr lang="en" sz="800">
-                <a:latin typeface="Roboto"/>
-                <a:ea typeface="Roboto"/>
-                <a:cs typeface="Roboto"/>
-                <a:sym typeface="Roboto"/>
-              </a:rPr>
-              <a:t> - </a:t>
-            </a:r>
-            <a:r>
-              <a:rPr lang="en" sz="800" u="sng">
-                <a:solidFill>
-                  <a:schemeClr val="hlink"/>
-                </a:solidFill>
-                <a:latin typeface="Roboto"/>
-                <a:ea typeface="Roboto"/>
-                <a:cs typeface="Roboto"/>
-                <a:sym typeface="Roboto"/>
-                <a:hlinkClick r:id="rId36"/>
-              </a:rPr>
-              <a:t>Join the Pharmaverse Slack</a:t>
-            </a:r>
-            <a:r>
-              <a:rPr lang="en" sz="800">
-                <a:latin typeface="Roboto"/>
-                <a:ea typeface="Roboto"/>
-                <a:cs typeface="Roboto"/>
-                <a:sym typeface="Roboto"/>
-              </a:rPr>
               <a:t> </a:t>
             </a:r>
             <a:endParaRPr sz="800">
+              <a:latin typeface="Roboto"/>
+              <a:ea typeface="Roboto"/>
+              <a:cs typeface="Roboto"/>
+              <a:sym typeface="Roboto"/>
+            </a:endParaRPr>
+          </a:p>
+        </p:txBody>
+      </p:sp>
+      <p:sp>
+        <p:nvSpPr>
+          <p:cNvPr id="131" name="Google Shape;131;p14"/>
+          <p:cNvSpPr txBox="1"/>
+          <p:nvPr/>
+        </p:nvSpPr>
+        <p:spPr>
+          <a:xfrm>
+            <a:off x="319900" y="1422908"/>
+            <a:ext cx="3209700" cy="476400"/>
+          </a:xfrm>
+          <a:prstGeom prst="rect">
+            <a:avLst/>
+          </a:prstGeom>
+          <a:noFill/>
+          <a:ln>
+            <a:noFill/>
+          </a:ln>
+        </p:spPr>
+        <p:txBody>
+          <a:bodyPr anchorCtr="0" anchor="t" bIns="91425" lIns="91425" spcFirstLastPara="1" rIns="91425" wrap="square" tIns="91425">
+            <a:noAutofit/>
+          </a:bodyPr>
+          <a:lstStyle/>
+          <a:p>
+            <a:pPr indent="0" lvl="0" marL="0" rtl="0" algn="l">
+              <a:spcBef>
+                <a:spcPts val="0"/>
+              </a:spcBef>
+              <a:spcAft>
+                <a:spcPts val="0"/>
+              </a:spcAft>
+              <a:buNone/>
+            </a:pPr>
+            <a:r>
+              <a:rPr b="1" lang="en" sz="900">
+                <a:solidFill>
+                  <a:schemeClr val="dk1"/>
+                </a:solidFill>
+                <a:uFill>
+                  <a:noFill/>
+                </a:uFill>
+                <a:latin typeface="Roboto"/>
+                <a:ea typeface="Roboto"/>
+                <a:cs typeface="Roboto"/>
+                <a:sym typeface="Roboto"/>
+                <a:hlinkClick r:id="rId35">
+                  <a:extLst>
+                    <a:ext uri="{A12FA001-AC4F-418D-AE19-62706E023703}">
+                      <ahyp:hlinkClr val="tx"/>
+                    </a:ext>
+                  </a:extLst>
+                </a:hlinkClick>
+              </a:rPr>
+              <a:t>derive_var</a:t>
+            </a:r>
+            <a:r>
+              <a:rPr b="1" lang="en" sz="900">
+                <a:solidFill>
+                  <a:schemeClr val="dk1"/>
+                </a:solidFill>
+                <a:uFill>
+                  <a:noFill/>
+                </a:uFill>
+                <a:latin typeface="Roboto"/>
+                <a:ea typeface="Roboto"/>
+                <a:cs typeface="Roboto"/>
+                <a:sym typeface="Roboto"/>
+                <a:hlinkClick r:id="rId36">
+                  <a:extLst>
+                    <a:ext uri="{A12FA001-AC4F-418D-AE19-62706E023703}">
+                      <ahyp:hlinkClr val="tx"/>
+                    </a:ext>
+                  </a:extLst>
+                </a:hlinkClick>
+              </a:rPr>
+              <a:t>_anrind</a:t>
+            </a:r>
+            <a:r>
+              <a:rPr b="1" lang="en" sz="900">
+                <a:solidFill>
+                  <a:schemeClr val="dk1"/>
+                </a:solidFill>
+                <a:latin typeface="Roboto"/>
+                <a:ea typeface="Roboto"/>
+                <a:cs typeface="Roboto"/>
+                <a:sym typeface="Roboto"/>
+              </a:rPr>
+              <a:t>(</a:t>
+            </a:r>
+            <a:r>
+              <a:rPr lang="en" sz="900">
+                <a:solidFill>
+                  <a:srgbClr val="9E9E9E"/>
+                </a:solidFill>
+                <a:latin typeface="Roboto"/>
+                <a:ea typeface="Roboto"/>
+                <a:cs typeface="Roboto"/>
+                <a:sym typeface="Roboto"/>
+              </a:rPr>
+              <a:t>dataset, use_a1h1lo)</a:t>
+            </a:r>
+            <a:endParaRPr sz="900">
+              <a:solidFill>
+                <a:srgbClr val="9E9E9E"/>
+              </a:solidFill>
+              <a:latin typeface="Roboto"/>
+              <a:ea typeface="Roboto"/>
+              <a:cs typeface="Roboto"/>
+              <a:sym typeface="Roboto"/>
+            </a:endParaRPr>
+          </a:p>
+          <a:p>
+            <a:pPr indent="0" lvl="0" marL="0" rtl="0" algn="l">
+              <a:spcBef>
+                <a:spcPts val="0"/>
+              </a:spcBef>
+              <a:spcAft>
+                <a:spcPts val="0"/>
+              </a:spcAft>
+              <a:buNone/>
+            </a:pPr>
+            <a:r>
+              <a:rPr lang="en" sz="900">
+                <a:solidFill>
+                  <a:schemeClr val="dk1"/>
+                </a:solidFill>
+                <a:latin typeface="Roboto"/>
+                <a:ea typeface="Roboto"/>
+                <a:cs typeface="Roboto"/>
+                <a:sym typeface="Roboto"/>
+              </a:rPr>
+              <a:t>Derive analysis reference range indicator (ANRIND)</a:t>
+            </a:r>
+            <a:endParaRPr sz="900">
+              <a:solidFill>
+                <a:schemeClr val="dk1"/>
+              </a:solidFill>
+              <a:latin typeface="Roboto"/>
+              <a:ea typeface="Roboto"/>
+              <a:cs typeface="Roboto"/>
+              <a:sym typeface="Roboto"/>
+            </a:endParaRPr>
+          </a:p>
+        </p:txBody>
+      </p:sp>
+      <p:sp>
+        <p:nvSpPr>
+          <p:cNvPr id="132" name="Google Shape;132;p14"/>
+          <p:cNvSpPr txBox="1"/>
+          <p:nvPr/>
+        </p:nvSpPr>
+        <p:spPr>
+          <a:xfrm>
+            <a:off x="310800" y="3993198"/>
+            <a:ext cx="3209700" cy="461700"/>
+          </a:xfrm>
+          <a:prstGeom prst="rect">
+            <a:avLst/>
+          </a:prstGeom>
+          <a:noFill/>
+          <a:ln>
+            <a:noFill/>
+          </a:ln>
+        </p:spPr>
+        <p:txBody>
+          <a:bodyPr anchorCtr="0" anchor="t" bIns="91425" lIns="91425" spcFirstLastPara="1" rIns="91425" wrap="square" tIns="91425">
+            <a:noAutofit/>
+          </a:bodyPr>
+          <a:lstStyle/>
+          <a:p>
+            <a:pPr indent="0" lvl="0" marL="0" rtl="0" algn="l">
+              <a:spcBef>
+                <a:spcPts val="0"/>
+              </a:spcBef>
+              <a:spcAft>
+                <a:spcPts val="0"/>
+              </a:spcAft>
+              <a:buNone/>
+            </a:pPr>
+            <a:r>
+              <a:rPr b="1" lang="en" sz="900">
+                <a:solidFill>
+                  <a:schemeClr val="dk1"/>
+                </a:solidFill>
+                <a:uFill>
+                  <a:noFill/>
+                </a:uFill>
+                <a:latin typeface="Roboto"/>
+                <a:ea typeface="Roboto"/>
+                <a:cs typeface="Roboto"/>
+                <a:sym typeface="Roboto"/>
+                <a:hlinkClick r:id="rId37">
+                  <a:extLst>
+                    <a:ext uri="{A12FA001-AC4F-418D-AE19-62706E023703}">
+                      <ahyp:hlinkClr val="tx"/>
+                    </a:ext>
+                  </a:extLst>
+                </a:hlinkClick>
+              </a:rPr>
+              <a:t>derive_vars_query</a:t>
+            </a:r>
+            <a:r>
+              <a:rPr lang="en" sz="900">
+                <a:solidFill>
+                  <a:srgbClr val="9E9E9E"/>
+                </a:solidFill>
+                <a:latin typeface="Roboto"/>
+                <a:ea typeface="Roboto"/>
+                <a:cs typeface="Roboto"/>
+                <a:sym typeface="Roboto"/>
+              </a:rPr>
+              <a:t>(dataset, dataset_queries)</a:t>
+            </a:r>
+            <a:endParaRPr sz="900">
+              <a:solidFill>
+                <a:srgbClr val="9E9E9E"/>
+              </a:solidFill>
+              <a:latin typeface="Roboto"/>
+              <a:ea typeface="Roboto"/>
+              <a:cs typeface="Roboto"/>
+              <a:sym typeface="Roboto"/>
+            </a:endParaRPr>
+          </a:p>
+          <a:p>
+            <a:pPr indent="0" lvl="0" marL="0" rtl="0" algn="l">
+              <a:spcBef>
+                <a:spcPts val="0"/>
+              </a:spcBef>
+              <a:spcAft>
+                <a:spcPts val="0"/>
+              </a:spcAft>
+              <a:buNone/>
+            </a:pPr>
+            <a:r>
+              <a:rPr lang="en" sz="900">
+                <a:solidFill>
+                  <a:schemeClr val="dk1"/>
+                </a:solidFill>
+                <a:latin typeface="Roboto"/>
+                <a:ea typeface="Roboto"/>
+                <a:cs typeface="Roboto"/>
+                <a:sym typeface="Roboto"/>
+              </a:rPr>
+              <a:t>Derive query variables.</a:t>
+            </a:r>
+            <a:endParaRPr sz="900">
+              <a:solidFill>
+                <a:schemeClr val="dk1"/>
+              </a:solidFill>
+              <a:latin typeface="Roboto"/>
+              <a:ea typeface="Roboto"/>
+              <a:cs typeface="Roboto"/>
+              <a:sym typeface="Roboto"/>
+            </a:endParaRPr>
+          </a:p>
+        </p:txBody>
+      </p:sp>
+      <p:sp>
+        <p:nvSpPr>
+          <p:cNvPr id="133" name="Google Shape;133;p14"/>
+          <p:cNvSpPr txBox="1"/>
+          <p:nvPr/>
+        </p:nvSpPr>
+        <p:spPr>
+          <a:xfrm>
+            <a:off x="310800" y="4344984"/>
+            <a:ext cx="3209700" cy="461700"/>
+          </a:xfrm>
+          <a:prstGeom prst="rect">
+            <a:avLst/>
+          </a:prstGeom>
+          <a:noFill/>
+          <a:ln>
+            <a:noFill/>
+          </a:ln>
+        </p:spPr>
+        <p:txBody>
+          <a:bodyPr anchorCtr="0" anchor="t" bIns="91425" lIns="91425" spcFirstLastPara="1" rIns="91425" wrap="square" tIns="91425">
+            <a:noAutofit/>
+          </a:bodyPr>
+          <a:lstStyle/>
+          <a:p>
+            <a:pPr indent="0" lvl="0" marL="0" rtl="0" algn="l">
+              <a:spcBef>
+                <a:spcPts val="0"/>
+              </a:spcBef>
+              <a:spcAft>
+                <a:spcPts val="0"/>
+              </a:spcAft>
+              <a:buNone/>
+            </a:pPr>
+            <a:r>
+              <a:rPr b="1" lang="en" sz="900">
+                <a:solidFill>
+                  <a:schemeClr val="dk1"/>
+                </a:solidFill>
+                <a:uFill>
+                  <a:noFill/>
+                </a:uFill>
+                <a:latin typeface="Roboto"/>
+                <a:ea typeface="Roboto"/>
+                <a:cs typeface="Roboto"/>
+                <a:sym typeface="Roboto"/>
+                <a:hlinkClick r:id="rId38">
+                  <a:extLst>
+                    <a:ext uri="{A12FA001-AC4F-418D-AE19-62706E023703}">
+                      <ahyp:hlinkClr val="tx"/>
+                    </a:ext>
+                  </a:extLst>
+                </a:hlinkClick>
+              </a:rPr>
+              <a:t>derive_vars_atc</a:t>
+            </a:r>
+            <a:r>
+              <a:rPr lang="en" sz="900">
+                <a:solidFill>
+                  <a:srgbClr val="9E9E9E"/>
+                </a:solidFill>
+                <a:latin typeface="Roboto"/>
+                <a:ea typeface="Roboto"/>
+                <a:cs typeface="Roboto"/>
+                <a:sym typeface="Roboto"/>
+              </a:rPr>
+              <a:t>(dataset, dataset_facm, by_vars, value_var)</a:t>
+            </a:r>
+            <a:endParaRPr sz="900">
+              <a:solidFill>
+                <a:srgbClr val="9E9E9E"/>
+              </a:solidFill>
+              <a:latin typeface="Roboto"/>
+              <a:ea typeface="Roboto"/>
+              <a:cs typeface="Roboto"/>
+              <a:sym typeface="Roboto"/>
+            </a:endParaRPr>
+          </a:p>
+          <a:p>
+            <a:pPr indent="0" lvl="0" marL="0" rtl="0" algn="l">
+              <a:spcBef>
+                <a:spcPts val="0"/>
+              </a:spcBef>
+              <a:spcAft>
+                <a:spcPts val="0"/>
+              </a:spcAft>
+              <a:buNone/>
+            </a:pPr>
+            <a:r>
+              <a:rPr lang="en" sz="900">
+                <a:solidFill>
+                  <a:schemeClr val="dk1"/>
+                </a:solidFill>
+                <a:latin typeface="Roboto"/>
+                <a:ea typeface="Roboto"/>
+                <a:cs typeface="Roboto"/>
+                <a:sym typeface="Roboto"/>
+              </a:rPr>
+              <a:t>Derive ATC class variables from FACM to ADCM..</a:t>
+            </a:r>
+            <a:endParaRPr sz="900">
+              <a:solidFill>
+                <a:schemeClr val="dk1"/>
+              </a:solidFill>
               <a:latin typeface="Roboto"/>
               <a:ea typeface="Roboto"/>
               <a:cs typeface="Roboto"/>
@@ -17253,253 +17704,4 @@
     </a:fmtScheme>
   </a:themeElements>
 </a:theme>
-</file>
-
-<file path=customXml/item1.xml><?xml version="1.0" encoding="utf-8"?>
-<ct:contentTypeSchema xmlns:ct="http://schemas.microsoft.com/office/2006/metadata/contentType" xmlns:ma="http://schemas.microsoft.com/office/2006/metadata/properties/metaAttributes" ct:_="" ma:_="" ma:contentTypeName="Document" ma:contentTypeID="0x01010018943E1407CCF04989863CF0F432E8B2" ma:contentTypeVersion="12" ma:contentTypeDescription="Create a new document." ma:contentTypeScope="" ma:versionID="face86bb8f6d78c63b5b11c26dfa156a">
-  <xsd:schema xmlns:xsd="http://www.w3.org/2001/XMLSchema" xmlns:xs="http://www.w3.org/2001/XMLSchema" xmlns:p="http://schemas.microsoft.com/office/2006/metadata/properties" xmlns:ns2="352660e0-d3e8-47c6-9ec5-fea43b473253" xmlns:ns3="d9de82e3-6650-437c-811c-4330ac3163a7" targetNamespace="http://schemas.microsoft.com/office/2006/metadata/properties" ma:root="true" ma:fieldsID="a549b78e3fd4626b0fafafc4d8dfd395" ns2:_="" ns3:_="">
-    <xsd:import namespace="352660e0-d3e8-47c6-9ec5-fea43b473253"/>
-    <xsd:import namespace="d9de82e3-6650-437c-811c-4330ac3163a7"/>
-    <xsd:element name="properties">
-      <xsd:complexType>
-        <xsd:sequence>
-          <xsd:element name="documentManagement">
-            <xsd:complexType>
-              <xsd:all>
-                <xsd:element ref="ns2:MediaServiceMetadata" minOccurs="0"/>
-                <xsd:element ref="ns2:MediaServiceFastMetadata" minOccurs="0"/>
-                <xsd:element ref="ns2:lcf76f155ced4ddcb4097134ff3c332f" minOccurs="0"/>
-                <xsd:element ref="ns3:TaxCatchAll" minOccurs="0"/>
-                <xsd:element ref="ns2:MediaServiceOCR" minOccurs="0"/>
-                <xsd:element ref="ns2:MediaServiceGenerationTime" minOccurs="0"/>
-                <xsd:element ref="ns2:MediaServiceEventHashCode" minOccurs="0"/>
-                <xsd:element ref="ns2:MediaLengthInSeconds" minOccurs="0"/>
-                <xsd:element ref="ns3:SharedWithUsers" minOccurs="0"/>
-                <xsd:element ref="ns3:SharedWithDetails" minOccurs="0"/>
-                <xsd:element ref="ns2:MediaServiceObjectDetectorVersions" minOccurs="0"/>
-              </xsd:all>
-            </xsd:complexType>
-          </xsd:element>
-        </xsd:sequence>
-      </xsd:complexType>
-    </xsd:element>
-  </xsd:schema>
-  <xsd:schema xmlns:xsd="http://www.w3.org/2001/XMLSchema" xmlns:xs="http://www.w3.org/2001/XMLSchema" xmlns:dms="http://schemas.microsoft.com/office/2006/documentManagement/types" xmlns:pc="http://schemas.microsoft.com/office/infopath/2007/PartnerControls" targetNamespace="352660e0-d3e8-47c6-9ec5-fea43b473253" elementFormDefault="qualified">
-    <xsd:import namespace="http://schemas.microsoft.com/office/2006/documentManagement/types"/>
-    <xsd:import namespace="http://schemas.microsoft.com/office/infopath/2007/PartnerControls"/>
-    <xsd:element name="MediaServiceMetadata" ma:index="8" nillable="true" ma:displayName="MediaServiceMetadata" ma:hidden="true" ma:internalName="MediaServiceMetadata" ma:readOnly="true">
-      <xsd:simpleType>
-        <xsd:restriction base="dms:Note"/>
-      </xsd:simpleType>
-    </xsd:element>
-    <xsd:element name="MediaServiceFastMetadata" ma:index="9" nillable="true" ma:displayName="MediaServiceFastMetadata" ma:hidden="true" ma:internalName="MediaServiceFastMetadata" ma:readOnly="true">
-      <xsd:simpleType>
-        <xsd:restriction base="dms:Note"/>
-      </xsd:simpleType>
-    </xsd:element>
-    <xsd:element name="lcf76f155ced4ddcb4097134ff3c332f" ma:index="11" nillable="true" ma:taxonomy="true" ma:internalName="lcf76f155ced4ddcb4097134ff3c332f" ma:taxonomyFieldName="MediaServiceImageTags" ma:displayName="Image Tags" ma:readOnly="false" ma:fieldId="{5cf76f15-5ced-4ddc-b409-7134ff3c332f}" ma:taxonomyMulti="true" ma:sspId="d49e3c31-ed93-422f-85c6-5d6f62fb859e" ma:termSetId="09814cd3-568e-fe90-9814-8d621ff8fb84" ma:anchorId="fba54fb3-c3e1-fe81-a776-ca4b69148c4d" ma:open="true" ma:isKeyword="false">
-      <xsd:complexType>
-        <xsd:sequence>
-          <xsd:element ref="pc:Terms" minOccurs="0" maxOccurs="1"/>
-        </xsd:sequence>
-      </xsd:complexType>
-    </xsd:element>
-    <xsd:element name="MediaServiceOCR" ma:index="13" nillable="true" ma:displayName="Extracted Text" ma:internalName="MediaServiceOCR" ma:readOnly="true">
-      <xsd:simpleType>
-        <xsd:restriction base="dms:Note">
-          <xsd:maxLength value="255"/>
-        </xsd:restriction>
-      </xsd:simpleType>
-    </xsd:element>
-    <xsd:element name="MediaServiceGenerationTime" ma:index="14" nillable="true" ma:displayName="MediaServiceGenerationTime" ma:hidden="true" ma:internalName="MediaServiceGenerationTime" ma:readOnly="true">
-      <xsd:simpleType>
-        <xsd:restriction base="dms:Text"/>
-      </xsd:simpleType>
-    </xsd:element>
-    <xsd:element name="MediaServiceEventHashCode" ma:index="15" nillable="true" ma:displayName="MediaServiceEventHashCode" ma:hidden="true" ma:internalName="MediaServiceEventHashCode" ma:readOnly="true">
-      <xsd:simpleType>
-        <xsd:restriction base="dms:Text"/>
-      </xsd:simpleType>
-    </xsd:element>
-    <xsd:element name="MediaLengthInSeconds" ma:index="16" nillable="true" ma:displayName="MediaLengthInSeconds" ma:hidden="true" ma:internalName="MediaLengthInSeconds" ma:readOnly="true">
-      <xsd:simpleType>
-        <xsd:restriction base="dms:Unknown"/>
-      </xsd:simpleType>
-    </xsd:element>
-    <xsd:element name="MediaServiceObjectDetectorVersions" ma:index="19" nillable="true" ma:displayName="MediaServiceObjectDetectorVersions" ma:hidden="true" ma:indexed="true" ma:internalName="MediaServiceObjectDetectorVersions" ma:readOnly="true">
-      <xsd:simpleType>
-        <xsd:restriction base="dms:Text"/>
-      </xsd:simpleType>
-    </xsd:element>
-  </xsd:schema>
-  <xsd:schema xmlns:xsd="http://www.w3.org/2001/XMLSchema" xmlns:xs="http://www.w3.org/2001/XMLSchema" xmlns:dms="http://schemas.microsoft.com/office/2006/documentManagement/types" xmlns:pc="http://schemas.microsoft.com/office/infopath/2007/PartnerControls" targetNamespace="d9de82e3-6650-437c-811c-4330ac3163a7" elementFormDefault="qualified">
-    <xsd:import namespace="http://schemas.microsoft.com/office/2006/documentManagement/types"/>
-    <xsd:import namespace="http://schemas.microsoft.com/office/infopath/2007/PartnerControls"/>
-    <xsd:element name="TaxCatchAll" ma:index="12" nillable="true" ma:displayName="Taxonomy Catch All Column" ma:hidden="true" ma:list="{f6c7ab44-08e3-4c86-bbfd-d550f2323352}" ma:internalName="TaxCatchAll" ma:showField="CatchAllData" ma:web="d9de82e3-6650-437c-811c-4330ac3163a7">
-      <xsd:complexType>
-        <xsd:complexContent>
-          <xsd:extension base="dms:MultiChoiceLookup">
-            <xsd:sequence>
-              <xsd:element name="Value" type="dms:Lookup" maxOccurs="unbounded" minOccurs="0" nillable="true"/>
-            </xsd:sequence>
-          </xsd:extension>
-        </xsd:complexContent>
-      </xsd:complexType>
-    </xsd:element>
-    <xsd:element name="SharedWithUsers" ma:index="17" nillable="true" ma:displayName="Shared With" ma:internalName="SharedWithUsers" ma:readOnly="true">
-      <xsd:complexType>
-        <xsd:complexContent>
-          <xsd:extension base="dms:UserMulti">
-            <xsd:sequence>
-              <xsd:element name="UserInfo" minOccurs="0" maxOccurs="unbounded">
-                <xsd:complexType>
-                  <xsd:sequence>
-                    <xsd:element name="DisplayName" type="xsd:string" minOccurs="0"/>
-                    <xsd:element name="AccountId" type="dms:UserId" minOccurs="0" nillable="true"/>
-                    <xsd:element name="AccountType" type="xsd:string" minOccurs="0"/>
-                  </xsd:sequence>
-                </xsd:complexType>
-              </xsd:element>
-            </xsd:sequence>
-          </xsd:extension>
-        </xsd:complexContent>
-      </xsd:complexType>
-    </xsd:element>
-    <xsd:element name="SharedWithDetails" ma:index="18" nillable="true" ma:displayName="Shared With Details" ma:internalName="SharedWithDetails" ma:readOnly="true">
-      <xsd:simpleType>
-        <xsd:restriction base="dms:Note">
-          <xsd:maxLength value="255"/>
-        </xsd:restriction>
-      </xsd:simpleType>
-    </xsd:element>
-  </xsd:schema>
-  <xsd:schema xmlns="http://schemas.openxmlformats.org/package/2006/metadata/core-properties" xmlns:xsd="http://www.w3.org/2001/XMLSchema" xmlns:xsi="http://www.w3.org/2001/XMLSchema-instance" xmlns:dc="http://purl.org/dc/elements/1.1/" xmlns:dcterms="http://purl.org/dc/terms/" xmlns:odoc="http://schemas.microsoft.com/internal/obd" targetNamespace="http://schemas.openxmlformats.org/package/2006/metadata/core-properties" elementFormDefault="qualified" attributeFormDefault="unqualified" blockDefault="#all">
-    <xsd:import namespace="http://purl.org/dc/elements/1.1/" schemaLocation="http://dublincore.org/schemas/xmls/qdc/2003/04/02/dc.xsd"/>
-    <xsd:import namespace="http://purl.org/dc/terms/" schemaLocation="http://dublincore.org/schemas/xmls/qdc/2003/04/02/dcterms.xsd"/>
-    <xsd:element name="coreProperties" type="CT_coreProperties"/>
-    <xsd:complexType name="CT_coreProperties">
-      <xsd:all>
-        <xsd:element ref="dc:creator" minOccurs="0" maxOccurs="1"/>
-        <xsd:element ref="dcterms:created" minOccurs="0" maxOccurs="1"/>
-        <xsd:element ref="dc:identifier" minOccurs="0" maxOccurs="1"/>
-        <xsd:element name="contentType" minOccurs="0" maxOccurs="1" type="xsd:string" ma:index="0" ma:displayName="Content Type"/>
-        <xsd:element ref="dc:title" minOccurs="0" maxOccurs="1" ma:index="4" ma:displayName="Title"/>
-        <xsd:element ref="dc:subject" minOccurs="0" maxOccurs="1"/>
-        <xsd:element ref="dc:description" minOccurs="0" maxOccurs="1"/>
-        <xsd:element name="keywords" minOccurs="0" maxOccurs="1" type="xsd:string"/>
-        <xsd:element ref="dc:language" minOccurs="0" maxOccurs="1"/>
-        <xsd:element name="category" minOccurs="0" maxOccurs="1" type="xsd:string"/>
-        <xsd:element name="version" minOccurs="0" maxOccurs="1" type="xsd:string"/>
-        <xsd:element name="revision" minOccurs="0" maxOccurs="1" type="xsd:string">
-          <xsd:annotation>
-            <xsd:documentation>
-                        This value indicates the number of saves or revisions. The application is responsible for updating this value after each revision.
-                    </xsd:documentation>
-          </xsd:annotation>
-        </xsd:element>
-        <xsd:element name="lastModifiedBy" minOccurs="0" maxOccurs="1" type="xsd:string"/>
-        <xsd:element ref="dcterms:modified" minOccurs="0" maxOccurs="1"/>
-        <xsd:element name="contentStatus" minOccurs="0" maxOccurs="1" type="xsd:string"/>
-      </xsd:all>
-    </xsd:complexType>
-  </xsd:schema>
-  <xs:schema xmlns:pc="http://schemas.microsoft.com/office/infopath/2007/PartnerControls" xmlns:xs="http://www.w3.org/2001/XMLSchema" targetNamespace="http://schemas.microsoft.com/office/infopath/2007/PartnerControls" elementFormDefault="qualified" attributeFormDefault="unqualified">
-    <xs:element name="Person">
-      <xs:complexType>
-        <xs:sequence>
-          <xs:element ref="pc:DisplayName" minOccurs="0"/>
-          <xs:element ref="pc:AccountId" minOccurs="0"/>
-          <xs:element ref="pc:AccountType" minOccurs="0"/>
-        </xs:sequence>
-      </xs:complexType>
-    </xs:element>
-    <xs:element name="DisplayName" type="xs:string"/>
-    <xs:element name="AccountId" type="xs:string"/>
-    <xs:element name="AccountType" type="xs:string"/>
-    <xs:element name="BDCAssociatedEntity">
-      <xs:complexType>
-        <xs:sequence>
-          <xs:element ref="pc:BDCEntity" minOccurs="0" maxOccurs="unbounded"/>
-        </xs:sequence>
-        <xs:attribute ref="pc:EntityNamespace"/>
-        <xs:attribute ref="pc:EntityName"/>
-        <xs:attribute ref="pc:SystemInstanceName"/>
-        <xs:attribute ref="pc:AssociationName"/>
-      </xs:complexType>
-    </xs:element>
-    <xs:attribute name="EntityNamespace" type="xs:string"/>
-    <xs:attribute name="EntityName" type="xs:string"/>
-    <xs:attribute name="SystemInstanceName" type="xs:string"/>
-    <xs:attribute name="AssociationName" type="xs:string"/>
-    <xs:element name="BDCEntity">
-      <xs:complexType>
-        <xs:sequence>
-          <xs:element ref="pc:EntityDisplayName" minOccurs="0"/>
-          <xs:element ref="pc:EntityInstanceReference" minOccurs="0"/>
-          <xs:element ref="pc:EntityId1" minOccurs="0"/>
-          <xs:element ref="pc:EntityId2" minOccurs="0"/>
-          <xs:element ref="pc:EntityId3" minOccurs="0"/>
-          <xs:element ref="pc:EntityId4" minOccurs="0"/>
-          <xs:element ref="pc:EntityId5" minOccurs="0"/>
-        </xs:sequence>
-      </xs:complexType>
-    </xs:element>
-    <xs:element name="EntityDisplayName" type="xs:string"/>
-    <xs:element name="EntityInstanceReference" type="xs:string"/>
-    <xs:element name="EntityId1" type="xs:string"/>
-    <xs:element name="EntityId2" type="xs:string"/>
-    <xs:element name="EntityId3" type="xs:string"/>
-    <xs:element name="EntityId4" type="xs:string"/>
-    <xs:element name="EntityId5" type="xs:string"/>
-    <xs:element name="Terms">
-      <xs:complexType>
-        <xs:sequence>
-          <xs:element ref="pc:TermInfo" minOccurs="0" maxOccurs="unbounded"/>
-        </xs:sequence>
-      </xs:complexType>
-    </xs:element>
-    <xs:element name="TermInfo">
-      <xs:complexType>
-        <xs:sequence>
-          <xs:element ref="pc:TermName" minOccurs="0"/>
-          <xs:element ref="pc:TermId" minOccurs="0"/>
-        </xs:sequence>
-      </xs:complexType>
-    </xs:element>
-    <xs:element name="TermName" type="xs:string"/>
-    <xs:element name="TermId" type="xs:string"/>
-  </xs:schema>
-</ct:contentTypeSchema>
-</file>
-
-<file path=customXml/item2.xml><?xml version="1.0" encoding="utf-8"?>
-<?mso-contentType ?>
-<FormTemplates xmlns="http://schemas.microsoft.com/sharepoint/v3/contenttype/forms">
-  <Display>DocumentLibraryForm</Display>
-  <Edit>DocumentLibraryForm</Edit>
-  <New>DocumentLibraryForm</New>
-</FormTemplates>
-</file>
-
-<file path=customXml/item3.xml><?xml version="1.0" encoding="utf-8"?>
-<p:properties xmlns:p="http://schemas.microsoft.com/office/2006/metadata/properties" xmlns:xsi="http://www.w3.org/2001/XMLSchema-instance" xmlns:pc="http://schemas.microsoft.com/office/infopath/2007/PartnerControls">
-  <documentManagement>
-    <TaxCatchAll xmlns="d9de82e3-6650-437c-811c-4330ac3163a7" xsi:nil="true"/>
-    <lcf76f155ced4ddcb4097134ff3c332f xmlns="352660e0-d3e8-47c6-9ec5-fea43b473253">
-      <Terms xmlns="http://schemas.microsoft.com/office/infopath/2007/PartnerControls"/>
-    </lcf76f155ced4ddcb4097134ff3c332f>
-  </documentManagement>
-</p:properties>
-</file>
-
-<file path=customXml/itemProps1.xml><?xml version="1.0" encoding="utf-8"?>
-<ds:datastoreItem xmlns:ds="http://schemas.openxmlformats.org/officeDocument/2006/customXml" ds:itemID="{766EFCB4-AF8A-467F-BA89-179EDED03AF6}"/>
-</file>
-
-<file path=customXml/itemProps2.xml><?xml version="1.0" encoding="utf-8"?>
-<ds:datastoreItem xmlns:ds="http://schemas.openxmlformats.org/officeDocument/2006/customXml" ds:itemID="{30E77052-7138-4655-9CBD-E235634B904D}"/>
-</file>
-
-<file path=customXml/itemProps3.xml><?xml version="1.0" encoding="utf-8"?>
-<ds:datastoreItem xmlns:ds="http://schemas.openxmlformats.org/officeDocument/2006/customXml" ds:itemID="{7E33F7B1-1DEB-4F14-B3AA-8C305CE30177}"/>
 </file>
</xml_diff>

<commit_message>
#2130 removed quotations from dataset_add call in derive_vars_joined
</commit_message>
<xml_diff>
--- a/inst/cheatsheet/admiral_cheatsheet.pptx
+++ b/inst/cheatsheet/admiral_cheatsheet.pptx
@@ -8015,7 +8015,7 @@
                 <a:cs typeface="Roboto"/>
                 <a:sym typeface="Roboto"/>
               </a:rPr>
-              <a:t>  dataset = adlb,  dataset_add = “adlb”,</a:t>
+              <a:t>  dataset = adlb,  dataset_add = adlb,</a:t>
             </a:r>
             <a:endParaRPr i="1" sz="900">
               <a:solidFill>
@@ -17149,6 +17149,285 @@
 </file>
 
 <file path=ppt/theme/theme1.xml><?xml version="1.0" encoding="utf-8"?>
+<a:theme xmlns:a="http://schemas.openxmlformats.org/drawingml/2006/main" xmlns:r="http://schemas.openxmlformats.org/officeDocument/2006/relationships" name="Simple Light">
+  <a:themeElements>
+    <a:clrScheme name="Simple Light">
+      <a:dk1>
+        <a:srgbClr val="000000"/>
+      </a:dk1>
+      <a:lt1>
+        <a:srgbClr val="FFFFFF"/>
+      </a:lt1>
+      <a:dk2>
+        <a:srgbClr val="595959"/>
+      </a:dk2>
+      <a:lt2>
+        <a:srgbClr val="EEEEEE"/>
+      </a:lt2>
+      <a:accent1>
+        <a:srgbClr val="4285F4"/>
+      </a:accent1>
+      <a:accent2>
+        <a:srgbClr val="212121"/>
+      </a:accent2>
+      <a:accent3>
+        <a:srgbClr val="78909C"/>
+      </a:accent3>
+      <a:accent4>
+        <a:srgbClr val="FFAB40"/>
+      </a:accent4>
+      <a:accent5>
+        <a:srgbClr val="0097A7"/>
+      </a:accent5>
+      <a:accent6>
+        <a:srgbClr val="EEFF41"/>
+      </a:accent6>
+      <a:hlink>
+        <a:srgbClr val="0097A7"/>
+      </a:hlink>
+      <a:folHlink>
+        <a:srgbClr val="0097A7"/>
+      </a:folHlink>
+    </a:clrScheme>
+    <a:fontScheme name="Office">
+      <a:majorFont>
+        <a:latin typeface="Arial"/>
+        <a:ea typeface=""/>
+        <a:cs typeface=""/>
+        <a:font script="Jpan" typeface="ＭＳ Ｐゴシック"/>
+        <a:font script="Hang" typeface="맑은 고딕"/>
+        <a:font script="Hans" typeface="宋体"/>
+        <a:font script="Hant" typeface="新細明體"/>
+        <a:font script="Arab" typeface="Times New Roman"/>
+        <a:font script="Hebr" typeface="Times New Roman"/>
+        <a:font script="Thai" typeface="Angsana New"/>
+        <a:font script="Ethi" typeface="Nyala"/>
+        <a:font script="Beng" typeface="Vrinda"/>
+        <a:font script="Gujr" typeface="Shruti"/>
+        <a:font script="Khmr" typeface="MoolBoran"/>
+        <a:font script="Knda" typeface="Tunga"/>
+        <a:font script="Guru" typeface="Raavi"/>
+        <a:font script="Cans" typeface="Euphemia"/>
+        <a:font script="Cher" typeface="Plantagenet Cherokee"/>
+        <a:font script="Yiii" typeface="Microsoft Yi Baiti"/>
+        <a:font script="Tibt" typeface="Microsoft Himalaya"/>
+        <a:font script="Thaa" typeface="MV Boli"/>
+        <a:font script="Deva" typeface="Mangal"/>
+        <a:font script="Telu" typeface="Gautami"/>
+        <a:font script="Taml" typeface="Latha"/>
+        <a:font script="Syrc" typeface="Estrangelo Edessa"/>
+        <a:font script="Orya" typeface="Kalinga"/>
+        <a:font script="Mlym" typeface="Kartika"/>
+        <a:font script="Laoo" typeface="DokChampa"/>
+        <a:font script="Sinh" typeface="Iskoola Pota"/>
+        <a:font script="Mong" typeface="Mongolian Baiti"/>
+        <a:font script="Viet" typeface="Times New Roman"/>
+        <a:font script="Uigh" typeface="Microsoft Uighur"/>
+        <a:font script="Geor" typeface="Sylfaen"/>
+      </a:majorFont>
+      <a:minorFont>
+        <a:latin typeface="Arial"/>
+        <a:ea typeface=""/>
+        <a:cs typeface=""/>
+        <a:font script="Jpan" typeface="ＭＳ Ｐゴシック"/>
+        <a:font script="Hang" typeface="맑은 고딕"/>
+        <a:font script="Hans" typeface="宋体"/>
+        <a:font script="Hant" typeface="新細明體"/>
+        <a:font script="Arab" typeface="Arial"/>
+        <a:font script="Hebr" typeface="Arial"/>
+        <a:font script="Thai" typeface="Cordia New"/>
+        <a:font script="Ethi" typeface="Nyala"/>
+        <a:font script="Beng" typeface="Vrinda"/>
+        <a:font script="Gujr" typeface="Shruti"/>
+        <a:font script="Khmr" typeface="DaunPenh"/>
+        <a:font script="Knda" typeface="Tunga"/>
+        <a:font script="Guru" typeface="Raavi"/>
+        <a:font script="Cans" typeface="Euphemia"/>
+        <a:font script="Cher" typeface="Plantagenet Cherokee"/>
+        <a:font script="Yiii" typeface="Microsoft Yi Baiti"/>
+        <a:font script="Tibt" typeface="Microsoft Himalaya"/>
+        <a:font script="Thaa" typeface="MV Boli"/>
+        <a:font script="Deva" typeface="Mangal"/>
+        <a:font script="Telu" typeface="Gautami"/>
+        <a:font script="Taml" typeface="Latha"/>
+        <a:font script="Syrc" typeface="Estrangelo Edessa"/>
+        <a:font script="Orya" typeface="Kalinga"/>
+        <a:font script="Mlym" typeface="Kartika"/>
+        <a:font script="Laoo" typeface="DokChampa"/>
+        <a:font script="Sinh" typeface="Iskoola Pota"/>
+        <a:font script="Mong" typeface="Mongolian Baiti"/>
+        <a:font script="Viet" typeface="Arial"/>
+        <a:font script="Uigh" typeface="Microsoft Uighur"/>
+        <a:font script="Geor" typeface="Sylfaen"/>
+      </a:minorFont>
+    </a:fontScheme>
+    <a:fmtScheme name="Office">
+      <a:fillStyleLst>
+        <a:solidFill>
+          <a:schemeClr val="phClr"/>
+        </a:solidFill>
+        <a:gradFill rotWithShape="1">
+          <a:gsLst>
+            <a:gs pos="0">
+              <a:schemeClr val="phClr">
+                <a:tint val="50000"/>
+                <a:satMod val="300000"/>
+              </a:schemeClr>
+            </a:gs>
+            <a:gs pos="35000">
+              <a:schemeClr val="phClr">
+                <a:tint val="37000"/>
+                <a:satMod val="300000"/>
+              </a:schemeClr>
+            </a:gs>
+            <a:gs pos="100000">
+              <a:schemeClr val="phClr">
+                <a:tint val="15000"/>
+                <a:satMod val="350000"/>
+              </a:schemeClr>
+            </a:gs>
+          </a:gsLst>
+          <a:lin ang="16200000" scaled="1"/>
+        </a:gradFill>
+        <a:gradFill rotWithShape="1">
+          <a:gsLst>
+            <a:gs pos="0">
+              <a:schemeClr val="phClr">
+                <a:tint val="100000"/>
+                <a:shade val="100000"/>
+                <a:satMod val="130000"/>
+              </a:schemeClr>
+            </a:gs>
+            <a:gs pos="100000">
+              <a:schemeClr val="phClr">
+                <a:tint val="50000"/>
+                <a:shade val="100000"/>
+                <a:satMod val="350000"/>
+              </a:schemeClr>
+            </a:gs>
+          </a:gsLst>
+          <a:lin ang="16200000" scaled="0"/>
+        </a:gradFill>
+      </a:fillStyleLst>
+      <a:lnStyleLst>
+        <a:ln w="9525" cap="flat" cmpd="sng" algn="ctr">
+          <a:solidFill>
+            <a:schemeClr val="phClr">
+              <a:shade val="95000"/>
+              <a:satMod val="105000"/>
+            </a:schemeClr>
+          </a:solidFill>
+          <a:prstDash val="solid"/>
+        </a:ln>
+        <a:ln w="25400" cap="flat" cmpd="sng" algn="ctr">
+          <a:solidFill>
+            <a:schemeClr val="phClr"/>
+          </a:solidFill>
+          <a:prstDash val="solid"/>
+        </a:ln>
+        <a:ln w="38100" cap="flat" cmpd="sng" algn="ctr">
+          <a:solidFill>
+            <a:schemeClr val="phClr"/>
+          </a:solidFill>
+          <a:prstDash val="solid"/>
+        </a:ln>
+      </a:lnStyleLst>
+      <a:effectStyleLst>
+        <a:effectStyle>
+          <a:effectLst>
+            <a:outerShdw blurRad="40000" dist="20000" dir="5400000" rotWithShape="0">
+              <a:srgbClr val="000000">
+                <a:alpha val="38000"/>
+              </a:srgbClr>
+            </a:outerShdw>
+          </a:effectLst>
+        </a:effectStyle>
+        <a:effectStyle>
+          <a:effectLst>
+            <a:outerShdw blurRad="40000" dist="23000" dir="5400000" rotWithShape="0">
+              <a:srgbClr val="000000">
+                <a:alpha val="35000"/>
+              </a:srgbClr>
+            </a:outerShdw>
+          </a:effectLst>
+        </a:effectStyle>
+        <a:effectStyle>
+          <a:effectLst>
+            <a:outerShdw blurRad="40000" dist="23000" dir="5400000" rotWithShape="0">
+              <a:srgbClr val="000000">
+                <a:alpha val="35000"/>
+              </a:srgbClr>
+            </a:outerShdw>
+          </a:effectLst>
+          <a:scene3d>
+            <a:camera prst="orthographicFront">
+              <a:rot lat="0" lon="0" rev="0"/>
+            </a:camera>
+            <a:lightRig rig="threePt" dir="t">
+              <a:rot lat="0" lon="0" rev="1200000"/>
+            </a:lightRig>
+          </a:scene3d>
+          <a:sp3d>
+            <a:bevelT w="63500" h="25400"/>
+          </a:sp3d>
+        </a:effectStyle>
+      </a:effectStyleLst>
+      <a:bgFillStyleLst>
+        <a:solidFill>
+          <a:schemeClr val="phClr"/>
+        </a:solidFill>
+        <a:gradFill rotWithShape="1">
+          <a:gsLst>
+            <a:gs pos="0">
+              <a:schemeClr val="phClr">
+                <a:tint val="40000"/>
+                <a:satMod val="350000"/>
+              </a:schemeClr>
+            </a:gs>
+            <a:gs pos="40000">
+              <a:schemeClr val="phClr">
+                <a:tint val="45000"/>
+                <a:shade val="99000"/>
+                <a:satMod val="350000"/>
+              </a:schemeClr>
+            </a:gs>
+            <a:gs pos="100000">
+              <a:schemeClr val="phClr">
+                <a:shade val="20000"/>
+                <a:satMod val="255000"/>
+              </a:schemeClr>
+            </a:gs>
+          </a:gsLst>
+          <a:path path="circle">
+            <a:fillToRect l="50000" t="-80000" r="50000" b="180000"/>
+          </a:path>
+        </a:gradFill>
+        <a:gradFill rotWithShape="1">
+          <a:gsLst>
+            <a:gs pos="0">
+              <a:schemeClr val="phClr">
+                <a:tint val="80000"/>
+                <a:satMod val="300000"/>
+              </a:schemeClr>
+            </a:gs>
+            <a:gs pos="100000">
+              <a:schemeClr val="phClr">
+                <a:shade val="30000"/>
+                <a:satMod val="200000"/>
+              </a:schemeClr>
+            </a:gs>
+          </a:gsLst>
+          <a:path path="circle">
+            <a:fillToRect l="50000" t="50000" r="50000" b="50000"/>
+          </a:path>
+        </a:gradFill>
+      </a:bgFillStyleLst>
+    </a:fmtScheme>
+  </a:themeElements>
+</a:theme>
+</file>
+
+<file path=ppt/theme/theme2.xml><?xml version="1.0" encoding="utf-8"?>
 <a:theme xmlns:a="http://schemas.openxmlformats.org/drawingml/2006/main" xmlns:r="http://schemas.openxmlformats.org/officeDocument/2006/relationships">
   <a:themeElements>
     <a:clrScheme name="Default">
@@ -17425,283 +17704,4 @@
     </a:fmtScheme>
   </a:themeElements>
 </a:theme>
-</file>
-
-<file path=ppt/theme/theme2.xml><?xml version="1.0" encoding="utf-8"?>
-<a:theme xmlns:a="http://schemas.openxmlformats.org/drawingml/2006/main" xmlns:r="http://schemas.openxmlformats.org/officeDocument/2006/relationships" name="Simple Light">
-  <a:themeElements>
-    <a:clrScheme name="Simple Light">
-      <a:dk1>
-        <a:srgbClr val="000000"/>
-      </a:dk1>
-      <a:lt1>
-        <a:srgbClr val="FFFFFF"/>
-      </a:lt1>
-      <a:dk2>
-        <a:srgbClr val="595959"/>
-      </a:dk2>
-      <a:lt2>
-        <a:srgbClr val="EEEEEE"/>
-      </a:lt2>
-      <a:accent1>
-        <a:srgbClr val="4285F4"/>
-      </a:accent1>
-      <a:accent2>
-        <a:srgbClr val="212121"/>
-      </a:accent2>
-      <a:accent3>
-        <a:srgbClr val="78909C"/>
-      </a:accent3>
-      <a:accent4>
-        <a:srgbClr val="FFAB40"/>
-      </a:accent4>
-      <a:accent5>
-        <a:srgbClr val="0097A7"/>
-      </a:accent5>
-      <a:accent6>
-        <a:srgbClr val="EEFF41"/>
-      </a:accent6>
-      <a:hlink>
-        <a:srgbClr val="0097A7"/>
-      </a:hlink>
-      <a:folHlink>
-        <a:srgbClr val="0097A7"/>
-      </a:folHlink>
-    </a:clrScheme>
-    <a:fontScheme name="Office">
-      <a:majorFont>
-        <a:latin typeface="Arial"/>
-        <a:ea typeface=""/>
-        <a:cs typeface=""/>
-        <a:font script="Jpan" typeface="ＭＳ Ｐゴシック"/>
-        <a:font script="Hang" typeface="맑은 고딕"/>
-        <a:font script="Hans" typeface="宋体"/>
-        <a:font script="Hant" typeface="新細明體"/>
-        <a:font script="Arab" typeface="Times New Roman"/>
-        <a:font script="Hebr" typeface="Times New Roman"/>
-        <a:font script="Thai" typeface="Angsana New"/>
-        <a:font script="Ethi" typeface="Nyala"/>
-        <a:font script="Beng" typeface="Vrinda"/>
-        <a:font script="Gujr" typeface="Shruti"/>
-        <a:font script="Khmr" typeface="MoolBoran"/>
-        <a:font script="Knda" typeface="Tunga"/>
-        <a:font script="Guru" typeface="Raavi"/>
-        <a:font script="Cans" typeface="Euphemia"/>
-        <a:font script="Cher" typeface="Plantagenet Cherokee"/>
-        <a:font script="Yiii" typeface="Microsoft Yi Baiti"/>
-        <a:font script="Tibt" typeface="Microsoft Himalaya"/>
-        <a:font script="Thaa" typeface="MV Boli"/>
-        <a:font script="Deva" typeface="Mangal"/>
-        <a:font script="Telu" typeface="Gautami"/>
-        <a:font script="Taml" typeface="Latha"/>
-        <a:font script="Syrc" typeface="Estrangelo Edessa"/>
-        <a:font script="Orya" typeface="Kalinga"/>
-        <a:font script="Mlym" typeface="Kartika"/>
-        <a:font script="Laoo" typeface="DokChampa"/>
-        <a:font script="Sinh" typeface="Iskoola Pota"/>
-        <a:font script="Mong" typeface="Mongolian Baiti"/>
-        <a:font script="Viet" typeface="Times New Roman"/>
-        <a:font script="Uigh" typeface="Microsoft Uighur"/>
-        <a:font script="Geor" typeface="Sylfaen"/>
-      </a:majorFont>
-      <a:minorFont>
-        <a:latin typeface="Arial"/>
-        <a:ea typeface=""/>
-        <a:cs typeface=""/>
-        <a:font script="Jpan" typeface="ＭＳ Ｐゴシック"/>
-        <a:font script="Hang" typeface="맑은 고딕"/>
-        <a:font script="Hans" typeface="宋体"/>
-        <a:font script="Hant" typeface="新細明體"/>
-        <a:font script="Arab" typeface="Arial"/>
-        <a:font script="Hebr" typeface="Arial"/>
-        <a:font script="Thai" typeface="Cordia New"/>
-        <a:font script="Ethi" typeface="Nyala"/>
-        <a:font script="Beng" typeface="Vrinda"/>
-        <a:font script="Gujr" typeface="Shruti"/>
-        <a:font script="Khmr" typeface="DaunPenh"/>
-        <a:font script="Knda" typeface="Tunga"/>
-        <a:font script="Guru" typeface="Raavi"/>
-        <a:font script="Cans" typeface="Euphemia"/>
-        <a:font script="Cher" typeface="Plantagenet Cherokee"/>
-        <a:font script="Yiii" typeface="Microsoft Yi Baiti"/>
-        <a:font script="Tibt" typeface="Microsoft Himalaya"/>
-        <a:font script="Thaa" typeface="MV Boli"/>
-        <a:font script="Deva" typeface="Mangal"/>
-        <a:font script="Telu" typeface="Gautami"/>
-        <a:font script="Taml" typeface="Latha"/>
-        <a:font script="Syrc" typeface="Estrangelo Edessa"/>
-        <a:font script="Orya" typeface="Kalinga"/>
-        <a:font script="Mlym" typeface="Kartika"/>
-        <a:font script="Laoo" typeface="DokChampa"/>
-        <a:font script="Sinh" typeface="Iskoola Pota"/>
-        <a:font script="Mong" typeface="Mongolian Baiti"/>
-        <a:font script="Viet" typeface="Arial"/>
-        <a:font script="Uigh" typeface="Microsoft Uighur"/>
-        <a:font script="Geor" typeface="Sylfaen"/>
-      </a:minorFont>
-    </a:fontScheme>
-    <a:fmtScheme name="Office">
-      <a:fillStyleLst>
-        <a:solidFill>
-          <a:schemeClr val="phClr"/>
-        </a:solidFill>
-        <a:gradFill rotWithShape="1">
-          <a:gsLst>
-            <a:gs pos="0">
-              <a:schemeClr val="phClr">
-                <a:tint val="50000"/>
-                <a:satMod val="300000"/>
-              </a:schemeClr>
-            </a:gs>
-            <a:gs pos="35000">
-              <a:schemeClr val="phClr">
-                <a:tint val="37000"/>
-                <a:satMod val="300000"/>
-              </a:schemeClr>
-            </a:gs>
-            <a:gs pos="100000">
-              <a:schemeClr val="phClr">
-                <a:tint val="15000"/>
-                <a:satMod val="350000"/>
-              </a:schemeClr>
-            </a:gs>
-          </a:gsLst>
-          <a:lin ang="16200000" scaled="1"/>
-        </a:gradFill>
-        <a:gradFill rotWithShape="1">
-          <a:gsLst>
-            <a:gs pos="0">
-              <a:schemeClr val="phClr">
-                <a:tint val="100000"/>
-                <a:shade val="100000"/>
-                <a:satMod val="130000"/>
-              </a:schemeClr>
-            </a:gs>
-            <a:gs pos="100000">
-              <a:schemeClr val="phClr">
-                <a:tint val="50000"/>
-                <a:shade val="100000"/>
-                <a:satMod val="350000"/>
-              </a:schemeClr>
-            </a:gs>
-          </a:gsLst>
-          <a:lin ang="16200000" scaled="0"/>
-        </a:gradFill>
-      </a:fillStyleLst>
-      <a:lnStyleLst>
-        <a:ln w="9525" cap="flat" cmpd="sng" algn="ctr">
-          <a:solidFill>
-            <a:schemeClr val="phClr">
-              <a:shade val="95000"/>
-              <a:satMod val="105000"/>
-            </a:schemeClr>
-          </a:solidFill>
-          <a:prstDash val="solid"/>
-        </a:ln>
-        <a:ln w="25400" cap="flat" cmpd="sng" algn="ctr">
-          <a:solidFill>
-            <a:schemeClr val="phClr"/>
-          </a:solidFill>
-          <a:prstDash val="solid"/>
-        </a:ln>
-        <a:ln w="38100" cap="flat" cmpd="sng" algn="ctr">
-          <a:solidFill>
-            <a:schemeClr val="phClr"/>
-          </a:solidFill>
-          <a:prstDash val="solid"/>
-        </a:ln>
-      </a:lnStyleLst>
-      <a:effectStyleLst>
-        <a:effectStyle>
-          <a:effectLst>
-            <a:outerShdw blurRad="40000" dist="20000" dir="5400000" rotWithShape="0">
-              <a:srgbClr val="000000">
-                <a:alpha val="38000"/>
-              </a:srgbClr>
-            </a:outerShdw>
-          </a:effectLst>
-        </a:effectStyle>
-        <a:effectStyle>
-          <a:effectLst>
-            <a:outerShdw blurRad="40000" dist="23000" dir="5400000" rotWithShape="0">
-              <a:srgbClr val="000000">
-                <a:alpha val="35000"/>
-              </a:srgbClr>
-            </a:outerShdw>
-          </a:effectLst>
-        </a:effectStyle>
-        <a:effectStyle>
-          <a:effectLst>
-            <a:outerShdw blurRad="40000" dist="23000" dir="5400000" rotWithShape="0">
-              <a:srgbClr val="000000">
-                <a:alpha val="35000"/>
-              </a:srgbClr>
-            </a:outerShdw>
-          </a:effectLst>
-          <a:scene3d>
-            <a:camera prst="orthographicFront">
-              <a:rot lat="0" lon="0" rev="0"/>
-            </a:camera>
-            <a:lightRig rig="threePt" dir="t">
-              <a:rot lat="0" lon="0" rev="1200000"/>
-            </a:lightRig>
-          </a:scene3d>
-          <a:sp3d>
-            <a:bevelT w="63500" h="25400"/>
-          </a:sp3d>
-        </a:effectStyle>
-      </a:effectStyleLst>
-      <a:bgFillStyleLst>
-        <a:solidFill>
-          <a:schemeClr val="phClr"/>
-        </a:solidFill>
-        <a:gradFill rotWithShape="1">
-          <a:gsLst>
-            <a:gs pos="0">
-              <a:schemeClr val="phClr">
-                <a:tint val="40000"/>
-                <a:satMod val="350000"/>
-              </a:schemeClr>
-            </a:gs>
-            <a:gs pos="40000">
-              <a:schemeClr val="phClr">
-                <a:tint val="45000"/>
-                <a:shade val="99000"/>
-                <a:satMod val="350000"/>
-              </a:schemeClr>
-            </a:gs>
-            <a:gs pos="100000">
-              <a:schemeClr val="phClr">
-                <a:shade val="20000"/>
-                <a:satMod val="255000"/>
-              </a:schemeClr>
-            </a:gs>
-          </a:gsLst>
-          <a:path path="circle">
-            <a:fillToRect l="50000" t="-80000" r="50000" b="180000"/>
-          </a:path>
-        </a:gradFill>
-        <a:gradFill rotWithShape="1">
-          <a:gsLst>
-            <a:gs pos="0">
-              <a:schemeClr val="phClr">
-                <a:tint val="80000"/>
-                <a:satMod val="300000"/>
-              </a:schemeClr>
-            </a:gs>
-            <a:gs pos="100000">
-              <a:schemeClr val="phClr">
-                <a:shade val="30000"/>
-                <a:satMod val="200000"/>
-              </a:schemeClr>
-            </a:gs>
-          </a:gsLst>
-          <a:path path="circle">
-            <a:fillToRect l="50000" t="50000" r="50000" b="50000"/>
-          </a:path>
-        </a:gradFill>
-      </a:bgFillStyleLst>
-    </a:fmtScheme>
-  </a:themeElements>
-</a:theme>
 </file>
</xml_diff>

<commit_message>
#2254 - added 2024 release schedule, added references to recent conferences, fixed missing full stops in README, regenerated cheatsheet due to misaligned background
</commit_message>
<xml_diff>
--- a/inst/cheatsheet/admiral_cheatsheet.pptx
+++ b/inst/cheatsheet/admiral_cheatsheet.pptx
@@ -5812,8 +5812,8 @@
         </p:nvSpPr>
         <p:spPr>
           <a:xfrm>
-            <a:off x="3695350" y="1029925"/>
-            <a:ext cx="3209700" cy="6285900"/>
+            <a:off x="3748125" y="1029925"/>
+            <a:ext cx="3227700" cy="6285900"/>
           </a:xfrm>
           <a:prstGeom prst="roundRect">
             <a:avLst>
@@ -6989,7 +6989,7 @@
         </p:nvSpPr>
         <p:spPr>
           <a:xfrm>
-            <a:off x="3771700" y="1112147"/>
+            <a:off x="3824476" y="1112147"/>
             <a:ext cx="3209700" cy="398100"/>
           </a:xfrm>
           <a:prstGeom prst="rect">
@@ -7105,7 +7105,7 @@
         </p:nvSpPr>
         <p:spPr>
           <a:xfrm>
-            <a:off x="4324575" y="1437050"/>
+            <a:off x="4377351" y="1437050"/>
             <a:ext cx="2580600" cy="2471100"/>
           </a:xfrm>
           <a:prstGeom prst="rect">
@@ -7782,7 +7782,7 @@
         </p:nvSpPr>
         <p:spPr>
           <a:xfrm>
-            <a:off x="4324575" y="3831947"/>
+            <a:off x="4377351" y="3831947"/>
             <a:ext cx="2580600" cy="1974000"/>
           </a:xfrm>
           <a:prstGeom prst="rect">
@@ -8312,7 +8312,7 @@
         </p:nvSpPr>
         <p:spPr>
           <a:xfrm>
-            <a:off x="3718275" y="6170350"/>
+            <a:off x="3771051" y="6170350"/>
             <a:ext cx="3186900" cy="840900"/>
           </a:xfrm>
           <a:prstGeom prst="rect">
@@ -9121,7 +9121,7 @@
         </p:blipFill>
         <p:spPr>
           <a:xfrm>
-            <a:off x="3818650" y="1558550"/>
+            <a:off x="3871426" y="1558550"/>
             <a:ext cx="557225" cy="2289924"/>
           </a:xfrm>
           <a:prstGeom prst="rect">
@@ -9149,7 +9149,7 @@
         </p:blipFill>
         <p:spPr>
           <a:xfrm>
-            <a:off x="3732750" y="3903588"/>
+            <a:off x="3785526" y="3903588"/>
             <a:ext cx="660878" cy="2289926"/>
           </a:xfrm>
           <a:prstGeom prst="rect">
@@ -11618,7 +11618,7 @@
         </p:nvSpPr>
         <p:spPr>
           <a:xfrm>
-            <a:off x="3896513" y="6807905"/>
+            <a:off x="3949288" y="6807905"/>
             <a:ext cx="2851200" cy="555000"/>
           </a:xfrm>
           <a:prstGeom prst="rect">
@@ -11724,52 +11724,7 @@
         </p:nvSpPr>
         <p:spPr>
           <a:xfrm>
-            <a:off x="3668200" y="435075"/>
-            <a:ext cx="3209700" cy="6873000"/>
-          </a:xfrm>
-          <a:prstGeom prst="roundRect">
-            <a:avLst>
-              <a:gd fmla="val 16667" name="adj"/>
-            </a:avLst>
-          </a:prstGeom>
-          <a:solidFill>
-            <a:schemeClr val="lt1"/>
-          </a:solidFill>
-          <a:ln>
-            <a:noFill/>
-          </a:ln>
-        </p:spPr>
-        <p:txBody>
-          <a:bodyPr anchorCtr="0" anchor="ctr" bIns="91425" lIns="91425" spcFirstLastPara="1" rIns="91425" wrap="square" tIns="91425">
-            <a:noAutofit/>
-          </a:bodyPr>
-          <a:lstStyle/>
-          <a:p>
-            <a:pPr indent="0" lvl="0" marL="0" rtl="0" algn="l">
-              <a:spcBef>
-                <a:spcPts val="0"/>
-              </a:spcBef>
-              <a:spcAft>
-                <a:spcPts val="0"/>
-              </a:spcAft>
-              <a:buNone/>
-            </a:pPr>
-            <a:r>
-              <a:t/>
-            </a:r>
-            <a:endParaRPr/>
-          </a:p>
-        </p:txBody>
-      </p:sp>
-      <p:sp>
-        <p:nvSpPr>
-          <p:cNvPr id="91" name="Google Shape;91;p14"/>
-          <p:cNvSpPr/>
-          <p:nvPr/>
-        </p:nvSpPr>
-        <p:spPr>
-          <a:xfrm>
-            <a:off x="7200550" y="435075"/>
+            <a:off x="7222450" y="434875"/>
             <a:ext cx="3209700" cy="7030200"/>
           </a:xfrm>
           <a:prstGeom prst="roundRect">
@@ -11806,9 +11761,99 @@
           </a:p>
         </p:txBody>
       </p:sp>
+      <p:sp>
+        <p:nvSpPr>
+          <p:cNvPr id="91" name="Google Shape;91;p14"/>
+          <p:cNvSpPr/>
+          <p:nvPr/>
+        </p:nvSpPr>
+        <p:spPr>
+          <a:xfrm>
+            <a:off x="3748125" y="434775"/>
+            <a:ext cx="3227700" cy="6881100"/>
+          </a:xfrm>
+          <a:prstGeom prst="roundRect">
+            <a:avLst>
+              <a:gd fmla="val 16667" name="adj"/>
+            </a:avLst>
+          </a:prstGeom>
+          <a:solidFill>
+            <a:schemeClr val="lt1"/>
+          </a:solidFill>
+          <a:ln>
+            <a:noFill/>
+          </a:ln>
+        </p:spPr>
+        <p:txBody>
+          <a:bodyPr anchorCtr="0" anchor="ctr" bIns="91425" lIns="91425" spcFirstLastPara="1" rIns="91425" wrap="square" tIns="91425">
+            <a:noAutofit/>
+          </a:bodyPr>
+          <a:lstStyle/>
+          <a:p>
+            <a:pPr indent="0" lvl="0" marL="0" rtl="0" algn="l">
+              <a:spcBef>
+                <a:spcPts val="0"/>
+              </a:spcBef>
+              <a:spcAft>
+                <a:spcPts val="0"/>
+              </a:spcAft>
+              <a:buNone/>
+            </a:pPr>
+            <a:r>
+              <a:t/>
+            </a:r>
+            <a:endParaRPr/>
+          </a:p>
+        </p:txBody>
+      </p:sp>
+      <p:sp>
+        <p:nvSpPr>
+          <p:cNvPr id="92" name="Google Shape;92;p14"/>
+          <p:cNvSpPr/>
+          <p:nvPr/>
+        </p:nvSpPr>
+        <p:spPr>
+          <a:xfrm>
+            <a:off x="288250" y="434775"/>
+            <a:ext cx="3209700" cy="7030200"/>
+          </a:xfrm>
+          <a:prstGeom prst="roundRect">
+            <a:avLst>
+              <a:gd fmla="val 16667" name="adj"/>
+            </a:avLst>
+          </a:prstGeom>
+          <a:solidFill>
+            <a:schemeClr val="lt1"/>
+          </a:solidFill>
+          <a:ln>
+            <a:noFill/>
+          </a:ln>
+        </p:spPr>
+        <p:txBody>
+          <a:bodyPr anchorCtr="0" anchor="ctr" bIns="91425" lIns="91425" spcFirstLastPara="1" rIns="91425" wrap="square" tIns="91425">
+            <a:noAutofit/>
+          </a:bodyPr>
+          <a:lstStyle/>
+          <a:p>
+            <a:pPr indent="0" lvl="0" marL="0" rtl="0" algn="l">
+              <a:spcBef>
+                <a:spcPts val="0"/>
+              </a:spcBef>
+              <a:spcAft>
+                <a:spcPts val="0"/>
+              </a:spcAft>
+              <a:buNone/>
+            </a:pPr>
+            <a:r>
+              <a:t/>
+            </a:r>
+            <a:endParaRPr/>
+          </a:p>
+        </p:txBody>
+      </p:sp>
       <p:pic>
         <p:nvPicPr>
-          <p:cNvPr id="92" name="Google Shape;92;p14"/>
+          <p:cNvPr id="93" name="Google Shape;93;p14"/>
           <p:cNvPicPr preferRelativeResize="0"/>
           <p:nvPr/>
         </p:nvPicPr>
@@ -11836,13 +11881,13 @@
       </p:pic>
       <p:sp>
         <p:nvSpPr>
-          <p:cNvPr id="93" name="Google Shape;93;p14"/>
+          <p:cNvPr id="94" name="Google Shape;94;p14"/>
           <p:cNvSpPr txBox="1"/>
           <p:nvPr/>
         </p:nvSpPr>
         <p:spPr>
           <a:xfrm>
-            <a:off x="3744400" y="432525"/>
+            <a:off x="3826386" y="432525"/>
             <a:ext cx="3209700" cy="398100"/>
           </a:xfrm>
           <a:prstGeom prst="rect">
@@ -11917,7 +11962,7 @@
       </p:sp>
       <p:sp>
         <p:nvSpPr>
-          <p:cNvPr id="94" name="Google Shape;94;p14"/>
+          <p:cNvPr id="95" name="Google Shape;95;p14"/>
           <p:cNvSpPr txBox="1"/>
           <p:nvPr/>
         </p:nvSpPr>
@@ -11998,13 +12043,13 @@
       </p:sp>
       <p:sp>
         <p:nvSpPr>
-          <p:cNvPr id="95" name="Google Shape;95;p14"/>
+          <p:cNvPr id="96" name="Google Shape;96;p14"/>
           <p:cNvSpPr txBox="1"/>
           <p:nvPr/>
         </p:nvSpPr>
         <p:spPr>
           <a:xfrm>
-            <a:off x="4653875" y="3139567"/>
+            <a:off x="4735861" y="3139567"/>
             <a:ext cx="2300400" cy="1747200"/>
           </a:xfrm>
           <a:prstGeom prst="rect">
@@ -12348,13 +12393,13 @@
       </p:sp>
       <p:sp>
         <p:nvSpPr>
-          <p:cNvPr id="96" name="Google Shape;96;p14"/>
+          <p:cNvPr id="97" name="Google Shape;97;p14"/>
           <p:cNvSpPr txBox="1"/>
           <p:nvPr/>
         </p:nvSpPr>
         <p:spPr>
           <a:xfrm>
-            <a:off x="4653775" y="1142200"/>
+            <a:off x="4735761" y="1142200"/>
             <a:ext cx="2300400" cy="1945800"/>
           </a:xfrm>
           <a:prstGeom prst="rect">
@@ -12730,7 +12775,7 @@
       </p:sp>
       <p:pic>
         <p:nvPicPr>
-          <p:cNvPr id="97" name="Google Shape;97;p14"/>
+          <p:cNvPr id="98" name="Google Shape;98;p14"/>
           <p:cNvPicPr preferRelativeResize="0"/>
           <p:nvPr/>
         </p:nvPicPr>
@@ -12744,7 +12789,7 @@
         </p:blipFill>
         <p:spPr>
           <a:xfrm>
-            <a:off x="3789675" y="3257092"/>
+            <a:off x="3871661" y="3257092"/>
             <a:ext cx="842700" cy="1441162"/>
           </a:xfrm>
           <a:prstGeom prst="rect">
@@ -12758,7 +12803,7 @@
       </p:pic>
       <p:pic>
         <p:nvPicPr>
-          <p:cNvPr id="98" name="Google Shape;98;p14"/>
+          <p:cNvPr id="99" name="Google Shape;99;p14"/>
           <p:cNvPicPr preferRelativeResize="0"/>
           <p:nvPr/>
         </p:nvPicPr>
@@ -12772,7 +12817,7 @@
         </p:blipFill>
         <p:spPr>
           <a:xfrm>
-            <a:off x="3811075" y="1245375"/>
+            <a:off x="3893061" y="1245375"/>
             <a:ext cx="799900" cy="1573075"/>
           </a:xfrm>
           <a:prstGeom prst="rect">
@@ -12786,13 +12831,13 @@
       </p:pic>
       <p:sp>
         <p:nvSpPr>
-          <p:cNvPr id="99" name="Google Shape;99;p14"/>
+          <p:cNvPr id="100" name="Google Shape;100;p14"/>
           <p:cNvSpPr txBox="1"/>
           <p:nvPr/>
         </p:nvSpPr>
         <p:spPr>
           <a:xfrm>
-            <a:off x="4653875" y="4894806"/>
+            <a:off x="4735861" y="4894806"/>
             <a:ext cx="2300400" cy="2261100"/>
           </a:xfrm>
           <a:prstGeom prst="rect">
@@ -13168,7 +13213,7 @@
       </p:sp>
       <p:sp>
         <p:nvSpPr>
-          <p:cNvPr id="100" name="Google Shape;100;p14"/>
+          <p:cNvPr id="101" name="Google Shape;101;p14"/>
           <p:cNvSpPr txBox="1"/>
           <p:nvPr/>
         </p:nvSpPr>
@@ -13249,7 +13294,7 @@
       </p:sp>
       <p:sp>
         <p:nvSpPr>
-          <p:cNvPr id="101" name="Google Shape;101;p14"/>
+          <p:cNvPr id="102" name="Google Shape;102;p14"/>
           <p:cNvSpPr txBox="1"/>
           <p:nvPr/>
         </p:nvSpPr>
@@ -13407,7 +13452,7 @@
       </p:sp>
       <p:sp>
         <p:nvSpPr>
-          <p:cNvPr id="102" name="Google Shape;102;p14"/>
+          <p:cNvPr id="103" name="Google Shape;103;p14"/>
           <p:cNvSpPr txBox="1"/>
           <p:nvPr/>
         </p:nvSpPr>
@@ -13563,7 +13608,7 @@
       </p:sp>
       <p:sp>
         <p:nvSpPr>
-          <p:cNvPr id="103" name="Google Shape;103;p14"/>
+          <p:cNvPr id="104" name="Google Shape;104;p14"/>
           <p:cNvSpPr txBox="1"/>
           <p:nvPr/>
         </p:nvSpPr>
@@ -13730,7 +13775,7 @@
       </p:sp>
       <p:pic>
         <p:nvPicPr>
-          <p:cNvPr id="104" name="Google Shape;104;p14"/>
+          <p:cNvPr id="105" name="Google Shape;105;p14"/>
           <p:cNvPicPr preferRelativeResize="0"/>
           <p:nvPr/>
         </p:nvPicPr>
@@ -13744,7 +13789,7 @@
         </p:blipFill>
         <p:spPr>
           <a:xfrm>
-            <a:off x="3764401" y="5003856"/>
+            <a:off x="3846386" y="5003856"/>
             <a:ext cx="893246" cy="1441150"/>
           </a:xfrm>
           <a:prstGeom prst="rect">
@@ -13758,7 +13803,7 @@
       </p:pic>
       <p:sp>
         <p:nvSpPr>
-          <p:cNvPr id="105" name="Google Shape;105;p14"/>
+          <p:cNvPr id="106" name="Google Shape;106;p14"/>
           <p:cNvSpPr txBox="1"/>
           <p:nvPr/>
         </p:nvSpPr>
@@ -14099,7 +14144,7 @@
       </p:sp>
       <p:sp>
         <p:nvSpPr>
-          <p:cNvPr id="106" name="Google Shape;106;p14"/>
+          <p:cNvPr id="107" name="Google Shape;107;p14"/>
           <p:cNvSpPr txBox="1"/>
           <p:nvPr/>
         </p:nvSpPr>
@@ -14374,7 +14419,7 @@
       </p:sp>
       <p:sp>
         <p:nvSpPr>
-          <p:cNvPr id="107" name="Google Shape;107;p14"/>
+          <p:cNvPr id="108" name="Google Shape;108;p14"/>
           <p:cNvSpPr txBox="1"/>
           <p:nvPr/>
         </p:nvSpPr>
@@ -14681,7 +14726,7 @@
       </p:sp>
       <p:pic>
         <p:nvPicPr>
-          <p:cNvPr id="108" name="Google Shape;108;p14"/>
+          <p:cNvPr id="109" name="Google Shape;109;p14"/>
           <p:cNvPicPr preferRelativeResize="0"/>
           <p:nvPr/>
         </p:nvPicPr>
@@ -14709,7 +14754,7 @@
       </p:pic>
       <p:pic>
         <p:nvPicPr>
-          <p:cNvPr id="109" name="Google Shape;109;p14"/>
+          <p:cNvPr id="110" name="Google Shape;110;p14"/>
           <p:cNvPicPr preferRelativeResize="0"/>
           <p:nvPr/>
         </p:nvPicPr>
@@ -14737,7 +14782,7 @@
       </p:pic>
       <p:pic>
         <p:nvPicPr>
-          <p:cNvPr id="110" name="Google Shape;110;p14"/>
+          <p:cNvPr id="111" name="Google Shape;111;p14"/>
           <p:cNvPicPr preferRelativeResize="0"/>
           <p:nvPr/>
         </p:nvPicPr>
@@ -14765,13 +14810,13 @@
       </p:pic>
       <p:sp>
         <p:nvSpPr>
-          <p:cNvPr id="111" name="Google Shape;111;p14"/>
+          <p:cNvPr id="112" name="Google Shape;112;p14"/>
           <p:cNvSpPr txBox="1"/>
           <p:nvPr/>
         </p:nvSpPr>
         <p:spPr>
           <a:xfrm>
-            <a:off x="3744400" y="738792"/>
+            <a:off x="3826386" y="738792"/>
             <a:ext cx="3209700" cy="461700"/>
           </a:xfrm>
           <a:prstGeom prst="rect">
@@ -14823,7 +14868,7 @@
       </p:sp>
       <p:pic>
         <p:nvPicPr>
-          <p:cNvPr id="112" name="Google Shape;112;p14"/>
+          <p:cNvPr id="113" name="Google Shape;113;p14"/>
           <p:cNvPicPr preferRelativeResize="0"/>
           <p:nvPr/>
         </p:nvPicPr>
@@ -14851,51 +14896,6 @@
       </p:pic>
       <p:sp>
         <p:nvSpPr>
-          <p:cNvPr id="113" name="Google Shape;113;p14"/>
-          <p:cNvSpPr/>
-          <p:nvPr/>
-        </p:nvSpPr>
-        <p:spPr>
-          <a:xfrm>
-            <a:off x="315400" y="435075"/>
-            <a:ext cx="3227700" cy="7050300"/>
-          </a:xfrm>
-          <a:prstGeom prst="roundRect">
-            <a:avLst>
-              <a:gd fmla="val 16667" name="adj"/>
-            </a:avLst>
-          </a:prstGeom>
-          <a:solidFill>
-            <a:schemeClr val="lt1"/>
-          </a:solidFill>
-          <a:ln>
-            <a:noFill/>
-          </a:ln>
-        </p:spPr>
-        <p:txBody>
-          <a:bodyPr anchorCtr="0" anchor="ctr" bIns="91425" lIns="91425" spcFirstLastPara="1" rIns="91425" wrap="square" tIns="91425">
-            <a:noAutofit/>
-          </a:bodyPr>
-          <a:lstStyle/>
-          <a:p>
-            <a:pPr indent="0" lvl="0" marL="0" rtl="0" algn="l">
-              <a:spcBef>
-                <a:spcPts val="0"/>
-              </a:spcBef>
-              <a:spcAft>
-                <a:spcPts val="0"/>
-              </a:spcAft>
-              <a:buNone/>
-            </a:pPr>
-            <a:r>
-              <a:t/>
-            </a:r>
-            <a:endParaRPr/>
-          </a:p>
-        </p:txBody>
-      </p:sp>
-      <p:sp>
-        <p:nvSpPr>
           <p:cNvPr id="114" name="Google Shape;114;p14"/>
           <p:cNvSpPr txBox="1"/>
           <p:nvPr/>
@@ -16568,8 +16568,8 @@
         </p:nvSpPr>
         <p:spPr>
           <a:xfrm>
-            <a:off x="503200" y="6972943"/>
-            <a:ext cx="2851200" cy="555000"/>
+            <a:off x="503200" y="6972950"/>
+            <a:ext cx="3017400" cy="555000"/>
           </a:xfrm>
           <a:prstGeom prst="rect">
             <a:avLst/>
@@ -17149,6 +17149,285 @@
 </file>
 
 <file path=ppt/theme/theme1.xml><?xml version="1.0" encoding="utf-8"?>
+<a:theme xmlns:a="http://schemas.openxmlformats.org/drawingml/2006/main" xmlns:r="http://schemas.openxmlformats.org/officeDocument/2006/relationships">
+  <a:themeElements>
+    <a:clrScheme name="Default">
+      <a:dk1>
+        <a:srgbClr val="000000"/>
+      </a:dk1>
+      <a:lt1>
+        <a:srgbClr val="FFFFFF"/>
+      </a:lt1>
+      <a:dk2>
+        <a:srgbClr val="158158"/>
+      </a:dk2>
+      <a:lt2>
+        <a:srgbClr val="F3F3F3"/>
+      </a:lt2>
+      <a:accent1>
+        <a:srgbClr val="058DC7"/>
+      </a:accent1>
+      <a:accent2>
+        <a:srgbClr val="50B432"/>
+      </a:accent2>
+      <a:accent3>
+        <a:srgbClr val="ED561B"/>
+      </a:accent3>
+      <a:accent4>
+        <a:srgbClr val="EDEF00"/>
+      </a:accent4>
+      <a:accent5>
+        <a:srgbClr val="24CBE5"/>
+      </a:accent5>
+      <a:accent6>
+        <a:srgbClr val="64E572"/>
+      </a:accent6>
+      <a:hlink>
+        <a:srgbClr val="2200CC"/>
+      </a:hlink>
+      <a:folHlink>
+        <a:srgbClr val="551A8B"/>
+      </a:folHlink>
+    </a:clrScheme>
+    <a:fontScheme name="Office">
+      <a:majorFont>
+        <a:latin typeface="Arial"/>
+        <a:ea typeface=""/>
+        <a:cs typeface=""/>
+        <a:font script="Jpan" typeface="ＭＳ Ｐゴシック"/>
+        <a:font script="Hang" typeface="맑은 고딕"/>
+        <a:font script="Hans" typeface="宋体"/>
+        <a:font script="Hant" typeface="新細明體"/>
+        <a:font script="Arab" typeface="Times New Roman"/>
+        <a:font script="Hebr" typeface="Times New Roman"/>
+        <a:font script="Thai" typeface="Angsana New"/>
+        <a:font script="Ethi" typeface="Nyala"/>
+        <a:font script="Beng" typeface="Vrinda"/>
+        <a:font script="Gujr" typeface="Shruti"/>
+        <a:font script="Khmr" typeface="MoolBoran"/>
+        <a:font script="Knda" typeface="Tunga"/>
+        <a:font script="Guru" typeface="Raavi"/>
+        <a:font script="Cans" typeface="Euphemia"/>
+        <a:font script="Cher" typeface="Plantagenet Cherokee"/>
+        <a:font script="Yiii" typeface="Microsoft Yi Baiti"/>
+        <a:font script="Tibt" typeface="Microsoft Himalaya"/>
+        <a:font script="Thaa" typeface="MV Boli"/>
+        <a:font script="Deva" typeface="Mangal"/>
+        <a:font script="Telu" typeface="Gautami"/>
+        <a:font script="Taml" typeface="Latha"/>
+        <a:font script="Syrc" typeface="Estrangelo Edessa"/>
+        <a:font script="Orya" typeface="Kalinga"/>
+        <a:font script="Mlym" typeface="Kartika"/>
+        <a:font script="Laoo" typeface="DokChampa"/>
+        <a:font script="Sinh" typeface="Iskoola Pota"/>
+        <a:font script="Mong" typeface="Mongolian Baiti"/>
+        <a:font script="Viet" typeface="Times New Roman"/>
+        <a:font script="Uigh" typeface="Microsoft Uighur"/>
+        <a:font script="Geor" typeface="Sylfaen"/>
+      </a:majorFont>
+      <a:minorFont>
+        <a:latin typeface="Arial"/>
+        <a:ea typeface=""/>
+        <a:cs typeface=""/>
+        <a:font script="Jpan" typeface="ＭＳ Ｐゴシック"/>
+        <a:font script="Hang" typeface="맑은 고딕"/>
+        <a:font script="Hans" typeface="宋体"/>
+        <a:font script="Hant" typeface="新細明體"/>
+        <a:font script="Arab" typeface="Arial"/>
+        <a:font script="Hebr" typeface="Arial"/>
+        <a:font script="Thai" typeface="Cordia New"/>
+        <a:font script="Ethi" typeface="Nyala"/>
+        <a:font script="Beng" typeface="Vrinda"/>
+        <a:font script="Gujr" typeface="Shruti"/>
+        <a:font script="Khmr" typeface="DaunPenh"/>
+        <a:font script="Knda" typeface="Tunga"/>
+        <a:font script="Guru" typeface="Raavi"/>
+        <a:font script="Cans" typeface="Euphemia"/>
+        <a:font script="Cher" typeface="Plantagenet Cherokee"/>
+        <a:font script="Yiii" typeface="Microsoft Yi Baiti"/>
+        <a:font script="Tibt" typeface="Microsoft Himalaya"/>
+        <a:font script="Thaa" typeface="MV Boli"/>
+        <a:font script="Deva" typeface="Mangal"/>
+        <a:font script="Telu" typeface="Gautami"/>
+        <a:font script="Taml" typeface="Latha"/>
+        <a:font script="Syrc" typeface="Estrangelo Edessa"/>
+        <a:font script="Orya" typeface="Kalinga"/>
+        <a:font script="Mlym" typeface="Kartika"/>
+        <a:font script="Laoo" typeface="DokChampa"/>
+        <a:font script="Sinh" typeface="Iskoola Pota"/>
+        <a:font script="Mong" typeface="Mongolian Baiti"/>
+        <a:font script="Viet" typeface="Arial"/>
+        <a:font script="Uigh" typeface="Microsoft Uighur"/>
+        <a:font script="Geor" typeface="Sylfaen"/>
+      </a:minorFont>
+    </a:fontScheme>
+    <a:fmtScheme name="Office">
+      <a:fillStyleLst>
+        <a:solidFill>
+          <a:schemeClr val="phClr"/>
+        </a:solidFill>
+        <a:gradFill rotWithShape="1">
+          <a:gsLst>
+            <a:gs pos="0">
+              <a:schemeClr val="phClr">
+                <a:tint val="50000"/>
+                <a:satMod val="300000"/>
+              </a:schemeClr>
+            </a:gs>
+            <a:gs pos="35000">
+              <a:schemeClr val="phClr">
+                <a:tint val="37000"/>
+                <a:satMod val="300000"/>
+              </a:schemeClr>
+            </a:gs>
+            <a:gs pos="100000">
+              <a:schemeClr val="phClr">
+                <a:tint val="15000"/>
+                <a:satMod val="350000"/>
+              </a:schemeClr>
+            </a:gs>
+          </a:gsLst>
+          <a:lin ang="16200000" scaled="1"/>
+        </a:gradFill>
+        <a:gradFill rotWithShape="1">
+          <a:gsLst>
+            <a:gs pos="0">
+              <a:schemeClr val="phClr">
+                <a:tint val="100000"/>
+                <a:shade val="100000"/>
+                <a:satMod val="130000"/>
+              </a:schemeClr>
+            </a:gs>
+            <a:gs pos="100000">
+              <a:schemeClr val="phClr">
+                <a:tint val="50000"/>
+                <a:shade val="100000"/>
+                <a:satMod val="350000"/>
+              </a:schemeClr>
+            </a:gs>
+          </a:gsLst>
+          <a:lin ang="16200000" scaled="0"/>
+        </a:gradFill>
+      </a:fillStyleLst>
+      <a:lnStyleLst>
+        <a:ln w="9525" cap="flat" cmpd="sng" algn="ctr">
+          <a:solidFill>
+            <a:schemeClr val="phClr">
+              <a:shade val="95000"/>
+              <a:satMod val="105000"/>
+            </a:schemeClr>
+          </a:solidFill>
+          <a:prstDash val="solid"/>
+        </a:ln>
+        <a:ln w="25400" cap="flat" cmpd="sng" algn="ctr">
+          <a:solidFill>
+            <a:schemeClr val="phClr"/>
+          </a:solidFill>
+          <a:prstDash val="solid"/>
+        </a:ln>
+        <a:ln w="38100" cap="flat" cmpd="sng" algn="ctr">
+          <a:solidFill>
+            <a:schemeClr val="phClr"/>
+          </a:solidFill>
+          <a:prstDash val="solid"/>
+        </a:ln>
+      </a:lnStyleLst>
+      <a:effectStyleLst>
+        <a:effectStyle>
+          <a:effectLst>
+            <a:outerShdw blurRad="40000" dist="20000" dir="5400000" rotWithShape="0">
+              <a:srgbClr val="000000">
+                <a:alpha val="38000"/>
+              </a:srgbClr>
+            </a:outerShdw>
+          </a:effectLst>
+        </a:effectStyle>
+        <a:effectStyle>
+          <a:effectLst>
+            <a:outerShdw blurRad="40000" dist="23000" dir="5400000" rotWithShape="0">
+              <a:srgbClr val="000000">
+                <a:alpha val="35000"/>
+              </a:srgbClr>
+            </a:outerShdw>
+          </a:effectLst>
+        </a:effectStyle>
+        <a:effectStyle>
+          <a:effectLst>
+            <a:outerShdw blurRad="40000" dist="23000" dir="5400000" rotWithShape="0">
+              <a:srgbClr val="000000">
+                <a:alpha val="35000"/>
+              </a:srgbClr>
+            </a:outerShdw>
+          </a:effectLst>
+          <a:scene3d>
+            <a:camera prst="orthographicFront">
+              <a:rot lat="0" lon="0" rev="0"/>
+            </a:camera>
+            <a:lightRig rig="threePt" dir="t">
+              <a:rot lat="0" lon="0" rev="1200000"/>
+            </a:lightRig>
+          </a:scene3d>
+          <a:sp3d>
+            <a:bevelT w="63500" h="25400"/>
+          </a:sp3d>
+        </a:effectStyle>
+      </a:effectStyleLst>
+      <a:bgFillStyleLst>
+        <a:solidFill>
+          <a:schemeClr val="phClr"/>
+        </a:solidFill>
+        <a:gradFill rotWithShape="1">
+          <a:gsLst>
+            <a:gs pos="0">
+              <a:schemeClr val="phClr">
+                <a:tint val="40000"/>
+                <a:satMod val="350000"/>
+              </a:schemeClr>
+            </a:gs>
+            <a:gs pos="40000">
+              <a:schemeClr val="phClr">
+                <a:tint val="45000"/>
+                <a:shade val="99000"/>
+                <a:satMod val="350000"/>
+              </a:schemeClr>
+            </a:gs>
+            <a:gs pos="100000">
+              <a:schemeClr val="phClr">
+                <a:shade val="20000"/>
+                <a:satMod val="255000"/>
+              </a:schemeClr>
+            </a:gs>
+          </a:gsLst>
+          <a:path path="circle">
+            <a:fillToRect l="50000" t="-80000" r="50000" b="180000"/>
+          </a:path>
+        </a:gradFill>
+        <a:gradFill rotWithShape="1">
+          <a:gsLst>
+            <a:gs pos="0">
+              <a:schemeClr val="phClr">
+                <a:tint val="80000"/>
+                <a:satMod val="300000"/>
+              </a:schemeClr>
+            </a:gs>
+            <a:gs pos="100000">
+              <a:schemeClr val="phClr">
+                <a:shade val="30000"/>
+                <a:satMod val="200000"/>
+              </a:schemeClr>
+            </a:gs>
+          </a:gsLst>
+          <a:path path="circle">
+            <a:fillToRect l="50000" t="50000" r="50000" b="50000"/>
+          </a:path>
+        </a:gradFill>
+      </a:bgFillStyleLst>
+    </a:fmtScheme>
+  </a:themeElements>
+</a:theme>
+</file>
+
+<file path=ppt/theme/theme2.xml><?xml version="1.0" encoding="utf-8"?>
 <a:theme xmlns:a="http://schemas.openxmlformats.org/drawingml/2006/main" xmlns:r="http://schemas.openxmlformats.org/officeDocument/2006/relationships" name="Simple Light">
   <a:themeElements>
     <a:clrScheme name="Simple Light">
@@ -17425,283 +17704,4 @@
     </a:fmtScheme>
   </a:themeElements>
 </a:theme>
-</file>
-
-<file path=ppt/theme/theme2.xml><?xml version="1.0" encoding="utf-8"?>
-<a:theme xmlns:a="http://schemas.openxmlformats.org/drawingml/2006/main" xmlns:r="http://schemas.openxmlformats.org/officeDocument/2006/relationships">
-  <a:themeElements>
-    <a:clrScheme name="Default">
-      <a:dk1>
-        <a:srgbClr val="000000"/>
-      </a:dk1>
-      <a:lt1>
-        <a:srgbClr val="FFFFFF"/>
-      </a:lt1>
-      <a:dk2>
-        <a:srgbClr val="158158"/>
-      </a:dk2>
-      <a:lt2>
-        <a:srgbClr val="F3F3F3"/>
-      </a:lt2>
-      <a:accent1>
-        <a:srgbClr val="058DC7"/>
-      </a:accent1>
-      <a:accent2>
-        <a:srgbClr val="50B432"/>
-      </a:accent2>
-      <a:accent3>
-        <a:srgbClr val="ED561B"/>
-      </a:accent3>
-      <a:accent4>
-        <a:srgbClr val="EDEF00"/>
-      </a:accent4>
-      <a:accent5>
-        <a:srgbClr val="24CBE5"/>
-      </a:accent5>
-      <a:accent6>
-        <a:srgbClr val="64E572"/>
-      </a:accent6>
-      <a:hlink>
-        <a:srgbClr val="2200CC"/>
-      </a:hlink>
-      <a:folHlink>
-        <a:srgbClr val="551A8B"/>
-      </a:folHlink>
-    </a:clrScheme>
-    <a:fontScheme name="Office">
-      <a:majorFont>
-        <a:latin typeface="Arial"/>
-        <a:ea typeface=""/>
-        <a:cs typeface=""/>
-        <a:font script="Jpan" typeface="ＭＳ Ｐゴシック"/>
-        <a:font script="Hang" typeface="맑은 고딕"/>
-        <a:font script="Hans" typeface="宋体"/>
-        <a:font script="Hant" typeface="新細明體"/>
-        <a:font script="Arab" typeface="Times New Roman"/>
-        <a:font script="Hebr" typeface="Times New Roman"/>
-        <a:font script="Thai" typeface="Angsana New"/>
-        <a:font script="Ethi" typeface="Nyala"/>
-        <a:font script="Beng" typeface="Vrinda"/>
-        <a:font script="Gujr" typeface="Shruti"/>
-        <a:font script="Khmr" typeface="MoolBoran"/>
-        <a:font script="Knda" typeface="Tunga"/>
-        <a:font script="Guru" typeface="Raavi"/>
-        <a:font script="Cans" typeface="Euphemia"/>
-        <a:font script="Cher" typeface="Plantagenet Cherokee"/>
-        <a:font script="Yiii" typeface="Microsoft Yi Baiti"/>
-        <a:font script="Tibt" typeface="Microsoft Himalaya"/>
-        <a:font script="Thaa" typeface="MV Boli"/>
-        <a:font script="Deva" typeface="Mangal"/>
-        <a:font script="Telu" typeface="Gautami"/>
-        <a:font script="Taml" typeface="Latha"/>
-        <a:font script="Syrc" typeface="Estrangelo Edessa"/>
-        <a:font script="Orya" typeface="Kalinga"/>
-        <a:font script="Mlym" typeface="Kartika"/>
-        <a:font script="Laoo" typeface="DokChampa"/>
-        <a:font script="Sinh" typeface="Iskoola Pota"/>
-        <a:font script="Mong" typeface="Mongolian Baiti"/>
-        <a:font script="Viet" typeface="Times New Roman"/>
-        <a:font script="Uigh" typeface="Microsoft Uighur"/>
-        <a:font script="Geor" typeface="Sylfaen"/>
-      </a:majorFont>
-      <a:minorFont>
-        <a:latin typeface="Arial"/>
-        <a:ea typeface=""/>
-        <a:cs typeface=""/>
-        <a:font script="Jpan" typeface="ＭＳ Ｐゴシック"/>
-        <a:font script="Hang" typeface="맑은 고딕"/>
-        <a:font script="Hans" typeface="宋体"/>
-        <a:font script="Hant" typeface="新細明體"/>
-        <a:font script="Arab" typeface="Arial"/>
-        <a:font script="Hebr" typeface="Arial"/>
-        <a:font script="Thai" typeface="Cordia New"/>
-        <a:font script="Ethi" typeface="Nyala"/>
-        <a:font script="Beng" typeface="Vrinda"/>
-        <a:font script="Gujr" typeface="Shruti"/>
-        <a:font script="Khmr" typeface="DaunPenh"/>
-        <a:font script="Knda" typeface="Tunga"/>
-        <a:font script="Guru" typeface="Raavi"/>
-        <a:font script="Cans" typeface="Euphemia"/>
-        <a:font script="Cher" typeface="Plantagenet Cherokee"/>
-        <a:font script="Yiii" typeface="Microsoft Yi Baiti"/>
-        <a:font script="Tibt" typeface="Microsoft Himalaya"/>
-        <a:font script="Thaa" typeface="MV Boli"/>
-        <a:font script="Deva" typeface="Mangal"/>
-        <a:font script="Telu" typeface="Gautami"/>
-        <a:font script="Taml" typeface="Latha"/>
-        <a:font script="Syrc" typeface="Estrangelo Edessa"/>
-        <a:font script="Orya" typeface="Kalinga"/>
-        <a:font script="Mlym" typeface="Kartika"/>
-        <a:font script="Laoo" typeface="DokChampa"/>
-        <a:font script="Sinh" typeface="Iskoola Pota"/>
-        <a:font script="Mong" typeface="Mongolian Baiti"/>
-        <a:font script="Viet" typeface="Arial"/>
-        <a:font script="Uigh" typeface="Microsoft Uighur"/>
-        <a:font script="Geor" typeface="Sylfaen"/>
-      </a:minorFont>
-    </a:fontScheme>
-    <a:fmtScheme name="Office">
-      <a:fillStyleLst>
-        <a:solidFill>
-          <a:schemeClr val="phClr"/>
-        </a:solidFill>
-        <a:gradFill rotWithShape="1">
-          <a:gsLst>
-            <a:gs pos="0">
-              <a:schemeClr val="phClr">
-                <a:tint val="50000"/>
-                <a:satMod val="300000"/>
-              </a:schemeClr>
-            </a:gs>
-            <a:gs pos="35000">
-              <a:schemeClr val="phClr">
-                <a:tint val="37000"/>
-                <a:satMod val="300000"/>
-              </a:schemeClr>
-            </a:gs>
-            <a:gs pos="100000">
-              <a:schemeClr val="phClr">
-                <a:tint val="15000"/>
-                <a:satMod val="350000"/>
-              </a:schemeClr>
-            </a:gs>
-          </a:gsLst>
-          <a:lin ang="16200000" scaled="1"/>
-        </a:gradFill>
-        <a:gradFill rotWithShape="1">
-          <a:gsLst>
-            <a:gs pos="0">
-              <a:schemeClr val="phClr">
-                <a:tint val="100000"/>
-                <a:shade val="100000"/>
-                <a:satMod val="130000"/>
-              </a:schemeClr>
-            </a:gs>
-            <a:gs pos="100000">
-              <a:schemeClr val="phClr">
-                <a:tint val="50000"/>
-                <a:shade val="100000"/>
-                <a:satMod val="350000"/>
-              </a:schemeClr>
-            </a:gs>
-          </a:gsLst>
-          <a:lin ang="16200000" scaled="0"/>
-        </a:gradFill>
-      </a:fillStyleLst>
-      <a:lnStyleLst>
-        <a:ln w="9525" cap="flat" cmpd="sng" algn="ctr">
-          <a:solidFill>
-            <a:schemeClr val="phClr">
-              <a:shade val="95000"/>
-              <a:satMod val="105000"/>
-            </a:schemeClr>
-          </a:solidFill>
-          <a:prstDash val="solid"/>
-        </a:ln>
-        <a:ln w="25400" cap="flat" cmpd="sng" algn="ctr">
-          <a:solidFill>
-            <a:schemeClr val="phClr"/>
-          </a:solidFill>
-          <a:prstDash val="solid"/>
-        </a:ln>
-        <a:ln w="38100" cap="flat" cmpd="sng" algn="ctr">
-          <a:solidFill>
-            <a:schemeClr val="phClr"/>
-          </a:solidFill>
-          <a:prstDash val="solid"/>
-        </a:ln>
-      </a:lnStyleLst>
-      <a:effectStyleLst>
-        <a:effectStyle>
-          <a:effectLst>
-            <a:outerShdw blurRad="40000" dist="20000" dir="5400000" rotWithShape="0">
-              <a:srgbClr val="000000">
-                <a:alpha val="38000"/>
-              </a:srgbClr>
-            </a:outerShdw>
-          </a:effectLst>
-        </a:effectStyle>
-        <a:effectStyle>
-          <a:effectLst>
-            <a:outerShdw blurRad="40000" dist="23000" dir="5400000" rotWithShape="0">
-              <a:srgbClr val="000000">
-                <a:alpha val="35000"/>
-              </a:srgbClr>
-            </a:outerShdw>
-          </a:effectLst>
-        </a:effectStyle>
-        <a:effectStyle>
-          <a:effectLst>
-            <a:outerShdw blurRad="40000" dist="23000" dir="5400000" rotWithShape="0">
-              <a:srgbClr val="000000">
-                <a:alpha val="35000"/>
-              </a:srgbClr>
-            </a:outerShdw>
-          </a:effectLst>
-          <a:scene3d>
-            <a:camera prst="orthographicFront">
-              <a:rot lat="0" lon="0" rev="0"/>
-            </a:camera>
-            <a:lightRig rig="threePt" dir="t">
-              <a:rot lat="0" lon="0" rev="1200000"/>
-            </a:lightRig>
-          </a:scene3d>
-          <a:sp3d>
-            <a:bevelT w="63500" h="25400"/>
-          </a:sp3d>
-        </a:effectStyle>
-      </a:effectStyleLst>
-      <a:bgFillStyleLst>
-        <a:solidFill>
-          <a:schemeClr val="phClr"/>
-        </a:solidFill>
-        <a:gradFill rotWithShape="1">
-          <a:gsLst>
-            <a:gs pos="0">
-              <a:schemeClr val="phClr">
-                <a:tint val="40000"/>
-                <a:satMod val="350000"/>
-              </a:schemeClr>
-            </a:gs>
-            <a:gs pos="40000">
-              <a:schemeClr val="phClr">
-                <a:tint val="45000"/>
-                <a:shade val="99000"/>
-                <a:satMod val="350000"/>
-              </a:schemeClr>
-            </a:gs>
-            <a:gs pos="100000">
-              <a:schemeClr val="phClr">
-                <a:shade val="20000"/>
-                <a:satMod val="255000"/>
-              </a:schemeClr>
-            </a:gs>
-          </a:gsLst>
-          <a:path path="circle">
-            <a:fillToRect l="50000" t="-80000" r="50000" b="180000"/>
-          </a:path>
-        </a:gradFill>
-        <a:gradFill rotWithShape="1">
-          <a:gsLst>
-            <a:gs pos="0">
-              <a:schemeClr val="phClr">
-                <a:tint val="80000"/>
-                <a:satMod val="300000"/>
-              </a:schemeClr>
-            </a:gs>
-            <a:gs pos="100000">
-              <a:schemeClr val="phClr">
-                <a:shade val="30000"/>
-                <a:satMod val="200000"/>
-              </a:schemeClr>
-            </a:gs>
-          </a:gsLst>
-          <a:path path="circle">
-            <a:fillToRect l="50000" t="50000" r="50000" b="50000"/>
-          </a:path>
-        </a:gradFill>
-      </a:bgFillStyleLst>
-    </a:fmtScheme>
-  </a:themeElements>
-</a:theme>
 </file>
</xml_diff>

<commit_message>
Closes #2254 - README updates for 1.0 (#2258)
* #2254 added missing punctuation in the README

* #2254 Added Sukalpo Saha and Romain Francois as contributors, Daniel Sjoberg as author, upgraded G Gayatri to author.

* #2254 added some available presentations and corrected typo

* #2254 - added 2024 release schedule, added references to recent conferences, fixed missing full stops in README, regenerated cheatsheet due to misaligned background

* #2254 chore: spelling

* #2254: removed erroneous full stop, archived older presentation in a new presentation archive article

* #2254 fix broken link

* #2218 moved presentation archive vignette to admiraldiscovery
</commit_message>
<xml_diff>
--- a/inst/cheatsheet/admiral_cheatsheet.pptx
+++ b/inst/cheatsheet/admiral_cheatsheet.pptx
@@ -5812,8 +5812,8 @@
         </p:nvSpPr>
         <p:spPr>
           <a:xfrm>
-            <a:off x="3695350" y="1029925"/>
-            <a:ext cx="3209700" cy="6285900"/>
+            <a:off x="3748125" y="1029925"/>
+            <a:ext cx="3227700" cy="6285900"/>
           </a:xfrm>
           <a:prstGeom prst="roundRect">
             <a:avLst>
@@ -6989,7 +6989,7 @@
         </p:nvSpPr>
         <p:spPr>
           <a:xfrm>
-            <a:off x="3771700" y="1112147"/>
+            <a:off x="3824476" y="1112147"/>
             <a:ext cx="3209700" cy="398100"/>
           </a:xfrm>
           <a:prstGeom prst="rect">
@@ -7105,7 +7105,7 @@
         </p:nvSpPr>
         <p:spPr>
           <a:xfrm>
-            <a:off x="4324575" y="1437050"/>
+            <a:off x="4377351" y="1437050"/>
             <a:ext cx="2580600" cy="2471100"/>
           </a:xfrm>
           <a:prstGeom prst="rect">
@@ -7782,7 +7782,7 @@
         </p:nvSpPr>
         <p:spPr>
           <a:xfrm>
-            <a:off x="4324575" y="3831947"/>
+            <a:off x="4377351" y="3831947"/>
             <a:ext cx="2580600" cy="1974000"/>
           </a:xfrm>
           <a:prstGeom prst="rect">
@@ -8312,7 +8312,7 @@
         </p:nvSpPr>
         <p:spPr>
           <a:xfrm>
-            <a:off x="3718275" y="6170350"/>
+            <a:off x="3771051" y="6170350"/>
             <a:ext cx="3186900" cy="840900"/>
           </a:xfrm>
           <a:prstGeom prst="rect">
@@ -9121,7 +9121,7 @@
         </p:blipFill>
         <p:spPr>
           <a:xfrm>
-            <a:off x="3818650" y="1558550"/>
+            <a:off x="3871426" y="1558550"/>
             <a:ext cx="557225" cy="2289924"/>
           </a:xfrm>
           <a:prstGeom prst="rect">
@@ -9149,7 +9149,7 @@
         </p:blipFill>
         <p:spPr>
           <a:xfrm>
-            <a:off x="3732750" y="3903588"/>
+            <a:off x="3785526" y="3903588"/>
             <a:ext cx="660878" cy="2289926"/>
           </a:xfrm>
           <a:prstGeom prst="rect">
@@ -11618,7 +11618,7 @@
         </p:nvSpPr>
         <p:spPr>
           <a:xfrm>
-            <a:off x="3896513" y="6807905"/>
+            <a:off x="3949288" y="6807905"/>
             <a:ext cx="2851200" cy="555000"/>
           </a:xfrm>
           <a:prstGeom prst="rect">
@@ -11724,52 +11724,7 @@
         </p:nvSpPr>
         <p:spPr>
           <a:xfrm>
-            <a:off x="3668200" y="435075"/>
-            <a:ext cx="3209700" cy="6873000"/>
-          </a:xfrm>
-          <a:prstGeom prst="roundRect">
-            <a:avLst>
-              <a:gd fmla="val 16667" name="adj"/>
-            </a:avLst>
-          </a:prstGeom>
-          <a:solidFill>
-            <a:schemeClr val="lt1"/>
-          </a:solidFill>
-          <a:ln>
-            <a:noFill/>
-          </a:ln>
-        </p:spPr>
-        <p:txBody>
-          <a:bodyPr anchorCtr="0" anchor="ctr" bIns="91425" lIns="91425" spcFirstLastPara="1" rIns="91425" wrap="square" tIns="91425">
-            <a:noAutofit/>
-          </a:bodyPr>
-          <a:lstStyle/>
-          <a:p>
-            <a:pPr indent="0" lvl="0" marL="0" rtl="0" algn="l">
-              <a:spcBef>
-                <a:spcPts val="0"/>
-              </a:spcBef>
-              <a:spcAft>
-                <a:spcPts val="0"/>
-              </a:spcAft>
-              <a:buNone/>
-            </a:pPr>
-            <a:r>
-              <a:t/>
-            </a:r>
-            <a:endParaRPr/>
-          </a:p>
-        </p:txBody>
-      </p:sp>
-      <p:sp>
-        <p:nvSpPr>
-          <p:cNvPr id="91" name="Google Shape;91;p14"/>
-          <p:cNvSpPr/>
-          <p:nvPr/>
-        </p:nvSpPr>
-        <p:spPr>
-          <a:xfrm>
-            <a:off x="7200550" y="435075"/>
+            <a:off x="7222450" y="434875"/>
             <a:ext cx="3209700" cy="7030200"/>
           </a:xfrm>
           <a:prstGeom prst="roundRect">
@@ -11806,9 +11761,99 @@
           </a:p>
         </p:txBody>
       </p:sp>
+      <p:sp>
+        <p:nvSpPr>
+          <p:cNvPr id="91" name="Google Shape;91;p14"/>
+          <p:cNvSpPr/>
+          <p:nvPr/>
+        </p:nvSpPr>
+        <p:spPr>
+          <a:xfrm>
+            <a:off x="3748125" y="434775"/>
+            <a:ext cx="3227700" cy="6881100"/>
+          </a:xfrm>
+          <a:prstGeom prst="roundRect">
+            <a:avLst>
+              <a:gd fmla="val 16667" name="adj"/>
+            </a:avLst>
+          </a:prstGeom>
+          <a:solidFill>
+            <a:schemeClr val="lt1"/>
+          </a:solidFill>
+          <a:ln>
+            <a:noFill/>
+          </a:ln>
+        </p:spPr>
+        <p:txBody>
+          <a:bodyPr anchorCtr="0" anchor="ctr" bIns="91425" lIns="91425" spcFirstLastPara="1" rIns="91425" wrap="square" tIns="91425">
+            <a:noAutofit/>
+          </a:bodyPr>
+          <a:lstStyle/>
+          <a:p>
+            <a:pPr indent="0" lvl="0" marL="0" rtl="0" algn="l">
+              <a:spcBef>
+                <a:spcPts val="0"/>
+              </a:spcBef>
+              <a:spcAft>
+                <a:spcPts val="0"/>
+              </a:spcAft>
+              <a:buNone/>
+            </a:pPr>
+            <a:r>
+              <a:t/>
+            </a:r>
+            <a:endParaRPr/>
+          </a:p>
+        </p:txBody>
+      </p:sp>
+      <p:sp>
+        <p:nvSpPr>
+          <p:cNvPr id="92" name="Google Shape;92;p14"/>
+          <p:cNvSpPr/>
+          <p:nvPr/>
+        </p:nvSpPr>
+        <p:spPr>
+          <a:xfrm>
+            <a:off x="288250" y="434775"/>
+            <a:ext cx="3209700" cy="7030200"/>
+          </a:xfrm>
+          <a:prstGeom prst="roundRect">
+            <a:avLst>
+              <a:gd fmla="val 16667" name="adj"/>
+            </a:avLst>
+          </a:prstGeom>
+          <a:solidFill>
+            <a:schemeClr val="lt1"/>
+          </a:solidFill>
+          <a:ln>
+            <a:noFill/>
+          </a:ln>
+        </p:spPr>
+        <p:txBody>
+          <a:bodyPr anchorCtr="0" anchor="ctr" bIns="91425" lIns="91425" spcFirstLastPara="1" rIns="91425" wrap="square" tIns="91425">
+            <a:noAutofit/>
+          </a:bodyPr>
+          <a:lstStyle/>
+          <a:p>
+            <a:pPr indent="0" lvl="0" marL="0" rtl="0" algn="l">
+              <a:spcBef>
+                <a:spcPts val="0"/>
+              </a:spcBef>
+              <a:spcAft>
+                <a:spcPts val="0"/>
+              </a:spcAft>
+              <a:buNone/>
+            </a:pPr>
+            <a:r>
+              <a:t/>
+            </a:r>
+            <a:endParaRPr/>
+          </a:p>
+        </p:txBody>
+      </p:sp>
       <p:pic>
         <p:nvPicPr>
-          <p:cNvPr id="92" name="Google Shape;92;p14"/>
+          <p:cNvPr id="93" name="Google Shape;93;p14"/>
           <p:cNvPicPr preferRelativeResize="0"/>
           <p:nvPr/>
         </p:nvPicPr>
@@ -11836,13 +11881,13 @@
       </p:pic>
       <p:sp>
         <p:nvSpPr>
-          <p:cNvPr id="93" name="Google Shape;93;p14"/>
+          <p:cNvPr id="94" name="Google Shape;94;p14"/>
           <p:cNvSpPr txBox="1"/>
           <p:nvPr/>
         </p:nvSpPr>
         <p:spPr>
           <a:xfrm>
-            <a:off x="3744400" y="432525"/>
+            <a:off x="3826386" y="432525"/>
             <a:ext cx="3209700" cy="398100"/>
           </a:xfrm>
           <a:prstGeom prst="rect">
@@ -11917,7 +11962,7 @@
       </p:sp>
       <p:sp>
         <p:nvSpPr>
-          <p:cNvPr id="94" name="Google Shape;94;p14"/>
+          <p:cNvPr id="95" name="Google Shape;95;p14"/>
           <p:cNvSpPr txBox="1"/>
           <p:nvPr/>
         </p:nvSpPr>
@@ -11998,13 +12043,13 @@
       </p:sp>
       <p:sp>
         <p:nvSpPr>
-          <p:cNvPr id="95" name="Google Shape;95;p14"/>
+          <p:cNvPr id="96" name="Google Shape;96;p14"/>
           <p:cNvSpPr txBox="1"/>
           <p:nvPr/>
         </p:nvSpPr>
         <p:spPr>
           <a:xfrm>
-            <a:off x="4653875" y="3139567"/>
+            <a:off x="4735861" y="3139567"/>
             <a:ext cx="2300400" cy="1747200"/>
           </a:xfrm>
           <a:prstGeom prst="rect">
@@ -12348,13 +12393,13 @@
       </p:sp>
       <p:sp>
         <p:nvSpPr>
-          <p:cNvPr id="96" name="Google Shape;96;p14"/>
+          <p:cNvPr id="97" name="Google Shape;97;p14"/>
           <p:cNvSpPr txBox="1"/>
           <p:nvPr/>
         </p:nvSpPr>
         <p:spPr>
           <a:xfrm>
-            <a:off x="4653775" y="1142200"/>
+            <a:off x="4735761" y="1142200"/>
             <a:ext cx="2300400" cy="1945800"/>
           </a:xfrm>
           <a:prstGeom prst="rect">
@@ -12730,7 +12775,7 @@
       </p:sp>
       <p:pic>
         <p:nvPicPr>
-          <p:cNvPr id="97" name="Google Shape;97;p14"/>
+          <p:cNvPr id="98" name="Google Shape;98;p14"/>
           <p:cNvPicPr preferRelativeResize="0"/>
           <p:nvPr/>
         </p:nvPicPr>
@@ -12744,7 +12789,7 @@
         </p:blipFill>
         <p:spPr>
           <a:xfrm>
-            <a:off x="3789675" y="3257092"/>
+            <a:off x="3871661" y="3257092"/>
             <a:ext cx="842700" cy="1441162"/>
           </a:xfrm>
           <a:prstGeom prst="rect">
@@ -12758,7 +12803,7 @@
       </p:pic>
       <p:pic>
         <p:nvPicPr>
-          <p:cNvPr id="98" name="Google Shape;98;p14"/>
+          <p:cNvPr id="99" name="Google Shape;99;p14"/>
           <p:cNvPicPr preferRelativeResize="0"/>
           <p:nvPr/>
         </p:nvPicPr>
@@ -12772,7 +12817,7 @@
         </p:blipFill>
         <p:spPr>
           <a:xfrm>
-            <a:off x="3811075" y="1245375"/>
+            <a:off x="3893061" y="1245375"/>
             <a:ext cx="799900" cy="1573075"/>
           </a:xfrm>
           <a:prstGeom prst="rect">
@@ -12786,13 +12831,13 @@
       </p:pic>
       <p:sp>
         <p:nvSpPr>
-          <p:cNvPr id="99" name="Google Shape;99;p14"/>
+          <p:cNvPr id="100" name="Google Shape;100;p14"/>
           <p:cNvSpPr txBox="1"/>
           <p:nvPr/>
         </p:nvSpPr>
         <p:spPr>
           <a:xfrm>
-            <a:off x="4653875" y="4894806"/>
+            <a:off x="4735861" y="4894806"/>
             <a:ext cx="2300400" cy="2261100"/>
           </a:xfrm>
           <a:prstGeom prst="rect">
@@ -13168,7 +13213,7 @@
       </p:sp>
       <p:sp>
         <p:nvSpPr>
-          <p:cNvPr id="100" name="Google Shape;100;p14"/>
+          <p:cNvPr id="101" name="Google Shape;101;p14"/>
           <p:cNvSpPr txBox="1"/>
           <p:nvPr/>
         </p:nvSpPr>
@@ -13249,7 +13294,7 @@
       </p:sp>
       <p:sp>
         <p:nvSpPr>
-          <p:cNvPr id="101" name="Google Shape;101;p14"/>
+          <p:cNvPr id="102" name="Google Shape;102;p14"/>
           <p:cNvSpPr txBox="1"/>
           <p:nvPr/>
         </p:nvSpPr>
@@ -13407,7 +13452,7 @@
       </p:sp>
       <p:sp>
         <p:nvSpPr>
-          <p:cNvPr id="102" name="Google Shape;102;p14"/>
+          <p:cNvPr id="103" name="Google Shape;103;p14"/>
           <p:cNvSpPr txBox="1"/>
           <p:nvPr/>
         </p:nvSpPr>
@@ -13563,7 +13608,7 @@
       </p:sp>
       <p:sp>
         <p:nvSpPr>
-          <p:cNvPr id="103" name="Google Shape;103;p14"/>
+          <p:cNvPr id="104" name="Google Shape;104;p14"/>
           <p:cNvSpPr txBox="1"/>
           <p:nvPr/>
         </p:nvSpPr>
@@ -13730,7 +13775,7 @@
       </p:sp>
       <p:pic>
         <p:nvPicPr>
-          <p:cNvPr id="104" name="Google Shape;104;p14"/>
+          <p:cNvPr id="105" name="Google Shape;105;p14"/>
           <p:cNvPicPr preferRelativeResize="0"/>
           <p:nvPr/>
         </p:nvPicPr>
@@ -13744,7 +13789,7 @@
         </p:blipFill>
         <p:spPr>
           <a:xfrm>
-            <a:off x="3764401" y="5003856"/>
+            <a:off x="3846386" y="5003856"/>
             <a:ext cx="893246" cy="1441150"/>
           </a:xfrm>
           <a:prstGeom prst="rect">
@@ -13758,7 +13803,7 @@
       </p:pic>
       <p:sp>
         <p:nvSpPr>
-          <p:cNvPr id="105" name="Google Shape;105;p14"/>
+          <p:cNvPr id="106" name="Google Shape;106;p14"/>
           <p:cNvSpPr txBox="1"/>
           <p:nvPr/>
         </p:nvSpPr>
@@ -14099,7 +14144,7 @@
       </p:sp>
       <p:sp>
         <p:nvSpPr>
-          <p:cNvPr id="106" name="Google Shape;106;p14"/>
+          <p:cNvPr id="107" name="Google Shape;107;p14"/>
           <p:cNvSpPr txBox="1"/>
           <p:nvPr/>
         </p:nvSpPr>
@@ -14374,7 +14419,7 @@
       </p:sp>
       <p:sp>
         <p:nvSpPr>
-          <p:cNvPr id="107" name="Google Shape;107;p14"/>
+          <p:cNvPr id="108" name="Google Shape;108;p14"/>
           <p:cNvSpPr txBox="1"/>
           <p:nvPr/>
         </p:nvSpPr>
@@ -14681,7 +14726,7 @@
       </p:sp>
       <p:pic>
         <p:nvPicPr>
-          <p:cNvPr id="108" name="Google Shape;108;p14"/>
+          <p:cNvPr id="109" name="Google Shape;109;p14"/>
           <p:cNvPicPr preferRelativeResize="0"/>
           <p:nvPr/>
         </p:nvPicPr>
@@ -14709,7 +14754,7 @@
       </p:pic>
       <p:pic>
         <p:nvPicPr>
-          <p:cNvPr id="109" name="Google Shape;109;p14"/>
+          <p:cNvPr id="110" name="Google Shape;110;p14"/>
           <p:cNvPicPr preferRelativeResize="0"/>
           <p:nvPr/>
         </p:nvPicPr>
@@ -14737,7 +14782,7 @@
       </p:pic>
       <p:pic>
         <p:nvPicPr>
-          <p:cNvPr id="110" name="Google Shape;110;p14"/>
+          <p:cNvPr id="111" name="Google Shape;111;p14"/>
           <p:cNvPicPr preferRelativeResize="0"/>
           <p:nvPr/>
         </p:nvPicPr>
@@ -14765,13 +14810,13 @@
       </p:pic>
       <p:sp>
         <p:nvSpPr>
-          <p:cNvPr id="111" name="Google Shape;111;p14"/>
+          <p:cNvPr id="112" name="Google Shape;112;p14"/>
           <p:cNvSpPr txBox="1"/>
           <p:nvPr/>
         </p:nvSpPr>
         <p:spPr>
           <a:xfrm>
-            <a:off x="3744400" y="738792"/>
+            <a:off x="3826386" y="738792"/>
             <a:ext cx="3209700" cy="461700"/>
           </a:xfrm>
           <a:prstGeom prst="rect">
@@ -14823,7 +14868,7 @@
       </p:sp>
       <p:pic>
         <p:nvPicPr>
-          <p:cNvPr id="112" name="Google Shape;112;p14"/>
+          <p:cNvPr id="113" name="Google Shape;113;p14"/>
           <p:cNvPicPr preferRelativeResize="0"/>
           <p:nvPr/>
         </p:nvPicPr>
@@ -14851,51 +14896,6 @@
       </p:pic>
       <p:sp>
         <p:nvSpPr>
-          <p:cNvPr id="113" name="Google Shape;113;p14"/>
-          <p:cNvSpPr/>
-          <p:nvPr/>
-        </p:nvSpPr>
-        <p:spPr>
-          <a:xfrm>
-            <a:off x="315400" y="435075"/>
-            <a:ext cx="3227700" cy="7050300"/>
-          </a:xfrm>
-          <a:prstGeom prst="roundRect">
-            <a:avLst>
-              <a:gd fmla="val 16667" name="adj"/>
-            </a:avLst>
-          </a:prstGeom>
-          <a:solidFill>
-            <a:schemeClr val="lt1"/>
-          </a:solidFill>
-          <a:ln>
-            <a:noFill/>
-          </a:ln>
-        </p:spPr>
-        <p:txBody>
-          <a:bodyPr anchorCtr="0" anchor="ctr" bIns="91425" lIns="91425" spcFirstLastPara="1" rIns="91425" wrap="square" tIns="91425">
-            <a:noAutofit/>
-          </a:bodyPr>
-          <a:lstStyle/>
-          <a:p>
-            <a:pPr indent="0" lvl="0" marL="0" rtl="0" algn="l">
-              <a:spcBef>
-                <a:spcPts val="0"/>
-              </a:spcBef>
-              <a:spcAft>
-                <a:spcPts val="0"/>
-              </a:spcAft>
-              <a:buNone/>
-            </a:pPr>
-            <a:r>
-              <a:t/>
-            </a:r>
-            <a:endParaRPr/>
-          </a:p>
-        </p:txBody>
-      </p:sp>
-      <p:sp>
-        <p:nvSpPr>
           <p:cNvPr id="114" name="Google Shape;114;p14"/>
           <p:cNvSpPr txBox="1"/>
           <p:nvPr/>
@@ -16568,8 +16568,8 @@
         </p:nvSpPr>
         <p:spPr>
           <a:xfrm>
-            <a:off x="503200" y="6972943"/>
-            <a:ext cx="2851200" cy="555000"/>
+            <a:off x="503200" y="6972950"/>
+            <a:ext cx="3017400" cy="555000"/>
           </a:xfrm>
           <a:prstGeom prst="rect">
             <a:avLst/>
@@ -17149,6 +17149,285 @@
 </file>
 
 <file path=ppt/theme/theme1.xml><?xml version="1.0" encoding="utf-8"?>
+<a:theme xmlns:a="http://schemas.openxmlformats.org/drawingml/2006/main" xmlns:r="http://schemas.openxmlformats.org/officeDocument/2006/relationships">
+  <a:themeElements>
+    <a:clrScheme name="Default">
+      <a:dk1>
+        <a:srgbClr val="000000"/>
+      </a:dk1>
+      <a:lt1>
+        <a:srgbClr val="FFFFFF"/>
+      </a:lt1>
+      <a:dk2>
+        <a:srgbClr val="158158"/>
+      </a:dk2>
+      <a:lt2>
+        <a:srgbClr val="F3F3F3"/>
+      </a:lt2>
+      <a:accent1>
+        <a:srgbClr val="058DC7"/>
+      </a:accent1>
+      <a:accent2>
+        <a:srgbClr val="50B432"/>
+      </a:accent2>
+      <a:accent3>
+        <a:srgbClr val="ED561B"/>
+      </a:accent3>
+      <a:accent4>
+        <a:srgbClr val="EDEF00"/>
+      </a:accent4>
+      <a:accent5>
+        <a:srgbClr val="24CBE5"/>
+      </a:accent5>
+      <a:accent6>
+        <a:srgbClr val="64E572"/>
+      </a:accent6>
+      <a:hlink>
+        <a:srgbClr val="2200CC"/>
+      </a:hlink>
+      <a:folHlink>
+        <a:srgbClr val="551A8B"/>
+      </a:folHlink>
+    </a:clrScheme>
+    <a:fontScheme name="Office">
+      <a:majorFont>
+        <a:latin typeface="Arial"/>
+        <a:ea typeface=""/>
+        <a:cs typeface=""/>
+        <a:font script="Jpan" typeface="ＭＳ Ｐゴシック"/>
+        <a:font script="Hang" typeface="맑은 고딕"/>
+        <a:font script="Hans" typeface="宋体"/>
+        <a:font script="Hant" typeface="新細明體"/>
+        <a:font script="Arab" typeface="Times New Roman"/>
+        <a:font script="Hebr" typeface="Times New Roman"/>
+        <a:font script="Thai" typeface="Angsana New"/>
+        <a:font script="Ethi" typeface="Nyala"/>
+        <a:font script="Beng" typeface="Vrinda"/>
+        <a:font script="Gujr" typeface="Shruti"/>
+        <a:font script="Khmr" typeface="MoolBoran"/>
+        <a:font script="Knda" typeface="Tunga"/>
+        <a:font script="Guru" typeface="Raavi"/>
+        <a:font script="Cans" typeface="Euphemia"/>
+        <a:font script="Cher" typeface="Plantagenet Cherokee"/>
+        <a:font script="Yiii" typeface="Microsoft Yi Baiti"/>
+        <a:font script="Tibt" typeface="Microsoft Himalaya"/>
+        <a:font script="Thaa" typeface="MV Boli"/>
+        <a:font script="Deva" typeface="Mangal"/>
+        <a:font script="Telu" typeface="Gautami"/>
+        <a:font script="Taml" typeface="Latha"/>
+        <a:font script="Syrc" typeface="Estrangelo Edessa"/>
+        <a:font script="Orya" typeface="Kalinga"/>
+        <a:font script="Mlym" typeface="Kartika"/>
+        <a:font script="Laoo" typeface="DokChampa"/>
+        <a:font script="Sinh" typeface="Iskoola Pota"/>
+        <a:font script="Mong" typeface="Mongolian Baiti"/>
+        <a:font script="Viet" typeface="Times New Roman"/>
+        <a:font script="Uigh" typeface="Microsoft Uighur"/>
+        <a:font script="Geor" typeface="Sylfaen"/>
+      </a:majorFont>
+      <a:minorFont>
+        <a:latin typeface="Arial"/>
+        <a:ea typeface=""/>
+        <a:cs typeface=""/>
+        <a:font script="Jpan" typeface="ＭＳ Ｐゴシック"/>
+        <a:font script="Hang" typeface="맑은 고딕"/>
+        <a:font script="Hans" typeface="宋体"/>
+        <a:font script="Hant" typeface="新細明體"/>
+        <a:font script="Arab" typeface="Arial"/>
+        <a:font script="Hebr" typeface="Arial"/>
+        <a:font script="Thai" typeface="Cordia New"/>
+        <a:font script="Ethi" typeface="Nyala"/>
+        <a:font script="Beng" typeface="Vrinda"/>
+        <a:font script="Gujr" typeface="Shruti"/>
+        <a:font script="Khmr" typeface="DaunPenh"/>
+        <a:font script="Knda" typeface="Tunga"/>
+        <a:font script="Guru" typeface="Raavi"/>
+        <a:font script="Cans" typeface="Euphemia"/>
+        <a:font script="Cher" typeface="Plantagenet Cherokee"/>
+        <a:font script="Yiii" typeface="Microsoft Yi Baiti"/>
+        <a:font script="Tibt" typeface="Microsoft Himalaya"/>
+        <a:font script="Thaa" typeface="MV Boli"/>
+        <a:font script="Deva" typeface="Mangal"/>
+        <a:font script="Telu" typeface="Gautami"/>
+        <a:font script="Taml" typeface="Latha"/>
+        <a:font script="Syrc" typeface="Estrangelo Edessa"/>
+        <a:font script="Orya" typeface="Kalinga"/>
+        <a:font script="Mlym" typeface="Kartika"/>
+        <a:font script="Laoo" typeface="DokChampa"/>
+        <a:font script="Sinh" typeface="Iskoola Pota"/>
+        <a:font script="Mong" typeface="Mongolian Baiti"/>
+        <a:font script="Viet" typeface="Arial"/>
+        <a:font script="Uigh" typeface="Microsoft Uighur"/>
+        <a:font script="Geor" typeface="Sylfaen"/>
+      </a:minorFont>
+    </a:fontScheme>
+    <a:fmtScheme name="Office">
+      <a:fillStyleLst>
+        <a:solidFill>
+          <a:schemeClr val="phClr"/>
+        </a:solidFill>
+        <a:gradFill rotWithShape="1">
+          <a:gsLst>
+            <a:gs pos="0">
+              <a:schemeClr val="phClr">
+                <a:tint val="50000"/>
+                <a:satMod val="300000"/>
+              </a:schemeClr>
+            </a:gs>
+            <a:gs pos="35000">
+              <a:schemeClr val="phClr">
+                <a:tint val="37000"/>
+                <a:satMod val="300000"/>
+              </a:schemeClr>
+            </a:gs>
+            <a:gs pos="100000">
+              <a:schemeClr val="phClr">
+                <a:tint val="15000"/>
+                <a:satMod val="350000"/>
+              </a:schemeClr>
+            </a:gs>
+          </a:gsLst>
+          <a:lin ang="16200000" scaled="1"/>
+        </a:gradFill>
+        <a:gradFill rotWithShape="1">
+          <a:gsLst>
+            <a:gs pos="0">
+              <a:schemeClr val="phClr">
+                <a:tint val="100000"/>
+                <a:shade val="100000"/>
+                <a:satMod val="130000"/>
+              </a:schemeClr>
+            </a:gs>
+            <a:gs pos="100000">
+              <a:schemeClr val="phClr">
+                <a:tint val="50000"/>
+                <a:shade val="100000"/>
+                <a:satMod val="350000"/>
+              </a:schemeClr>
+            </a:gs>
+          </a:gsLst>
+          <a:lin ang="16200000" scaled="0"/>
+        </a:gradFill>
+      </a:fillStyleLst>
+      <a:lnStyleLst>
+        <a:ln w="9525" cap="flat" cmpd="sng" algn="ctr">
+          <a:solidFill>
+            <a:schemeClr val="phClr">
+              <a:shade val="95000"/>
+              <a:satMod val="105000"/>
+            </a:schemeClr>
+          </a:solidFill>
+          <a:prstDash val="solid"/>
+        </a:ln>
+        <a:ln w="25400" cap="flat" cmpd="sng" algn="ctr">
+          <a:solidFill>
+            <a:schemeClr val="phClr"/>
+          </a:solidFill>
+          <a:prstDash val="solid"/>
+        </a:ln>
+        <a:ln w="38100" cap="flat" cmpd="sng" algn="ctr">
+          <a:solidFill>
+            <a:schemeClr val="phClr"/>
+          </a:solidFill>
+          <a:prstDash val="solid"/>
+        </a:ln>
+      </a:lnStyleLst>
+      <a:effectStyleLst>
+        <a:effectStyle>
+          <a:effectLst>
+            <a:outerShdw blurRad="40000" dist="20000" dir="5400000" rotWithShape="0">
+              <a:srgbClr val="000000">
+                <a:alpha val="38000"/>
+              </a:srgbClr>
+            </a:outerShdw>
+          </a:effectLst>
+        </a:effectStyle>
+        <a:effectStyle>
+          <a:effectLst>
+            <a:outerShdw blurRad="40000" dist="23000" dir="5400000" rotWithShape="0">
+              <a:srgbClr val="000000">
+                <a:alpha val="35000"/>
+              </a:srgbClr>
+            </a:outerShdw>
+          </a:effectLst>
+        </a:effectStyle>
+        <a:effectStyle>
+          <a:effectLst>
+            <a:outerShdw blurRad="40000" dist="23000" dir="5400000" rotWithShape="0">
+              <a:srgbClr val="000000">
+                <a:alpha val="35000"/>
+              </a:srgbClr>
+            </a:outerShdw>
+          </a:effectLst>
+          <a:scene3d>
+            <a:camera prst="orthographicFront">
+              <a:rot lat="0" lon="0" rev="0"/>
+            </a:camera>
+            <a:lightRig rig="threePt" dir="t">
+              <a:rot lat="0" lon="0" rev="1200000"/>
+            </a:lightRig>
+          </a:scene3d>
+          <a:sp3d>
+            <a:bevelT w="63500" h="25400"/>
+          </a:sp3d>
+        </a:effectStyle>
+      </a:effectStyleLst>
+      <a:bgFillStyleLst>
+        <a:solidFill>
+          <a:schemeClr val="phClr"/>
+        </a:solidFill>
+        <a:gradFill rotWithShape="1">
+          <a:gsLst>
+            <a:gs pos="0">
+              <a:schemeClr val="phClr">
+                <a:tint val="40000"/>
+                <a:satMod val="350000"/>
+              </a:schemeClr>
+            </a:gs>
+            <a:gs pos="40000">
+              <a:schemeClr val="phClr">
+                <a:tint val="45000"/>
+                <a:shade val="99000"/>
+                <a:satMod val="350000"/>
+              </a:schemeClr>
+            </a:gs>
+            <a:gs pos="100000">
+              <a:schemeClr val="phClr">
+                <a:shade val="20000"/>
+                <a:satMod val="255000"/>
+              </a:schemeClr>
+            </a:gs>
+          </a:gsLst>
+          <a:path path="circle">
+            <a:fillToRect l="50000" t="-80000" r="50000" b="180000"/>
+          </a:path>
+        </a:gradFill>
+        <a:gradFill rotWithShape="1">
+          <a:gsLst>
+            <a:gs pos="0">
+              <a:schemeClr val="phClr">
+                <a:tint val="80000"/>
+                <a:satMod val="300000"/>
+              </a:schemeClr>
+            </a:gs>
+            <a:gs pos="100000">
+              <a:schemeClr val="phClr">
+                <a:shade val="30000"/>
+                <a:satMod val="200000"/>
+              </a:schemeClr>
+            </a:gs>
+          </a:gsLst>
+          <a:path path="circle">
+            <a:fillToRect l="50000" t="50000" r="50000" b="50000"/>
+          </a:path>
+        </a:gradFill>
+      </a:bgFillStyleLst>
+    </a:fmtScheme>
+  </a:themeElements>
+</a:theme>
+</file>
+
+<file path=ppt/theme/theme2.xml><?xml version="1.0" encoding="utf-8"?>
 <a:theme xmlns:a="http://schemas.openxmlformats.org/drawingml/2006/main" xmlns:r="http://schemas.openxmlformats.org/officeDocument/2006/relationships" name="Simple Light">
   <a:themeElements>
     <a:clrScheme name="Simple Light">
@@ -17425,283 +17704,4 @@
     </a:fmtScheme>
   </a:themeElements>
 </a:theme>
-</file>
-
-<file path=ppt/theme/theme2.xml><?xml version="1.0" encoding="utf-8"?>
-<a:theme xmlns:a="http://schemas.openxmlformats.org/drawingml/2006/main" xmlns:r="http://schemas.openxmlformats.org/officeDocument/2006/relationships">
-  <a:themeElements>
-    <a:clrScheme name="Default">
-      <a:dk1>
-        <a:srgbClr val="000000"/>
-      </a:dk1>
-      <a:lt1>
-        <a:srgbClr val="FFFFFF"/>
-      </a:lt1>
-      <a:dk2>
-        <a:srgbClr val="158158"/>
-      </a:dk2>
-      <a:lt2>
-        <a:srgbClr val="F3F3F3"/>
-      </a:lt2>
-      <a:accent1>
-        <a:srgbClr val="058DC7"/>
-      </a:accent1>
-      <a:accent2>
-        <a:srgbClr val="50B432"/>
-      </a:accent2>
-      <a:accent3>
-        <a:srgbClr val="ED561B"/>
-      </a:accent3>
-      <a:accent4>
-        <a:srgbClr val="EDEF00"/>
-      </a:accent4>
-      <a:accent5>
-        <a:srgbClr val="24CBE5"/>
-      </a:accent5>
-      <a:accent6>
-        <a:srgbClr val="64E572"/>
-      </a:accent6>
-      <a:hlink>
-        <a:srgbClr val="2200CC"/>
-      </a:hlink>
-      <a:folHlink>
-        <a:srgbClr val="551A8B"/>
-      </a:folHlink>
-    </a:clrScheme>
-    <a:fontScheme name="Office">
-      <a:majorFont>
-        <a:latin typeface="Arial"/>
-        <a:ea typeface=""/>
-        <a:cs typeface=""/>
-        <a:font script="Jpan" typeface="ＭＳ Ｐゴシック"/>
-        <a:font script="Hang" typeface="맑은 고딕"/>
-        <a:font script="Hans" typeface="宋体"/>
-        <a:font script="Hant" typeface="新細明體"/>
-        <a:font script="Arab" typeface="Times New Roman"/>
-        <a:font script="Hebr" typeface="Times New Roman"/>
-        <a:font script="Thai" typeface="Angsana New"/>
-        <a:font script="Ethi" typeface="Nyala"/>
-        <a:font script="Beng" typeface="Vrinda"/>
-        <a:font script="Gujr" typeface="Shruti"/>
-        <a:font script="Khmr" typeface="MoolBoran"/>
-        <a:font script="Knda" typeface="Tunga"/>
-        <a:font script="Guru" typeface="Raavi"/>
-        <a:font script="Cans" typeface="Euphemia"/>
-        <a:font script="Cher" typeface="Plantagenet Cherokee"/>
-        <a:font script="Yiii" typeface="Microsoft Yi Baiti"/>
-        <a:font script="Tibt" typeface="Microsoft Himalaya"/>
-        <a:font script="Thaa" typeface="MV Boli"/>
-        <a:font script="Deva" typeface="Mangal"/>
-        <a:font script="Telu" typeface="Gautami"/>
-        <a:font script="Taml" typeface="Latha"/>
-        <a:font script="Syrc" typeface="Estrangelo Edessa"/>
-        <a:font script="Orya" typeface="Kalinga"/>
-        <a:font script="Mlym" typeface="Kartika"/>
-        <a:font script="Laoo" typeface="DokChampa"/>
-        <a:font script="Sinh" typeface="Iskoola Pota"/>
-        <a:font script="Mong" typeface="Mongolian Baiti"/>
-        <a:font script="Viet" typeface="Times New Roman"/>
-        <a:font script="Uigh" typeface="Microsoft Uighur"/>
-        <a:font script="Geor" typeface="Sylfaen"/>
-      </a:majorFont>
-      <a:minorFont>
-        <a:latin typeface="Arial"/>
-        <a:ea typeface=""/>
-        <a:cs typeface=""/>
-        <a:font script="Jpan" typeface="ＭＳ Ｐゴシック"/>
-        <a:font script="Hang" typeface="맑은 고딕"/>
-        <a:font script="Hans" typeface="宋体"/>
-        <a:font script="Hant" typeface="新細明體"/>
-        <a:font script="Arab" typeface="Arial"/>
-        <a:font script="Hebr" typeface="Arial"/>
-        <a:font script="Thai" typeface="Cordia New"/>
-        <a:font script="Ethi" typeface="Nyala"/>
-        <a:font script="Beng" typeface="Vrinda"/>
-        <a:font script="Gujr" typeface="Shruti"/>
-        <a:font script="Khmr" typeface="DaunPenh"/>
-        <a:font script="Knda" typeface="Tunga"/>
-        <a:font script="Guru" typeface="Raavi"/>
-        <a:font script="Cans" typeface="Euphemia"/>
-        <a:font script="Cher" typeface="Plantagenet Cherokee"/>
-        <a:font script="Yiii" typeface="Microsoft Yi Baiti"/>
-        <a:font script="Tibt" typeface="Microsoft Himalaya"/>
-        <a:font script="Thaa" typeface="MV Boli"/>
-        <a:font script="Deva" typeface="Mangal"/>
-        <a:font script="Telu" typeface="Gautami"/>
-        <a:font script="Taml" typeface="Latha"/>
-        <a:font script="Syrc" typeface="Estrangelo Edessa"/>
-        <a:font script="Orya" typeface="Kalinga"/>
-        <a:font script="Mlym" typeface="Kartika"/>
-        <a:font script="Laoo" typeface="DokChampa"/>
-        <a:font script="Sinh" typeface="Iskoola Pota"/>
-        <a:font script="Mong" typeface="Mongolian Baiti"/>
-        <a:font script="Viet" typeface="Arial"/>
-        <a:font script="Uigh" typeface="Microsoft Uighur"/>
-        <a:font script="Geor" typeface="Sylfaen"/>
-      </a:minorFont>
-    </a:fontScheme>
-    <a:fmtScheme name="Office">
-      <a:fillStyleLst>
-        <a:solidFill>
-          <a:schemeClr val="phClr"/>
-        </a:solidFill>
-        <a:gradFill rotWithShape="1">
-          <a:gsLst>
-            <a:gs pos="0">
-              <a:schemeClr val="phClr">
-                <a:tint val="50000"/>
-                <a:satMod val="300000"/>
-              </a:schemeClr>
-            </a:gs>
-            <a:gs pos="35000">
-              <a:schemeClr val="phClr">
-                <a:tint val="37000"/>
-                <a:satMod val="300000"/>
-              </a:schemeClr>
-            </a:gs>
-            <a:gs pos="100000">
-              <a:schemeClr val="phClr">
-                <a:tint val="15000"/>
-                <a:satMod val="350000"/>
-              </a:schemeClr>
-            </a:gs>
-          </a:gsLst>
-          <a:lin ang="16200000" scaled="1"/>
-        </a:gradFill>
-        <a:gradFill rotWithShape="1">
-          <a:gsLst>
-            <a:gs pos="0">
-              <a:schemeClr val="phClr">
-                <a:tint val="100000"/>
-                <a:shade val="100000"/>
-                <a:satMod val="130000"/>
-              </a:schemeClr>
-            </a:gs>
-            <a:gs pos="100000">
-              <a:schemeClr val="phClr">
-                <a:tint val="50000"/>
-                <a:shade val="100000"/>
-                <a:satMod val="350000"/>
-              </a:schemeClr>
-            </a:gs>
-          </a:gsLst>
-          <a:lin ang="16200000" scaled="0"/>
-        </a:gradFill>
-      </a:fillStyleLst>
-      <a:lnStyleLst>
-        <a:ln w="9525" cap="flat" cmpd="sng" algn="ctr">
-          <a:solidFill>
-            <a:schemeClr val="phClr">
-              <a:shade val="95000"/>
-              <a:satMod val="105000"/>
-            </a:schemeClr>
-          </a:solidFill>
-          <a:prstDash val="solid"/>
-        </a:ln>
-        <a:ln w="25400" cap="flat" cmpd="sng" algn="ctr">
-          <a:solidFill>
-            <a:schemeClr val="phClr"/>
-          </a:solidFill>
-          <a:prstDash val="solid"/>
-        </a:ln>
-        <a:ln w="38100" cap="flat" cmpd="sng" algn="ctr">
-          <a:solidFill>
-            <a:schemeClr val="phClr"/>
-          </a:solidFill>
-          <a:prstDash val="solid"/>
-        </a:ln>
-      </a:lnStyleLst>
-      <a:effectStyleLst>
-        <a:effectStyle>
-          <a:effectLst>
-            <a:outerShdw blurRad="40000" dist="20000" dir="5400000" rotWithShape="0">
-              <a:srgbClr val="000000">
-                <a:alpha val="38000"/>
-              </a:srgbClr>
-            </a:outerShdw>
-          </a:effectLst>
-        </a:effectStyle>
-        <a:effectStyle>
-          <a:effectLst>
-            <a:outerShdw blurRad="40000" dist="23000" dir="5400000" rotWithShape="0">
-              <a:srgbClr val="000000">
-                <a:alpha val="35000"/>
-              </a:srgbClr>
-            </a:outerShdw>
-          </a:effectLst>
-        </a:effectStyle>
-        <a:effectStyle>
-          <a:effectLst>
-            <a:outerShdw blurRad="40000" dist="23000" dir="5400000" rotWithShape="0">
-              <a:srgbClr val="000000">
-                <a:alpha val="35000"/>
-              </a:srgbClr>
-            </a:outerShdw>
-          </a:effectLst>
-          <a:scene3d>
-            <a:camera prst="orthographicFront">
-              <a:rot lat="0" lon="0" rev="0"/>
-            </a:camera>
-            <a:lightRig rig="threePt" dir="t">
-              <a:rot lat="0" lon="0" rev="1200000"/>
-            </a:lightRig>
-          </a:scene3d>
-          <a:sp3d>
-            <a:bevelT w="63500" h="25400"/>
-          </a:sp3d>
-        </a:effectStyle>
-      </a:effectStyleLst>
-      <a:bgFillStyleLst>
-        <a:solidFill>
-          <a:schemeClr val="phClr"/>
-        </a:solidFill>
-        <a:gradFill rotWithShape="1">
-          <a:gsLst>
-            <a:gs pos="0">
-              <a:schemeClr val="phClr">
-                <a:tint val="40000"/>
-                <a:satMod val="350000"/>
-              </a:schemeClr>
-            </a:gs>
-            <a:gs pos="40000">
-              <a:schemeClr val="phClr">
-                <a:tint val="45000"/>
-                <a:shade val="99000"/>
-                <a:satMod val="350000"/>
-              </a:schemeClr>
-            </a:gs>
-            <a:gs pos="100000">
-              <a:schemeClr val="phClr">
-                <a:shade val="20000"/>
-                <a:satMod val="255000"/>
-              </a:schemeClr>
-            </a:gs>
-          </a:gsLst>
-          <a:path path="circle">
-            <a:fillToRect l="50000" t="-80000" r="50000" b="180000"/>
-          </a:path>
-        </a:gradFill>
-        <a:gradFill rotWithShape="1">
-          <a:gsLst>
-            <a:gs pos="0">
-              <a:schemeClr val="phClr">
-                <a:tint val="80000"/>
-                <a:satMod val="300000"/>
-              </a:schemeClr>
-            </a:gs>
-            <a:gs pos="100000">
-              <a:schemeClr val="phClr">
-                <a:shade val="30000"/>
-                <a:satMod val="200000"/>
-              </a:schemeClr>
-            </a:gs>
-          </a:gsLst>
-          <a:path path="circle">
-            <a:fillToRect l="50000" t="50000" r="50000" b="50000"/>
-          </a:path>
-        </a:gradFill>
-      </a:bgFillStyleLst>
-    </a:fmtScheme>
-  </a:themeElements>
-</a:theme>
 </file>
</xml_diff>

<commit_message>
Closes #2275 Cheatsheet Enhancements (#2276)
#2275 updated cheatsheet

Co-authored-by: Ben Straub <ben.x.straub@gsk.com>
</commit_message>
<xml_diff>
--- a/inst/cheatsheet/admiral_cheatsheet.pptx
+++ b/inst/cheatsheet/admiral_cheatsheet.pptx
@@ -8390,22 +8390,10 @@
                   </a:extLst>
                 </a:hlinkClick>
               </a:rPr>
-              <a:t>derive_expected_records</a:t>
-            </a:r>
-            <a:r>
-              <a:rPr b="1" lang="en" sz="900">
-                <a:solidFill>
-                  <a:schemeClr val="dk1"/>
-                </a:solidFill>
-                <a:latin typeface="Roboto"/>
-                <a:ea typeface="Roboto"/>
-                <a:cs typeface="Roboto"/>
-                <a:sym typeface="Roboto"/>
-              </a:rPr>
-              <a:t>(), </a:t>
-            </a:r>
-            <a:r>
-              <a:rPr b="1" lang="en" sz="900">
+              <a:t>d</a:t>
+            </a:r>
+            <a:r>
+              <a:rPr b="1" lang="en" sz="850">
                 <a:solidFill>
                   <a:schemeClr val="dk1"/>
                 </a:solidFill>
@@ -8424,42 +8412,22 @@
                   </a:extLst>
                 </a:hlinkClick>
               </a:rPr>
-              <a:t>derive_locf_records</a:t>
-            </a:r>
-            <a:r>
-              <a:rPr b="1" lang="en" sz="900">
-                <a:solidFill>
-                  <a:schemeClr val="dk1"/>
-                </a:solidFill>
-                <a:latin typeface="Roboto"/>
-                <a:ea typeface="Roboto"/>
-                <a:cs typeface="Roboto"/>
-                <a:sym typeface="Roboto"/>
-              </a:rPr>
-              <a:t>()</a:t>
-            </a:r>
-            <a:endParaRPr b="1" sz="900">
-              <a:solidFill>
-                <a:schemeClr val="dk1"/>
-              </a:solidFill>
-              <a:latin typeface="Roboto"/>
-              <a:ea typeface="Roboto"/>
-              <a:cs typeface="Roboto"/>
-              <a:sym typeface="Roboto"/>
-            </a:endParaRPr>
-          </a:p>
-          <a:p>
-            <a:pPr indent="0" lvl="0" marL="0" rtl="0" algn="l">
-              <a:spcBef>
-                <a:spcPts val="0"/>
-              </a:spcBef>
-              <a:spcAft>
-                <a:spcPts val="0"/>
-              </a:spcAft>
-              <a:buNone/>
-            </a:pPr>
-            <a:r>
-              <a:rPr b="1" lang="en" sz="900">
+              <a:t>erive_expected_records</a:t>
+            </a:r>
+            <a:r>
+              <a:rPr b="1" lang="en" sz="850">
+                <a:solidFill>
+                  <a:schemeClr val="dk1"/>
+                </a:solidFill>
+                <a:latin typeface="Roboto"/>
+                <a:ea typeface="Roboto"/>
+                <a:cs typeface="Roboto"/>
+                <a:sym typeface="Roboto"/>
+              </a:rPr>
+              <a:t>(), </a:t>
+            </a:r>
+            <a:r>
+              <a:rPr b="1" lang="en" sz="850">
                 <a:solidFill>
                   <a:schemeClr val="dk1"/>
                 </a:solidFill>
@@ -8478,10 +8446,42 @@
                   </a:extLst>
                 </a:hlinkClick>
               </a:rPr>
-              <a:t>d</a:t>
-            </a:r>
-            <a:r>
-              <a:rPr b="1" lang="en" sz="900">
+              <a:t>derive_locf_records</a:t>
+            </a:r>
+            <a:r>
+              <a:rPr b="1" lang="en" sz="850">
+                <a:solidFill>
+                  <a:schemeClr val="dk1"/>
+                </a:solidFill>
+                <a:latin typeface="Roboto"/>
+                <a:ea typeface="Roboto"/>
+                <a:cs typeface="Roboto"/>
+                <a:sym typeface="Roboto"/>
+              </a:rPr>
+              <a:t>()</a:t>
+            </a:r>
+            <a:endParaRPr b="1" sz="850">
+              <a:solidFill>
+                <a:schemeClr val="dk1"/>
+              </a:solidFill>
+              <a:latin typeface="Roboto"/>
+              <a:ea typeface="Roboto"/>
+              <a:cs typeface="Roboto"/>
+              <a:sym typeface="Roboto"/>
+            </a:endParaRPr>
+          </a:p>
+          <a:p>
+            <a:pPr indent="0" lvl="0" marL="0" rtl="0" algn="l">
+              <a:spcBef>
+                <a:spcPts val="0"/>
+              </a:spcBef>
+              <a:spcAft>
+                <a:spcPts val="0"/>
+              </a:spcAft>
+              <a:buNone/>
+            </a:pPr>
+            <a:r>
+              <a:rPr b="1" lang="en" sz="850">
                 <a:solidFill>
                   <a:schemeClr val="dk1"/>
                 </a:solidFill>
@@ -8500,22 +8500,10 @@
                   </a:extLst>
                 </a:hlinkClick>
               </a:rPr>
-              <a:t>erive_extreme_event</a:t>
-            </a:r>
-            <a:r>
-              <a:rPr b="1" lang="en" sz="900">
-                <a:solidFill>
-                  <a:schemeClr val="dk1"/>
-                </a:solidFill>
-                <a:latin typeface="Roboto"/>
-                <a:ea typeface="Roboto"/>
-                <a:cs typeface="Roboto"/>
-                <a:sym typeface="Roboto"/>
-              </a:rPr>
-              <a:t>(), </a:t>
-            </a:r>
-            <a:r>
-              <a:rPr b="1" lang="en" sz="900">
+              <a:t>d</a:t>
+            </a:r>
+            <a:r>
+              <a:rPr b="1" lang="en" sz="850">
                 <a:solidFill>
                   <a:schemeClr val="dk1"/>
                 </a:solidFill>
@@ -8534,47 +8522,22 @@
                   </a:extLst>
                 </a:hlinkClick>
               </a:rPr>
-              <a:t>derive_param_exposure</a:t>
-            </a:r>
-            <a:r>
-              <a:rPr b="1" lang="en" sz="900">
-                <a:solidFill>
-                  <a:schemeClr val="dk1"/>
-                </a:solidFill>
-                <a:latin typeface="Roboto"/>
-                <a:ea typeface="Roboto"/>
-                <a:cs typeface="Roboto"/>
-                <a:sym typeface="Roboto"/>
-              </a:rPr>
-              <a:t>(),</a:t>
-            </a:r>
-            <a:endParaRPr b="1" sz="900">
-              <a:solidFill>
-                <a:schemeClr val="dk1"/>
-              </a:solidFill>
-              <a:latin typeface="Roboto"/>
-              <a:ea typeface="Roboto"/>
-              <a:cs typeface="Roboto"/>
-              <a:sym typeface="Roboto"/>
-            </a:endParaRPr>
-          </a:p>
-          <a:p>
-            <a:pPr indent="0" lvl="0" marL="0" rtl="0" algn="l">
-              <a:spcBef>
-                <a:spcPts val="0"/>
-              </a:spcBef>
-              <a:spcAft>
-                <a:spcPts val="0"/>
-              </a:spcAft>
-              <a:buClr>
-                <a:schemeClr val="dk1"/>
-              </a:buClr>
-              <a:buSzPts val="1100"/>
-              <a:buFont typeface="Arial"/>
-              <a:buNone/>
-            </a:pPr>
-            <a:r>
-              <a:rPr b="1" lang="en" sz="900">
+              <a:t>erive_extreme_event</a:t>
+            </a:r>
+            <a:r>
+              <a:rPr b="1" lang="en" sz="850">
+                <a:solidFill>
+                  <a:schemeClr val="dk1"/>
+                </a:solidFill>
+                <a:latin typeface="Roboto"/>
+                <a:ea typeface="Roboto"/>
+                <a:cs typeface="Roboto"/>
+                <a:sym typeface="Roboto"/>
+              </a:rPr>
+              <a:t>(), </a:t>
+            </a:r>
+            <a:r>
+              <a:rPr b="1" lang="en" sz="850">
                 <a:solidFill>
                   <a:schemeClr val="dk1"/>
                 </a:solidFill>
@@ -8593,10 +8556,69 @@
                   </a:extLst>
                 </a:hlinkClick>
               </a:rPr>
+              <a:t>derive_param_exposure</a:t>
+            </a:r>
+            <a:r>
+              <a:rPr b="1" lang="en" sz="850">
+                <a:solidFill>
+                  <a:schemeClr val="dk1"/>
+                </a:solidFill>
+                <a:latin typeface="Roboto"/>
+                <a:ea typeface="Roboto"/>
+                <a:cs typeface="Roboto"/>
+                <a:sym typeface="Roboto"/>
+              </a:rPr>
+              <a:t>(),</a:t>
+            </a:r>
+            <a:endParaRPr b="1" sz="850">
+              <a:solidFill>
+                <a:schemeClr val="dk1"/>
+              </a:solidFill>
+              <a:latin typeface="Roboto"/>
+              <a:ea typeface="Roboto"/>
+              <a:cs typeface="Roboto"/>
+              <a:sym typeface="Roboto"/>
+            </a:endParaRPr>
+          </a:p>
+          <a:p>
+            <a:pPr indent="0" lvl="0" marL="0" rtl="0" algn="l">
+              <a:spcBef>
+                <a:spcPts val="0"/>
+              </a:spcBef>
+              <a:spcAft>
+                <a:spcPts val="0"/>
+              </a:spcAft>
+              <a:buClr>
+                <a:schemeClr val="dk1"/>
+              </a:buClr>
+              <a:buSzPts val="1100"/>
+              <a:buFont typeface="Arial"/>
+              <a:buNone/>
+            </a:pPr>
+            <a:r>
+              <a:rPr b="1" lang="en" sz="850">
+                <a:solidFill>
+                  <a:schemeClr val="dk1"/>
+                </a:solidFill>
+                <a:uFill>
+                  <a:noFill/>
+                </a:uFill>
+                <a:latin typeface="Roboto"/>
+                <a:ea typeface="Roboto"/>
+                <a:cs typeface="Roboto"/>
+                <a:sym typeface="Roboto"/>
+                <a:hlinkClick r:id="rId15">
+                  <a:extLst>
+                    <a:ext uri="{A12FA001-AC4F-418D-AE19-62706E023703}">
+                      <ahyp:hlinkClr val="tx"/>
+                    </a:ext>
+                  </a:extLst>
+                </a:hlinkClick>
+              </a:rPr>
               <a:t>derive_summary_records</a:t>
             </a:r>
             <a:r>
-              <a:rPr b="1" lang="en" sz="900">
+              <a:rPr b="1" lang="en" sz="850">
                 <a:solidFill>
                   <a:schemeClr val="dk1"/>
                 </a:solidFill>
@@ -8607,7 +8629,7 @@
               </a:rPr>
               <a:t>()</a:t>
             </a:r>
-            <a:endParaRPr b="1" sz="900">
+            <a:endParaRPr b="1" sz="850">
               <a:solidFill>
                 <a:schemeClr val="dk1"/>
               </a:solidFill>
@@ -8630,7 +8652,7 @@
             <a:r>
               <a:t/>
             </a:r>
-            <a:endParaRPr i="1" sz="900">
+            <a:endParaRPr i="1" sz="850">
               <a:solidFill>
                 <a:schemeClr val="dk1"/>
               </a:solidFill>
@@ -8719,8 +8741,8 @@
         </p:nvSpPr>
         <p:spPr>
           <a:xfrm>
-            <a:off x="354550" y="6785250"/>
-            <a:ext cx="3114600" cy="738900"/>
+            <a:off x="454250" y="6751628"/>
+            <a:ext cx="3245100" cy="846600"/>
           </a:xfrm>
           <a:prstGeom prst="rect">
             <a:avLst/>
@@ -8778,29 +8800,7 @@
               <a:buNone/>
             </a:pPr>
             <a:r>
-              <a:rPr b="1" lang="en" sz="900">
-                <a:solidFill>
-                  <a:schemeClr val="dk1"/>
-                </a:solidFill>
-                <a:uFill>
-                  <a:noFill/>
-                </a:uFill>
-                <a:latin typeface="Roboto"/>
-                <a:ea typeface="Roboto"/>
-                <a:cs typeface="Roboto"/>
-                <a:sym typeface="Roboto"/>
-                <a:hlinkClick r:id="rId15">
-                  <a:extLst>
-                    <a:ext uri="{A12FA001-AC4F-418D-AE19-62706E023703}">
-                      <ahyp:hlinkClr val="tx"/>
-                    </a:ext>
-                  </a:extLst>
-                </a:hlinkClick>
-              </a:rPr>
-              <a:t>d</a:t>
-            </a:r>
-            <a:r>
-              <a:rPr b="1" lang="en" sz="900">
+              <a:rPr b="1" lang="en" sz="850">
                 <a:solidFill>
                   <a:schemeClr val="dk1"/>
                 </a:solidFill>
@@ -8819,22 +8819,22 @@
                   </a:extLst>
                 </a:hlinkClick>
               </a:rPr>
-              <a:t>erive_vars_transposed</a:t>
-            </a:r>
-            <a:r>
-              <a:rPr b="1" lang="en" sz="900">
-                <a:solidFill>
-                  <a:schemeClr val="dk1"/>
-                </a:solidFill>
-                <a:latin typeface="Roboto"/>
-                <a:ea typeface="Roboto"/>
-                <a:cs typeface="Roboto"/>
-                <a:sym typeface="Roboto"/>
-              </a:rPr>
-              <a:t>(), </a:t>
-            </a:r>
-            <a:r>
-              <a:rPr b="1" lang="en" sz="900">
+              <a:t>derive_vars_extreme_event</a:t>
+            </a:r>
+            <a:r>
+              <a:rPr b="1" lang="en" sz="850">
+                <a:solidFill>
+                  <a:schemeClr val="dk1"/>
+                </a:solidFill>
+                <a:latin typeface="Roboto"/>
+                <a:ea typeface="Roboto"/>
+                <a:cs typeface="Roboto"/>
+                <a:sym typeface="Roboto"/>
+              </a:rPr>
+              <a:t>() </a:t>
+            </a:r>
+            <a:r>
+              <a:rPr b="1" lang="en" sz="850">
                 <a:solidFill>
                   <a:schemeClr val="dk1"/>
                 </a:solidFill>
@@ -8853,10 +8853,10 @@
                   </a:extLst>
                 </a:hlinkClick>
               </a:rPr>
-              <a:t>derive_var_merged_ef_msrc</a:t>
-            </a:r>
-            <a:r>
-              <a:rPr b="1" lang="en" sz="900">
+              <a:t>derive_vars_merged_lookup</a:t>
+            </a:r>
+            <a:r>
+              <a:rPr b="1" lang="en" sz="850">
                 <a:solidFill>
                   <a:schemeClr val="dk1"/>
                 </a:solidFill>
@@ -8867,28 +8867,28 @@
               </a:rPr>
               <a:t>()</a:t>
             </a:r>
-            <a:endParaRPr b="1" sz="900">
-              <a:solidFill>
-                <a:schemeClr val="dk1"/>
-              </a:solidFill>
-              <a:latin typeface="Roboto"/>
-              <a:ea typeface="Roboto"/>
-              <a:cs typeface="Roboto"/>
-              <a:sym typeface="Roboto"/>
-            </a:endParaRPr>
-          </a:p>
-          <a:p>
-            <a:pPr indent="0" lvl="0" marL="0" rtl="0" algn="l">
-              <a:spcBef>
-                <a:spcPts val="0"/>
-              </a:spcBef>
-              <a:spcAft>
-                <a:spcPts val="0"/>
-              </a:spcAft>
-              <a:buNone/>
-            </a:pPr>
-            <a:r>
-              <a:rPr b="1" lang="en" sz="900">
+            <a:endParaRPr sz="850" u="sng">
+              <a:solidFill>
+                <a:schemeClr val="dk1"/>
+              </a:solidFill>
+              <a:latin typeface="Roboto"/>
+              <a:ea typeface="Roboto"/>
+              <a:cs typeface="Roboto"/>
+              <a:sym typeface="Roboto"/>
+            </a:endParaRPr>
+          </a:p>
+          <a:p>
+            <a:pPr indent="0" lvl="0" marL="0" rtl="0" algn="l">
+              <a:spcBef>
+                <a:spcPts val="0"/>
+              </a:spcBef>
+              <a:spcAft>
+                <a:spcPts val="0"/>
+              </a:spcAft>
+              <a:buNone/>
+            </a:pPr>
+            <a:r>
+              <a:rPr b="1" lang="en" sz="850">
                 <a:solidFill>
                   <a:schemeClr val="dk1"/>
                 </a:solidFill>
@@ -8910,7 +8910,7 @@
               <a:t>d</a:t>
             </a:r>
             <a:r>
-              <a:rPr b="1" lang="en" sz="900">
+              <a:rPr b="1" lang="en" sz="850">
                 <a:solidFill>
                   <a:schemeClr val="dk1"/>
                 </a:solidFill>
@@ -8929,10 +8929,10 @@
                   </a:extLst>
                 </a:hlinkClick>
               </a:rPr>
-              <a:t>erive_vars_computed</a:t>
-            </a:r>
-            <a:r>
-              <a:rPr b="1" lang="en" sz="900">
+              <a:t>erive_vars_transposed</a:t>
+            </a:r>
+            <a:r>
+              <a:rPr b="1" lang="en" sz="850">
                 <a:solidFill>
                   <a:schemeClr val="dk1"/>
                 </a:solidFill>
@@ -8944,7 +8944,7 @@
               <a:t>(), </a:t>
             </a:r>
             <a:r>
-              <a:rPr b="1" lang="en" sz="900">
+              <a:rPr b="1" lang="en" sz="850">
                 <a:solidFill>
                   <a:schemeClr val="dk1"/>
                 </a:solidFill>
@@ -8963,10 +8963,42 @@
                   </a:extLst>
                 </a:hlinkClick>
               </a:rPr>
-              <a:t>d</a:t>
-            </a:r>
-            <a:r>
-              <a:rPr b="1" lang="en" sz="900">
+              <a:t>derive_var_merged_ef_msrc</a:t>
+            </a:r>
+            <a:r>
+              <a:rPr b="1" lang="en" sz="850">
+                <a:solidFill>
+                  <a:schemeClr val="dk1"/>
+                </a:solidFill>
+                <a:latin typeface="Roboto"/>
+                <a:ea typeface="Roboto"/>
+                <a:cs typeface="Roboto"/>
+                <a:sym typeface="Roboto"/>
+              </a:rPr>
+              <a:t>()</a:t>
+            </a:r>
+            <a:endParaRPr b="1" sz="850">
+              <a:solidFill>
+                <a:schemeClr val="dk1"/>
+              </a:solidFill>
+              <a:latin typeface="Roboto"/>
+              <a:ea typeface="Roboto"/>
+              <a:cs typeface="Roboto"/>
+              <a:sym typeface="Roboto"/>
+            </a:endParaRPr>
+          </a:p>
+          <a:p>
+            <a:pPr indent="0" lvl="0" marL="0" rtl="0" algn="l">
+              <a:spcBef>
+                <a:spcPts val="0"/>
+              </a:spcBef>
+              <a:spcAft>
+                <a:spcPts val="0"/>
+              </a:spcAft>
+              <a:buNone/>
+            </a:pPr>
+            <a:r>
+              <a:rPr b="1" lang="en" sz="850">
                 <a:solidFill>
                   <a:schemeClr val="dk1"/>
                 </a:solidFill>
@@ -8985,54 +9017,10 @@
                   </a:extLst>
                 </a:hlinkClick>
               </a:rPr>
-              <a:t>erive_var_merged_summary</a:t>
-            </a:r>
-            <a:r>
-              <a:rPr b="1" lang="en" sz="900">
-                <a:solidFill>
-                  <a:schemeClr val="dk1"/>
-                </a:solidFill>
-                <a:latin typeface="Roboto"/>
-                <a:ea typeface="Roboto"/>
-                <a:cs typeface="Roboto"/>
-                <a:sym typeface="Roboto"/>
-              </a:rPr>
-              <a:t>()</a:t>
-            </a:r>
-            <a:endParaRPr b="1" sz="900">
-              <a:solidFill>
-                <a:schemeClr val="dk1"/>
-              </a:solidFill>
-              <a:latin typeface="Roboto"/>
-              <a:ea typeface="Roboto"/>
-              <a:cs typeface="Roboto"/>
-              <a:sym typeface="Roboto"/>
-            </a:endParaRPr>
-          </a:p>
-          <a:p>
-            <a:pPr indent="0" lvl="0" marL="0" rtl="0" algn="l">
-              <a:spcBef>
-                <a:spcPts val="0"/>
-              </a:spcBef>
-              <a:spcAft>
-                <a:spcPts val="0"/>
-              </a:spcAft>
-              <a:buNone/>
-            </a:pPr>
-            <a:r>
-              <a:rPr b="1" lang="en" sz="900">
-                <a:solidFill>
-                  <a:schemeClr val="dk1"/>
-                </a:solidFill>
-                <a:latin typeface="Roboto"/>
-                <a:ea typeface="Roboto"/>
-                <a:cs typeface="Roboto"/>
-                <a:sym typeface="Roboto"/>
-              </a:rPr>
-              <a:t>                             </a:t>
-            </a:r>
-            <a:r>
-              <a:rPr b="1" lang="en" sz="900">
+              <a:t>d</a:t>
+            </a:r>
+            <a:r>
+              <a:rPr b="1" lang="en" sz="850">
                 <a:solidFill>
                   <a:schemeClr val="dk1"/>
                 </a:solidFill>
@@ -9051,10 +9039,66 @@
                   </a:extLst>
                 </a:hlinkClick>
               </a:rPr>
-              <a:t>derive_vars_extreme_event</a:t>
-            </a:r>
-            <a:r>
-              <a:rPr b="1" lang="en" sz="900">
+              <a:t>erive_vars_computed</a:t>
+            </a:r>
+            <a:r>
+              <a:rPr b="1" lang="en" sz="850">
+                <a:solidFill>
+                  <a:schemeClr val="dk1"/>
+                </a:solidFill>
+                <a:latin typeface="Roboto"/>
+                <a:ea typeface="Roboto"/>
+                <a:cs typeface="Roboto"/>
+                <a:sym typeface="Roboto"/>
+              </a:rPr>
+              <a:t>(), </a:t>
+            </a:r>
+            <a:r>
+              <a:rPr b="1" lang="en" sz="850">
+                <a:solidFill>
+                  <a:schemeClr val="dk1"/>
+                </a:solidFill>
+                <a:uFill>
+                  <a:noFill/>
+                </a:uFill>
+                <a:latin typeface="Roboto"/>
+                <a:ea typeface="Roboto"/>
+                <a:cs typeface="Roboto"/>
+                <a:sym typeface="Roboto"/>
+                <a:hlinkClick r:id="rId23">
+                  <a:extLst>
+                    <a:ext uri="{A12FA001-AC4F-418D-AE19-62706E023703}">
+                      <ahyp:hlinkClr val="tx"/>
+                    </a:ext>
+                  </a:extLst>
+                </a:hlinkClick>
+              </a:rPr>
+              <a:t>d</a:t>
+            </a:r>
+            <a:r>
+              <a:rPr b="1" lang="en" sz="850">
+                <a:solidFill>
+                  <a:schemeClr val="dk1"/>
+                </a:solidFill>
+                <a:uFill>
+                  <a:noFill/>
+                </a:uFill>
+                <a:latin typeface="Roboto"/>
+                <a:ea typeface="Roboto"/>
+                <a:cs typeface="Roboto"/>
+                <a:sym typeface="Roboto"/>
+                <a:hlinkClick r:id="rId24">
+                  <a:extLst>
+                    <a:ext uri="{A12FA001-AC4F-418D-AE19-62706E023703}">
+                      <ahyp:hlinkClr val="tx"/>
+                    </a:ext>
+                  </a:extLst>
+                </a:hlinkClick>
+              </a:rPr>
+              <a:t>erive_var_merged_summary</a:t>
+            </a:r>
+            <a:r>
+              <a:rPr b="1" lang="en" sz="850">
                 <a:solidFill>
                   <a:schemeClr val="dk1"/>
                 </a:solidFill>
@@ -9065,7 +9109,30 @@
               </a:rPr>
               <a:t>()</a:t>
             </a:r>
-            <a:endParaRPr b="1" sz="900">
+            <a:endParaRPr b="1" sz="850">
+              <a:solidFill>
+                <a:schemeClr val="dk1"/>
+              </a:solidFill>
+              <a:latin typeface="Roboto"/>
+              <a:ea typeface="Roboto"/>
+              <a:cs typeface="Roboto"/>
+              <a:sym typeface="Roboto"/>
+            </a:endParaRPr>
+          </a:p>
+          <a:p>
+            <a:pPr indent="0" lvl="0" marL="0" rtl="0" algn="l">
+              <a:spcBef>
+                <a:spcPts val="0"/>
+              </a:spcBef>
+              <a:spcAft>
+                <a:spcPts val="0"/>
+              </a:spcAft>
+              <a:buNone/>
+            </a:pPr>
+            <a:r>
+              <a:t/>
+            </a:r>
+            <a:endParaRPr b="1" sz="850">
               <a:solidFill>
                 <a:schemeClr val="dk1"/>
               </a:solidFill>
@@ -9084,7 +9151,7 @@
           <p:nvPr/>
         </p:nvPicPr>
         <p:blipFill>
-          <a:blip r:embed="rId23">
+          <a:blip r:embed="rId25">
             <a:alphaModFix/>
           </a:blip>
           <a:stretch>
@@ -9112,7 +9179,7 @@
           <p:nvPr/>
         </p:nvPicPr>
         <p:blipFill>
-          <a:blip r:embed="rId24">
+          <a:blip r:embed="rId26">
             <a:alphaModFix/>
           </a:blip>
           <a:stretch>
@@ -9140,7 +9207,7 @@
           <p:nvPr/>
         </p:nvPicPr>
         <p:blipFill>
-          <a:blip r:embed="rId25">
+          <a:blip r:embed="rId27">
             <a:alphaModFix/>
           </a:blip>
           <a:stretch>
@@ -9213,7 +9280,7 @@
                 <a:ea typeface="Roboto"/>
                 <a:cs typeface="Roboto"/>
                 <a:sym typeface="Roboto"/>
-                <a:hlinkClick r:id="rId26"/>
+                <a:hlinkClick r:id="rId28"/>
               </a:rPr>
               <a:t>Github Repo</a:t>
             </a:r>
@@ -9235,7 +9302,7 @@
                 <a:ea typeface="Roboto"/>
                 <a:cs typeface="Roboto"/>
                 <a:sym typeface="Roboto"/>
-                <a:hlinkClick r:id="rId27"/>
+                <a:hlinkClick r:id="rId29"/>
               </a:rPr>
               <a:t>Documentation</a:t>
             </a:r>
@@ -9257,7 +9324,7 @@
                 <a:ea typeface="Roboto"/>
                 <a:cs typeface="Roboto"/>
                 <a:sym typeface="Roboto"/>
-                <a:hlinkClick r:id="rId28"/>
+                <a:hlinkClick r:id="rId30"/>
               </a:rPr>
               <a:t>Join the Pharmaverse Slack</a:t>
             </a:r>
@@ -9286,7 +9353,7 @@
           <p:nvPr/>
         </p:nvPicPr>
         <p:blipFill>
-          <a:blip r:embed="rId29">
+          <a:blip r:embed="rId31">
             <a:alphaModFix/>
           </a:blip>
           <a:stretch>
@@ -9511,7 +9578,7 @@
                 <a:ea typeface="Roboto"/>
                 <a:cs typeface="Roboto"/>
                 <a:sym typeface="Roboto"/>
-                <a:hlinkClick r:id="rId30">
+                <a:hlinkClick r:id="rId32">
                   <a:extLst>
                     <a:ext uri="{A12FA001-AC4F-418D-AE19-62706E023703}">
                       <ahyp:hlinkClr val="tx"/>
@@ -9752,7 +9819,7 @@
                 <a:ea typeface="Roboto"/>
                 <a:cs typeface="Roboto"/>
                 <a:sym typeface="Roboto"/>
-                <a:hlinkClick r:id="rId31">
+                <a:hlinkClick r:id="rId33">
                   <a:extLst>
                     <a:ext uri="{A12FA001-AC4F-418D-AE19-62706E023703}">
                       <ahyp:hlinkClr val="tx"/>
@@ -10084,7 +10151,7 @@
                 <a:ea typeface="Roboto"/>
                 <a:cs typeface="Roboto"/>
                 <a:sym typeface="Roboto"/>
-                <a:hlinkClick r:id="rId32">
+                <a:hlinkClick r:id="rId34">
                   <a:extLst>
                     <a:ext uri="{A12FA001-AC4F-418D-AE19-62706E023703}">
                       <ahyp:hlinkClr val="tx"/>
@@ -10434,7 +10501,7 @@
                 <a:ea typeface="Roboto"/>
                 <a:cs typeface="Roboto"/>
                 <a:sym typeface="Roboto"/>
-                <a:hlinkClick r:id="rId33">
+                <a:hlinkClick r:id="rId35">
                   <a:extLst>
                     <a:ext uri="{A12FA001-AC4F-418D-AE19-62706E023703}">
                       <ahyp:hlinkClr val="tx"/>
@@ -10695,7 +10762,7 @@
           <p:nvPr/>
         </p:nvPicPr>
         <p:blipFill>
-          <a:blip r:embed="rId34">
+          <a:blip r:embed="rId36">
             <a:alphaModFix/>
           </a:blip>
           <a:stretch>
@@ -10936,114 +11003,6 @@
                 <a:ea typeface="Roboto"/>
                 <a:cs typeface="Roboto"/>
                 <a:sym typeface="Roboto"/>
-                <a:hlinkClick r:id="rId35">
-                  <a:extLst>
-                    <a:ext uri="{A12FA001-AC4F-418D-AE19-62706E023703}">
-                      <ahyp:hlinkClr val="tx"/>
-                    </a:ext>
-                  </a:extLst>
-                </a:hlinkClick>
-              </a:rPr>
-              <a:t>compute_age_years</a:t>
-            </a:r>
-            <a:r>
-              <a:rPr b="1" lang="en" sz="900">
-                <a:solidFill>
-                  <a:schemeClr val="dk1"/>
-                </a:solidFill>
-                <a:latin typeface="Roboto"/>
-                <a:ea typeface="Roboto"/>
-                <a:cs typeface="Roboto"/>
-                <a:sym typeface="Roboto"/>
-              </a:rPr>
-              <a:t>()</a:t>
-            </a:r>
-            <a:endParaRPr b="1" sz="900">
-              <a:solidFill>
-                <a:schemeClr val="dk1"/>
-              </a:solidFill>
-              <a:latin typeface="Roboto"/>
-              <a:ea typeface="Roboto"/>
-              <a:cs typeface="Roboto"/>
-              <a:sym typeface="Roboto"/>
-            </a:endParaRPr>
-          </a:p>
-          <a:p>
-            <a:pPr indent="0" lvl="0" marL="0" rtl="0" algn="l">
-              <a:spcBef>
-                <a:spcPts val="0"/>
-              </a:spcBef>
-              <a:spcAft>
-                <a:spcPts val="0"/>
-              </a:spcAft>
-              <a:buNone/>
-            </a:pPr>
-            <a:r>
-              <a:rPr b="1" lang="en" sz="900">
-                <a:solidFill>
-                  <a:schemeClr val="dk1"/>
-                </a:solidFill>
-                <a:uFill>
-                  <a:noFill/>
-                </a:uFill>
-                <a:latin typeface="Roboto"/>
-                <a:ea typeface="Roboto"/>
-                <a:cs typeface="Roboto"/>
-                <a:sym typeface="Roboto"/>
-                <a:hlinkClick r:id="rId36">
-                  <a:extLst>
-                    <a:ext uri="{A12FA001-AC4F-418D-AE19-62706E023703}">
-                      <ahyp:hlinkClr val="tx"/>
-                    </a:ext>
-                  </a:extLst>
-                </a:hlinkClick>
-              </a:rPr>
-              <a:t>compute_dtf</a:t>
-            </a:r>
-            <a:r>
-              <a:rPr b="1" lang="en" sz="900">
-                <a:solidFill>
-                  <a:schemeClr val="dk1"/>
-                </a:solidFill>
-                <a:latin typeface="Roboto"/>
-                <a:ea typeface="Roboto"/>
-                <a:cs typeface="Roboto"/>
-                <a:sym typeface="Roboto"/>
-              </a:rPr>
-              <a:t>()</a:t>
-            </a:r>
-            <a:endParaRPr b="1" sz="900">
-              <a:solidFill>
-                <a:schemeClr val="dk1"/>
-              </a:solidFill>
-              <a:latin typeface="Roboto"/>
-              <a:ea typeface="Roboto"/>
-              <a:cs typeface="Roboto"/>
-              <a:sym typeface="Roboto"/>
-            </a:endParaRPr>
-          </a:p>
-          <a:p>
-            <a:pPr indent="0" lvl="0" marL="0" rtl="0" algn="l">
-              <a:spcBef>
-                <a:spcPts val="0"/>
-              </a:spcBef>
-              <a:spcAft>
-                <a:spcPts val="0"/>
-              </a:spcAft>
-              <a:buNone/>
-            </a:pPr>
-            <a:r>
-              <a:rPr b="1" lang="en" sz="900">
-                <a:solidFill>
-                  <a:schemeClr val="dk1"/>
-                </a:solidFill>
-                <a:uFill>
-                  <a:noFill/>
-                </a:uFill>
-                <a:latin typeface="Roboto"/>
-                <a:ea typeface="Roboto"/>
-                <a:cs typeface="Roboto"/>
-                <a:sym typeface="Roboto"/>
                 <a:hlinkClick r:id="rId37">
                   <a:extLst>
                     <a:ext uri="{A12FA001-AC4F-418D-AE19-62706E023703}">
@@ -11052,7 +11011,7 @@
                   </a:extLst>
                 </a:hlinkClick>
               </a:rPr>
-              <a:t>compute_duration</a:t>
+              <a:t>compute_age_years</a:t>
             </a:r>
             <a:r>
               <a:rPr b="1" lang="en" sz="900">
@@ -11106,7 +11065,7 @@
                   </a:extLst>
                 </a:hlinkClick>
               </a:rPr>
-              <a:t>compute_tmf</a:t>
+              <a:t>compute_dtf</a:t>
             </a:r>
             <a:r>
               <a:rPr b="1" lang="en" sz="900">
@@ -11153,6 +11112,114 @@
                 <a:cs typeface="Roboto"/>
                 <a:sym typeface="Roboto"/>
                 <a:hlinkClick r:id="rId39">
+                  <a:extLst>
+                    <a:ext uri="{A12FA001-AC4F-418D-AE19-62706E023703}">
+                      <ahyp:hlinkClr val="tx"/>
+                    </a:ext>
+                  </a:extLst>
+                </a:hlinkClick>
+              </a:rPr>
+              <a:t>compute_duration</a:t>
+            </a:r>
+            <a:r>
+              <a:rPr b="1" lang="en" sz="900">
+                <a:solidFill>
+                  <a:schemeClr val="dk1"/>
+                </a:solidFill>
+                <a:latin typeface="Roboto"/>
+                <a:ea typeface="Roboto"/>
+                <a:cs typeface="Roboto"/>
+                <a:sym typeface="Roboto"/>
+              </a:rPr>
+              <a:t>()</a:t>
+            </a:r>
+            <a:endParaRPr b="1" sz="900">
+              <a:solidFill>
+                <a:schemeClr val="dk1"/>
+              </a:solidFill>
+              <a:latin typeface="Roboto"/>
+              <a:ea typeface="Roboto"/>
+              <a:cs typeface="Roboto"/>
+              <a:sym typeface="Roboto"/>
+            </a:endParaRPr>
+          </a:p>
+          <a:p>
+            <a:pPr indent="0" lvl="0" marL="0" rtl="0" algn="l">
+              <a:spcBef>
+                <a:spcPts val="0"/>
+              </a:spcBef>
+              <a:spcAft>
+                <a:spcPts val="0"/>
+              </a:spcAft>
+              <a:buNone/>
+            </a:pPr>
+            <a:r>
+              <a:rPr b="1" lang="en" sz="900">
+                <a:solidFill>
+                  <a:schemeClr val="dk1"/>
+                </a:solidFill>
+                <a:uFill>
+                  <a:noFill/>
+                </a:uFill>
+                <a:latin typeface="Roboto"/>
+                <a:ea typeface="Roboto"/>
+                <a:cs typeface="Roboto"/>
+                <a:sym typeface="Roboto"/>
+                <a:hlinkClick r:id="rId40">
+                  <a:extLst>
+                    <a:ext uri="{A12FA001-AC4F-418D-AE19-62706E023703}">
+                      <ahyp:hlinkClr val="tx"/>
+                    </a:ext>
+                  </a:extLst>
+                </a:hlinkClick>
+              </a:rPr>
+              <a:t>compute_tmf</a:t>
+            </a:r>
+            <a:r>
+              <a:rPr b="1" lang="en" sz="900">
+                <a:solidFill>
+                  <a:schemeClr val="dk1"/>
+                </a:solidFill>
+                <a:latin typeface="Roboto"/>
+                <a:ea typeface="Roboto"/>
+                <a:cs typeface="Roboto"/>
+                <a:sym typeface="Roboto"/>
+              </a:rPr>
+              <a:t>()</a:t>
+            </a:r>
+            <a:endParaRPr b="1" sz="900">
+              <a:solidFill>
+                <a:schemeClr val="dk1"/>
+              </a:solidFill>
+              <a:latin typeface="Roboto"/>
+              <a:ea typeface="Roboto"/>
+              <a:cs typeface="Roboto"/>
+              <a:sym typeface="Roboto"/>
+            </a:endParaRPr>
+          </a:p>
+          <a:p>
+            <a:pPr indent="0" lvl="0" marL="0" rtl="0" algn="l">
+              <a:spcBef>
+                <a:spcPts val="0"/>
+              </a:spcBef>
+              <a:spcAft>
+                <a:spcPts val="0"/>
+              </a:spcAft>
+              <a:buNone/>
+            </a:pPr>
+            <a:r>
+              <a:rPr b="1" lang="en" sz="900">
+                <a:solidFill>
+                  <a:schemeClr val="dk1"/>
+                </a:solidFill>
+                <a:uFill>
+                  <a:noFill/>
+                </a:uFill>
+                <a:latin typeface="Roboto"/>
+                <a:ea typeface="Roboto"/>
+                <a:cs typeface="Roboto"/>
+                <a:sym typeface="Roboto"/>
+                <a:hlinkClick r:id="rId41">
                   <a:extLst>
                     <a:ext uri="{A12FA001-AC4F-418D-AE19-62706E023703}">
                       <ahyp:hlinkClr val="tx"/>
@@ -11301,114 +11368,6 @@
                 <a:ea typeface="Roboto"/>
                 <a:cs typeface="Roboto"/>
                 <a:sym typeface="Roboto"/>
-                <a:hlinkClick r:id="rId40">
-                  <a:extLst>
-                    <a:ext uri="{A12FA001-AC4F-418D-AE19-62706E023703}">
-                      <ahyp:hlinkClr val="tx"/>
-                    </a:ext>
-                  </a:extLst>
-                </a:hlinkClick>
-              </a:rPr>
-              <a:t>convert_dtc_to_dt</a:t>
-            </a:r>
-            <a:r>
-              <a:rPr b="1" lang="en" sz="900">
-                <a:solidFill>
-                  <a:schemeClr val="dk1"/>
-                </a:solidFill>
-                <a:latin typeface="Roboto"/>
-                <a:ea typeface="Roboto"/>
-                <a:cs typeface="Roboto"/>
-                <a:sym typeface="Roboto"/>
-              </a:rPr>
-              <a:t>()</a:t>
-            </a:r>
-            <a:endParaRPr b="1" sz="900">
-              <a:solidFill>
-                <a:schemeClr val="dk1"/>
-              </a:solidFill>
-              <a:latin typeface="Roboto"/>
-              <a:ea typeface="Roboto"/>
-              <a:cs typeface="Roboto"/>
-              <a:sym typeface="Roboto"/>
-            </a:endParaRPr>
-          </a:p>
-          <a:p>
-            <a:pPr indent="0" lvl="0" marL="0" rtl="0" algn="l">
-              <a:spcBef>
-                <a:spcPts val="0"/>
-              </a:spcBef>
-              <a:spcAft>
-                <a:spcPts val="0"/>
-              </a:spcAft>
-              <a:buNone/>
-            </a:pPr>
-            <a:r>
-              <a:rPr b="1" lang="en" sz="900">
-                <a:solidFill>
-                  <a:schemeClr val="dk1"/>
-                </a:solidFill>
-                <a:uFill>
-                  <a:noFill/>
-                </a:uFill>
-                <a:latin typeface="Roboto"/>
-                <a:ea typeface="Roboto"/>
-                <a:cs typeface="Roboto"/>
-                <a:sym typeface="Roboto"/>
-                <a:hlinkClick r:id="rId41">
-                  <a:extLst>
-                    <a:ext uri="{A12FA001-AC4F-418D-AE19-62706E023703}">
-                      <ahyp:hlinkClr val="tx"/>
-                    </a:ext>
-                  </a:extLst>
-                </a:hlinkClick>
-              </a:rPr>
-              <a:t>convert_dtc_to_dtm</a:t>
-            </a:r>
-            <a:r>
-              <a:rPr b="1" lang="en" sz="900">
-                <a:solidFill>
-                  <a:schemeClr val="dk1"/>
-                </a:solidFill>
-                <a:latin typeface="Roboto"/>
-                <a:ea typeface="Roboto"/>
-                <a:cs typeface="Roboto"/>
-                <a:sym typeface="Roboto"/>
-              </a:rPr>
-              <a:t>()</a:t>
-            </a:r>
-            <a:endParaRPr b="1" sz="900">
-              <a:solidFill>
-                <a:schemeClr val="dk1"/>
-              </a:solidFill>
-              <a:latin typeface="Roboto"/>
-              <a:ea typeface="Roboto"/>
-              <a:cs typeface="Roboto"/>
-              <a:sym typeface="Roboto"/>
-            </a:endParaRPr>
-          </a:p>
-          <a:p>
-            <a:pPr indent="0" lvl="0" marL="0" rtl="0" algn="l">
-              <a:spcBef>
-                <a:spcPts val="0"/>
-              </a:spcBef>
-              <a:spcAft>
-                <a:spcPts val="0"/>
-              </a:spcAft>
-              <a:buNone/>
-            </a:pPr>
-            <a:r>
-              <a:rPr b="1" lang="en" sz="900">
-                <a:solidFill>
-                  <a:schemeClr val="dk1"/>
-                </a:solidFill>
-                <a:uFill>
-                  <a:noFill/>
-                </a:uFill>
-                <a:latin typeface="Roboto"/>
-                <a:ea typeface="Roboto"/>
-                <a:cs typeface="Roboto"/>
-                <a:sym typeface="Roboto"/>
                 <a:hlinkClick r:id="rId42">
                   <a:extLst>
                     <a:ext uri="{A12FA001-AC4F-418D-AE19-62706E023703}">
@@ -11417,8 +11376,40 @@
                   </a:extLst>
                 </a:hlinkClick>
               </a:rPr>
-              <a:t>i</a:t>
-            </a:r>
+              <a:t>convert_dtc_to_dt</a:t>
+            </a:r>
+            <a:r>
+              <a:rPr b="1" lang="en" sz="900">
+                <a:solidFill>
+                  <a:schemeClr val="dk1"/>
+                </a:solidFill>
+                <a:latin typeface="Roboto"/>
+                <a:ea typeface="Roboto"/>
+                <a:cs typeface="Roboto"/>
+                <a:sym typeface="Roboto"/>
+              </a:rPr>
+              <a:t>()</a:t>
+            </a:r>
+            <a:endParaRPr b="1" sz="900">
+              <a:solidFill>
+                <a:schemeClr val="dk1"/>
+              </a:solidFill>
+              <a:latin typeface="Roboto"/>
+              <a:ea typeface="Roboto"/>
+              <a:cs typeface="Roboto"/>
+              <a:sym typeface="Roboto"/>
+            </a:endParaRPr>
+          </a:p>
+          <a:p>
+            <a:pPr indent="0" lvl="0" marL="0" rtl="0" algn="l">
+              <a:spcBef>
+                <a:spcPts val="0"/>
+              </a:spcBef>
+              <a:spcAft>
+                <a:spcPts val="0"/>
+              </a:spcAft>
+              <a:buNone/>
+            </a:pPr>
             <a:r>
               <a:rPr b="1" lang="en" sz="900">
                 <a:solidFill>
@@ -11439,8 +11430,40 @@
                   </a:extLst>
                 </a:hlinkClick>
               </a:rPr>
-              <a:t>mpute_dtc</a:t>
-            </a:r>
+              <a:t>convert_dtc_to_dtm</a:t>
+            </a:r>
+            <a:r>
+              <a:rPr b="1" lang="en" sz="900">
+                <a:solidFill>
+                  <a:schemeClr val="dk1"/>
+                </a:solidFill>
+                <a:latin typeface="Roboto"/>
+                <a:ea typeface="Roboto"/>
+                <a:cs typeface="Roboto"/>
+                <a:sym typeface="Roboto"/>
+              </a:rPr>
+              <a:t>()</a:t>
+            </a:r>
+            <a:endParaRPr b="1" sz="900">
+              <a:solidFill>
+                <a:schemeClr val="dk1"/>
+              </a:solidFill>
+              <a:latin typeface="Roboto"/>
+              <a:ea typeface="Roboto"/>
+              <a:cs typeface="Roboto"/>
+              <a:sym typeface="Roboto"/>
+            </a:endParaRPr>
+          </a:p>
+          <a:p>
+            <a:pPr indent="0" lvl="0" marL="0" rtl="0" algn="l">
+              <a:spcBef>
+                <a:spcPts val="0"/>
+              </a:spcBef>
+              <a:spcAft>
+                <a:spcPts val="0"/>
+              </a:spcAft>
+              <a:buNone/>
+            </a:pPr>
             <a:r>
               <a:rPr b="1" lang="en" sz="900">
                 <a:solidFill>
@@ -11461,40 +11484,8 @@
                   </a:extLst>
                 </a:hlinkClick>
               </a:rPr>
-              <a:t>_dt</a:t>
-            </a:r>
-            <a:r>
-              <a:rPr b="1" lang="en" sz="900">
-                <a:solidFill>
-                  <a:schemeClr val="dk1"/>
-                </a:solidFill>
-                <a:latin typeface="Roboto"/>
-                <a:ea typeface="Roboto"/>
-                <a:cs typeface="Roboto"/>
-                <a:sym typeface="Roboto"/>
-              </a:rPr>
-              <a:t>()</a:t>
-            </a:r>
-            <a:endParaRPr b="1" sz="900">
-              <a:solidFill>
-                <a:schemeClr val="dk1"/>
-              </a:solidFill>
-              <a:latin typeface="Roboto"/>
-              <a:ea typeface="Roboto"/>
-              <a:cs typeface="Roboto"/>
-              <a:sym typeface="Roboto"/>
-            </a:endParaRPr>
-          </a:p>
-          <a:p>
-            <a:pPr indent="0" lvl="0" marL="0" rtl="0" algn="l">
-              <a:spcBef>
-                <a:spcPts val="0"/>
-              </a:spcBef>
-              <a:spcAft>
-                <a:spcPts val="0"/>
-              </a:spcAft>
-              <a:buNone/>
-            </a:pPr>
+              <a:t>i</a:t>
+            </a:r>
             <a:r>
               <a:rPr b="1" lang="en" sz="900">
                 <a:solidFill>
@@ -11508,6 +11499,82 @@
                 <a:cs typeface="Roboto"/>
                 <a:sym typeface="Roboto"/>
                 <a:hlinkClick r:id="rId45">
+                  <a:extLst>
+                    <a:ext uri="{A12FA001-AC4F-418D-AE19-62706E023703}">
+                      <ahyp:hlinkClr val="tx"/>
+                    </a:ext>
+                  </a:extLst>
+                </a:hlinkClick>
+              </a:rPr>
+              <a:t>mpute_dtc</a:t>
+            </a:r>
+            <a:r>
+              <a:rPr b="1" lang="en" sz="900">
+                <a:solidFill>
+                  <a:schemeClr val="dk1"/>
+                </a:solidFill>
+                <a:uFill>
+                  <a:noFill/>
+                </a:uFill>
+                <a:latin typeface="Roboto"/>
+                <a:ea typeface="Roboto"/>
+                <a:cs typeface="Roboto"/>
+                <a:sym typeface="Roboto"/>
+                <a:hlinkClick r:id="rId46">
+                  <a:extLst>
+                    <a:ext uri="{A12FA001-AC4F-418D-AE19-62706E023703}">
+                      <ahyp:hlinkClr val="tx"/>
+                    </a:ext>
+                  </a:extLst>
+                </a:hlinkClick>
+              </a:rPr>
+              <a:t>_dt</a:t>
+            </a:r>
+            <a:r>
+              <a:rPr b="1" lang="en" sz="900">
+                <a:solidFill>
+                  <a:schemeClr val="dk1"/>
+                </a:solidFill>
+                <a:latin typeface="Roboto"/>
+                <a:ea typeface="Roboto"/>
+                <a:cs typeface="Roboto"/>
+                <a:sym typeface="Roboto"/>
+              </a:rPr>
+              <a:t>()</a:t>
+            </a:r>
+            <a:endParaRPr b="1" sz="900">
+              <a:solidFill>
+                <a:schemeClr val="dk1"/>
+              </a:solidFill>
+              <a:latin typeface="Roboto"/>
+              <a:ea typeface="Roboto"/>
+              <a:cs typeface="Roboto"/>
+              <a:sym typeface="Roboto"/>
+            </a:endParaRPr>
+          </a:p>
+          <a:p>
+            <a:pPr indent="0" lvl="0" marL="0" rtl="0" algn="l">
+              <a:spcBef>
+                <a:spcPts val="0"/>
+              </a:spcBef>
+              <a:spcAft>
+                <a:spcPts val="0"/>
+              </a:spcAft>
+              <a:buNone/>
+            </a:pPr>
+            <a:r>
+              <a:rPr b="1" lang="en" sz="900">
+                <a:solidFill>
+                  <a:schemeClr val="dk1"/>
+                </a:solidFill>
+                <a:uFill>
+                  <a:noFill/>
+                </a:uFill>
+                <a:latin typeface="Roboto"/>
+                <a:ea typeface="Roboto"/>
+                <a:cs typeface="Roboto"/>
+                <a:sym typeface="Roboto"/>
+                <a:hlinkClick r:id="rId47">
                   <a:extLst>
                     <a:ext uri="{A12FA001-AC4F-418D-AE19-62706E023703}">
                       <ahyp:hlinkClr val="tx"/>
@@ -11662,7 +11729,7 @@
                 <a:ea typeface="Roboto"/>
                 <a:cs typeface="Roboto"/>
                 <a:sym typeface="Roboto"/>
-                <a:hlinkClick r:id="rId46"/>
+                <a:hlinkClick r:id="rId48"/>
               </a:rPr>
               <a:t>reference page</a:t>
             </a:r>
@@ -11968,7 +12035,7 @@
         </p:nvSpPr>
         <p:spPr>
           <a:xfrm>
-            <a:off x="7200550" y="2110750"/>
+            <a:off x="7200550" y="2068172"/>
             <a:ext cx="3209700" cy="398100"/>
           </a:xfrm>
           <a:prstGeom prst="rect">
@@ -13614,7 +13681,7 @@
         </p:nvSpPr>
         <p:spPr>
           <a:xfrm>
-            <a:off x="8109750" y="2389900"/>
+            <a:off x="8109750" y="2347322"/>
             <a:ext cx="2300400" cy="884700"/>
           </a:xfrm>
           <a:prstGeom prst="rect">
@@ -13809,7 +13876,7 @@
         </p:nvSpPr>
         <p:spPr>
           <a:xfrm>
-            <a:off x="8087650" y="4370875"/>
+            <a:off x="8087650" y="3077164"/>
             <a:ext cx="2300400" cy="1065600"/>
           </a:xfrm>
           <a:prstGeom prst="rect">
@@ -14150,8 +14217,8 @@
         </p:nvSpPr>
         <p:spPr>
           <a:xfrm>
-            <a:off x="8109825" y="3151900"/>
-            <a:ext cx="2300400" cy="1263300"/>
+            <a:off x="8087650" y="4616511"/>
+            <a:ext cx="2344500" cy="1676100"/>
           </a:xfrm>
           <a:prstGeom prst="rect">
             <a:avLst/>
@@ -14196,11 +14263,23 @@
                   </a:extLst>
                 </a:hlinkClick>
               </a:rPr>
-              <a:t>extract_duplicate_records</a:t>
+              <a:t>filter_extreme</a:t>
             </a:r>
             <a:r>
               <a:rPr lang="en" sz="900">
                 <a:solidFill>
+                  <a:schemeClr val="dk1"/>
+                </a:solidFill>
+                <a:latin typeface="Roboto"/>
+                <a:ea typeface="Roboto"/>
+                <a:cs typeface="Roboto"/>
+                <a:sym typeface="Roboto"/>
+              </a:rPr>
+              <a:t>(</a:t>
+            </a:r>
+            <a:r>
+              <a:rPr lang="en" sz="900">
+                <a:solidFill>
                   <a:srgbClr val="9E9E9E"/>
                 </a:solidFill>
                 <a:latin typeface="Roboto"/>
@@ -14208,51 +14287,62 @@
                 <a:cs typeface="Roboto"/>
                 <a:sym typeface="Roboto"/>
               </a:rPr>
-              <a:t>(</a:t>
-            </a:r>
+              <a:t>dataset, by_vars, order, mode, check_type = "warning") </a:t>
+            </a:r>
+            <a:endParaRPr sz="900">
+              <a:solidFill>
+                <a:srgbClr val="9E9E9E"/>
+              </a:solidFill>
+              <a:latin typeface="Roboto"/>
+              <a:ea typeface="Roboto"/>
+              <a:cs typeface="Roboto"/>
+              <a:sym typeface="Roboto"/>
+            </a:endParaRPr>
+          </a:p>
+          <a:p>
+            <a:pPr indent="0" lvl="0" marL="0" rtl="0" algn="l">
+              <a:spcBef>
+                <a:spcPts val="0"/>
+              </a:spcBef>
+              <a:spcAft>
+                <a:spcPts val="0"/>
+              </a:spcAft>
+              <a:buNone/>
+            </a:pPr>
             <a:r>
               <a:rPr lang="en" sz="900">
                 <a:solidFill>
-                  <a:srgbClr val="9E9E9E"/>
-                </a:solidFill>
-                <a:latin typeface="Roboto"/>
-                <a:ea typeface="Roboto"/>
-                <a:cs typeface="Roboto"/>
-                <a:sym typeface="Roboto"/>
-              </a:rPr>
-              <a:t>dataset, by_vars)</a:t>
+                  <a:schemeClr val="dk1"/>
+                </a:solidFill>
+                <a:latin typeface="Roboto"/>
+                <a:ea typeface="Roboto"/>
+                <a:cs typeface="Roboto"/>
+                <a:sym typeface="Roboto"/>
+              </a:rPr>
+              <a:t>Filters the first/last record in by group.</a:t>
             </a:r>
             <a:endParaRPr sz="900">
               <a:solidFill>
-                <a:srgbClr val="9E9E9E"/>
-              </a:solidFill>
-              <a:latin typeface="Roboto"/>
-              <a:ea typeface="Roboto"/>
-              <a:cs typeface="Roboto"/>
-              <a:sym typeface="Roboto"/>
-            </a:endParaRPr>
-          </a:p>
-          <a:p>
-            <a:pPr indent="0" lvl="0" marL="0" rtl="0" algn="l">
-              <a:spcBef>
-                <a:spcPts val="0"/>
-              </a:spcBef>
-              <a:spcAft>
-                <a:spcPts val="0"/>
-              </a:spcAft>
-              <a:buNone/>
-            </a:pPr>
-            <a:r>
-              <a:rPr lang="en" sz="900">
-                <a:solidFill>
-                  <a:schemeClr val="dk1"/>
-                </a:solidFill>
-                <a:latin typeface="Roboto"/>
-                <a:ea typeface="Roboto"/>
-                <a:cs typeface="Roboto"/>
-                <a:sym typeface="Roboto"/>
-              </a:rPr>
-              <a:t>Extract duplicate records from a dataset.</a:t>
+                <a:schemeClr val="dk1"/>
+              </a:solidFill>
+              <a:latin typeface="Roboto"/>
+              <a:ea typeface="Roboto"/>
+              <a:cs typeface="Roboto"/>
+              <a:sym typeface="Roboto"/>
+            </a:endParaRPr>
+          </a:p>
+          <a:p>
+            <a:pPr indent="0" lvl="0" marL="0" rtl="0" algn="l">
+              <a:spcBef>
+                <a:spcPts val="0"/>
+              </a:spcBef>
+              <a:spcAft>
+                <a:spcPts val="0"/>
+              </a:spcAft>
+              <a:buNone/>
+            </a:pPr>
+            <a:r>
+              <a:t/>
             </a:r>
             <a:endParaRPr sz="900">
               <a:solidFill>
@@ -14275,29 +14365,6 @@
               <a:buNone/>
             </a:pPr>
             <a:r>
-              <a:t/>
-            </a:r>
-            <a:endParaRPr sz="900">
-              <a:solidFill>
-                <a:schemeClr val="dk1"/>
-              </a:solidFill>
-              <a:latin typeface="Roboto"/>
-              <a:ea typeface="Roboto"/>
-              <a:cs typeface="Roboto"/>
-              <a:sym typeface="Roboto"/>
-            </a:endParaRPr>
-          </a:p>
-          <a:p>
-            <a:pPr indent="0" lvl="0" marL="0" rtl="0" algn="l">
-              <a:spcBef>
-                <a:spcPts val="0"/>
-              </a:spcBef>
-              <a:spcAft>
-                <a:spcPts val="0"/>
-              </a:spcAft>
-              <a:buNone/>
-            </a:pPr>
-            <a:r>
               <a:rPr i="1" lang="en" sz="900">
                 <a:solidFill>
                   <a:schemeClr val="dk1"/>
@@ -14307,7 +14374,7 @@
                 <a:cs typeface="Roboto"/>
                 <a:sym typeface="Roboto"/>
               </a:rPr>
-              <a:t>extract_duplicate_records(</a:t>
+              <a:t>filter_extreme(by_vars = exprs(USUBJID),</a:t>
             </a:r>
             <a:endParaRPr i="1" sz="900">
               <a:solidFill>
@@ -14339,71 +14406,7 @@
                 <a:cs typeface="Roboto"/>
                 <a:sym typeface="Roboto"/>
               </a:rPr>
-              <a:t>  dataset = adsl, </a:t>
-            </a:r>
-            <a:endParaRPr i="1" sz="900">
-              <a:solidFill>
-                <a:schemeClr val="dk1"/>
-              </a:solidFill>
-              <a:latin typeface="Roboto"/>
-              <a:ea typeface="Roboto"/>
-              <a:cs typeface="Roboto"/>
-              <a:sym typeface="Roboto"/>
-            </a:endParaRPr>
-          </a:p>
-          <a:p>
-            <a:pPr indent="0" lvl="0" marL="0" rtl="0" algn="l">
-              <a:spcBef>
-                <a:spcPts val="0"/>
-              </a:spcBef>
-              <a:spcAft>
-                <a:spcPts val="0"/>
-              </a:spcAft>
-              <a:buNone/>
-            </a:pPr>
-            <a:r>
-              <a:rPr i="1" lang="en" sz="900">
-                <a:solidFill>
-                  <a:schemeClr val="dk1"/>
-                </a:solidFill>
-                <a:latin typeface="Roboto"/>
-                <a:ea typeface="Roboto"/>
-                <a:cs typeface="Roboto"/>
-                <a:sym typeface="Roboto"/>
-              </a:rPr>
-              <a:t>  by_vars = exprs(USUBJID)</a:t>
-            </a:r>
-            <a:endParaRPr i="1" sz="900">
-              <a:solidFill>
-                <a:schemeClr val="dk1"/>
-              </a:solidFill>
-              <a:latin typeface="Roboto"/>
-              <a:ea typeface="Roboto"/>
-              <a:cs typeface="Roboto"/>
-              <a:sym typeface="Roboto"/>
-            </a:endParaRPr>
-          </a:p>
-          <a:p>
-            <a:pPr indent="0" lvl="0" marL="0" rtl="0" algn="l">
-              <a:spcBef>
-                <a:spcPts val="0"/>
-              </a:spcBef>
-              <a:spcAft>
-                <a:spcPts val="0"/>
-              </a:spcAft>
-              <a:buNone/>
-            </a:pPr>
-            <a:r>
-              <a:rPr i="1" lang="en" sz="900">
-                <a:solidFill>
-                  <a:schemeClr val="dk1"/>
-                </a:solidFill>
-                <a:latin typeface="Roboto"/>
-                <a:ea typeface="Roboto"/>
-                <a:cs typeface="Roboto"/>
-                <a:sym typeface="Roboto"/>
-              </a:rPr>
-              <a:t>)</a:t>
+              <a:t>    order = exprs(EXSEQ), mode = "first")</a:t>
             </a:r>
             <a:endParaRPr b="1" sz="900">
               <a:solidFill>
@@ -14417,16 +14420,24 @@
           </a:p>
         </p:txBody>
       </p:sp>
-      <p:sp>
-        <p:nvSpPr>
+      <p:pic>
+        <p:nvPicPr>
           <p:cNvPr id="108" name="Google Shape;108;p14"/>
-          <p:cNvSpPr txBox="1"/>
+          <p:cNvPicPr preferRelativeResize="0"/>
           <p:nvPr/>
-        </p:nvSpPr>
+        </p:nvPicPr>
+        <p:blipFill>
+          <a:blip r:embed="rId15">
+            <a:alphaModFix/>
+          </a:blip>
+          <a:stretch>
+            <a:fillRect/>
+          </a:stretch>
+        </p:blipFill>
         <p:spPr>
           <a:xfrm>
-            <a:off x="8087650" y="5974092"/>
-            <a:ext cx="2300400" cy="1676100"/>
+            <a:off x="7326594" y="2434347"/>
+            <a:ext cx="757100" cy="687625"/>
           </a:xfrm>
           <a:prstGeom prst="rect">
             <a:avLst/>
@@ -14436,294 +14447,7 @@
             <a:noFill/>
           </a:ln>
         </p:spPr>
-        <p:txBody>
-          <a:bodyPr anchorCtr="0" anchor="t" bIns="91425" lIns="91425" spcFirstLastPara="1" rIns="91425" wrap="square" tIns="91425">
-            <a:noAutofit/>
-          </a:bodyPr>
-          <a:lstStyle/>
-          <a:p>
-            <a:pPr indent="0" lvl="0" marL="0" rtl="0" algn="l">
-              <a:spcBef>
-                <a:spcPts val="0"/>
-              </a:spcBef>
-              <a:spcAft>
-                <a:spcPts val="0"/>
-              </a:spcAft>
-              <a:buNone/>
-            </a:pPr>
-            <a:r>
-              <a:rPr b="1" lang="en" sz="900">
-                <a:solidFill>
-                  <a:schemeClr val="dk1"/>
-                </a:solidFill>
-                <a:uFill>
-                  <a:noFill/>
-                </a:uFill>
-                <a:latin typeface="Roboto"/>
-                <a:ea typeface="Roboto"/>
-                <a:cs typeface="Roboto"/>
-                <a:sym typeface="Roboto"/>
-                <a:hlinkClick r:id="rId15">
-                  <a:extLst>
-                    <a:ext uri="{A12FA001-AC4F-418D-AE19-62706E023703}">
-                      <ahyp:hlinkClr val="tx"/>
-                    </a:ext>
-                  </a:extLst>
-                </a:hlinkClick>
-              </a:rPr>
-              <a:t>filter_extreme</a:t>
-            </a:r>
-            <a:r>
-              <a:rPr lang="en" sz="900">
-                <a:solidFill>
-                  <a:schemeClr val="dk1"/>
-                </a:solidFill>
-                <a:latin typeface="Roboto"/>
-                <a:ea typeface="Roboto"/>
-                <a:cs typeface="Roboto"/>
-                <a:sym typeface="Roboto"/>
-              </a:rPr>
-              <a:t>(</a:t>
-            </a:r>
-            <a:r>
-              <a:rPr lang="en" sz="900">
-                <a:solidFill>
-                  <a:srgbClr val="9E9E9E"/>
-                </a:solidFill>
-                <a:latin typeface="Roboto"/>
-                <a:ea typeface="Roboto"/>
-                <a:cs typeface="Roboto"/>
-                <a:sym typeface="Roboto"/>
-              </a:rPr>
-              <a:t>dataset, by_vars, order, mode, check_type = "warning") </a:t>
-            </a:r>
-            <a:endParaRPr sz="900">
-              <a:solidFill>
-                <a:srgbClr val="9E9E9E"/>
-              </a:solidFill>
-              <a:latin typeface="Roboto"/>
-              <a:ea typeface="Roboto"/>
-              <a:cs typeface="Roboto"/>
-              <a:sym typeface="Roboto"/>
-            </a:endParaRPr>
-          </a:p>
-          <a:p>
-            <a:pPr indent="0" lvl="0" marL="0" rtl="0" algn="l">
-              <a:spcBef>
-                <a:spcPts val="0"/>
-              </a:spcBef>
-              <a:spcAft>
-                <a:spcPts val="0"/>
-              </a:spcAft>
-              <a:buNone/>
-            </a:pPr>
-            <a:r>
-              <a:rPr lang="en" sz="900">
-                <a:solidFill>
-                  <a:schemeClr val="dk1"/>
-                </a:solidFill>
-                <a:latin typeface="Roboto"/>
-                <a:ea typeface="Roboto"/>
-                <a:cs typeface="Roboto"/>
-                <a:sym typeface="Roboto"/>
-              </a:rPr>
-              <a:t>Filters the first or last observation for each by group.</a:t>
-            </a:r>
-            <a:endParaRPr sz="900">
-              <a:solidFill>
-                <a:schemeClr val="dk1"/>
-              </a:solidFill>
-              <a:latin typeface="Roboto"/>
-              <a:ea typeface="Roboto"/>
-              <a:cs typeface="Roboto"/>
-              <a:sym typeface="Roboto"/>
-            </a:endParaRPr>
-          </a:p>
-          <a:p>
-            <a:pPr indent="0" lvl="0" marL="0" rtl="0" algn="l">
-              <a:spcBef>
-                <a:spcPts val="0"/>
-              </a:spcBef>
-              <a:spcAft>
-                <a:spcPts val="0"/>
-              </a:spcAft>
-              <a:buNone/>
-            </a:pPr>
-            <a:r>
-              <a:t/>
-            </a:r>
-            <a:endParaRPr sz="900">
-              <a:solidFill>
-                <a:schemeClr val="dk1"/>
-              </a:solidFill>
-              <a:latin typeface="Roboto"/>
-              <a:ea typeface="Roboto"/>
-              <a:cs typeface="Roboto"/>
-              <a:sym typeface="Roboto"/>
-            </a:endParaRPr>
-          </a:p>
-          <a:p>
-            <a:pPr indent="0" lvl="0" marL="0" rtl="0" algn="l">
-              <a:spcBef>
-                <a:spcPts val="0"/>
-              </a:spcBef>
-              <a:spcAft>
-                <a:spcPts val="0"/>
-              </a:spcAft>
-              <a:buNone/>
-            </a:pPr>
-            <a:r>
-              <a:rPr i="1" lang="en" sz="900">
-                <a:solidFill>
-                  <a:schemeClr val="dk1"/>
-                </a:solidFill>
-                <a:latin typeface="Roboto"/>
-                <a:ea typeface="Roboto"/>
-                <a:cs typeface="Roboto"/>
-                <a:sym typeface="Roboto"/>
-              </a:rPr>
-              <a:t>filter_extreme(</a:t>
-            </a:r>
-            <a:endParaRPr i="1" sz="900">
-              <a:solidFill>
-                <a:schemeClr val="dk1"/>
-              </a:solidFill>
-              <a:latin typeface="Roboto"/>
-              <a:ea typeface="Roboto"/>
-              <a:cs typeface="Roboto"/>
-              <a:sym typeface="Roboto"/>
-            </a:endParaRPr>
-          </a:p>
-          <a:p>
-            <a:pPr indent="0" lvl="0" marL="0" rtl="0" algn="l">
-              <a:spcBef>
-                <a:spcPts val="0"/>
-              </a:spcBef>
-              <a:spcAft>
-                <a:spcPts val="0"/>
-              </a:spcAft>
-              <a:buNone/>
-            </a:pPr>
-            <a:r>
-              <a:rPr i="1" lang="en" sz="900">
-                <a:solidFill>
-                  <a:schemeClr val="dk1"/>
-                </a:solidFill>
-                <a:latin typeface="Roboto"/>
-                <a:ea typeface="Roboto"/>
-                <a:cs typeface="Roboto"/>
-                <a:sym typeface="Roboto"/>
-              </a:rPr>
-              <a:t>    by_vars = exprs(USUBJID),</a:t>
-            </a:r>
-            <a:endParaRPr i="1" sz="900">
-              <a:solidFill>
-                <a:schemeClr val="dk1"/>
-              </a:solidFill>
-              <a:latin typeface="Roboto"/>
-              <a:ea typeface="Roboto"/>
-              <a:cs typeface="Roboto"/>
-              <a:sym typeface="Roboto"/>
-            </a:endParaRPr>
-          </a:p>
-          <a:p>
-            <a:pPr indent="0" lvl="0" marL="0" rtl="0" algn="l">
-              <a:spcBef>
-                <a:spcPts val="0"/>
-              </a:spcBef>
-              <a:spcAft>
-                <a:spcPts val="0"/>
-              </a:spcAft>
-              <a:buNone/>
-            </a:pPr>
-            <a:r>
-              <a:rPr i="1" lang="en" sz="900">
-                <a:solidFill>
-                  <a:schemeClr val="dk1"/>
-                </a:solidFill>
-                <a:latin typeface="Roboto"/>
-                <a:ea typeface="Roboto"/>
-                <a:cs typeface="Roboto"/>
-                <a:sym typeface="Roboto"/>
-              </a:rPr>
-              <a:t>    order = exprs(EXSEQ),</a:t>
-            </a:r>
-            <a:endParaRPr i="1" sz="900">
-              <a:solidFill>
-                <a:schemeClr val="dk1"/>
-              </a:solidFill>
-              <a:latin typeface="Roboto"/>
-              <a:ea typeface="Roboto"/>
-              <a:cs typeface="Roboto"/>
-              <a:sym typeface="Roboto"/>
-            </a:endParaRPr>
-          </a:p>
-          <a:p>
-            <a:pPr indent="0" lvl="0" marL="0" rtl="0" algn="l">
-              <a:spcBef>
-                <a:spcPts val="0"/>
-              </a:spcBef>
-              <a:spcAft>
-                <a:spcPts val="0"/>
-              </a:spcAft>
-              <a:buNone/>
-            </a:pPr>
-            <a:r>
-              <a:rPr i="1" lang="en" sz="900">
-                <a:solidFill>
-                  <a:schemeClr val="dk1"/>
-                </a:solidFill>
-                <a:latin typeface="Roboto"/>
-                <a:ea typeface="Roboto"/>
-                <a:cs typeface="Roboto"/>
-                <a:sym typeface="Roboto"/>
-              </a:rPr>
-              <a:t>    mode = "first"</a:t>
-            </a:r>
-            <a:endParaRPr i="1" sz="900">
-              <a:solidFill>
-                <a:schemeClr val="dk1"/>
-              </a:solidFill>
-              <a:latin typeface="Roboto"/>
-              <a:ea typeface="Roboto"/>
-              <a:cs typeface="Roboto"/>
-              <a:sym typeface="Roboto"/>
-            </a:endParaRPr>
-          </a:p>
-          <a:p>
-            <a:pPr indent="0" lvl="0" marL="0" rtl="0" algn="l">
-              <a:spcBef>
-                <a:spcPts val="0"/>
-              </a:spcBef>
-              <a:spcAft>
-                <a:spcPts val="0"/>
-              </a:spcAft>
-              <a:buNone/>
-            </a:pPr>
-            <a:r>
-              <a:rPr i="1" lang="en" sz="900">
-                <a:solidFill>
-                  <a:schemeClr val="dk1"/>
-                </a:solidFill>
-                <a:latin typeface="Roboto"/>
-                <a:ea typeface="Roboto"/>
-                <a:cs typeface="Roboto"/>
-                <a:sym typeface="Roboto"/>
-              </a:rPr>
-              <a:t>  )</a:t>
-            </a:r>
-            <a:endParaRPr b="1" sz="900">
-              <a:solidFill>
-                <a:schemeClr val="dk1"/>
-              </a:solidFill>
-              <a:latin typeface="Roboto"/>
-              <a:ea typeface="Roboto"/>
-              <a:cs typeface="Roboto"/>
-              <a:sym typeface="Roboto"/>
-            </a:endParaRPr>
-          </a:p>
-        </p:txBody>
-      </p:sp>
+      </p:pic>
       <p:pic>
         <p:nvPicPr>
           <p:cNvPr id="109" name="Google Shape;109;p14"/>
@@ -14740,63 +14464,7 @@
         </p:blipFill>
         <p:spPr>
           <a:xfrm>
-            <a:off x="7315950" y="3245875"/>
-            <a:ext cx="799900" cy="611245"/>
-          </a:xfrm>
-          <a:prstGeom prst="rect">
-            <a:avLst/>
-          </a:prstGeom>
-          <a:noFill/>
-          <a:ln>
-            <a:noFill/>
-          </a:ln>
-        </p:spPr>
-      </p:pic>
-      <p:pic>
-        <p:nvPicPr>
-          <p:cNvPr id="110" name="Google Shape;110;p14"/>
-          <p:cNvPicPr preferRelativeResize="0"/>
-          <p:nvPr/>
-        </p:nvPicPr>
-        <p:blipFill>
-          <a:blip r:embed="rId17">
-            <a:alphaModFix/>
-          </a:blip>
-          <a:stretch>
-            <a:fillRect/>
-          </a:stretch>
-        </p:blipFill>
-        <p:spPr>
-          <a:xfrm>
-            <a:off x="7315950" y="2476925"/>
-            <a:ext cx="757100" cy="687625"/>
-          </a:xfrm>
-          <a:prstGeom prst="rect">
-            <a:avLst/>
-          </a:prstGeom>
-          <a:noFill/>
-          <a:ln>
-            <a:noFill/>
-          </a:ln>
-        </p:spPr>
-      </p:pic>
-      <p:pic>
-        <p:nvPicPr>
-          <p:cNvPr id="111" name="Google Shape;111;p14"/>
-          <p:cNvPicPr preferRelativeResize="0"/>
-          <p:nvPr/>
-        </p:nvPicPr>
-        <p:blipFill>
-          <a:blip r:embed="rId18">
-            <a:alphaModFix/>
-          </a:blip>
-          <a:stretch>
-            <a:fillRect/>
-          </a:stretch>
-        </p:blipFill>
-        <p:spPr>
-          <a:xfrm>
-            <a:off x="7273150" y="6094467"/>
+            <a:off x="7294439" y="4736889"/>
             <a:ext cx="842700" cy="616309"/>
           </a:xfrm>
           <a:prstGeom prst="rect">
@@ -14810,7 +14478,7 @@
       </p:pic>
       <p:sp>
         <p:nvSpPr>
-          <p:cNvPr id="112" name="Google Shape;112;p14"/>
+          <p:cNvPr id="110" name="Google Shape;110;p14"/>
           <p:cNvSpPr txBox="1"/>
           <p:nvPr/>
         </p:nvSpPr>
@@ -14868,12 +14536,12 @@
       </p:sp>
       <p:pic>
         <p:nvPicPr>
-          <p:cNvPr id="113" name="Google Shape;113;p14"/>
+          <p:cNvPr id="111" name="Google Shape;111;p14"/>
           <p:cNvPicPr preferRelativeResize="0"/>
           <p:nvPr/>
         </p:nvPicPr>
         <p:blipFill>
-          <a:blip r:embed="rId19">
+          <a:blip r:embed="rId17">
             <a:alphaModFix/>
           </a:blip>
           <a:stretch>
@@ -14882,7 +14550,7 @@
         </p:blipFill>
         <p:spPr>
           <a:xfrm>
-            <a:off x="7315950" y="4463825"/>
+            <a:off x="7315950" y="3170114"/>
             <a:ext cx="799900" cy="1393371"/>
           </a:xfrm>
           <a:prstGeom prst="rect">
@@ -14896,7 +14564,7 @@
       </p:pic>
       <p:sp>
         <p:nvSpPr>
-          <p:cNvPr id="114" name="Google Shape;114;p14"/>
+          <p:cNvPr id="112" name="Google Shape;112;p14"/>
           <p:cNvSpPr txBox="1"/>
           <p:nvPr/>
         </p:nvSpPr>
@@ -14954,7 +14622,7 @@
       </p:sp>
       <p:sp>
         <p:nvSpPr>
-          <p:cNvPr id="115" name="Google Shape;115;p14"/>
+          <p:cNvPr id="113" name="Google Shape;113;p14"/>
           <p:cNvSpPr txBox="1"/>
           <p:nvPr/>
         </p:nvSpPr>
@@ -14998,7 +14666,7 @@
                 <a:ea typeface="Roboto"/>
                 <a:cs typeface="Roboto"/>
                 <a:sym typeface="Roboto"/>
-                <a:hlinkClick r:id="rId20">
+                <a:hlinkClick r:id="rId18">
                   <a:extLst>
                     <a:ext uri="{A12FA001-AC4F-418D-AE19-62706E023703}">
                       <ahyp:hlinkClr val="tx"/>
@@ -15089,7 +14757,7 @@
       </p:sp>
       <p:sp>
         <p:nvSpPr>
-          <p:cNvPr id="116" name="Google Shape;116;p14"/>
+          <p:cNvPr id="114" name="Google Shape;114;p14"/>
           <p:cNvSpPr txBox="1"/>
           <p:nvPr/>
         </p:nvSpPr>
@@ -15133,7 +14801,7 @@
                 <a:ea typeface="Roboto"/>
                 <a:cs typeface="Roboto"/>
                 <a:sym typeface="Roboto"/>
-                <a:hlinkClick r:id="rId21">
+                <a:hlinkClick r:id="rId19">
                   <a:extLst>
                     <a:ext uri="{A12FA001-AC4F-418D-AE19-62706E023703}">
                       <ahyp:hlinkClr val="tx"/>
@@ -15201,7 +14869,7 @@
       </p:sp>
       <p:sp>
         <p:nvSpPr>
-          <p:cNvPr id="117" name="Google Shape;117;p14"/>
+          <p:cNvPr id="115" name="Google Shape;115;p14"/>
           <p:cNvSpPr txBox="1"/>
           <p:nvPr/>
         </p:nvSpPr>
@@ -15245,7 +14913,7 @@
                 <a:ea typeface="Roboto"/>
                 <a:cs typeface="Roboto"/>
                 <a:sym typeface="Roboto"/>
-                <a:hlinkClick r:id="rId22">
+                <a:hlinkClick r:id="rId20">
                   <a:extLst>
                     <a:ext uri="{A12FA001-AC4F-418D-AE19-62706E023703}">
                       <ahyp:hlinkClr val="tx"/>
@@ -15345,7 +15013,7 @@
       </p:sp>
       <p:sp>
         <p:nvSpPr>
-          <p:cNvPr id="118" name="Google Shape;118;p14"/>
+          <p:cNvPr id="116" name="Google Shape;116;p14"/>
           <p:cNvSpPr txBox="1"/>
           <p:nvPr/>
         </p:nvSpPr>
@@ -15389,7 +15057,7 @@
                 <a:ea typeface="Roboto"/>
                 <a:cs typeface="Roboto"/>
                 <a:sym typeface="Roboto"/>
-                <a:hlinkClick r:id="rId23">
+                <a:hlinkClick r:id="rId21">
                   <a:extLst>
                     <a:ext uri="{A12FA001-AC4F-418D-AE19-62706E023703}">
                       <ahyp:hlinkClr val="tx"/>
@@ -15457,7 +15125,7 @@
       </p:sp>
       <p:sp>
         <p:nvSpPr>
-          <p:cNvPr id="119" name="Google Shape;119;p14"/>
+          <p:cNvPr id="117" name="Google Shape;117;p14"/>
           <p:cNvSpPr txBox="1"/>
           <p:nvPr/>
         </p:nvSpPr>
@@ -15501,7 +15169,7 @@
                 <a:ea typeface="Roboto"/>
                 <a:cs typeface="Roboto"/>
                 <a:sym typeface="Roboto"/>
-                <a:hlinkClick r:id="rId24">
+                <a:hlinkClick r:id="rId22">
                   <a:extLst>
                     <a:ext uri="{A12FA001-AC4F-418D-AE19-62706E023703}">
                       <ahyp:hlinkClr val="tx"/>
@@ -15569,7 +15237,7 @@
       </p:sp>
       <p:sp>
         <p:nvSpPr>
-          <p:cNvPr id="120" name="Google Shape;120;p14"/>
+          <p:cNvPr id="118" name="Google Shape;118;p14"/>
           <p:cNvSpPr txBox="1"/>
           <p:nvPr/>
         </p:nvSpPr>
@@ -15613,7 +15281,7 @@
                 <a:ea typeface="Roboto"/>
                 <a:cs typeface="Roboto"/>
                 <a:sym typeface="Roboto"/>
-                <a:hlinkClick r:id="rId25">
+                <a:hlinkClick r:id="rId23">
                   <a:extLst>
                     <a:ext uri="{A12FA001-AC4F-418D-AE19-62706E023703}">
                       <ahyp:hlinkClr val="tx"/>
@@ -15681,7 +15349,7 @@
       </p:sp>
       <p:sp>
         <p:nvSpPr>
-          <p:cNvPr id="121" name="Google Shape;121;p14"/>
+          <p:cNvPr id="119" name="Google Shape;119;p14"/>
           <p:cNvSpPr txBox="1"/>
           <p:nvPr/>
         </p:nvSpPr>
@@ -15785,7 +15453,7 @@
       </p:sp>
       <p:sp>
         <p:nvSpPr>
-          <p:cNvPr id="122" name="Google Shape;122;p14"/>
+          <p:cNvPr id="120" name="Google Shape;120;p14"/>
           <p:cNvSpPr txBox="1"/>
           <p:nvPr/>
         </p:nvSpPr>
@@ -15841,7 +15509,7 @@
                 <a:ea typeface="Roboto"/>
                 <a:cs typeface="Roboto"/>
                 <a:sym typeface="Roboto"/>
-                <a:hlinkClick r:id="rId26">
+                <a:hlinkClick r:id="rId24">
                   <a:extLst>
                     <a:ext uri="{A12FA001-AC4F-418D-AE19-62706E023703}">
                       <ahyp:hlinkClr val="tx"/>
@@ -15932,7 +15600,7 @@
       </p:sp>
       <p:sp>
         <p:nvSpPr>
-          <p:cNvPr id="123" name="Google Shape;123;p14"/>
+          <p:cNvPr id="121" name="Google Shape;121;p14"/>
           <p:cNvSpPr txBox="1"/>
           <p:nvPr/>
         </p:nvSpPr>
@@ -15988,7 +15656,7 @@
                 <a:ea typeface="Roboto"/>
                 <a:cs typeface="Roboto"/>
                 <a:sym typeface="Roboto"/>
-                <a:hlinkClick r:id="rId27">
+                <a:hlinkClick r:id="rId25">
                   <a:extLst>
                     <a:ext uri="{A12FA001-AC4F-418D-AE19-62706E023703}">
                       <ahyp:hlinkClr val="tx"/>
@@ -16056,7 +15724,7 @@
       </p:sp>
       <p:sp>
         <p:nvSpPr>
-          <p:cNvPr id="124" name="Google Shape;124;p14"/>
+          <p:cNvPr id="122" name="Google Shape;122;p14"/>
           <p:cNvSpPr txBox="1"/>
           <p:nvPr/>
         </p:nvSpPr>
@@ -16112,7 +15780,7 @@
                 <a:ea typeface="Roboto"/>
                 <a:cs typeface="Roboto"/>
                 <a:sym typeface="Roboto"/>
-                <a:hlinkClick r:id="rId28">
+                <a:hlinkClick r:id="rId26">
                   <a:extLst>
                     <a:ext uri="{A12FA001-AC4F-418D-AE19-62706E023703}">
                       <ahyp:hlinkClr val="tx"/>
@@ -16180,7 +15848,7 @@
       </p:sp>
       <p:sp>
         <p:nvSpPr>
-          <p:cNvPr id="125" name="Google Shape;125;p14"/>
+          <p:cNvPr id="123" name="Google Shape;123;p14"/>
           <p:cNvSpPr txBox="1"/>
           <p:nvPr/>
         </p:nvSpPr>
@@ -16224,7 +15892,7 @@
                 <a:ea typeface="Roboto"/>
                 <a:cs typeface="Roboto"/>
                 <a:sym typeface="Roboto"/>
-                <a:hlinkClick r:id="rId29">
+                <a:hlinkClick r:id="rId27">
                   <a:extLst>
                     <a:ext uri="{A12FA001-AC4F-418D-AE19-62706E023703}">
                       <ahyp:hlinkClr val="tx"/>
@@ -16316,7 +15984,7 @@
       </p:sp>
       <p:sp>
         <p:nvSpPr>
-          <p:cNvPr id="126" name="Google Shape;126;p14"/>
+          <p:cNvPr id="124" name="Google Shape;124;p14"/>
           <p:cNvSpPr txBox="1"/>
           <p:nvPr/>
         </p:nvSpPr>
@@ -16360,7 +16028,7 @@
                 <a:ea typeface="Roboto"/>
                 <a:cs typeface="Roboto"/>
                 <a:sym typeface="Roboto"/>
-                <a:hlinkClick r:id="rId30">
+                <a:hlinkClick r:id="rId28">
                   <a:extLst>
                     <a:ext uri="{A12FA001-AC4F-418D-AE19-62706E023703}">
                       <ahyp:hlinkClr val="tx"/>
@@ -16428,7 +16096,7 @@
       </p:sp>
       <p:sp>
         <p:nvSpPr>
-          <p:cNvPr id="127" name="Google Shape;127;p14"/>
+          <p:cNvPr id="125" name="Google Shape;125;p14"/>
           <p:cNvSpPr txBox="1"/>
           <p:nvPr/>
         </p:nvSpPr>
@@ -16510,7 +16178,7 @@
       </p:sp>
       <p:sp>
         <p:nvSpPr>
-          <p:cNvPr id="128" name="Google Shape;128;p14"/>
+          <p:cNvPr id="126" name="Google Shape;126;p14"/>
           <p:cNvSpPr txBox="1"/>
           <p:nvPr/>
         </p:nvSpPr>
@@ -16562,7 +16230,7 @@
       </p:sp>
       <p:sp>
         <p:nvSpPr>
-          <p:cNvPr id="129" name="Google Shape;129;p14"/>
+          <p:cNvPr id="127" name="Google Shape;127;p14"/>
           <p:cNvSpPr txBox="1"/>
           <p:nvPr/>
         </p:nvSpPr>
@@ -16630,7 +16298,7 @@
                 <a:ea typeface="Roboto"/>
                 <a:cs typeface="Roboto"/>
                 <a:sym typeface="Roboto"/>
-                <a:hlinkClick r:id="rId31"/>
+                <a:hlinkClick r:id="rId29"/>
               </a:rPr>
               <a:t>reference page</a:t>
             </a:r>
@@ -16654,7 +16322,7 @@
       </p:sp>
       <p:sp>
         <p:nvSpPr>
-          <p:cNvPr id="130" name="Google Shape;130;p14"/>
+          <p:cNvPr id="128" name="Google Shape;128;p14"/>
           <p:cNvSpPr txBox="1"/>
           <p:nvPr/>
         </p:nvSpPr>
@@ -16704,51 +16372,51 @@
                 <a:ea typeface="Roboto"/>
                 <a:cs typeface="Roboto"/>
                 <a:sym typeface="Roboto"/>
+                <a:hlinkClick r:id="rId30"/>
+              </a:rPr>
+              <a:t>Github Repo</a:t>
+            </a:r>
+            <a:r>
+              <a:rPr lang="en" sz="800">
+                <a:latin typeface="Roboto"/>
+                <a:ea typeface="Roboto"/>
+                <a:cs typeface="Roboto"/>
+                <a:sym typeface="Roboto"/>
+              </a:rPr>
+              <a:t> - </a:t>
+            </a:r>
+            <a:r>
+              <a:rPr lang="en" sz="800" u="sng">
+                <a:solidFill>
+                  <a:schemeClr val="hlink"/>
+                </a:solidFill>
+                <a:latin typeface="Roboto"/>
+                <a:ea typeface="Roboto"/>
+                <a:cs typeface="Roboto"/>
+                <a:sym typeface="Roboto"/>
+                <a:hlinkClick r:id="rId31"/>
+              </a:rPr>
+              <a:t>Documentation</a:t>
+            </a:r>
+            <a:r>
+              <a:rPr lang="en" sz="800">
+                <a:latin typeface="Roboto"/>
+                <a:ea typeface="Roboto"/>
+                <a:cs typeface="Roboto"/>
+                <a:sym typeface="Roboto"/>
+              </a:rPr>
+              <a:t> - </a:t>
+            </a:r>
+            <a:r>
+              <a:rPr lang="en" sz="800" u="sng">
+                <a:solidFill>
+                  <a:schemeClr val="hlink"/>
+                </a:solidFill>
+                <a:latin typeface="Roboto"/>
+                <a:ea typeface="Roboto"/>
+                <a:cs typeface="Roboto"/>
+                <a:sym typeface="Roboto"/>
                 <a:hlinkClick r:id="rId32"/>
-              </a:rPr>
-              <a:t>Github Repo</a:t>
-            </a:r>
-            <a:r>
-              <a:rPr lang="en" sz="800">
-                <a:latin typeface="Roboto"/>
-                <a:ea typeface="Roboto"/>
-                <a:cs typeface="Roboto"/>
-                <a:sym typeface="Roboto"/>
-              </a:rPr>
-              <a:t> - </a:t>
-            </a:r>
-            <a:r>
-              <a:rPr lang="en" sz="800" u="sng">
-                <a:solidFill>
-                  <a:schemeClr val="hlink"/>
-                </a:solidFill>
-                <a:latin typeface="Roboto"/>
-                <a:ea typeface="Roboto"/>
-                <a:cs typeface="Roboto"/>
-                <a:sym typeface="Roboto"/>
-                <a:hlinkClick r:id="rId33"/>
-              </a:rPr>
-              <a:t>Documentation</a:t>
-            </a:r>
-            <a:r>
-              <a:rPr lang="en" sz="800">
-                <a:latin typeface="Roboto"/>
-                <a:ea typeface="Roboto"/>
-                <a:cs typeface="Roboto"/>
-                <a:sym typeface="Roboto"/>
-              </a:rPr>
-              <a:t> - </a:t>
-            </a:r>
-            <a:r>
-              <a:rPr lang="en" sz="800" u="sng">
-                <a:solidFill>
-                  <a:schemeClr val="hlink"/>
-                </a:solidFill>
-                <a:latin typeface="Roboto"/>
-                <a:ea typeface="Roboto"/>
-                <a:cs typeface="Roboto"/>
-                <a:sym typeface="Roboto"/>
-                <a:hlinkClick r:id="rId34"/>
               </a:rPr>
               <a:t>Join the Pharmaverse Slack</a:t>
             </a:r>
@@ -16772,7 +16440,7 @@
       </p:sp>
       <p:sp>
         <p:nvSpPr>
-          <p:cNvPr id="131" name="Google Shape;131;p14"/>
+          <p:cNvPr id="129" name="Google Shape;129;p14"/>
           <p:cNvSpPr txBox="1"/>
           <p:nvPr/>
         </p:nvSpPr>
@@ -16816,7 +16484,7 @@
                 <a:ea typeface="Roboto"/>
                 <a:cs typeface="Roboto"/>
                 <a:sym typeface="Roboto"/>
-                <a:hlinkClick r:id="rId35">
+                <a:hlinkClick r:id="rId33">
                   <a:extLst>
                     <a:ext uri="{A12FA001-AC4F-418D-AE19-62706E023703}">
                       <ahyp:hlinkClr val="tx"/>
@@ -16838,7 +16506,7 @@
                 <a:ea typeface="Roboto"/>
                 <a:cs typeface="Roboto"/>
                 <a:sym typeface="Roboto"/>
-                <a:hlinkClick r:id="rId36">
+                <a:hlinkClick r:id="rId34">
                   <a:extLst>
                     <a:ext uri="{A12FA001-AC4F-418D-AE19-62706E023703}">
                       <ahyp:hlinkClr val="tx"/>
@@ -16918,7 +16586,7 @@
       </p:sp>
       <p:sp>
         <p:nvSpPr>
-          <p:cNvPr id="132" name="Google Shape;132;p14"/>
+          <p:cNvPr id="130" name="Google Shape;130;p14"/>
           <p:cNvSpPr txBox="1"/>
           <p:nvPr/>
         </p:nvSpPr>
@@ -16962,7 +16630,7 @@
                 <a:ea typeface="Roboto"/>
                 <a:cs typeface="Roboto"/>
                 <a:sym typeface="Roboto"/>
-                <a:hlinkClick r:id="rId37">
+                <a:hlinkClick r:id="rId35">
                   <a:extLst>
                     <a:ext uri="{A12FA001-AC4F-418D-AE19-62706E023703}">
                       <ahyp:hlinkClr val="tx"/>
@@ -17030,7 +16698,7 @@
       </p:sp>
       <p:sp>
         <p:nvSpPr>
-          <p:cNvPr id="133" name="Google Shape;133;p14"/>
+          <p:cNvPr id="131" name="Google Shape;131;p14"/>
           <p:cNvSpPr txBox="1"/>
           <p:nvPr/>
         </p:nvSpPr>
@@ -17074,6 +16742,143 @@
                 <a:ea typeface="Roboto"/>
                 <a:cs typeface="Roboto"/>
                 <a:sym typeface="Roboto"/>
+                <a:hlinkClick r:id="rId36">
+                  <a:extLst>
+                    <a:ext uri="{A12FA001-AC4F-418D-AE19-62706E023703}">
+                      <ahyp:hlinkClr val="tx"/>
+                    </a:ext>
+                  </a:extLst>
+                </a:hlinkClick>
+              </a:rPr>
+              <a:t>derive_vars_atc</a:t>
+            </a:r>
+            <a:r>
+              <a:rPr lang="en" sz="900">
+                <a:solidFill>
+                  <a:srgbClr val="9E9E9E"/>
+                </a:solidFill>
+                <a:latin typeface="Roboto"/>
+                <a:ea typeface="Roboto"/>
+                <a:cs typeface="Roboto"/>
+                <a:sym typeface="Roboto"/>
+              </a:rPr>
+              <a:t>(dataset, dataset_facm, by_vars, value_var)</a:t>
+            </a:r>
+            <a:endParaRPr sz="900">
+              <a:solidFill>
+                <a:srgbClr val="9E9E9E"/>
+              </a:solidFill>
+              <a:latin typeface="Roboto"/>
+              <a:ea typeface="Roboto"/>
+              <a:cs typeface="Roboto"/>
+              <a:sym typeface="Roboto"/>
+            </a:endParaRPr>
+          </a:p>
+          <a:p>
+            <a:pPr indent="0" lvl="0" marL="0" rtl="0" algn="l">
+              <a:spcBef>
+                <a:spcPts val="0"/>
+              </a:spcBef>
+              <a:spcAft>
+                <a:spcPts val="0"/>
+              </a:spcAft>
+              <a:buNone/>
+            </a:pPr>
+            <a:r>
+              <a:rPr lang="en" sz="900">
+                <a:solidFill>
+                  <a:schemeClr val="dk1"/>
+                </a:solidFill>
+                <a:latin typeface="Roboto"/>
+                <a:ea typeface="Roboto"/>
+                <a:cs typeface="Roboto"/>
+                <a:sym typeface="Roboto"/>
+              </a:rPr>
+              <a:t>Derive ATC class variables from FACM to ADCM..</a:t>
+            </a:r>
+            <a:endParaRPr sz="900">
+              <a:solidFill>
+                <a:schemeClr val="dk1"/>
+              </a:solidFill>
+              <a:latin typeface="Roboto"/>
+              <a:ea typeface="Roboto"/>
+              <a:cs typeface="Roboto"/>
+              <a:sym typeface="Roboto"/>
+            </a:endParaRPr>
+          </a:p>
+        </p:txBody>
+      </p:sp>
+      <p:pic>
+        <p:nvPicPr>
+          <p:cNvPr id="132" name="Google Shape;132;p14"/>
+          <p:cNvPicPr preferRelativeResize="0"/>
+          <p:nvPr/>
+        </p:nvPicPr>
+        <p:blipFill>
+          <a:blip r:embed="rId37">
+            <a:alphaModFix/>
+          </a:blip>
+          <a:stretch>
+            <a:fillRect/>
+          </a:stretch>
+        </p:blipFill>
+        <p:spPr>
+          <a:xfrm>
+            <a:off x="7291194" y="5654293"/>
+            <a:ext cx="799900" cy="1357111"/>
+          </a:xfrm>
+          <a:prstGeom prst="rect">
+            <a:avLst/>
+          </a:prstGeom>
+          <a:noFill/>
+          <a:ln>
+            <a:noFill/>
+          </a:ln>
+        </p:spPr>
+      </p:pic>
+      <p:sp>
+        <p:nvSpPr>
+          <p:cNvPr id="133" name="Google Shape;133;p14"/>
+          <p:cNvSpPr txBox="1"/>
+          <p:nvPr/>
+        </p:nvSpPr>
+        <p:spPr>
+          <a:xfrm>
+            <a:off x="8073650" y="5505518"/>
+            <a:ext cx="2300400" cy="1945800"/>
+          </a:xfrm>
+          <a:prstGeom prst="rect">
+            <a:avLst/>
+          </a:prstGeom>
+          <a:noFill/>
+          <a:ln>
+            <a:noFill/>
+          </a:ln>
+        </p:spPr>
+        <p:txBody>
+          <a:bodyPr anchorCtr="0" anchor="t" bIns="91425" lIns="91425" spcFirstLastPara="1" rIns="91425" wrap="square" tIns="91425">
+            <a:noAutofit/>
+          </a:bodyPr>
+          <a:lstStyle/>
+          <a:p>
+            <a:pPr indent="0" lvl="0" marL="0" rtl="0" algn="l">
+              <a:spcBef>
+                <a:spcPts val="0"/>
+              </a:spcBef>
+              <a:spcAft>
+                <a:spcPts val="0"/>
+              </a:spcAft>
+              <a:buNone/>
+            </a:pPr>
+            <a:r>
+              <a:rPr b="1" lang="en" sz="900" u="sng">
+                <a:solidFill>
+                  <a:srgbClr val="000000"/>
+                </a:solidFill>
+                <a:latin typeface="Roboto"/>
+                <a:ea typeface="Roboto"/>
+                <a:cs typeface="Roboto"/>
+                <a:sym typeface="Roboto"/>
                 <a:hlinkClick r:id="rId38">
                   <a:extLst>
                     <a:ext uri="{A12FA001-AC4F-418D-AE19-62706E023703}">
@@ -17082,7 +16887,7 @@
                   </a:extLst>
                 </a:hlinkClick>
               </a:rPr>
-              <a:t>derive_vars_atc</a:t>
+              <a:t>filter_relative</a:t>
             </a:r>
             <a:r>
               <a:rPr lang="en" sz="900">
@@ -17094,7 +16899,7 @@
                 <a:cs typeface="Roboto"/>
                 <a:sym typeface="Roboto"/>
               </a:rPr>
-              <a:t>(dataset, dataset_facm, by_vars, value_var)</a:t>
+              <a:t>(dataset, by_vars, order, condition, mode, selection, inclusive…)</a:t>
             </a:r>
             <a:endParaRPr sz="900">
               <a:solidFill>
@@ -17119,18 +16924,366 @@
             <a:r>
               <a:rPr lang="en" sz="900">
                 <a:solidFill>
-                  <a:schemeClr val="dk1"/>
-                </a:solidFill>
-                <a:latin typeface="Roboto"/>
-                <a:ea typeface="Roboto"/>
-                <a:cs typeface="Roboto"/>
-                <a:sym typeface="Roboto"/>
-              </a:rPr>
-              <a:t>Derive ATC class variables from FACM to ADCM..</a:t>
+                  <a:srgbClr val="000000"/>
+                </a:solidFill>
+                <a:latin typeface="Roboto"/>
+                <a:ea typeface="Roboto"/>
+                <a:cs typeface="Roboto"/>
+                <a:sym typeface="Roboto"/>
+              </a:rPr>
+              <a:t>Filters the observations before or after the observation where a specified condition is fulfilled for each by group.</a:t>
             </a:r>
             <a:endParaRPr sz="900">
               <a:solidFill>
-                <a:schemeClr val="dk1"/>
+                <a:srgbClr val="000000"/>
+              </a:solidFill>
+              <a:latin typeface="Roboto"/>
+              <a:ea typeface="Roboto"/>
+              <a:cs typeface="Roboto"/>
+              <a:sym typeface="Roboto"/>
+            </a:endParaRPr>
+          </a:p>
+          <a:p>
+            <a:pPr indent="0" lvl="0" marL="0" rtl="0" algn="l">
+              <a:spcBef>
+                <a:spcPts val="0"/>
+              </a:spcBef>
+              <a:spcAft>
+                <a:spcPts val="0"/>
+              </a:spcAft>
+              <a:buNone/>
+            </a:pPr>
+            <a:r>
+              <a:t/>
+            </a:r>
+            <a:endParaRPr sz="500">
+              <a:solidFill>
+                <a:srgbClr val="000000"/>
+              </a:solidFill>
+              <a:latin typeface="Roboto"/>
+              <a:ea typeface="Roboto"/>
+              <a:cs typeface="Roboto"/>
+              <a:sym typeface="Roboto"/>
+            </a:endParaRPr>
+          </a:p>
+          <a:p>
+            <a:pPr indent="0" lvl="0" marL="0" rtl="0" algn="l">
+              <a:spcBef>
+                <a:spcPts val="0"/>
+              </a:spcBef>
+              <a:spcAft>
+                <a:spcPts val="0"/>
+              </a:spcAft>
+              <a:buNone/>
+            </a:pPr>
+            <a:r>
+              <a:rPr i="1" lang="en" sz="900">
+                <a:solidFill>
+                  <a:srgbClr val="000000"/>
+                </a:solidFill>
+                <a:latin typeface="Roboto"/>
+                <a:ea typeface="Roboto"/>
+                <a:cs typeface="Roboto"/>
+                <a:sym typeface="Roboto"/>
+              </a:rPr>
+              <a:t> filter_relative(</a:t>
+            </a:r>
+            <a:endParaRPr i="1" sz="900">
+              <a:solidFill>
+                <a:srgbClr val="000000"/>
+              </a:solidFill>
+              <a:latin typeface="Roboto"/>
+              <a:ea typeface="Roboto"/>
+              <a:cs typeface="Roboto"/>
+              <a:sym typeface="Roboto"/>
+            </a:endParaRPr>
+          </a:p>
+          <a:p>
+            <a:pPr indent="0" lvl="0" marL="0" rtl="0" algn="l">
+              <a:spcBef>
+                <a:spcPts val="0"/>
+              </a:spcBef>
+              <a:spcAft>
+                <a:spcPts val="0"/>
+              </a:spcAft>
+              <a:buNone/>
+            </a:pPr>
+            <a:r>
+              <a:rPr i="1" lang="en" sz="900">
+                <a:solidFill>
+                  <a:srgbClr val="000000"/>
+                </a:solidFill>
+                <a:latin typeface="Roboto"/>
+                <a:ea typeface="Roboto"/>
+                <a:cs typeface="Roboto"/>
+                <a:sym typeface="Roboto"/>
+              </a:rPr>
+              <a:t>   response,</a:t>
+            </a:r>
+            <a:endParaRPr i="1" sz="900">
+              <a:solidFill>
+                <a:srgbClr val="000000"/>
+              </a:solidFill>
+              <a:latin typeface="Roboto"/>
+              <a:ea typeface="Roboto"/>
+              <a:cs typeface="Roboto"/>
+              <a:sym typeface="Roboto"/>
+            </a:endParaRPr>
+          </a:p>
+          <a:p>
+            <a:pPr indent="0" lvl="0" marL="0" rtl="0" algn="l">
+              <a:spcBef>
+                <a:spcPts val="0"/>
+              </a:spcBef>
+              <a:spcAft>
+                <a:spcPts val="0"/>
+              </a:spcAft>
+              <a:buNone/>
+            </a:pPr>
+            <a:r>
+              <a:rPr i="1" lang="en" sz="900">
+                <a:solidFill>
+                  <a:srgbClr val="000000"/>
+                </a:solidFill>
+                <a:latin typeface="Roboto"/>
+                <a:ea typeface="Roboto"/>
+                <a:cs typeface="Roboto"/>
+                <a:sym typeface="Roboto"/>
+              </a:rPr>
+              <a:t>    by_vars = exprs(USUBJID),</a:t>
+            </a:r>
+            <a:endParaRPr i="1" sz="900">
+              <a:solidFill>
+                <a:srgbClr val="000000"/>
+              </a:solidFill>
+              <a:latin typeface="Roboto"/>
+              <a:ea typeface="Roboto"/>
+              <a:cs typeface="Roboto"/>
+              <a:sym typeface="Roboto"/>
+            </a:endParaRPr>
+          </a:p>
+          <a:p>
+            <a:pPr indent="0" lvl="0" marL="0" rtl="0" algn="l">
+              <a:spcBef>
+                <a:spcPts val="0"/>
+              </a:spcBef>
+              <a:spcAft>
+                <a:spcPts val="0"/>
+              </a:spcAft>
+              <a:buNone/>
+            </a:pPr>
+            <a:r>
+              <a:rPr i="1" lang="en" sz="900">
+                <a:solidFill>
+                  <a:srgbClr val="000000"/>
+                </a:solidFill>
+                <a:latin typeface="Roboto"/>
+                <a:ea typeface="Roboto"/>
+                <a:cs typeface="Roboto"/>
+                <a:sym typeface="Roboto"/>
+              </a:rPr>
+              <a:t>    order = exprs(AVISITN),</a:t>
+            </a:r>
+            <a:endParaRPr i="1" sz="900">
+              <a:solidFill>
+                <a:srgbClr val="000000"/>
+              </a:solidFill>
+              <a:latin typeface="Roboto"/>
+              <a:ea typeface="Roboto"/>
+              <a:cs typeface="Roboto"/>
+              <a:sym typeface="Roboto"/>
+            </a:endParaRPr>
+          </a:p>
+          <a:p>
+            <a:pPr indent="0" lvl="0" marL="0" rtl="0" algn="l">
+              <a:spcBef>
+                <a:spcPts val="0"/>
+              </a:spcBef>
+              <a:spcAft>
+                <a:spcPts val="0"/>
+              </a:spcAft>
+              <a:buNone/>
+            </a:pPr>
+            <a:r>
+              <a:rPr i="1" lang="en" sz="900">
+                <a:solidFill>
+                  <a:srgbClr val="000000"/>
+                </a:solidFill>
+                <a:latin typeface="Roboto"/>
+                <a:ea typeface="Roboto"/>
+                <a:cs typeface="Roboto"/>
+                <a:sym typeface="Roboto"/>
+              </a:rPr>
+              <a:t>    condition = AVALC == "PD",</a:t>
+            </a:r>
+            <a:endParaRPr i="1" sz="900">
+              <a:solidFill>
+                <a:srgbClr val="000000"/>
+              </a:solidFill>
+              <a:latin typeface="Roboto"/>
+              <a:ea typeface="Roboto"/>
+              <a:cs typeface="Roboto"/>
+              <a:sym typeface="Roboto"/>
+            </a:endParaRPr>
+          </a:p>
+          <a:p>
+            <a:pPr indent="0" lvl="0" marL="0" rtl="0" algn="l">
+              <a:spcBef>
+                <a:spcPts val="0"/>
+              </a:spcBef>
+              <a:spcAft>
+                <a:spcPts val="0"/>
+              </a:spcAft>
+              <a:buNone/>
+            </a:pPr>
+            <a:r>
+              <a:rPr i="1" lang="en" sz="900">
+                <a:solidFill>
+                  <a:srgbClr val="000000"/>
+                </a:solidFill>
+                <a:latin typeface="Roboto"/>
+                <a:ea typeface="Roboto"/>
+                <a:cs typeface="Roboto"/>
+                <a:sym typeface="Roboto"/>
+              </a:rPr>
+              <a:t>    mode = "first", selection = "before",</a:t>
+            </a:r>
+            <a:endParaRPr i="1" sz="900">
+              <a:solidFill>
+                <a:srgbClr val="000000"/>
+              </a:solidFill>
+              <a:latin typeface="Roboto"/>
+              <a:ea typeface="Roboto"/>
+              <a:cs typeface="Roboto"/>
+              <a:sym typeface="Roboto"/>
+            </a:endParaRPr>
+          </a:p>
+          <a:p>
+            <a:pPr indent="0" lvl="0" marL="0" rtl="0" algn="l">
+              <a:spcBef>
+                <a:spcPts val="0"/>
+              </a:spcBef>
+              <a:spcAft>
+                <a:spcPts val="0"/>
+              </a:spcAft>
+              <a:buNone/>
+            </a:pPr>
+            <a:r>
+              <a:rPr i="1" lang="en" sz="900">
+                <a:solidFill>
+                  <a:srgbClr val="000000"/>
+                </a:solidFill>
+                <a:latin typeface="Roboto"/>
+                <a:ea typeface="Roboto"/>
+                <a:cs typeface="Roboto"/>
+                <a:sym typeface="Roboto"/>
+              </a:rPr>
+              <a:t>    inclusive = TRUE</a:t>
+            </a:r>
+            <a:endParaRPr i="1" sz="900">
+              <a:solidFill>
+                <a:srgbClr val="000000"/>
+              </a:solidFill>
+              <a:latin typeface="Roboto"/>
+              <a:ea typeface="Roboto"/>
+              <a:cs typeface="Roboto"/>
+              <a:sym typeface="Roboto"/>
+            </a:endParaRPr>
+          </a:p>
+          <a:p>
+            <a:pPr indent="0" lvl="0" marL="0" rtl="0" algn="l">
+              <a:spcBef>
+                <a:spcPts val="0"/>
+              </a:spcBef>
+              <a:spcAft>
+                <a:spcPts val="0"/>
+              </a:spcAft>
+              <a:buNone/>
+            </a:pPr>
+            <a:r>
+              <a:rPr i="1" lang="en" sz="900">
+                <a:solidFill>
+                  <a:srgbClr val="000000"/>
+                </a:solidFill>
+                <a:latin typeface="Roboto"/>
+                <a:ea typeface="Roboto"/>
+                <a:cs typeface="Roboto"/>
+                <a:sym typeface="Roboto"/>
+              </a:rPr>
+              <a:t>)</a:t>
+            </a:r>
+            <a:endParaRPr i="1" sz="900">
+              <a:solidFill>
+                <a:srgbClr val="000000"/>
+              </a:solidFill>
+              <a:latin typeface="Roboto"/>
+              <a:ea typeface="Roboto"/>
+              <a:cs typeface="Roboto"/>
+              <a:sym typeface="Roboto"/>
+            </a:endParaRPr>
+          </a:p>
+          <a:p>
+            <a:pPr indent="0" lvl="0" marL="0" rtl="0" algn="l">
+              <a:spcBef>
+                <a:spcPts val="0"/>
+              </a:spcBef>
+              <a:spcAft>
+                <a:spcPts val="0"/>
+              </a:spcAft>
+              <a:buNone/>
+            </a:pPr>
+            <a:r>
+              <a:t/>
+            </a:r>
+            <a:endParaRPr i="1" sz="900">
+              <a:solidFill>
+                <a:srgbClr val="000000"/>
+              </a:solidFill>
+              <a:latin typeface="Roboto"/>
+              <a:ea typeface="Roboto"/>
+              <a:cs typeface="Roboto"/>
+              <a:sym typeface="Roboto"/>
+            </a:endParaRPr>
+          </a:p>
+          <a:p>
+            <a:pPr indent="0" lvl="0" marL="0" rtl="0" algn="l">
+              <a:spcBef>
+                <a:spcPts val="0"/>
+              </a:spcBef>
+              <a:spcAft>
+                <a:spcPts val="0"/>
+              </a:spcAft>
+              <a:buNone/>
+            </a:pPr>
+            <a:r>
+              <a:t/>
+            </a:r>
+            <a:endParaRPr sz="900">
+              <a:solidFill>
+                <a:srgbClr val="000000"/>
+              </a:solidFill>
+              <a:latin typeface="Roboto"/>
+              <a:ea typeface="Roboto"/>
+              <a:cs typeface="Roboto"/>
+              <a:sym typeface="Roboto"/>
+            </a:endParaRPr>
+          </a:p>
+          <a:p>
+            <a:pPr indent="0" lvl="0" marL="0" rtl="0" algn="l">
+              <a:spcBef>
+                <a:spcPts val="0"/>
+              </a:spcBef>
+              <a:spcAft>
+                <a:spcPts val="0"/>
+              </a:spcAft>
+              <a:buNone/>
+            </a:pPr>
+            <a:r>
+              <a:t/>
+            </a:r>
+            <a:endParaRPr b="1" sz="900">
+              <a:solidFill>
+                <a:srgbClr val="000000"/>
               </a:solidFill>
               <a:latin typeface="Roboto"/>
               <a:ea typeface="Roboto"/>

</xml_diff>

<commit_message>
#2458 updates following review
</commit_message>
<xml_diff>
--- a/inst/cheatsheet/admiral_cheatsheet.pptx
+++ b/inst/cheatsheet/admiral_cheatsheet.pptx
@@ -5865,7 +5865,7 @@
               <a:buNone/>
             </a:pPr>
             <a:r>
-              <a:rPr lang="en" sz="3700">
+              <a:rPr lang="en" sz="3700" dirty="0">
                 <a:solidFill>
                   <a:srgbClr val="666666"/>
                 </a:solidFill>
@@ -5877,7 +5877,7 @@
               <a:t>admiral</a:t>
             </a:r>
             <a:r>
-              <a:rPr lang="en" sz="3700">
+              <a:rPr lang="en" sz="3700" dirty="0">
                 <a:latin typeface="Roboto Mono Medium"/>
                 <a:ea typeface="Roboto Mono Medium"/>
                 <a:cs typeface="Roboto Mono Medium"/>
@@ -5886,7 +5886,7 @@
               <a:t> :: </a:t>
             </a:r>
             <a:r>
-              <a:rPr lang="en" sz="2700">
+              <a:rPr lang="en" sz="2700" dirty="0">
                 <a:solidFill>
                   <a:srgbClr val="434343"/>
                 </a:solidFill>
@@ -5897,7 +5897,7 @@
               </a:rPr>
               <a:t>CHEAT SHEET</a:t>
             </a:r>
-            <a:endParaRPr sz="2700">
+            <a:endParaRPr sz="2700" dirty="0">
               <a:solidFill>
                 <a:srgbClr val="434343"/>
               </a:solidFill>
@@ -8311,6 +8311,20 @@
             <a:r>
               <a:rPr lang="en" sz="850" b="1" dirty="0">
                 <a:solidFill>
+                  <a:schemeClr val="bg1">
+                    <a:lumMod val="50000"/>
+                  </a:schemeClr>
+                </a:solidFill>
+                <a:latin typeface="Roboto"/>
+                <a:ea typeface="Roboto"/>
+                <a:cs typeface="Roboto"/>
+                <a:sym typeface="Roboto"/>
+              </a:rPr>
+              <a:t>()</a:t>
+            </a:r>
+            <a:r>
+              <a:rPr lang="en" sz="850" b="1" dirty="0">
+                <a:solidFill>
                   <a:schemeClr val="dk1"/>
                 </a:solidFill>
                 <a:latin typeface="Roboto"/>
@@ -8318,7 +8332,7 @@
                 <a:cs typeface="Roboto"/>
                 <a:sym typeface="Roboto"/>
               </a:rPr>
-              <a:t>(), </a:t>
+              <a:t> </a:t>
             </a:r>
             <a:r>
               <a:rPr lang="en" sz="850" b="1" dirty="0">
@@ -8345,7 +8359,9 @@
             <a:r>
               <a:rPr lang="en" sz="850" b="1" dirty="0">
                 <a:solidFill>
-                  <a:schemeClr val="dk1"/>
+                  <a:schemeClr val="bg1">
+                    <a:lumMod val="50000"/>
+                  </a:schemeClr>
                 </a:solidFill>
                 <a:latin typeface="Roboto"/>
                 <a:ea typeface="Roboto"/>
@@ -8356,7 +8372,9 @@
             </a:r>
             <a:endParaRPr sz="850" b="1" dirty="0">
               <a:solidFill>
-                <a:schemeClr val="dk1"/>
+                <a:schemeClr val="bg1">
+                  <a:lumMod val="50000"/>
+                </a:schemeClr>
               </a:solidFill>
               <a:latin typeface="Roboto"/>
               <a:ea typeface="Roboto"/>
@@ -8399,6 +8417,20 @@
             <a:r>
               <a:rPr lang="en" sz="850" b="1" dirty="0">
                 <a:solidFill>
+                  <a:schemeClr val="bg1">
+                    <a:lumMod val="50000"/>
+                  </a:schemeClr>
+                </a:solidFill>
+                <a:latin typeface="Roboto"/>
+                <a:ea typeface="Roboto"/>
+                <a:cs typeface="Roboto"/>
+                <a:sym typeface="Roboto"/>
+              </a:rPr>
+              <a:t>()</a:t>
+            </a:r>
+            <a:r>
+              <a:rPr lang="en" sz="850" b="1" dirty="0">
+                <a:solidFill>
                   <a:schemeClr val="dk1"/>
                 </a:solidFill>
                 <a:latin typeface="Roboto"/>
@@ -8406,7 +8438,7 @@
                 <a:cs typeface="Roboto"/>
                 <a:sym typeface="Roboto"/>
               </a:rPr>
-              <a:t>(), </a:t>
+              <a:t> </a:t>
             </a:r>
             <a:r>
               <a:rPr lang="en" sz="850" b="1" dirty="0">
@@ -8433,14 +8465,16 @@
             <a:r>
               <a:rPr lang="en" sz="850" b="1" dirty="0">
                 <a:solidFill>
-                  <a:schemeClr val="dk1"/>
-                </a:solidFill>
-                <a:latin typeface="Roboto"/>
-                <a:ea typeface="Roboto"/>
-                <a:cs typeface="Roboto"/>
-                <a:sym typeface="Roboto"/>
-              </a:rPr>
-              <a:t>(),</a:t>
+                  <a:schemeClr val="bg1">
+                    <a:lumMod val="50000"/>
+                  </a:schemeClr>
+                </a:solidFill>
+                <a:latin typeface="Roboto"/>
+                <a:ea typeface="Roboto"/>
+                <a:cs typeface="Roboto"/>
+                <a:sym typeface="Roboto"/>
+              </a:rPr>
+              <a:t>()</a:t>
             </a:r>
             <a:endParaRPr sz="850" b="1" dirty="0">
               <a:solidFill>
@@ -8492,7 +8526,9 @@
             <a:r>
               <a:rPr lang="en" sz="850" b="1" dirty="0">
                 <a:solidFill>
-                  <a:schemeClr val="dk1"/>
+                  <a:schemeClr val="bg1">
+                    <a:lumMod val="50000"/>
+                  </a:schemeClr>
                 </a:solidFill>
                 <a:latin typeface="Roboto"/>
                 <a:ea typeface="Roboto"/>
@@ -8503,7 +8539,9 @@
             </a:r>
             <a:endParaRPr sz="850" b="1" dirty="0">
               <a:solidFill>
-                <a:schemeClr val="dk1"/>
+                <a:schemeClr val="bg1">
+                  <a:lumMod val="50000"/>
+                </a:schemeClr>
               </a:solidFill>
               <a:latin typeface="Roboto"/>
               <a:ea typeface="Roboto"/>
@@ -8684,6 +8722,20 @@
             <a:r>
               <a:rPr lang="en" sz="850" b="1" dirty="0">
                 <a:solidFill>
+                  <a:schemeClr val="bg1">
+                    <a:lumMod val="50000"/>
+                  </a:schemeClr>
+                </a:solidFill>
+                <a:latin typeface="Roboto"/>
+                <a:ea typeface="Roboto"/>
+                <a:cs typeface="Roboto"/>
+                <a:sym typeface="Roboto"/>
+              </a:rPr>
+              <a:t>()</a:t>
+            </a:r>
+            <a:r>
+              <a:rPr lang="en" sz="850" b="1" dirty="0">
+                <a:solidFill>
                   <a:schemeClr val="dk1"/>
                 </a:solidFill>
                 <a:latin typeface="Roboto"/>
@@ -8691,7 +8743,7 @@
                 <a:cs typeface="Roboto"/>
                 <a:sym typeface="Roboto"/>
               </a:rPr>
-              <a:t>() </a:t>
+              <a:t> </a:t>
             </a:r>
             <a:r>
               <a:rPr lang="en" sz="850" b="1" dirty="0">
@@ -8718,7 +8770,9 @@
             <a:r>
               <a:rPr lang="en" sz="850" b="1" dirty="0">
                 <a:solidFill>
-                  <a:schemeClr val="dk1"/>
+                  <a:schemeClr val="bg1">
+                    <a:lumMod val="50000"/>
+                  </a:schemeClr>
                 </a:solidFill>
                 <a:latin typeface="Roboto"/>
                 <a:ea typeface="Roboto"/>
@@ -8729,7 +8783,9 @@
             </a:r>
             <a:endParaRPr sz="850" u="sng" dirty="0">
               <a:solidFill>
-                <a:schemeClr val="dk1"/>
+                <a:schemeClr val="bg1">
+                  <a:lumMod val="50000"/>
+                </a:schemeClr>
               </a:solidFill>
               <a:latin typeface="Roboto"/>
               <a:ea typeface="Roboto"/>
@@ -8772,6 +8828,20 @@
             <a:r>
               <a:rPr lang="en" sz="850" b="1" dirty="0">
                 <a:solidFill>
+                  <a:schemeClr val="bg1">
+                    <a:lumMod val="50000"/>
+                  </a:schemeClr>
+                </a:solidFill>
+                <a:latin typeface="Roboto"/>
+                <a:ea typeface="Roboto"/>
+                <a:cs typeface="Roboto"/>
+                <a:sym typeface="Roboto"/>
+              </a:rPr>
+              <a:t>()</a:t>
+            </a:r>
+            <a:r>
+              <a:rPr lang="en" sz="850" b="1" dirty="0">
+                <a:solidFill>
                   <a:schemeClr val="dk1"/>
                 </a:solidFill>
                 <a:latin typeface="Roboto"/>
@@ -8779,7 +8849,7 @@
                 <a:cs typeface="Roboto"/>
                 <a:sym typeface="Roboto"/>
               </a:rPr>
-              <a:t>(), </a:t>
+              <a:t> </a:t>
             </a:r>
             <a:r>
               <a:rPr lang="en" sz="850" b="1" dirty="0">
@@ -8806,7 +8876,9 @@
             <a:r>
               <a:rPr lang="en" sz="850" b="1" dirty="0">
                 <a:solidFill>
-                  <a:schemeClr val="dk1"/>
+                  <a:schemeClr val="bg1">
+                    <a:lumMod val="50000"/>
+                  </a:schemeClr>
                 </a:solidFill>
                 <a:latin typeface="Roboto"/>
                 <a:ea typeface="Roboto"/>
@@ -8817,7 +8889,9 @@
             </a:r>
             <a:endParaRPr sz="850" b="1" dirty="0">
               <a:solidFill>
-                <a:schemeClr val="dk1"/>
+                <a:schemeClr val="bg1">
+                  <a:lumMod val="50000"/>
+                </a:schemeClr>
               </a:solidFill>
               <a:latin typeface="Roboto"/>
               <a:ea typeface="Roboto"/>
@@ -8860,6 +8934,20 @@
             <a:r>
               <a:rPr lang="en" sz="850" b="1" dirty="0">
                 <a:solidFill>
+                  <a:schemeClr val="bg1">
+                    <a:lumMod val="50000"/>
+                  </a:schemeClr>
+                </a:solidFill>
+                <a:latin typeface="Roboto"/>
+                <a:ea typeface="Roboto"/>
+                <a:cs typeface="Roboto"/>
+                <a:sym typeface="Roboto"/>
+              </a:rPr>
+              <a:t>()</a:t>
+            </a:r>
+            <a:r>
+              <a:rPr lang="en" sz="850" b="1" dirty="0">
+                <a:solidFill>
                   <a:schemeClr val="dk1"/>
                 </a:solidFill>
                 <a:latin typeface="Roboto"/>
@@ -8867,7 +8955,7 @@
                 <a:cs typeface="Roboto"/>
                 <a:sym typeface="Roboto"/>
               </a:rPr>
-              <a:t>(), </a:t>
+              <a:t> </a:t>
             </a:r>
             <a:r>
               <a:rPr lang="en" sz="850" b="1" dirty="0">
@@ -8894,7 +8982,9 @@
             <a:r>
               <a:rPr lang="en" sz="850" b="1" dirty="0">
                 <a:solidFill>
-                  <a:schemeClr val="dk1"/>
+                  <a:schemeClr val="bg1">
+                    <a:lumMod val="50000"/>
+                  </a:schemeClr>
                 </a:solidFill>
                 <a:latin typeface="Roboto"/>
                 <a:ea typeface="Roboto"/>
@@ -8933,6 +9023,20 @@
             <a:r>
               <a:rPr lang="en" sz="850" b="1" dirty="0">
                 <a:solidFill>
+                  <a:schemeClr val="bg1">
+                    <a:lumMod val="50000"/>
+                  </a:schemeClr>
+                </a:solidFill>
+                <a:latin typeface="Roboto"/>
+                <a:ea typeface="Roboto"/>
+                <a:cs typeface="Roboto"/>
+                <a:sym typeface="Roboto"/>
+              </a:rPr>
+              <a:t>()</a:t>
+            </a:r>
+            <a:r>
+              <a:rPr lang="en" sz="850" b="1" dirty="0">
+                <a:solidFill>
                   <a:schemeClr val="dk1"/>
                 </a:solidFill>
                 <a:latin typeface="Roboto"/>
@@ -8940,7 +9044,7 @@
                 <a:cs typeface="Roboto"/>
                 <a:sym typeface="Roboto"/>
               </a:rPr>
-              <a:t>(), </a:t>
+              <a:t> </a:t>
             </a:r>
             <a:r>
               <a:rPr lang="en" sz="850" b="1" dirty="0">
@@ -8961,7 +9065,9 @@
             <a:r>
               <a:rPr lang="en" sz="850" b="1" dirty="0">
                 <a:solidFill>
-                  <a:schemeClr val="dk1"/>
+                  <a:schemeClr val="bg1">
+                    <a:lumMod val="50000"/>
+                  </a:schemeClr>
                 </a:solidFill>
                 <a:latin typeface="Roboto"/>
                 <a:ea typeface="Roboto"/>
@@ -10791,7 +10897,9 @@
             <a:r>
               <a:rPr lang="en" sz="900" b="1" dirty="0">
                 <a:solidFill>
-                  <a:schemeClr val="dk1"/>
+                  <a:schemeClr val="bg1">
+                    <a:lumMod val="50000"/>
+                  </a:schemeClr>
                 </a:solidFill>
                 <a:latin typeface="Roboto"/>
                 <a:ea typeface="Roboto"/>
@@ -10802,7 +10910,9 @@
             </a:r>
             <a:endParaRPr sz="900" b="1" dirty="0">
               <a:solidFill>
-                <a:schemeClr val="dk1"/>
+                <a:schemeClr val="bg1">
+                  <a:lumMod val="50000"/>
+                </a:schemeClr>
               </a:solidFill>
               <a:latin typeface="Roboto"/>
               <a:ea typeface="Roboto"/>
@@ -10845,7 +10955,9 @@
             <a:r>
               <a:rPr lang="en" sz="900" b="1" dirty="0">
                 <a:solidFill>
-                  <a:schemeClr val="dk1"/>
+                  <a:schemeClr val="bg1">
+                    <a:lumMod val="50000"/>
+                  </a:schemeClr>
                 </a:solidFill>
                 <a:latin typeface="Roboto"/>
                 <a:ea typeface="Roboto"/>
@@ -10856,7 +10968,9 @@
             </a:r>
             <a:endParaRPr sz="900" b="1" dirty="0">
               <a:solidFill>
-                <a:schemeClr val="dk1"/>
+                <a:schemeClr val="bg1">
+                  <a:lumMod val="50000"/>
+                </a:schemeClr>
               </a:solidFill>
               <a:latin typeface="Roboto"/>
               <a:ea typeface="Roboto"/>
@@ -10899,7 +11013,9 @@
             <a:r>
               <a:rPr lang="en" sz="900" b="1" dirty="0">
                 <a:solidFill>
-                  <a:schemeClr val="dk1"/>
+                  <a:schemeClr val="bg1">
+                    <a:lumMod val="50000"/>
+                  </a:schemeClr>
                 </a:solidFill>
                 <a:latin typeface="Roboto"/>
                 <a:ea typeface="Roboto"/>
@@ -10910,7 +11026,9 @@
             </a:r>
             <a:endParaRPr sz="900" b="1" dirty="0">
               <a:solidFill>
-                <a:schemeClr val="dk1"/>
+                <a:schemeClr val="bg1">
+                  <a:lumMod val="50000"/>
+                </a:schemeClr>
               </a:solidFill>
               <a:latin typeface="Roboto"/>
               <a:ea typeface="Roboto"/>
@@ -10953,7 +11071,9 @@
             <a:r>
               <a:rPr lang="en" sz="900" b="1" dirty="0">
                 <a:solidFill>
-                  <a:schemeClr val="dk1"/>
+                  <a:schemeClr val="bg1">
+                    <a:lumMod val="50000"/>
+                  </a:schemeClr>
                 </a:solidFill>
                 <a:latin typeface="Roboto"/>
                 <a:ea typeface="Roboto"/>
@@ -10962,15 +11082,6 @@
               </a:rPr>
               <a:t>()</a:t>
             </a:r>
-            <a:endParaRPr sz="900" b="1" dirty="0">
-              <a:solidFill>
-                <a:schemeClr val="dk1"/>
-              </a:solidFill>
-              <a:latin typeface="Roboto"/>
-              <a:ea typeface="Roboto"/>
-              <a:cs typeface="Roboto"/>
-              <a:sym typeface="Roboto"/>
-            </a:endParaRPr>
           </a:p>
           <a:p>
             <a:pPr marL="0" lvl="0" indent="0" algn="l" rtl="0">
@@ -10994,20 +11105,46 @@
                 <a:ea typeface="Roboto"/>
                 <a:cs typeface="Roboto"/>
                 <a:sym typeface="Roboto"/>
-                <a:hlinkClick r:id="rId36">
-                  <a:extLst>
-                    <a:ext uri="{A12FA001-AC4F-418D-AE19-62706E023703}">
-                      <ahyp:hlinkClr xmlns:ahyp="http://schemas.microsoft.com/office/drawing/2018/hyperlinkcolor" val="tx"/>
-                    </a:ext>
-                  </a:extLst>
-                </a:hlinkClick>
-              </a:rPr>
-              <a:t>convert_date_to_dtm</a:t>
+              </a:rPr>
+              <a:t>compute</a:t>
             </a:r>
             <a:r>
               <a:rPr lang="en" sz="900" b="1" dirty="0">
                 <a:solidFill>
-                  <a:schemeClr val="dk1"/>
+                  <a:schemeClr val="accent5"/>
+                </a:solidFill>
+                <a:uFill>
+                  <a:noFill/>
+                </a:uFill>
+                <a:latin typeface="Roboto"/>
+                <a:ea typeface="Roboto"/>
+                <a:cs typeface="Roboto"/>
+                <a:sym typeface="Roboto"/>
+                <a:hlinkClick r:id="rId36"/>
+              </a:rPr>
+              <a:t>_</a:t>
+            </a:r>
+            <a:r>
+              <a:rPr lang="en" sz="900" b="1" dirty="0">
+                <a:solidFill>
+                  <a:schemeClr val="accent5"/>
+                </a:solidFill>
+                <a:uFill>
+                  <a:noFill/>
+                </a:uFill>
+                <a:latin typeface="Roboto"/>
+                <a:ea typeface="Roboto"/>
+                <a:cs typeface="Roboto"/>
+                <a:sym typeface="Roboto"/>
+              </a:rPr>
+              <a:t>scale</a:t>
+            </a:r>
+            <a:r>
+              <a:rPr lang="en" sz="900" b="1" dirty="0">
+                <a:solidFill>
+                  <a:schemeClr val="bg1">
+                    <a:lumMod val="50000"/>
+                  </a:schemeClr>
                 </a:solidFill>
                 <a:latin typeface="Roboto"/>
                 <a:ea typeface="Roboto"/>
@@ -11016,35 +11153,6 @@
               </a:rPr>
               <a:t>()</a:t>
             </a:r>
-            <a:endParaRPr sz="900" b="1" i="1" dirty="0">
-              <a:solidFill>
-                <a:schemeClr val="dk1"/>
-              </a:solidFill>
-              <a:latin typeface="Roboto"/>
-              <a:ea typeface="Roboto"/>
-              <a:cs typeface="Roboto"/>
-              <a:sym typeface="Roboto"/>
-            </a:endParaRPr>
-          </a:p>
-          <a:p>
-            <a:pPr marL="0" lvl="0" indent="0" algn="l" rtl="0">
-              <a:spcBef>
-                <a:spcPts val="0"/>
-              </a:spcBef>
-              <a:spcAft>
-                <a:spcPts val="0"/>
-              </a:spcAft>
-              <a:buNone/>
-            </a:pPr>
-            <a:endParaRPr sz="900" b="1" i="1" dirty="0">
-              <a:solidFill>
-                <a:schemeClr val="dk1"/>
-              </a:solidFill>
-              <a:latin typeface="Roboto"/>
-              <a:ea typeface="Roboto"/>
-              <a:cs typeface="Roboto"/>
-              <a:sym typeface="Roboto"/>
-            </a:endParaRPr>
           </a:p>
           <a:p>
             <a:pPr marL="0" lvl="0" indent="0" algn="l" rtl="0">
@@ -11142,34 +11250,58 @@
                   </a:extLst>
                 </a:hlinkClick>
               </a:rPr>
-              <a:t>t</a:t>
-            </a:r>
-            <a:r>
-              <a:rPr lang="en" sz="900" b="1" dirty="0">
+              <a:t>convert_date_to_dtm</a:t>
+            </a:r>
+            <a:r>
+              <a:rPr lang="en-US" sz="900" b="1" dirty="0">
+                <a:solidFill>
+                  <a:schemeClr val="bg1">
+                    <a:lumMod val="50000"/>
+                  </a:schemeClr>
+                </a:solidFill>
+                <a:latin typeface="Roboto"/>
+                <a:ea typeface="Roboto"/>
+                <a:cs typeface="Roboto"/>
+                <a:sym typeface="Roboto"/>
+              </a:rPr>
+              <a:t>()</a:t>
+            </a:r>
+            <a:endParaRPr lang="en-US" sz="900" b="1" dirty="0">
+              <a:solidFill>
+                <a:schemeClr val="bg1">
+                  <a:lumMod val="50000"/>
+                </a:schemeClr>
+              </a:solidFill>
+              <a:uFill>
+                <a:noFill/>
+              </a:uFill>
+              <a:latin typeface="Roboto"/>
+              <a:ea typeface="Roboto"/>
+              <a:cs typeface="Roboto"/>
+              <a:sym typeface="Roboto"/>
+              <a:hlinkClick r:id="rId38">
+                <a:extLst>
+                  <a:ext uri="{A12FA001-AC4F-418D-AE19-62706E023703}">
+                    <ahyp:hlinkClr xmlns:ahyp="http://schemas.microsoft.com/office/drawing/2018/hyperlinkcolor" val="tx"/>
+                  </a:ext>
+                </a:extLst>
+              </a:hlinkClick>
+            </a:endParaRPr>
+          </a:p>
+          <a:p>
+            <a:pPr marL="0" lvl="0" indent="0" algn="l" rtl="0">
+              <a:spcBef>
+                <a:spcPts val="0"/>
+              </a:spcBef>
+              <a:spcAft>
+                <a:spcPts val="0"/>
+              </a:spcAft>
+              <a:buNone/>
+            </a:pPr>
+            <a:r>
+              <a:rPr lang="en-US" sz="900" b="1" dirty="0">
                 <a:solidFill>
                   <a:schemeClr val="accent5"/>
-                </a:solidFill>
-                <a:uFill>
-                  <a:noFill/>
-                </a:uFill>
-                <a:latin typeface="Roboto"/>
-                <a:ea typeface="Roboto"/>
-                <a:cs typeface="Roboto"/>
-                <a:sym typeface="Roboto"/>
-                <a:hlinkClick r:id="rId37">
-                  <a:extLst>
-                    <a:ext uri="{A12FA001-AC4F-418D-AE19-62706E023703}">
-                      <ahyp:hlinkClr xmlns:ahyp="http://schemas.microsoft.com/office/drawing/2018/hyperlinkcolor" val="tx"/>
-                    </a:ext>
-                  </a:extLst>
-                </a:hlinkClick>
-              </a:rPr>
-              <a:t>ransform_range</a:t>
-            </a:r>
-            <a:r>
-              <a:rPr lang="en" sz="900" b="1" dirty="0">
-                <a:solidFill>
-                  <a:schemeClr val="accent2"/>
                 </a:solidFill>
                 <a:uFill>
                   <a:noFill/>
@@ -11186,19 +11318,8 @@
                   </a:extLst>
                 </a:hlinkClick>
               </a:rPr>
-              <a:t>()</a:t>
-            </a:r>
-          </a:p>
-          <a:p>
-            <a:pPr marL="0" lvl="0" indent="0" algn="l" rtl="0">
-              <a:spcBef>
-                <a:spcPts val="0"/>
-              </a:spcBef>
-              <a:spcAft>
-                <a:spcPts val="0"/>
-              </a:spcAft>
-              <a:buNone/>
-            </a:pPr>
+              <a:t>t</a:t>
+            </a:r>
             <a:r>
               <a:rPr lang="en" sz="900" b="1" dirty="0">
                 <a:solidFill>
@@ -11219,66 +11340,14 @@
                   </a:extLst>
                 </a:hlinkClick>
               </a:rPr>
-              <a:t>c</a:t>
+              <a:t>ransform_range</a:t>
             </a:r>
             <a:r>
               <a:rPr lang="en" sz="900" b="1" dirty="0">
                 <a:solidFill>
-                  <a:schemeClr val="accent5"/>
-                </a:solidFill>
-                <a:uFill>
-                  <a:noFill/>
-                </a:uFill>
-                <a:latin typeface="Roboto"/>
-                <a:ea typeface="Roboto"/>
-                <a:cs typeface="Roboto"/>
-                <a:sym typeface="Roboto"/>
-                <a:hlinkClick r:id="rId38">
-                  <a:extLst>
-                    <a:ext uri="{A12FA001-AC4F-418D-AE19-62706E023703}">
-                      <ahyp:hlinkClr xmlns:ahyp="http://schemas.microsoft.com/office/drawing/2018/hyperlinkcolor" val="tx"/>
-                    </a:ext>
-                  </a:extLst>
-                </a:hlinkClick>
-              </a:rPr>
-              <a:t>onvert_dtc_to_dt</a:t>
-            </a:r>
-            <a:r>
-              <a:rPr lang="en" sz="900" b="1" dirty="0">
-                <a:solidFill>
-                  <a:schemeClr val="dk1"/>
-                </a:solidFill>
-                <a:latin typeface="Roboto"/>
-                <a:ea typeface="Roboto"/>
-                <a:cs typeface="Roboto"/>
-                <a:sym typeface="Roboto"/>
-              </a:rPr>
-              <a:t>()</a:t>
-            </a:r>
-            <a:endParaRPr sz="900" b="1" dirty="0">
-              <a:solidFill>
-                <a:schemeClr val="dk1"/>
-              </a:solidFill>
-              <a:latin typeface="Roboto"/>
-              <a:ea typeface="Roboto"/>
-              <a:cs typeface="Roboto"/>
-              <a:sym typeface="Roboto"/>
-            </a:endParaRPr>
-          </a:p>
-          <a:p>
-            <a:pPr marL="0" lvl="0" indent="0" algn="l" rtl="0">
-              <a:spcBef>
-                <a:spcPts val="0"/>
-              </a:spcBef>
-              <a:spcAft>
-                <a:spcPts val="0"/>
-              </a:spcAft>
-              <a:buNone/>
-            </a:pPr>
-            <a:r>
-              <a:rPr lang="en" sz="900" b="1" dirty="0">
-                <a:solidFill>
-                  <a:schemeClr val="accent5"/>
+                  <a:schemeClr val="bg1">
+                    <a:lumMod val="50000"/>
+                  </a:schemeClr>
                 </a:solidFill>
                 <a:uFill>
                   <a:noFill/>
@@ -11295,12 +11364,47 @@
                   </a:extLst>
                 </a:hlinkClick>
               </a:rPr>
-              <a:t>convert_dtc_to_dtm</a:t>
-            </a:r>
+              <a:t>()</a:t>
+            </a:r>
+          </a:p>
+          <a:p>
+            <a:pPr marL="0" lvl="0" indent="0" algn="l" rtl="0">
+              <a:spcBef>
+                <a:spcPts val="0"/>
+              </a:spcBef>
+              <a:spcAft>
+                <a:spcPts val="0"/>
+              </a:spcAft>
+              <a:buNone/>
+            </a:pPr>
             <a:r>
               <a:rPr lang="en" sz="900" b="1" dirty="0">
                 <a:solidFill>
-                  <a:schemeClr val="dk1"/>
+                  <a:schemeClr val="accent5"/>
+                </a:solidFill>
+                <a:uFill>
+                  <a:noFill/>
+                </a:uFill>
+                <a:latin typeface="Roboto"/>
+                <a:ea typeface="Roboto"/>
+                <a:cs typeface="Roboto"/>
+                <a:sym typeface="Roboto"/>
+                <a:hlinkClick r:id="rId39">
+                  <a:extLst>
+                    <a:ext uri="{A12FA001-AC4F-418D-AE19-62706E023703}">
+                      <ahyp:hlinkClr xmlns:ahyp="http://schemas.microsoft.com/office/drawing/2018/hyperlinkcolor" val="tx"/>
+                    </a:ext>
+                  </a:extLst>
+                </a:hlinkClick>
+              </a:rPr>
+              <a:t>convert_dtc_to_dt</a:t>
+            </a:r>
+            <a:r>
+              <a:rPr lang="en" sz="900" b="1" dirty="0">
+                <a:solidFill>
+                  <a:schemeClr val="bg1">
+                    <a:lumMod val="50000"/>
+                  </a:schemeClr>
                 </a:solidFill>
                 <a:latin typeface="Roboto"/>
                 <a:ea typeface="Roboto"/>
@@ -11311,7 +11415,9 @@
             </a:r>
             <a:endParaRPr sz="900" b="1" dirty="0">
               <a:solidFill>
-                <a:schemeClr val="dk1"/>
+                <a:schemeClr val="bg1">
+                  <a:lumMod val="50000"/>
+                </a:schemeClr>
               </a:solidFill>
               <a:latin typeface="Roboto"/>
               <a:ea typeface="Roboto"/>
@@ -11349,12 +11455,14 @@
                   </a:extLst>
                 </a:hlinkClick>
               </a:rPr>
-              <a:t>impute_dtc_dt</a:t>
+              <a:t>convert_dtc_to_dtm</a:t>
             </a:r>
             <a:r>
               <a:rPr lang="en" sz="900" b="1" dirty="0">
                 <a:solidFill>
-                  <a:schemeClr val="dk1"/>
+                  <a:schemeClr val="bg1">
+                    <a:lumMod val="50000"/>
+                  </a:schemeClr>
                 </a:solidFill>
                 <a:latin typeface="Roboto"/>
                 <a:ea typeface="Roboto"/>
@@ -11363,83 +11471,11 @@
               </a:rPr>
               <a:t>()</a:t>
             </a:r>
-            <a:endParaRPr sz="900" b="1" dirty="0">
-              <a:solidFill>
-                <a:schemeClr val="dk1"/>
-              </a:solidFill>
-              <a:latin typeface="Roboto"/>
-              <a:ea typeface="Roboto"/>
-              <a:cs typeface="Roboto"/>
-              <a:sym typeface="Roboto"/>
-            </a:endParaRPr>
-          </a:p>
-          <a:p>
-            <a:pPr marL="0" lvl="0" indent="0" algn="l" rtl="0">
-              <a:spcBef>
-                <a:spcPts val="0"/>
-              </a:spcBef>
-              <a:spcAft>
-                <a:spcPts val="0"/>
-              </a:spcAft>
-              <a:buNone/>
-            </a:pPr>
-            <a:r>
-              <a:rPr lang="en" sz="900" b="1" dirty="0">
-                <a:solidFill>
-                  <a:schemeClr val="accent5"/>
-                </a:solidFill>
-                <a:uFill>
-                  <a:noFill/>
-                </a:uFill>
-                <a:latin typeface="Roboto"/>
-                <a:ea typeface="Roboto"/>
-                <a:cs typeface="Roboto"/>
-                <a:sym typeface="Roboto"/>
-                <a:hlinkClick r:id="rId41">
-                  <a:extLst>
-                    <a:ext uri="{A12FA001-AC4F-418D-AE19-62706E023703}">
-                      <ahyp:hlinkClr xmlns:ahyp="http://schemas.microsoft.com/office/drawing/2018/hyperlinkcolor" val="tx"/>
-                    </a:ext>
-                  </a:extLst>
-                </a:hlinkClick>
-              </a:rPr>
-              <a:t>impute_dtc_dtm</a:t>
-            </a:r>
-            <a:r>
-              <a:rPr lang="en" sz="900" b="1" dirty="0">
-                <a:solidFill>
-                  <a:schemeClr val="dk1"/>
-                </a:solidFill>
-                <a:latin typeface="Roboto"/>
-                <a:ea typeface="Roboto"/>
-                <a:cs typeface="Roboto"/>
-                <a:sym typeface="Roboto"/>
-              </a:rPr>
-              <a:t>()</a:t>
-            </a:r>
-            <a:endParaRPr sz="900" b="1" i="1" dirty="0">
-              <a:solidFill>
-                <a:schemeClr val="dk1"/>
-              </a:solidFill>
-              <a:latin typeface="Roboto"/>
-              <a:ea typeface="Roboto"/>
-              <a:cs typeface="Roboto"/>
-              <a:sym typeface="Roboto"/>
-            </a:endParaRPr>
-          </a:p>
-          <a:p>
-            <a:pPr marL="0" lvl="0" indent="0" algn="l" rtl="0">
-              <a:spcBef>
-                <a:spcPts val="0"/>
-              </a:spcBef>
-              <a:spcAft>
-                <a:spcPts val="0"/>
-              </a:spcAft>
-              <a:buNone/>
-            </a:pPr>
             <a:endParaRPr sz="900" i="1" dirty="0">
               <a:solidFill>
-                <a:schemeClr val="dk1"/>
+                <a:schemeClr val="bg1">
+                  <a:lumMod val="50000"/>
+                </a:schemeClr>
               </a:solidFill>
               <a:latin typeface="Roboto"/>
               <a:ea typeface="Roboto"/>
@@ -11541,7 +11577,7 @@
                 <a:ea typeface="Roboto"/>
                 <a:cs typeface="Roboto"/>
                 <a:sym typeface="Roboto"/>
-                <a:hlinkClick r:id="rId42"/>
+                <a:hlinkClick r:id="rId41"/>
               </a:rPr>
               <a:t>reference page</a:t>
             </a:r>
@@ -13878,39 +13914,7 @@
                 <a:cs typeface="Roboto"/>
                 <a:sym typeface="Roboto"/>
               </a:rPr>
-              <a:t>  filter_add = AEDECOD == "FATIGUE")</a:t>
-            </a:r>
-            <a:endParaRPr sz="900" i="1" dirty="0">
-              <a:solidFill>
-                <a:schemeClr val="dk1"/>
-              </a:solidFill>
-              <a:latin typeface="Roboto"/>
-              <a:ea typeface="Roboto"/>
-              <a:cs typeface="Roboto"/>
-              <a:sym typeface="Roboto"/>
-            </a:endParaRPr>
-          </a:p>
-          <a:p>
-            <a:pPr marL="0" lvl="0" indent="0" algn="l" rtl="0">
-              <a:spcBef>
-                <a:spcPts val="0"/>
-              </a:spcBef>
-              <a:spcAft>
-                <a:spcPts val="0"/>
-              </a:spcAft>
-              <a:buNone/>
-            </a:pPr>
-            <a:r>
-              <a:rPr lang="en" sz="900" i="1" dirty="0">
-                <a:solidFill>
-                  <a:schemeClr val="dk1"/>
-                </a:solidFill>
-                <a:latin typeface="Roboto"/>
-                <a:ea typeface="Roboto"/>
-                <a:cs typeface="Roboto"/>
-                <a:sym typeface="Roboto"/>
-              </a:rPr>
-              <a:t>)</a:t>
+              <a:t>  filter_add = AEDECOD == "FATIGUE"))</a:t>
             </a:r>
             <a:endParaRPr sz="900" i="1" dirty="0">
               <a:solidFill>
@@ -14023,7 +14027,9 @@
             <a:r>
               <a:rPr lang="en" sz="900" dirty="0">
                 <a:solidFill>
-                  <a:schemeClr val="dk1"/>
+                  <a:schemeClr val="bg1">
+                    <a:lumMod val="50000"/>
+                  </a:schemeClr>
                 </a:solidFill>
                 <a:latin typeface="Roboto"/>
                 <a:ea typeface="Roboto"/>
@@ -14670,7 +14676,7 @@
                   </a:extLst>
                 </a:hlinkClick>
               </a:rPr>
-              <a:t>derive_var_atoxgr</a:t>
+              <a:t>derive_var_atoxgr_dir</a:t>
             </a:r>
             <a:r>
               <a:rPr lang="en" sz="900" dirty="0">
@@ -14746,7 +14752,7 @@
                 <a:cs typeface="Roboto"/>
                 <a:sym typeface="Roboto"/>
               </a:rPr>
-              <a:t>Derive character lab grade based on high and low severity/toxicity grade(s).</a:t>
+              <a:t>Derive character lab grade based on severity or toxicity criteria.</a:t>
             </a:r>
             <a:endParaRPr sz="900" dirty="0">
               <a:solidFill>
@@ -16135,8 +16141,8 @@
         </p:nvSpPr>
         <p:spPr>
           <a:xfrm>
-            <a:off x="319900" y="1298344"/>
-            <a:ext cx="3209700" cy="530889"/>
+            <a:off x="319900" y="1298345"/>
+            <a:ext cx="3209700" cy="408766"/>
           </a:xfrm>
           <a:prstGeom prst="rect">
             <a:avLst/>
@@ -16207,7 +16213,7 @@
                 <a:cs typeface="Roboto"/>
                 <a:sym typeface="Roboto"/>
               </a:rPr>
-              <a:t>dataset, use_a1h1lo)</a:t>
+              <a:t>dataset, use_a1h1lo, …)</a:t>
             </a:r>
             <a:endParaRPr sz="900" dirty="0">
               <a:solidFill>
@@ -16540,23 +16546,35 @@
               <a:buNone/>
             </a:pPr>
             <a:r>
+              <a:rPr lang="en-US" sz="900" b="1" dirty="0">
+                <a:solidFill>
+                  <a:schemeClr val="accent5"/>
+                </a:solidFill>
+                <a:uFill>
+                  <a:noFill/>
+                </a:uFill>
+                <a:latin typeface="Roboto"/>
+                <a:ea typeface="Roboto"/>
+                <a:cs typeface="Roboto"/>
+                <a:sym typeface="Roboto"/>
+                <a:hlinkClick r:id="rId37"/>
+              </a:rPr>
+              <a:t>filter_relative</a:t>
+            </a:r>
+            <a:r>
               <a:rPr lang="en" sz="900" b="1" dirty="0">
                 <a:solidFill>
-                  <a:schemeClr val="bg1"/>
-                </a:solidFill>
-                <a:latin typeface="Roboto"/>
-                <a:ea typeface="Roboto"/>
-                <a:cs typeface="Roboto"/>
-                <a:sym typeface="Roboto"/>
-                <a:hlinkClick r:id="rId37">
-                  <a:extLst>
-                    <a:ext uri="{A12FA001-AC4F-418D-AE19-62706E023703}">
-                      <ahyp:hlinkClr xmlns:ahyp="http://schemas.microsoft.com/office/drawing/2018/hyperlinkcolor" val="tx"/>
-                    </a:ext>
-                  </a:extLst>
-                </a:hlinkClick>
-              </a:rPr>
-              <a:t>filter_relative</a:t>
+                  <a:schemeClr val="accent5"/>
+                </a:solidFill>
+                <a:uFill>
+                  <a:noFill/>
+                </a:uFill>
+                <a:latin typeface="Roboto"/>
+                <a:ea typeface="Roboto"/>
+                <a:cs typeface="Roboto"/>
+                <a:sym typeface="Roboto"/>
+              </a:rPr>
+              <a:t> </a:t>
             </a:r>
             <a:r>
               <a:rPr lang="en" sz="900" dirty="0">
@@ -16844,39 +16862,7 @@
                 <a:cs typeface="Roboto"/>
                 <a:sym typeface="Roboto"/>
               </a:rPr>
-              <a:t>    inclusive = TRUE</a:t>
-            </a:r>
-            <a:endParaRPr sz="900" i="1" dirty="0">
-              <a:solidFill>
-                <a:srgbClr val="000000"/>
-              </a:solidFill>
-              <a:latin typeface="Roboto"/>
-              <a:ea typeface="Roboto"/>
-              <a:cs typeface="Roboto"/>
-              <a:sym typeface="Roboto"/>
-            </a:endParaRPr>
-          </a:p>
-          <a:p>
-            <a:pPr marL="0" lvl="0" indent="0" algn="l" rtl="0">
-              <a:spcBef>
-                <a:spcPts val="0"/>
-              </a:spcBef>
-              <a:spcAft>
-                <a:spcPts val="0"/>
-              </a:spcAft>
-              <a:buNone/>
-            </a:pPr>
-            <a:r>
-              <a:rPr lang="en" sz="900" i="1" dirty="0">
-                <a:solidFill>
-                  <a:srgbClr val="000000"/>
-                </a:solidFill>
-                <a:latin typeface="Roboto"/>
-                <a:ea typeface="Roboto"/>
-                <a:cs typeface="Roboto"/>
-                <a:sym typeface="Roboto"/>
-              </a:rPr>
-              <a:t>)</a:t>
+              <a:t>    inclusive = TRUE)</a:t>
             </a:r>
             <a:endParaRPr sz="900" i="1" dirty="0">
               <a:solidFill>

</xml_diff>

<commit_message>
#2458 Further updates from review
</commit_message>
<xml_diff>
--- a/inst/cheatsheet/admiral_cheatsheet.pptx
+++ b/inst/cheatsheet/admiral_cheatsheet.pptx
@@ -11094,7 +11094,7 @@
               <a:buNone/>
             </a:pPr>
             <a:r>
-              <a:rPr lang="en" sz="900" b="1" dirty="0">
+              <a:rPr lang="en-US" sz="900" b="1" dirty="0">
                 <a:solidFill>
                   <a:schemeClr val="accent5"/>
                 </a:solidFill>
@@ -11105,11 +11105,12 @@
                 <a:ea typeface="Roboto"/>
                 <a:cs typeface="Roboto"/>
                 <a:sym typeface="Roboto"/>
-              </a:rPr>
-              <a:t>compute</a:t>
-            </a:r>
-            <a:r>
-              <a:rPr lang="en" sz="900" b="1" dirty="0">
+                <a:hlinkClick r:id="rId36"/>
+              </a:rPr>
+              <a:t>c</a:t>
+            </a:r>
+            <a:r>
+              <a:rPr lang="en-US" sz="900" b="1" dirty="0">
                 <a:solidFill>
                   <a:schemeClr val="accent5"/>
                 </a:solidFill>
@@ -11122,22 +11123,7 @@
                 <a:sym typeface="Roboto"/>
                 <a:hlinkClick r:id="rId36"/>
               </a:rPr>
-              <a:t>_</a:t>
-            </a:r>
-            <a:r>
-              <a:rPr lang="en" sz="900" b="1" dirty="0">
-                <a:solidFill>
-                  <a:schemeClr val="accent5"/>
-                </a:solidFill>
-                <a:uFill>
-                  <a:noFill/>
-                </a:uFill>
-                <a:latin typeface="Roboto"/>
-                <a:ea typeface="Roboto"/>
-                <a:cs typeface="Roboto"/>
-                <a:sym typeface="Roboto"/>
-              </a:rPr>
-              <a:t>scale</a:t>
+              <a:t>ompute_scale</a:t>
             </a:r>
             <a:r>
               <a:rPr lang="en" sz="900" b="1" dirty="0">
@@ -14608,7 +14594,7 @@
                 <a:cs typeface="Roboto"/>
                 <a:sym typeface="Roboto"/>
               </a:rPr>
-              <a:t>Add subperiod, period, or phase variables.</a:t>
+              <a:t>Add ADL subperiod, period, or phase variables.</a:t>
             </a:r>
             <a:endParaRPr sz="900" dirty="0">
               <a:solidFill>
@@ -14631,7 +14617,7 @@
         <p:spPr>
           <a:xfrm>
             <a:off x="319900" y="1631849"/>
-            <a:ext cx="3209700" cy="585933"/>
+            <a:ext cx="3350136" cy="585933"/>
           </a:xfrm>
           <a:prstGeom prst="rect">
             <a:avLst/>
@@ -14688,60 +14674,8 @@
                 <a:cs typeface="Roboto"/>
                 <a:sym typeface="Roboto"/>
               </a:rPr>
-              <a:t>(dataset, lotox_description_var,</a:t>
-            </a:r>
-            <a:endParaRPr sz="900" dirty="0">
-              <a:solidFill>
-                <a:srgbClr val="9E9E9E"/>
-              </a:solidFill>
-              <a:latin typeface="Roboto"/>
-              <a:ea typeface="Roboto"/>
-              <a:cs typeface="Roboto"/>
-              <a:sym typeface="Roboto"/>
-            </a:endParaRPr>
-          </a:p>
-          <a:p>
-            <a:pPr marL="0" lvl="0" indent="0" algn="l" rtl="0">
-              <a:spcBef>
-                <a:spcPts val="0"/>
-              </a:spcBef>
-              <a:spcAft>
-                <a:spcPts val="0"/>
-              </a:spcAft>
-              <a:buNone/>
-            </a:pPr>
-            <a:r>
-              <a:rPr lang="en" sz="900" dirty="0">
-                <a:solidFill>
-                  <a:srgbClr val="9E9E9E"/>
-                </a:solidFill>
-                <a:latin typeface="Roboto"/>
-                <a:ea typeface="Roboto"/>
-                <a:cs typeface="Roboto"/>
-                <a:sym typeface="Roboto"/>
-              </a:rPr>
-              <a:t>hitox_description_var)</a:t>
-            </a:r>
-            <a:endParaRPr sz="900" dirty="0">
-              <a:solidFill>
-                <a:srgbClr val="9E9E9E"/>
-              </a:solidFill>
-              <a:latin typeface="Roboto"/>
-              <a:ea typeface="Roboto"/>
-              <a:cs typeface="Roboto"/>
-              <a:sym typeface="Roboto"/>
-            </a:endParaRPr>
-          </a:p>
-          <a:p>
-            <a:pPr marL="0" lvl="0" indent="0" algn="l" rtl="0">
-              <a:spcBef>
-                <a:spcPts val="0"/>
-              </a:spcBef>
-              <a:spcAft>
-                <a:spcPts val="0"/>
-              </a:spcAft>
-              <a:buNone/>
-            </a:pPr>
+              <a:t>(dataset,  new_var, tox_description_var, meta_criteria, criteria_direction, get_unit_expr, signif_dig) </a:t>
+            </a:r>
             <a:r>
               <a:rPr lang="en" sz="900" dirty="0">
                 <a:solidFill>

</xml_diff>

<commit_message>
#2458 cheatsheet_1point1_1point2: update derive_vars_crit_flag()
</commit_message>
<xml_diff>
--- a/inst/cheatsheet/admiral_cheatsheet.pptx
+++ b/inst/cheatsheet/admiral_cheatsheet.pptx
@@ -15,14 +15,14 @@
   <p:notesSz cx="6858000" cy="9144000"/>
   <p:embeddedFontLst>
     <p:embeddedFont>
-      <p:font typeface="Roboto" panose="02000000000000000000" pitchFamily="2" charset="0"/>
+      <p:font typeface="Roboto Mono Medium" panose="020B0604020202020204" charset="0"/>
       <p:regular r:id="rId5"/>
       <p:bold r:id="rId6"/>
       <p:italic r:id="rId7"/>
       <p:boldItalic r:id="rId8"/>
     </p:embeddedFont>
     <p:embeddedFont>
-      <p:font typeface="Roboto Mono Medium" panose="00000009000000000000" pitchFamily="49" charset="0"/>
+      <p:font typeface="Roboto" panose="02000000000000000000" pitchFamily="2" charset="0"/>
       <p:regular r:id="rId9"/>
       <p:bold r:id="rId10"/>
       <p:italic r:id="rId11"/>
@@ -6148,7 +6148,7 @@
                 <a:hlinkClick r:id="rId3">
                   <a:extLst>
                     <a:ext uri="{A12FA001-AC4F-418D-AE19-62706E023703}">
-                      <ahyp:hlinkClr xmlns:ahyp="http://schemas.microsoft.com/office/drawing/2018/hyperlinkcolor" val="tx"/>
+                      <ahyp:hlinkClr xmlns:ahyp="http://schemas.microsoft.com/office/drawing/2018/hyperlinkcolor" xmlns="" val="tx"/>
                     </a:ext>
                   </a:extLst>
                 </a:hlinkClick>
@@ -6633,7 +6633,7 @@
                 <a:hlinkClick r:id="rId4">
                   <a:extLst>
                     <a:ext uri="{A12FA001-AC4F-418D-AE19-62706E023703}">
-                      <ahyp:hlinkClr xmlns:ahyp="http://schemas.microsoft.com/office/drawing/2018/hyperlinkcolor" val="tx"/>
+                      <ahyp:hlinkClr xmlns:ahyp="http://schemas.microsoft.com/office/drawing/2018/hyperlinkcolor" xmlns="" val="tx"/>
                     </a:ext>
                   </a:extLst>
                 </a:hlinkClick>
@@ -7157,7 +7157,7 @@
                 <a:hlinkClick r:id="rId5">
                   <a:extLst>
                     <a:ext uri="{A12FA001-AC4F-418D-AE19-62706E023703}">
-                      <ahyp:hlinkClr xmlns:ahyp="http://schemas.microsoft.com/office/drawing/2018/hyperlinkcolor" val="tx"/>
+                      <ahyp:hlinkClr xmlns:ahyp="http://schemas.microsoft.com/office/drawing/2018/hyperlinkcolor" xmlns="" val="tx"/>
                     </a:ext>
                   </a:extLst>
                 </a:hlinkClick>
@@ -7787,7 +7787,7 @@
                 <a:hlinkClick r:id="rId6">
                   <a:extLst>
                     <a:ext uri="{A12FA001-AC4F-418D-AE19-62706E023703}">
-                      <ahyp:hlinkClr xmlns:ahyp="http://schemas.microsoft.com/office/drawing/2018/hyperlinkcolor" val="tx"/>
+                      <ahyp:hlinkClr xmlns:ahyp="http://schemas.microsoft.com/office/drawing/2018/hyperlinkcolor" xmlns="" val="tx"/>
                     </a:ext>
                   </a:extLst>
                 </a:hlinkClick>
@@ -8279,7 +8279,7 @@
                 <a:hlinkClick r:id="rId7">
                   <a:extLst>
                     <a:ext uri="{A12FA001-AC4F-418D-AE19-62706E023703}">
-                      <ahyp:hlinkClr xmlns:ahyp="http://schemas.microsoft.com/office/drawing/2018/hyperlinkcolor" val="tx"/>
+                      <ahyp:hlinkClr xmlns:ahyp="http://schemas.microsoft.com/office/drawing/2018/hyperlinkcolor" xmlns="" val="tx"/>
                     </a:ext>
                   </a:extLst>
                 </a:hlinkClick>
@@ -8301,7 +8301,7 @@
                 <a:hlinkClick r:id="rId7">
                   <a:extLst>
                     <a:ext uri="{A12FA001-AC4F-418D-AE19-62706E023703}">
-                      <ahyp:hlinkClr xmlns:ahyp="http://schemas.microsoft.com/office/drawing/2018/hyperlinkcolor" val="tx"/>
+                      <ahyp:hlinkClr xmlns:ahyp="http://schemas.microsoft.com/office/drawing/2018/hyperlinkcolor" xmlns="" val="tx"/>
                     </a:ext>
                   </a:extLst>
                 </a:hlinkClick>
@@ -8349,7 +8349,7 @@
                 <a:hlinkClick r:id="rId8">
                   <a:extLst>
                     <a:ext uri="{A12FA001-AC4F-418D-AE19-62706E023703}">
-                      <ahyp:hlinkClr xmlns:ahyp="http://schemas.microsoft.com/office/drawing/2018/hyperlinkcolor" val="tx"/>
+                      <ahyp:hlinkClr xmlns:ahyp="http://schemas.microsoft.com/office/drawing/2018/hyperlinkcolor" xmlns="" val="tx"/>
                     </a:ext>
                   </a:extLst>
                 </a:hlinkClick>
@@ -8407,7 +8407,7 @@
                 <a:hlinkClick r:id="rId9">
                   <a:extLst>
                     <a:ext uri="{A12FA001-AC4F-418D-AE19-62706E023703}">
-                      <ahyp:hlinkClr xmlns:ahyp="http://schemas.microsoft.com/office/drawing/2018/hyperlinkcolor" val="tx"/>
+                      <ahyp:hlinkClr xmlns:ahyp="http://schemas.microsoft.com/office/drawing/2018/hyperlinkcolor" xmlns="" val="tx"/>
                     </a:ext>
                   </a:extLst>
                 </a:hlinkClick>
@@ -8455,7 +8455,7 @@
                 <a:hlinkClick r:id="rId10">
                   <a:extLst>
                     <a:ext uri="{A12FA001-AC4F-418D-AE19-62706E023703}">
-                      <ahyp:hlinkClr xmlns:ahyp="http://schemas.microsoft.com/office/drawing/2018/hyperlinkcolor" val="tx"/>
+                      <ahyp:hlinkClr xmlns:ahyp="http://schemas.microsoft.com/office/drawing/2018/hyperlinkcolor" xmlns="" val="tx"/>
                     </a:ext>
                   </a:extLst>
                 </a:hlinkClick>
@@ -8516,7 +8516,7 @@
                 <a:hlinkClick r:id="rId11">
                   <a:extLst>
                     <a:ext uri="{A12FA001-AC4F-418D-AE19-62706E023703}">
-                      <ahyp:hlinkClr xmlns:ahyp="http://schemas.microsoft.com/office/drawing/2018/hyperlinkcolor" val="tx"/>
+                      <ahyp:hlinkClr xmlns:ahyp="http://schemas.microsoft.com/office/drawing/2018/hyperlinkcolor" xmlns="" val="tx"/>
                     </a:ext>
                   </a:extLst>
                 </a:hlinkClick>
@@ -8712,7 +8712,7 @@
                 <a:hlinkClick r:id="rId12">
                   <a:extLst>
                     <a:ext uri="{A12FA001-AC4F-418D-AE19-62706E023703}">
-                      <ahyp:hlinkClr xmlns:ahyp="http://schemas.microsoft.com/office/drawing/2018/hyperlinkcolor" val="tx"/>
+                      <ahyp:hlinkClr xmlns:ahyp="http://schemas.microsoft.com/office/drawing/2018/hyperlinkcolor" xmlns="" val="tx"/>
                     </a:ext>
                   </a:extLst>
                 </a:hlinkClick>
@@ -8760,7 +8760,7 @@
                 <a:hlinkClick r:id="rId13">
                   <a:extLst>
                     <a:ext uri="{A12FA001-AC4F-418D-AE19-62706E023703}">
-                      <ahyp:hlinkClr xmlns:ahyp="http://schemas.microsoft.com/office/drawing/2018/hyperlinkcolor" val="tx"/>
+                      <ahyp:hlinkClr xmlns:ahyp="http://schemas.microsoft.com/office/drawing/2018/hyperlinkcolor" xmlns="" val="tx"/>
                     </a:ext>
                   </a:extLst>
                 </a:hlinkClick>
@@ -8818,7 +8818,7 @@
                 <a:hlinkClick r:id="rId14">
                   <a:extLst>
                     <a:ext uri="{A12FA001-AC4F-418D-AE19-62706E023703}">
-                      <ahyp:hlinkClr xmlns:ahyp="http://schemas.microsoft.com/office/drawing/2018/hyperlinkcolor" val="tx"/>
+                      <ahyp:hlinkClr xmlns:ahyp="http://schemas.microsoft.com/office/drawing/2018/hyperlinkcolor" xmlns="" val="tx"/>
                     </a:ext>
                   </a:extLst>
                 </a:hlinkClick>
@@ -8866,7 +8866,7 @@
                 <a:hlinkClick r:id="rId15">
                   <a:extLst>
                     <a:ext uri="{A12FA001-AC4F-418D-AE19-62706E023703}">
-                      <ahyp:hlinkClr xmlns:ahyp="http://schemas.microsoft.com/office/drawing/2018/hyperlinkcolor" val="tx"/>
+                      <ahyp:hlinkClr xmlns:ahyp="http://schemas.microsoft.com/office/drawing/2018/hyperlinkcolor" xmlns="" val="tx"/>
                     </a:ext>
                   </a:extLst>
                 </a:hlinkClick>
@@ -8924,7 +8924,7 @@
                 <a:hlinkClick r:id="rId16">
                   <a:extLst>
                     <a:ext uri="{A12FA001-AC4F-418D-AE19-62706E023703}">
-                      <ahyp:hlinkClr xmlns:ahyp="http://schemas.microsoft.com/office/drawing/2018/hyperlinkcolor" val="tx"/>
+                      <ahyp:hlinkClr xmlns:ahyp="http://schemas.microsoft.com/office/drawing/2018/hyperlinkcolor" xmlns="" val="tx"/>
                     </a:ext>
                   </a:extLst>
                 </a:hlinkClick>
@@ -8972,7 +8972,7 @@
                 <a:hlinkClick r:id="rId17">
                   <a:extLst>
                     <a:ext uri="{A12FA001-AC4F-418D-AE19-62706E023703}">
-                      <ahyp:hlinkClr xmlns:ahyp="http://schemas.microsoft.com/office/drawing/2018/hyperlinkcolor" val="tx"/>
+                      <ahyp:hlinkClr xmlns:ahyp="http://schemas.microsoft.com/office/drawing/2018/hyperlinkcolor" xmlns="" val="tx"/>
                     </a:ext>
                   </a:extLst>
                 </a:hlinkClick>
@@ -9510,7 +9510,7 @@
                 <a:hlinkClick r:id="rId27">
                   <a:extLst>
                     <a:ext uri="{A12FA001-AC4F-418D-AE19-62706E023703}">
-                      <ahyp:hlinkClr xmlns:ahyp="http://schemas.microsoft.com/office/drawing/2018/hyperlinkcolor" val="tx"/>
+                      <ahyp:hlinkClr xmlns:ahyp="http://schemas.microsoft.com/office/drawing/2018/hyperlinkcolor" xmlns="" val="tx"/>
                     </a:ext>
                   </a:extLst>
                 </a:hlinkClick>
@@ -9739,7 +9739,7 @@
                 <a:hlinkClick r:id="rId28">
                   <a:extLst>
                     <a:ext uri="{A12FA001-AC4F-418D-AE19-62706E023703}">
-                      <ahyp:hlinkClr xmlns:ahyp="http://schemas.microsoft.com/office/drawing/2018/hyperlinkcolor" val="tx"/>
+                      <ahyp:hlinkClr xmlns:ahyp="http://schemas.microsoft.com/office/drawing/2018/hyperlinkcolor" xmlns="" val="tx"/>
                     </a:ext>
                   </a:extLst>
                 </a:hlinkClick>
@@ -10059,7 +10059,7 @@
                 <a:hlinkClick r:id="rId29">
                   <a:extLst>
                     <a:ext uri="{A12FA001-AC4F-418D-AE19-62706E023703}">
-                      <ahyp:hlinkClr xmlns:ahyp="http://schemas.microsoft.com/office/drawing/2018/hyperlinkcolor" val="tx"/>
+                      <ahyp:hlinkClr xmlns:ahyp="http://schemas.microsoft.com/office/drawing/2018/hyperlinkcolor" xmlns="" val="tx"/>
                     </a:ext>
                   </a:extLst>
                 </a:hlinkClick>
@@ -10401,7 +10401,7 @@
                 <a:hlinkClick r:id="rId30">
                   <a:extLst>
                     <a:ext uri="{A12FA001-AC4F-418D-AE19-62706E023703}">
-                      <ahyp:hlinkClr xmlns:ahyp="http://schemas.microsoft.com/office/drawing/2018/hyperlinkcolor" val="tx"/>
+                      <ahyp:hlinkClr xmlns:ahyp="http://schemas.microsoft.com/office/drawing/2018/hyperlinkcolor" xmlns="" val="tx"/>
                     </a:ext>
                   </a:extLst>
                 </a:hlinkClick>
@@ -10887,7 +10887,7 @@
                 <a:hlinkClick r:id="rId32">
                   <a:extLst>
                     <a:ext uri="{A12FA001-AC4F-418D-AE19-62706E023703}">
-                      <ahyp:hlinkClr xmlns:ahyp="http://schemas.microsoft.com/office/drawing/2018/hyperlinkcolor" val="tx"/>
+                      <ahyp:hlinkClr xmlns:ahyp="http://schemas.microsoft.com/office/drawing/2018/hyperlinkcolor" xmlns="" val="tx"/>
                     </a:ext>
                   </a:extLst>
                 </a:hlinkClick>
@@ -10945,7 +10945,7 @@
                 <a:hlinkClick r:id="rId33">
                   <a:extLst>
                     <a:ext uri="{A12FA001-AC4F-418D-AE19-62706E023703}">
-                      <ahyp:hlinkClr xmlns:ahyp="http://schemas.microsoft.com/office/drawing/2018/hyperlinkcolor" val="tx"/>
+                      <ahyp:hlinkClr xmlns:ahyp="http://schemas.microsoft.com/office/drawing/2018/hyperlinkcolor" xmlns="" val="tx"/>
                     </a:ext>
                   </a:extLst>
                 </a:hlinkClick>
@@ -11003,7 +11003,7 @@
                 <a:hlinkClick r:id="rId34">
                   <a:extLst>
                     <a:ext uri="{A12FA001-AC4F-418D-AE19-62706E023703}">
-                      <ahyp:hlinkClr xmlns:ahyp="http://schemas.microsoft.com/office/drawing/2018/hyperlinkcolor" val="tx"/>
+                      <ahyp:hlinkClr xmlns:ahyp="http://schemas.microsoft.com/office/drawing/2018/hyperlinkcolor" xmlns="" val="tx"/>
                     </a:ext>
                   </a:extLst>
                 </a:hlinkClick>
@@ -11061,7 +11061,7 @@
                 <a:hlinkClick r:id="rId35">
                   <a:extLst>
                     <a:ext uri="{A12FA001-AC4F-418D-AE19-62706E023703}">
-                      <ahyp:hlinkClr xmlns:ahyp="http://schemas.microsoft.com/office/drawing/2018/hyperlinkcolor" val="tx"/>
+                      <ahyp:hlinkClr xmlns:ahyp="http://schemas.microsoft.com/office/drawing/2018/hyperlinkcolor" xmlns="" val="tx"/>
                     </a:ext>
                   </a:extLst>
                 </a:hlinkClick>
@@ -11107,23 +11107,7 @@
                 <a:sym typeface="Roboto"/>
                 <a:hlinkClick r:id="rId36"/>
               </a:rPr>
-              <a:t>c</a:t>
-            </a:r>
-            <a:r>
-              <a:rPr lang="en-US" sz="900" b="1" dirty="0">
-                <a:solidFill>
-                  <a:schemeClr val="accent5"/>
-                </a:solidFill>
-                <a:uFill>
-                  <a:noFill/>
-                </a:uFill>
-                <a:latin typeface="Roboto"/>
-                <a:ea typeface="Roboto"/>
-                <a:cs typeface="Roboto"/>
-                <a:sym typeface="Roboto"/>
-                <a:hlinkClick r:id="rId36"/>
-              </a:rPr>
-              <a:t>ompute_scale</a:t>
+              <a:t>compute_scale</a:t>
             </a:r>
             <a:r>
               <a:rPr lang="en" sz="900" b="1" dirty="0">
@@ -11231,7 +11215,7 @@
                 <a:hlinkClick r:id="rId37">
                   <a:extLst>
                     <a:ext uri="{A12FA001-AC4F-418D-AE19-62706E023703}">
-                      <ahyp:hlinkClr xmlns:ahyp="http://schemas.microsoft.com/office/drawing/2018/hyperlinkcolor" val="tx"/>
+                      <ahyp:hlinkClr xmlns:ahyp="http://schemas.microsoft.com/office/drawing/2018/hyperlinkcolor" xmlns="" val="tx"/>
                     </a:ext>
                   </a:extLst>
                 </a:hlinkClick>
@@ -11268,7 +11252,7 @@
               <a:hlinkClick r:id="rId38">
                 <a:extLst>
                   <a:ext uri="{A12FA001-AC4F-418D-AE19-62706E023703}">
-                    <ahyp:hlinkClr xmlns:ahyp="http://schemas.microsoft.com/office/drawing/2018/hyperlinkcolor" val="tx"/>
+                    <ahyp:hlinkClr xmlns:ahyp="http://schemas.microsoft.com/office/drawing/2018/hyperlinkcolor" xmlns="" val="tx"/>
                   </a:ext>
                 </a:extLst>
               </a:hlinkClick>
@@ -11299,7 +11283,7 @@
                 <a:hlinkClick r:id="rId38">
                   <a:extLst>
                     <a:ext uri="{A12FA001-AC4F-418D-AE19-62706E023703}">
-                      <ahyp:hlinkClr xmlns:ahyp="http://schemas.microsoft.com/office/drawing/2018/hyperlinkcolor" val="tx"/>
+                      <ahyp:hlinkClr xmlns:ahyp="http://schemas.microsoft.com/office/drawing/2018/hyperlinkcolor" xmlns="" val="tx"/>
                     </a:ext>
                   </a:extLst>
                 </a:hlinkClick>
@@ -11321,7 +11305,7 @@
                 <a:hlinkClick r:id="rId38">
                   <a:extLst>
                     <a:ext uri="{A12FA001-AC4F-418D-AE19-62706E023703}">
-                      <ahyp:hlinkClr xmlns:ahyp="http://schemas.microsoft.com/office/drawing/2018/hyperlinkcolor" val="tx"/>
+                      <ahyp:hlinkClr xmlns:ahyp="http://schemas.microsoft.com/office/drawing/2018/hyperlinkcolor" xmlns="" val="tx"/>
                     </a:ext>
                   </a:extLst>
                 </a:hlinkClick>
@@ -11345,7 +11329,7 @@
                 <a:hlinkClick r:id="rId39">
                   <a:extLst>
                     <a:ext uri="{A12FA001-AC4F-418D-AE19-62706E023703}">
-                      <ahyp:hlinkClr xmlns:ahyp="http://schemas.microsoft.com/office/drawing/2018/hyperlinkcolor" val="tx"/>
+                      <ahyp:hlinkClr xmlns:ahyp="http://schemas.microsoft.com/office/drawing/2018/hyperlinkcolor" xmlns="" val="tx"/>
                     </a:ext>
                   </a:extLst>
                 </a:hlinkClick>
@@ -11378,7 +11362,7 @@
                 <a:hlinkClick r:id="rId39">
                   <a:extLst>
                     <a:ext uri="{A12FA001-AC4F-418D-AE19-62706E023703}">
-                      <ahyp:hlinkClr xmlns:ahyp="http://schemas.microsoft.com/office/drawing/2018/hyperlinkcolor" val="tx"/>
+                      <ahyp:hlinkClr xmlns:ahyp="http://schemas.microsoft.com/office/drawing/2018/hyperlinkcolor" xmlns="" val="tx"/>
                     </a:ext>
                   </a:extLst>
                 </a:hlinkClick>
@@ -11436,7 +11420,7 @@
                 <a:hlinkClick r:id="rId40">
                   <a:extLst>
                     <a:ext uri="{A12FA001-AC4F-418D-AE19-62706E023703}">
-                      <ahyp:hlinkClr xmlns:ahyp="http://schemas.microsoft.com/office/drawing/2018/hyperlinkcolor" val="tx"/>
+                      <ahyp:hlinkClr xmlns:ahyp="http://schemas.microsoft.com/office/drawing/2018/hyperlinkcolor" xmlns="" val="tx"/>
                     </a:ext>
                   </a:extLst>
                 </a:hlinkClick>
@@ -11977,7 +11961,7 @@
                 <a:hlinkClick r:id="rId4">
                   <a:extLst>
                     <a:ext uri="{A12FA001-AC4F-418D-AE19-62706E023703}">
-                      <ahyp:hlinkClr xmlns:ahyp="http://schemas.microsoft.com/office/drawing/2018/hyperlinkcolor" val="tx"/>
+                      <ahyp:hlinkClr xmlns:ahyp="http://schemas.microsoft.com/office/drawing/2018/hyperlinkcolor" xmlns="" val="tx"/>
                     </a:ext>
                   </a:extLst>
                 </a:hlinkClick>
@@ -12321,7 +12305,7 @@
                 <a:hlinkClick r:id="rId5">
                   <a:extLst>
                     <a:ext uri="{A12FA001-AC4F-418D-AE19-62706E023703}">
-                      <ahyp:hlinkClr xmlns:ahyp="http://schemas.microsoft.com/office/drawing/2018/hyperlinkcolor" val="tx"/>
+                      <ahyp:hlinkClr xmlns:ahyp="http://schemas.microsoft.com/office/drawing/2018/hyperlinkcolor" xmlns="" val="tx"/>
                     </a:ext>
                   </a:extLst>
                 </a:hlinkClick>
@@ -12753,7 +12737,7 @@
                 <a:hlinkClick r:id="rId8">
                   <a:extLst>
                     <a:ext uri="{A12FA001-AC4F-418D-AE19-62706E023703}">
-                      <ahyp:hlinkClr xmlns:ahyp="http://schemas.microsoft.com/office/drawing/2018/hyperlinkcolor" val="tx"/>
+                      <ahyp:hlinkClr xmlns:ahyp="http://schemas.microsoft.com/office/drawing/2018/hyperlinkcolor" xmlns="" val="tx"/>
                     </a:ext>
                   </a:extLst>
                 </a:hlinkClick>
@@ -13207,7 +13191,7 @@
                 <a:hlinkClick r:id="rId9">
                   <a:extLst>
                     <a:ext uri="{A12FA001-AC4F-418D-AE19-62706E023703}">
-                      <ahyp:hlinkClr xmlns:ahyp="http://schemas.microsoft.com/office/drawing/2018/hyperlinkcolor" val="tx"/>
+                      <ahyp:hlinkClr xmlns:ahyp="http://schemas.microsoft.com/office/drawing/2018/hyperlinkcolor" xmlns="" val="tx"/>
                     </a:ext>
                   </a:extLst>
                 </a:hlinkClick>
@@ -13359,7 +13343,7 @@
                 <a:hlinkClick r:id="rId10">
                   <a:extLst>
                     <a:ext uri="{A12FA001-AC4F-418D-AE19-62706E023703}">
-                      <ahyp:hlinkClr xmlns:ahyp="http://schemas.microsoft.com/office/drawing/2018/hyperlinkcolor" val="tx"/>
+                      <ahyp:hlinkClr xmlns:ahyp="http://schemas.microsoft.com/office/drawing/2018/hyperlinkcolor" xmlns="" val="tx"/>
                     </a:ext>
                   </a:extLst>
                 </a:hlinkClick>
@@ -13515,7 +13499,7 @@
                 <a:hlinkClick r:id="rId11">
                   <a:extLst>
                     <a:ext uri="{A12FA001-AC4F-418D-AE19-62706E023703}">
-                      <ahyp:hlinkClr xmlns:ahyp="http://schemas.microsoft.com/office/drawing/2018/hyperlinkcolor" val="tx"/>
+                      <ahyp:hlinkClr xmlns:ahyp="http://schemas.microsoft.com/office/drawing/2018/hyperlinkcolor" xmlns="" val="tx"/>
                     </a:ext>
                   </a:extLst>
                 </a:hlinkClick>
@@ -13703,7 +13687,7 @@
                 <a:hlinkClick r:id="rId13">
                   <a:extLst>
                     <a:ext uri="{A12FA001-AC4F-418D-AE19-62706E023703}">
-                      <ahyp:hlinkClr xmlns:ahyp="http://schemas.microsoft.com/office/drawing/2018/hyperlinkcolor" val="tx"/>
+                      <ahyp:hlinkClr xmlns:ahyp="http://schemas.microsoft.com/office/drawing/2018/hyperlinkcolor" xmlns="" val="tx"/>
                     </a:ext>
                   </a:extLst>
                 </a:hlinkClick>
@@ -14003,7 +13987,7 @@
                 <a:hlinkClick r:id="rId14">
                   <a:extLst>
                     <a:ext uri="{A12FA001-AC4F-418D-AE19-62706E023703}">
-                      <ahyp:hlinkClr xmlns:ahyp="http://schemas.microsoft.com/office/drawing/2018/hyperlinkcolor" val="tx"/>
+                      <ahyp:hlinkClr xmlns:ahyp="http://schemas.microsoft.com/office/drawing/2018/hyperlinkcolor" xmlns="" val="tx"/>
                     </a:ext>
                   </a:extLst>
                 </a:hlinkClick>
@@ -14413,7 +14397,7 @@
                 <a:hlinkClick r:id="rId18">
                   <a:extLst>
                     <a:ext uri="{A12FA001-AC4F-418D-AE19-62706E023703}">
-                      <ahyp:hlinkClr xmlns:ahyp="http://schemas.microsoft.com/office/drawing/2018/hyperlinkcolor" val="tx"/>
+                      <ahyp:hlinkClr xmlns:ahyp="http://schemas.microsoft.com/office/drawing/2018/hyperlinkcolor" xmlns="" val="tx"/>
                     </a:ext>
                   </a:extLst>
                 </a:hlinkClick>
@@ -14545,7 +14529,7 @@
                 <a:hlinkClick r:id="rId19">
                   <a:extLst>
                     <a:ext uri="{A12FA001-AC4F-418D-AE19-62706E023703}">
-                      <ahyp:hlinkClr xmlns:ahyp="http://schemas.microsoft.com/office/drawing/2018/hyperlinkcolor" val="tx"/>
+                      <ahyp:hlinkClr xmlns:ahyp="http://schemas.microsoft.com/office/drawing/2018/hyperlinkcolor" xmlns="" val="tx"/>
                     </a:ext>
                   </a:extLst>
                 </a:hlinkClick>
@@ -14669,7 +14653,7 @@
                 <a:hlinkClick r:id="rId20">
                   <a:extLst>
                     <a:ext uri="{A12FA001-AC4F-418D-AE19-62706E023703}">
-                      <ahyp:hlinkClr xmlns:ahyp="http://schemas.microsoft.com/office/drawing/2018/hyperlinkcolor" val="tx"/>
+                      <ahyp:hlinkClr xmlns:ahyp="http://schemas.microsoft.com/office/drawing/2018/hyperlinkcolor" xmlns="" val="tx"/>
                     </a:ext>
                   </a:extLst>
                 </a:hlinkClick>
@@ -14761,7 +14745,7 @@
                 <a:hlinkClick r:id="rId21">
                   <a:extLst>
                     <a:ext uri="{A12FA001-AC4F-418D-AE19-62706E023703}">
-                      <ahyp:hlinkClr xmlns:ahyp="http://schemas.microsoft.com/office/drawing/2018/hyperlinkcolor" val="tx"/>
+                      <ahyp:hlinkClr xmlns:ahyp="http://schemas.microsoft.com/office/drawing/2018/hyperlinkcolor" xmlns="" val="tx"/>
                     </a:ext>
                   </a:extLst>
                 </a:hlinkClick>
@@ -14888,7 +14872,7 @@
                 <a:hlinkClick r:id="rId22">
                   <a:extLst>
                     <a:ext uri="{A12FA001-AC4F-418D-AE19-62706E023703}">
-                      <ahyp:hlinkClr xmlns:ahyp="http://schemas.microsoft.com/office/drawing/2018/hyperlinkcolor" val="tx"/>
+                      <ahyp:hlinkClr xmlns:ahyp="http://schemas.microsoft.com/office/drawing/2018/hyperlinkcolor" xmlns="" val="tx"/>
                     </a:ext>
                   </a:extLst>
                 </a:hlinkClick>
@@ -15000,7 +14984,7 @@
                 <a:hlinkClick r:id="rId23">
                   <a:extLst>
                     <a:ext uri="{A12FA001-AC4F-418D-AE19-62706E023703}">
-                      <ahyp:hlinkClr xmlns:ahyp="http://schemas.microsoft.com/office/drawing/2018/hyperlinkcolor" val="tx"/>
+                      <ahyp:hlinkClr xmlns:ahyp="http://schemas.microsoft.com/office/drawing/2018/hyperlinkcolor" xmlns="" val="tx"/>
                     </a:ext>
                   </a:extLst>
                 </a:hlinkClick>
@@ -15222,7 +15206,7 @@
                 <a:hlinkClick r:id="rId24">
                   <a:extLst>
                     <a:ext uri="{A12FA001-AC4F-418D-AE19-62706E023703}">
-                      <ahyp:hlinkClr xmlns:ahyp="http://schemas.microsoft.com/office/drawing/2018/hyperlinkcolor" val="tx"/>
+                      <ahyp:hlinkClr xmlns:ahyp="http://schemas.microsoft.com/office/drawing/2018/hyperlinkcolor" xmlns="" val="tx"/>
                     </a:ext>
                   </a:extLst>
                 </a:hlinkClick>
@@ -15366,7 +15350,7 @@
                 <a:hlinkClick r:id="rId25">
                   <a:extLst>
                     <a:ext uri="{A12FA001-AC4F-418D-AE19-62706E023703}">
-                      <ahyp:hlinkClr xmlns:ahyp="http://schemas.microsoft.com/office/drawing/2018/hyperlinkcolor" val="tx"/>
+                      <ahyp:hlinkClr xmlns:ahyp="http://schemas.microsoft.com/office/drawing/2018/hyperlinkcolor" xmlns="" val="tx"/>
                     </a:ext>
                   </a:extLst>
                 </a:hlinkClick>
@@ -15490,7 +15474,7 @@
                 <a:hlinkClick r:id="rId26">
                   <a:extLst>
                     <a:ext uri="{A12FA001-AC4F-418D-AE19-62706E023703}">
-                      <ahyp:hlinkClr xmlns:ahyp="http://schemas.microsoft.com/office/drawing/2018/hyperlinkcolor" val="tx"/>
+                      <ahyp:hlinkClr xmlns:ahyp="http://schemas.microsoft.com/office/drawing/2018/hyperlinkcolor" xmlns="" val="tx"/>
                     </a:ext>
                   </a:extLst>
                 </a:hlinkClick>
@@ -15602,7 +15586,7 @@
                 <a:hlinkClick r:id="rId27">
                   <a:extLst>
                     <a:ext uri="{A12FA001-AC4F-418D-AE19-62706E023703}">
-                      <ahyp:hlinkClr xmlns:ahyp="http://schemas.microsoft.com/office/drawing/2018/hyperlinkcolor" val="tx"/>
+                      <ahyp:hlinkClr xmlns:ahyp="http://schemas.microsoft.com/office/drawing/2018/hyperlinkcolor" xmlns="" val="tx"/>
                     </a:ext>
                   </a:extLst>
                 </a:hlinkClick>
@@ -15714,7 +15698,7 @@
                 <a:hlinkClick r:id="rId28">
                   <a:extLst>
                     <a:ext uri="{A12FA001-AC4F-418D-AE19-62706E023703}">
-                      <ahyp:hlinkClr xmlns:ahyp="http://schemas.microsoft.com/office/drawing/2018/hyperlinkcolor" val="tx"/>
+                      <ahyp:hlinkClr xmlns:ahyp="http://schemas.microsoft.com/office/drawing/2018/hyperlinkcolor" xmlns="" val="tx"/>
                     </a:ext>
                   </a:extLst>
                 </a:hlinkClick>
@@ -16128,7 +16112,7 @@
                 <a:hlinkClick r:id="rId33">
                   <a:extLst>
                     <a:ext uri="{A12FA001-AC4F-418D-AE19-62706E023703}">
-                      <ahyp:hlinkClr xmlns:ahyp="http://schemas.microsoft.com/office/drawing/2018/hyperlinkcolor" val="tx"/>
+                      <ahyp:hlinkClr xmlns:ahyp="http://schemas.microsoft.com/office/drawing/2018/hyperlinkcolor" xmlns="" val="tx"/>
                     </a:ext>
                   </a:extLst>
                 </a:hlinkClick>
@@ -16254,7 +16238,7 @@
                 <a:hlinkClick r:id="rId34">
                   <a:extLst>
                     <a:ext uri="{A12FA001-AC4F-418D-AE19-62706E023703}">
-                      <ahyp:hlinkClr xmlns:ahyp="http://schemas.microsoft.com/office/drawing/2018/hyperlinkcolor" val="tx"/>
+                      <ahyp:hlinkClr xmlns:ahyp="http://schemas.microsoft.com/office/drawing/2018/hyperlinkcolor" xmlns="" val="tx"/>
                     </a:ext>
                   </a:extLst>
                 </a:hlinkClick>
@@ -16366,7 +16350,7 @@
                 <a:hlinkClick r:id="rId35">
                   <a:extLst>
                     <a:ext uri="{A12FA001-AC4F-418D-AE19-62706E023703}">
-                      <ahyp:hlinkClr xmlns:ahyp="http://schemas.microsoft.com/office/drawing/2018/hyperlinkcolor" val="tx"/>
+                      <ahyp:hlinkClr xmlns:ahyp="http://schemas.microsoft.com/office/drawing/2018/hyperlinkcolor" xmlns="" val="tx"/>
                     </a:ext>
                   </a:extLst>
                 </a:hlinkClick>
@@ -16974,7 +16958,19 @@
                 <a:cs typeface="Roboto"/>
                 <a:sym typeface="Roboto"/>
               </a:rPr>
-              <a:t>Derive criterion flag variables (CRITy, CRITyFL(N)).</a:t>
+              <a:t>Derive criterion flag variables (CRITy, </a:t>
+            </a:r>
+            <a:r>
+              <a:rPr lang="en" sz="900" dirty="0" smtClean="0">
+                <a:solidFill>
+                  <a:schemeClr val="dk1"/>
+                </a:solidFill>
+                <a:latin typeface="Roboto"/>
+                <a:ea typeface="Roboto"/>
+                <a:cs typeface="Roboto"/>
+                <a:sym typeface="Roboto"/>
+              </a:rPr>
+              <a:t>CRITyF(L/N)).</a:t>
             </a:r>
             <a:endParaRPr sz="900" dirty="0">
               <a:solidFill>

</xml_diff>

<commit_message>
#2758 cheatsheet updated for 1.3
</commit_message>
<xml_diff>
--- a/inst/cheatsheet/admiral_cheatsheet.pptx
+++ b/inst/cheatsheet/admiral_cheatsheet.pptx
@@ -15,14 +15,14 @@
   <p:notesSz cx="6858000" cy="9144000"/>
   <p:embeddedFontLst>
     <p:embeddedFont>
-      <p:font typeface="Roboto Mono Medium" panose="020B0604020202020204" charset="0"/>
+      <p:font typeface="Roboto" panose="02000000000000000000" pitchFamily="2" charset="0"/>
       <p:regular r:id="rId5"/>
       <p:bold r:id="rId6"/>
       <p:italic r:id="rId7"/>
       <p:boldItalic r:id="rId8"/>
     </p:embeddedFont>
     <p:embeddedFont>
-      <p:font typeface="Roboto" panose="02000000000000000000" pitchFamily="2" charset="0"/>
+      <p:font typeface="Roboto Mono Medium" panose="00000009000000000000" pitchFamily="49" charset="0"/>
       <p:regular r:id="rId9"/>
       <p:bold r:id="rId10"/>
       <p:italic r:id="rId11"/>
@@ -5751,7 +5751,7 @@
         <p:spPr>
           <a:xfrm>
             <a:off x="278725" y="1556250"/>
-            <a:ext cx="3227700" cy="638400"/>
+            <a:ext cx="3219225" cy="638400"/>
           </a:xfrm>
           <a:prstGeom prst="rect">
             <a:avLst/>
@@ -6148,7 +6148,7 @@
                 <a:hlinkClick r:id="rId3">
                   <a:extLst>
                     <a:ext uri="{A12FA001-AC4F-418D-AE19-62706E023703}">
-                      <ahyp:hlinkClr xmlns:ahyp="http://schemas.microsoft.com/office/drawing/2018/hyperlinkcolor" xmlns="" val="tx"/>
+                      <ahyp:hlinkClr xmlns:ahyp="http://schemas.microsoft.com/office/drawing/2018/hyperlinkcolor" val="tx"/>
                     </a:ext>
                   </a:extLst>
                 </a:hlinkClick>
@@ -6473,39 +6473,7 @@
                 <a:cs typeface="Roboto"/>
                 <a:sym typeface="Roboto"/>
               </a:rPr>
-              <a:t>  filter_add = VSTESTCD == "WEIGHT"</a:t>
-            </a:r>
-            <a:endParaRPr sz="900" i="1" dirty="0">
-              <a:solidFill>
-                <a:schemeClr val="dk1"/>
-              </a:solidFill>
-              <a:latin typeface="Roboto"/>
-              <a:ea typeface="Roboto"/>
-              <a:cs typeface="Roboto"/>
-              <a:sym typeface="Roboto"/>
-            </a:endParaRPr>
-          </a:p>
-          <a:p>
-            <a:pPr marL="0" lvl="0" indent="0" algn="l" rtl="0">
-              <a:spcBef>
-                <a:spcPts val="0"/>
-              </a:spcBef>
-              <a:spcAft>
-                <a:spcPts val="0"/>
-              </a:spcAft>
-              <a:buNone/>
-            </a:pPr>
-            <a:r>
-              <a:rPr lang="en" sz="900" i="1" dirty="0">
-                <a:solidFill>
-                  <a:schemeClr val="dk1"/>
-                </a:solidFill>
-                <a:latin typeface="Roboto"/>
-                <a:ea typeface="Roboto"/>
-                <a:cs typeface="Roboto"/>
-                <a:sym typeface="Roboto"/>
-              </a:rPr>
-              <a:t>)</a:t>
+              <a:t>  filter_add = VSTESTCD == "WEIGHT")</a:t>
             </a:r>
             <a:endParaRPr sz="900" i="1" dirty="0">
               <a:solidFill>
@@ -6592,7 +6560,7 @@
         </p:nvSpPr>
         <p:spPr>
           <a:xfrm>
-            <a:off x="1031050" y="4851123"/>
+            <a:off x="1031050" y="4711015"/>
             <a:ext cx="2466900" cy="2084100"/>
           </a:xfrm>
           <a:prstGeom prst="rect">
@@ -6633,7 +6601,7 @@
                 <a:hlinkClick r:id="rId4">
                   <a:extLst>
                     <a:ext uri="{A12FA001-AC4F-418D-AE19-62706E023703}">
-                      <ahyp:hlinkClr xmlns:ahyp="http://schemas.microsoft.com/office/drawing/2018/hyperlinkcolor" xmlns="" val="tx"/>
+                      <ahyp:hlinkClr xmlns:ahyp="http://schemas.microsoft.com/office/drawing/2018/hyperlinkcolor" val="tx"/>
                     </a:ext>
                   </a:extLst>
                 </a:hlinkClick>
@@ -7157,7 +7125,7 @@
                 <a:hlinkClick r:id="rId5">
                   <a:extLst>
                     <a:ext uri="{A12FA001-AC4F-418D-AE19-62706E023703}">
-                      <ahyp:hlinkClr xmlns:ahyp="http://schemas.microsoft.com/office/drawing/2018/hyperlinkcolor" xmlns="" val="tx"/>
+                      <ahyp:hlinkClr xmlns:ahyp="http://schemas.microsoft.com/office/drawing/2018/hyperlinkcolor" val="tx"/>
                     </a:ext>
                   </a:extLst>
                 </a:hlinkClick>
@@ -7787,7 +7755,7 @@
                 <a:hlinkClick r:id="rId6">
                   <a:extLst>
                     <a:ext uri="{A12FA001-AC4F-418D-AE19-62706E023703}">
-                      <ahyp:hlinkClr xmlns:ahyp="http://schemas.microsoft.com/office/drawing/2018/hyperlinkcolor" xmlns="" val="tx"/>
+                      <ahyp:hlinkClr xmlns:ahyp="http://schemas.microsoft.com/office/drawing/2018/hyperlinkcolor" val="tx"/>
                     </a:ext>
                   </a:extLst>
                 </a:hlinkClick>
@@ -8279,7 +8247,7 @@
                 <a:hlinkClick r:id="rId7">
                   <a:extLst>
                     <a:ext uri="{A12FA001-AC4F-418D-AE19-62706E023703}">
-                      <ahyp:hlinkClr xmlns:ahyp="http://schemas.microsoft.com/office/drawing/2018/hyperlinkcolor" xmlns="" val="tx"/>
+                      <ahyp:hlinkClr xmlns:ahyp="http://schemas.microsoft.com/office/drawing/2018/hyperlinkcolor" val="tx"/>
                     </a:ext>
                   </a:extLst>
                 </a:hlinkClick>
@@ -8301,7 +8269,7 @@
                 <a:hlinkClick r:id="rId7">
                   <a:extLst>
                     <a:ext uri="{A12FA001-AC4F-418D-AE19-62706E023703}">
-                      <ahyp:hlinkClr xmlns:ahyp="http://schemas.microsoft.com/office/drawing/2018/hyperlinkcolor" xmlns="" val="tx"/>
+                      <ahyp:hlinkClr xmlns:ahyp="http://schemas.microsoft.com/office/drawing/2018/hyperlinkcolor" val="tx"/>
                     </a:ext>
                   </a:extLst>
                 </a:hlinkClick>
@@ -8349,7 +8317,7 @@
                 <a:hlinkClick r:id="rId8">
                   <a:extLst>
                     <a:ext uri="{A12FA001-AC4F-418D-AE19-62706E023703}">
-                      <ahyp:hlinkClr xmlns:ahyp="http://schemas.microsoft.com/office/drawing/2018/hyperlinkcolor" xmlns="" val="tx"/>
+                      <ahyp:hlinkClr xmlns:ahyp="http://schemas.microsoft.com/office/drawing/2018/hyperlinkcolor" val="tx"/>
                     </a:ext>
                   </a:extLst>
                 </a:hlinkClick>
@@ -8407,7 +8375,7 @@
                 <a:hlinkClick r:id="rId9">
                   <a:extLst>
                     <a:ext uri="{A12FA001-AC4F-418D-AE19-62706E023703}">
-                      <ahyp:hlinkClr xmlns:ahyp="http://schemas.microsoft.com/office/drawing/2018/hyperlinkcolor" xmlns="" val="tx"/>
+                      <ahyp:hlinkClr xmlns:ahyp="http://schemas.microsoft.com/office/drawing/2018/hyperlinkcolor" val="tx"/>
                     </a:ext>
                   </a:extLst>
                 </a:hlinkClick>
@@ -8455,7 +8423,7 @@
                 <a:hlinkClick r:id="rId10">
                   <a:extLst>
                     <a:ext uri="{A12FA001-AC4F-418D-AE19-62706E023703}">
-                      <ahyp:hlinkClr xmlns:ahyp="http://schemas.microsoft.com/office/drawing/2018/hyperlinkcolor" xmlns="" val="tx"/>
+                      <ahyp:hlinkClr xmlns:ahyp="http://schemas.microsoft.com/office/drawing/2018/hyperlinkcolor" val="tx"/>
                     </a:ext>
                   </a:extLst>
                 </a:hlinkClick>
@@ -8516,7 +8484,7 @@
                 <a:hlinkClick r:id="rId11">
                   <a:extLst>
                     <a:ext uri="{A12FA001-AC4F-418D-AE19-62706E023703}">
-                      <ahyp:hlinkClr xmlns:ahyp="http://schemas.microsoft.com/office/drawing/2018/hyperlinkcolor" xmlns="" val="tx"/>
+                      <ahyp:hlinkClr xmlns:ahyp="http://schemas.microsoft.com/office/drawing/2018/hyperlinkcolor" val="tx"/>
                     </a:ext>
                   </a:extLst>
                 </a:hlinkClick>
@@ -8639,8 +8607,8 @@
         </p:nvSpPr>
         <p:spPr>
           <a:xfrm>
-            <a:off x="454250" y="6644948"/>
-            <a:ext cx="3245100" cy="846355"/>
+            <a:off x="454250" y="6504840"/>
+            <a:ext cx="3245100" cy="977160"/>
           </a:xfrm>
           <a:prstGeom prst="rect">
             <a:avLst/>
@@ -8712,7 +8680,7 @@
                 <a:hlinkClick r:id="rId12">
                   <a:extLst>
                     <a:ext uri="{A12FA001-AC4F-418D-AE19-62706E023703}">
-                      <ahyp:hlinkClr xmlns:ahyp="http://schemas.microsoft.com/office/drawing/2018/hyperlinkcolor" xmlns="" val="tx"/>
+                      <ahyp:hlinkClr xmlns:ahyp="http://schemas.microsoft.com/office/drawing/2018/hyperlinkcolor" val="tx"/>
                     </a:ext>
                   </a:extLst>
                 </a:hlinkClick>
@@ -8760,7 +8728,7 @@
                 <a:hlinkClick r:id="rId13">
                   <a:extLst>
                     <a:ext uri="{A12FA001-AC4F-418D-AE19-62706E023703}">
-                      <ahyp:hlinkClr xmlns:ahyp="http://schemas.microsoft.com/office/drawing/2018/hyperlinkcolor" xmlns="" val="tx"/>
+                      <ahyp:hlinkClr xmlns:ahyp="http://schemas.microsoft.com/office/drawing/2018/hyperlinkcolor" val="tx"/>
                     </a:ext>
                   </a:extLst>
                 </a:hlinkClick>
@@ -8818,7 +8786,7 @@
                 <a:hlinkClick r:id="rId14">
                   <a:extLst>
                     <a:ext uri="{A12FA001-AC4F-418D-AE19-62706E023703}">
-                      <ahyp:hlinkClr xmlns:ahyp="http://schemas.microsoft.com/office/drawing/2018/hyperlinkcolor" xmlns="" val="tx"/>
+                      <ahyp:hlinkClr xmlns:ahyp="http://schemas.microsoft.com/office/drawing/2018/hyperlinkcolor" val="tx"/>
                     </a:ext>
                   </a:extLst>
                 </a:hlinkClick>
@@ -8866,7 +8834,7 @@
                 <a:hlinkClick r:id="rId15">
                   <a:extLst>
                     <a:ext uri="{A12FA001-AC4F-418D-AE19-62706E023703}">
-                      <ahyp:hlinkClr xmlns:ahyp="http://schemas.microsoft.com/office/drawing/2018/hyperlinkcolor" xmlns="" val="tx"/>
+                      <ahyp:hlinkClr xmlns:ahyp="http://schemas.microsoft.com/office/drawing/2018/hyperlinkcolor" val="tx"/>
                     </a:ext>
                   </a:extLst>
                 </a:hlinkClick>
@@ -8924,7 +8892,7 @@
                 <a:hlinkClick r:id="rId16">
                   <a:extLst>
                     <a:ext uri="{A12FA001-AC4F-418D-AE19-62706E023703}">
-                      <ahyp:hlinkClr xmlns:ahyp="http://schemas.microsoft.com/office/drawing/2018/hyperlinkcolor" xmlns="" val="tx"/>
+                      <ahyp:hlinkClr xmlns:ahyp="http://schemas.microsoft.com/office/drawing/2018/hyperlinkcolor" val="tx"/>
                     </a:ext>
                   </a:extLst>
                 </a:hlinkClick>
@@ -8972,7 +8940,7 @@
                 <a:hlinkClick r:id="rId17">
                   <a:extLst>
                     <a:ext uri="{A12FA001-AC4F-418D-AE19-62706E023703}">
-                      <ahyp:hlinkClr xmlns:ahyp="http://schemas.microsoft.com/office/drawing/2018/hyperlinkcolor" xmlns="" val="tx"/>
+                      <ahyp:hlinkClr xmlns:ahyp="http://schemas.microsoft.com/office/drawing/2018/hyperlinkcolor" val="tx"/>
                     </a:ext>
                   </a:extLst>
                 </a:hlinkClick>
@@ -9016,9 +8984,30 @@
                 <a:ea typeface="Roboto"/>
                 <a:cs typeface="Roboto"/>
                 <a:sym typeface="Roboto"/>
-                <a:hlinkClick r:id="rId18"/>
-              </a:rPr>
-              <a:t>derive_vars_cat</a:t>
+                <a:hlinkClick r:id="rId18">
+                  <a:extLst>
+                    <a:ext uri="{A12FA001-AC4F-418D-AE19-62706E023703}">
+                      <ahyp:hlinkClr xmlns:ahyp="http://schemas.microsoft.com/office/drawing/2018/hyperlinkcolor" val="tx"/>
+                    </a:ext>
+                  </a:extLst>
+                </a:hlinkClick>
+              </a:rPr>
+              <a:t>derive_</a:t>
+            </a:r>
+            <a:r>
+              <a:rPr lang="en" sz="850" b="1" dirty="0">
+                <a:solidFill>
+                  <a:schemeClr val="accent5"/>
+                </a:solidFill>
+                <a:uFill>
+                  <a:noFill/>
+                </a:uFill>
+                <a:latin typeface="Roboto"/>
+                <a:ea typeface="Roboto"/>
+                <a:cs typeface="Roboto"/>
+                <a:sym typeface="Roboto"/>
+              </a:rPr>
+              <a:t>var_extreme_flag</a:t>
             </a:r>
             <a:r>
               <a:rPr lang="en" sz="850" b="1" dirty="0">
@@ -9032,19 +9021,7 @@
                 <a:cs typeface="Roboto"/>
                 <a:sym typeface="Roboto"/>
               </a:rPr>
-              <a:t>()</a:t>
-            </a:r>
-            <a:r>
-              <a:rPr lang="en" sz="850" b="1" dirty="0">
-                <a:solidFill>
-                  <a:schemeClr val="dk1"/>
-                </a:solidFill>
-                <a:latin typeface="Roboto"/>
-                <a:ea typeface="Roboto"/>
-                <a:cs typeface="Roboto"/>
-                <a:sym typeface="Roboto"/>
-              </a:rPr>
-              <a:t> </a:t>
+              <a:t>() </a:t>
             </a:r>
             <a:r>
               <a:rPr lang="en" sz="850" b="1" dirty="0">
@@ -9058,7 +9035,96 @@
                 <a:ea typeface="Roboto"/>
                 <a:cs typeface="Roboto"/>
                 <a:sym typeface="Roboto"/>
-                <a:hlinkClick r:id="rId19"/>
+                <a:hlinkClick r:id="rId19">
+                  <a:extLst>
+                    <a:ext uri="{A12FA001-AC4F-418D-AE19-62706E023703}">
+                      <ahyp:hlinkClr xmlns:ahyp="http://schemas.microsoft.com/office/drawing/2018/hyperlinkcolor" val="tx"/>
+                    </a:ext>
+                  </a:extLst>
+                </a:hlinkClick>
+              </a:rPr>
+              <a:t>derive_vars_joined_summary</a:t>
+            </a:r>
+            <a:r>
+              <a:rPr lang="en" sz="850" b="1" dirty="0">
+                <a:solidFill>
+                  <a:schemeClr val="bg1">
+                    <a:lumMod val="50000"/>
+                  </a:schemeClr>
+                </a:solidFill>
+                <a:latin typeface="Roboto"/>
+                <a:ea typeface="Roboto"/>
+                <a:cs typeface="Roboto"/>
+                <a:sym typeface="Roboto"/>
+              </a:rPr>
+              <a:t>()</a:t>
+            </a:r>
+          </a:p>
+          <a:p>
+            <a:pPr marL="0" lvl="0" indent="0" algn="l" rtl="0">
+              <a:spcBef>
+                <a:spcPts val="0"/>
+              </a:spcBef>
+              <a:spcAft>
+                <a:spcPts val="0"/>
+              </a:spcAft>
+              <a:buNone/>
+            </a:pPr>
+            <a:r>
+              <a:rPr lang="en" sz="850" b="1" dirty="0">
+                <a:solidFill>
+                  <a:schemeClr val="accent5"/>
+                </a:solidFill>
+                <a:uFill>
+                  <a:noFill/>
+                </a:uFill>
+                <a:latin typeface="Roboto"/>
+                <a:ea typeface="Roboto"/>
+                <a:cs typeface="Roboto"/>
+                <a:sym typeface="Roboto"/>
+                <a:hlinkClick r:id="rId20"/>
+              </a:rPr>
+              <a:t>derive_vars_cat</a:t>
+            </a:r>
+            <a:r>
+              <a:rPr lang="en" sz="850" b="1" dirty="0">
+                <a:solidFill>
+                  <a:schemeClr val="bg1">
+                    <a:lumMod val="50000"/>
+                  </a:schemeClr>
+                </a:solidFill>
+                <a:latin typeface="Roboto"/>
+                <a:ea typeface="Roboto"/>
+                <a:cs typeface="Roboto"/>
+                <a:sym typeface="Roboto"/>
+              </a:rPr>
+              <a:t>()</a:t>
+            </a:r>
+            <a:r>
+              <a:rPr lang="en" sz="850" b="1" dirty="0">
+                <a:solidFill>
+                  <a:schemeClr val="dk1"/>
+                </a:solidFill>
+                <a:latin typeface="Roboto"/>
+                <a:ea typeface="Roboto"/>
+                <a:cs typeface="Roboto"/>
+                <a:sym typeface="Roboto"/>
+              </a:rPr>
+              <a:t> </a:t>
+            </a:r>
+            <a:r>
+              <a:rPr lang="en" sz="850" b="1" dirty="0">
+                <a:solidFill>
+                  <a:schemeClr val="accent5"/>
+                </a:solidFill>
+                <a:uFill>
+                  <a:noFill/>
+                </a:uFill>
+                <a:latin typeface="Roboto"/>
+                <a:ea typeface="Roboto"/>
+                <a:cs typeface="Roboto"/>
+                <a:sym typeface="Roboto"/>
+                <a:hlinkClick r:id="rId21"/>
               </a:rPr>
               <a:t>derive_vars_crit_flag</a:t>
             </a:r>
@@ -9086,7 +9152,7 @@
           <p:nvPr/>
         </p:nvPicPr>
         <p:blipFill>
-          <a:blip r:embed="rId20">
+          <a:blip r:embed="rId22">
             <a:alphaModFix/>
           </a:blip>
           <a:stretch>
@@ -9114,7 +9180,7 @@
           <p:nvPr/>
         </p:nvPicPr>
         <p:blipFill>
-          <a:blip r:embed="rId21">
+          <a:blip r:embed="rId23">
             <a:alphaModFix/>
           </a:blip>
           <a:stretch>
@@ -9142,7 +9208,7 @@
           <p:nvPr/>
         </p:nvPicPr>
         <p:blipFill>
-          <a:blip r:embed="rId22">
+          <a:blip r:embed="rId24">
             <a:alphaModFix/>
           </a:blip>
           <a:stretch>
@@ -9215,7 +9281,7 @@
                 <a:ea typeface="Roboto"/>
                 <a:cs typeface="Roboto"/>
                 <a:sym typeface="Roboto"/>
-                <a:hlinkClick r:id="rId23"/>
+                <a:hlinkClick r:id="rId25"/>
               </a:rPr>
               <a:t>Github Repo</a:t>
             </a:r>
@@ -9237,7 +9303,7 @@
                 <a:ea typeface="Roboto"/>
                 <a:cs typeface="Roboto"/>
                 <a:sym typeface="Roboto"/>
-                <a:hlinkClick r:id="rId24"/>
+                <a:hlinkClick r:id="rId26"/>
               </a:rPr>
               <a:t>Documentation</a:t>
             </a:r>
@@ -9259,7 +9325,7 @@
                 <a:ea typeface="Roboto"/>
                 <a:cs typeface="Roboto"/>
                 <a:sym typeface="Roboto"/>
-                <a:hlinkClick r:id="rId25"/>
+                <a:hlinkClick r:id="rId27"/>
               </a:rPr>
               <a:t>Join the Pharmaverse Slack</a:t>
             </a:r>
@@ -9288,7 +9354,7 @@
           <p:nvPr/>
         </p:nvPicPr>
         <p:blipFill>
-          <a:blip r:embed="rId26">
+          <a:blip r:embed="rId28">
             <a:alphaModFix/>
           </a:blip>
           <a:stretch>
@@ -9297,7 +9363,7 @@
         </p:blipFill>
         <p:spPr>
           <a:xfrm>
-            <a:off x="354550" y="4944100"/>
+            <a:off x="354550" y="4803992"/>
             <a:ext cx="708750" cy="1609599"/>
           </a:xfrm>
           <a:prstGeom prst="rect">
@@ -9507,10 +9573,10 @@
                 <a:ea typeface="Roboto"/>
                 <a:cs typeface="Roboto"/>
                 <a:sym typeface="Roboto"/>
-                <a:hlinkClick r:id="rId27">
+                <a:hlinkClick r:id="rId29">
                   <a:extLst>
                     <a:ext uri="{A12FA001-AC4F-418D-AE19-62706E023703}">
-                      <ahyp:hlinkClr xmlns:ahyp="http://schemas.microsoft.com/office/drawing/2018/hyperlinkcolor" xmlns="" val="tx"/>
+                      <ahyp:hlinkClr xmlns:ahyp="http://schemas.microsoft.com/office/drawing/2018/hyperlinkcolor" val="tx"/>
                     </a:ext>
                   </a:extLst>
                 </a:hlinkClick>
@@ -9736,10 +9802,10 @@
                 <a:ea typeface="Roboto"/>
                 <a:cs typeface="Roboto"/>
                 <a:sym typeface="Roboto"/>
-                <a:hlinkClick r:id="rId28">
+                <a:hlinkClick r:id="rId30">
                   <a:extLst>
                     <a:ext uri="{A12FA001-AC4F-418D-AE19-62706E023703}">
-                      <ahyp:hlinkClr xmlns:ahyp="http://schemas.microsoft.com/office/drawing/2018/hyperlinkcolor" xmlns="" val="tx"/>
+                      <ahyp:hlinkClr xmlns:ahyp="http://schemas.microsoft.com/office/drawing/2018/hyperlinkcolor" val="tx"/>
                     </a:ext>
                   </a:extLst>
                 </a:hlinkClick>
@@ -10056,10 +10122,10 @@
                 <a:ea typeface="Roboto"/>
                 <a:cs typeface="Roboto"/>
                 <a:sym typeface="Roboto"/>
-                <a:hlinkClick r:id="rId29">
+                <a:hlinkClick r:id="rId31">
                   <a:extLst>
                     <a:ext uri="{A12FA001-AC4F-418D-AE19-62706E023703}">
-                      <ahyp:hlinkClr xmlns:ahyp="http://schemas.microsoft.com/office/drawing/2018/hyperlinkcolor" xmlns="" val="tx"/>
+                      <ahyp:hlinkClr xmlns:ahyp="http://schemas.microsoft.com/office/drawing/2018/hyperlinkcolor" val="tx"/>
                     </a:ext>
                   </a:extLst>
                 </a:hlinkClick>
@@ -10398,10 +10464,10 @@
                 <a:ea typeface="Roboto"/>
                 <a:cs typeface="Roboto"/>
                 <a:sym typeface="Roboto"/>
-                <a:hlinkClick r:id="rId30">
+                <a:hlinkClick r:id="rId32">
                   <a:extLst>
                     <a:ext uri="{A12FA001-AC4F-418D-AE19-62706E023703}">
-                      <ahyp:hlinkClr xmlns:ahyp="http://schemas.microsoft.com/office/drawing/2018/hyperlinkcolor" xmlns="" val="tx"/>
+                      <ahyp:hlinkClr xmlns:ahyp="http://schemas.microsoft.com/office/drawing/2018/hyperlinkcolor" val="tx"/>
                     </a:ext>
                   </a:extLst>
                 </a:hlinkClick>
@@ -10661,7 +10727,7 @@
           <p:nvPr/>
         </p:nvPicPr>
         <p:blipFill>
-          <a:blip r:embed="rId31">
+          <a:blip r:embed="rId33">
             <a:alphaModFix/>
           </a:blip>
           <a:stretch>
@@ -10717,7 +10783,7 @@
               <a:buNone/>
             </a:pPr>
             <a:r>
-              <a:rPr lang="en">
+              <a:rPr lang="en" dirty="0">
                 <a:solidFill>
                   <a:srgbClr val="FF0000"/>
                 </a:solidFill>
@@ -10728,7 +10794,7 @@
               </a:rPr>
               <a:t>Computation Functions for Vectors</a:t>
             </a:r>
-            <a:endParaRPr>
+            <a:endParaRPr dirty="0">
               <a:solidFill>
                 <a:srgbClr val="FF0000"/>
               </a:solidFill>
@@ -10748,7 +10814,7 @@
               </a:spcAft>
               <a:buNone/>
             </a:pPr>
-            <a:endParaRPr sz="1200">
+            <a:endParaRPr sz="1200" dirty="0">
               <a:solidFill>
                 <a:schemeClr val="dk1"/>
               </a:solidFill>
@@ -10768,7 +10834,7 @@
               </a:spcAft>
               <a:buNone/>
             </a:pPr>
-            <a:endParaRPr sz="1200" b="1">
+            <a:endParaRPr sz="1200" b="1" dirty="0">
               <a:solidFill>
                 <a:schemeClr val="dk1"/>
               </a:solidFill>
@@ -10815,7 +10881,7 @@
               <a:buNone/>
             </a:pPr>
             <a:r>
-              <a:rPr lang="en" sz="900" b="1">
+              <a:rPr lang="en" sz="900" b="1" dirty="0">
                 <a:solidFill>
                   <a:srgbClr val="FF0000"/>
                 </a:solidFill>
@@ -10826,7 +10892,7 @@
               </a:rPr>
               <a:t>These functions do what their names suggest and can be  used inside dplyr:: mutate() or other {admiral} functions.</a:t>
             </a:r>
-            <a:endParaRPr sz="900" b="1" i="1">
+            <a:endParaRPr sz="900" b="1" i="1" dirty="0">
               <a:solidFill>
                 <a:srgbClr val="FF0000"/>
               </a:solidFill>
@@ -10884,10 +10950,10 @@
                 <a:ea typeface="Roboto"/>
                 <a:cs typeface="Roboto"/>
                 <a:sym typeface="Roboto"/>
-                <a:hlinkClick r:id="rId32">
+                <a:hlinkClick r:id="rId34">
                   <a:extLst>
                     <a:ext uri="{A12FA001-AC4F-418D-AE19-62706E023703}">
-                      <ahyp:hlinkClr xmlns:ahyp="http://schemas.microsoft.com/office/drawing/2018/hyperlinkcolor" xmlns="" val="tx"/>
+                      <ahyp:hlinkClr xmlns:ahyp="http://schemas.microsoft.com/office/drawing/2018/hyperlinkcolor" val="tx"/>
                     </a:ext>
                   </a:extLst>
                 </a:hlinkClick>
@@ -10942,10 +11008,10 @@
                 <a:ea typeface="Roboto"/>
                 <a:cs typeface="Roboto"/>
                 <a:sym typeface="Roboto"/>
-                <a:hlinkClick r:id="rId33">
+                <a:hlinkClick r:id="rId35">
                   <a:extLst>
                     <a:ext uri="{A12FA001-AC4F-418D-AE19-62706E023703}">
-                      <ahyp:hlinkClr xmlns:ahyp="http://schemas.microsoft.com/office/drawing/2018/hyperlinkcolor" xmlns="" val="tx"/>
+                      <ahyp:hlinkClr xmlns:ahyp="http://schemas.microsoft.com/office/drawing/2018/hyperlinkcolor" val="tx"/>
                     </a:ext>
                   </a:extLst>
                 </a:hlinkClick>
@@ -11000,10 +11066,10 @@
                 <a:ea typeface="Roboto"/>
                 <a:cs typeface="Roboto"/>
                 <a:sym typeface="Roboto"/>
-                <a:hlinkClick r:id="rId34">
+                <a:hlinkClick r:id="rId36">
                   <a:extLst>
                     <a:ext uri="{A12FA001-AC4F-418D-AE19-62706E023703}">
-                      <ahyp:hlinkClr xmlns:ahyp="http://schemas.microsoft.com/office/drawing/2018/hyperlinkcolor" xmlns="" val="tx"/>
+                      <ahyp:hlinkClr xmlns:ahyp="http://schemas.microsoft.com/office/drawing/2018/hyperlinkcolor" val="tx"/>
                     </a:ext>
                   </a:extLst>
                 </a:hlinkClick>
@@ -11058,10 +11124,10 @@
                 <a:ea typeface="Roboto"/>
                 <a:cs typeface="Roboto"/>
                 <a:sym typeface="Roboto"/>
-                <a:hlinkClick r:id="rId35">
+                <a:hlinkClick r:id="rId37">
                   <a:extLst>
                     <a:ext uri="{A12FA001-AC4F-418D-AE19-62706E023703}">
-                      <ahyp:hlinkClr xmlns:ahyp="http://schemas.microsoft.com/office/drawing/2018/hyperlinkcolor" xmlns="" val="tx"/>
+                      <ahyp:hlinkClr xmlns:ahyp="http://schemas.microsoft.com/office/drawing/2018/hyperlinkcolor" val="tx"/>
                     </a:ext>
                   </a:extLst>
                 </a:hlinkClick>
@@ -11105,7 +11171,7 @@
                 <a:ea typeface="Roboto"/>
                 <a:cs typeface="Roboto"/>
                 <a:sym typeface="Roboto"/>
-                <a:hlinkClick r:id="rId36"/>
+                <a:hlinkClick r:id="rId38"/>
               </a:rPr>
               <a:t>compute_scale</a:t>
             </a:r>
@@ -11212,10 +11278,10 @@
                 <a:ea typeface="Roboto"/>
                 <a:cs typeface="Roboto"/>
                 <a:sym typeface="Roboto"/>
-                <a:hlinkClick r:id="rId37">
+                <a:hlinkClick r:id="rId39">
                   <a:extLst>
                     <a:ext uri="{A12FA001-AC4F-418D-AE19-62706E023703}">
-                      <ahyp:hlinkClr xmlns:ahyp="http://schemas.microsoft.com/office/drawing/2018/hyperlinkcolor" xmlns="" val="tx"/>
+                      <ahyp:hlinkClr xmlns:ahyp="http://schemas.microsoft.com/office/drawing/2018/hyperlinkcolor" val="tx"/>
                     </a:ext>
                   </a:extLst>
                 </a:hlinkClick>
@@ -11249,10 +11315,10 @@
               <a:ea typeface="Roboto"/>
               <a:cs typeface="Roboto"/>
               <a:sym typeface="Roboto"/>
-              <a:hlinkClick r:id="rId38">
+              <a:hlinkClick r:id="rId40">
                 <a:extLst>
                   <a:ext uri="{A12FA001-AC4F-418D-AE19-62706E023703}">
-                    <ahyp:hlinkClr xmlns:ahyp="http://schemas.microsoft.com/office/drawing/2018/hyperlinkcolor" xmlns="" val="tx"/>
+                    <ahyp:hlinkClr xmlns:ahyp="http://schemas.microsoft.com/office/drawing/2018/hyperlinkcolor" val="tx"/>
                   </a:ext>
                 </a:extLst>
               </a:hlinkClick>
@@ -11280,10 +11346,10 @@
                 <a:ea typeface="Roboto"/>
                 <a:cs typeface="Roboto"/>
                 <a:sym typeface="Roboto"/>
-                <a:hlinkClick r:id="rId38">
+                <a:hlinkClick r:id="rId40">
                   <a:extLst>
                     <a:ext uri="{A12FA001-AC4F-418D-AE19-62706E023703}">
-                      <ahyp:hlinkClr xmlns:ahyp="http://schemas.microsoft.com/office/drawing/2018/hyperlinkcolor" xmlns="" val="tx"/>
+                      <ahyp:hlinkClr xmlns:ahyp="http://schemas.microsoft.com/office/drawing/2018/hyperlinkcolor" val="tx"/>
                     </a:ext>
                   </a:extLst>
                 </a:hlinkClick>
@@ -11302,10 +11368,10 @@
                 <a:ea typeface="Roboto"/>
                 <a:cs typeface="Roboto"/>
                 <a:sym typeface="Roboto"/>
-                <a:hlinkClick r:id="rId38">
+                <a:hlinkClick r:id="rId40">
                   <a:extLst>
                     <a:ext uri="{A12FA001-AC4F-418D-AE19-62706E023703}">
-                      <ahyp:hlinkClr xmlns:ahyp="http://schemas.microsoft.com/office/drawing/2018/hyperlinkcolor" xmlns="" val="tx"/>
+                      <ahyp:hlinkClr xmlns:ahyp="http://schemas.microsoft.com/office/drawing/2018/hyperlinkcolor" val="tx"/>
                     </a:ext>
                   </a:extLst>
                 </a:hlinkClick>
@@ -11326,10 +11392,10 @@
                 <a:ea typeface="Roboto"/>
                 <a:cs typeface="Roboto"/>
                 <a:sym typeface="Roboto"/>
-                <a:hlinkClick r:id="rId39">
+                <a:hlinkClick r:id="rId41">
                   <a:extLst>
                     <a:ext uri="{A12FA001-AC4F-418D-AE19-62706E023703}">
-                      <ahyp:hlinkClr xmlns:ahyp="http://schemas.microsoft.com/office/drawing/2018/hyperlinkcolor" xmlns="" val="tx"/>
+                      <ahyp:hlinkClr xmlns:ahyp="http://schemas.microsoft.com/office/drawing/2018/hyperlinkcolor" val="tx"/>
                     </a:ext>
                   </a:extLst>
                 </a:hlinkClick>
@@ -11359,10 +11425,10 @@
                 <a:ea typeface="Roboto"/>
                 <a:cs typeface="Roboto"/>
                 <a:sym typeface="Roboto"/>
-                <a:hlinkClick r:id="rId39">
+                <a:hlinkClick r:id="rId41">
                   <a:extLst>
                     <a:ext uri="{A12FA001-AC4F-418D-AE19-62706E023703}">
-                      <ahyp:hlinkClr xmlns:ahyp="http://schemas.microsoft.com/office/drawing/2018/hyperlinkcolor" xmlns="" val="tx"/>
+                      <ahyp:hlinkClr xmlns:ahyp="http://schemas.microsoft.com/office/drawing/2018/hyperlinkcolor" val="tx"/>
                     </a:ext>
                   </a:extLst>
                 </a:hlinkClick>
@@ -11417,10 +11483,10 @@
                 <a:ea typeface="Roboto"/>
                 <a:cs typeface="Roboto"/>
                 <a:sym typeface="Roboto"/>
-                <a:hlinkClick r:id="rId40">
+                <a:hlinkClick r:id="rId42">
                   <a:extLst>
                     <a:ext uri="{A12FA001-AC4F-418D-AE19-62706E023703}">
-                      <ahyp:hlinkClr xmlns:ahyp="http://schemas.microsoft.com/office/drawing/2018/hyperlinkcolor" xmlns="" val="tx"/>
+                      <ahyp:hlinkClr xmlns:ahyp="http://schemas.microsoft.com/office/drawing/2018/hyperlinkcolor" val="tx"/>
                     </a:ext>
                   </a:extLst>
                 </a:hlinkClick>
@@ -11547,7 +11613,7 @@
                 <a:ea typeface="Roboto"/>
                 <a:cs typeface="Roboto"/>
                 <a:sym typeface="Roboto"/>
-                <a:hlinkClick r:id="rId41"/>
+                <a:hlinkClick r:id="rId43"/>
               </a:rPr>
               <a:t>reference page</a:t>
             </a:r>
@@ -11961,7 +12027,7 @@
                 <a:hlinkClick r:id="rId4">
                   <a:extLst>
                     <a:ext uri="{A12FA001-AC4F-418D-AE19-62706E023703}">
-                      <ahyp:hlinkClr xmlns:ahyp="http://schemas.microsoft.com/office/drawing/2018/hyperlinkcolor" xmlns="" val="tx"/>
+                      <ahyp:hlinkClr xmlns:ahyp="http://schemas.microsoft.com/office/drawing/2018/hyperlinkcolor" val="tx"/>
                     </a:ext>
                   </a:extLst>
                 </a:hlinkClick>
@@ -12305,7 +12371,7 @@
                 <a:hlinkClick r:id="rId5">
                   <a:extLst>
                     <a:ext uri="{A12FA001-AC4F-418D-AE19-62706E023703}">
-                      <ahyp:hlinkClr xmlns:ahyp="http://schemas.microsoft.com/office/drawing/2018/hyperlinkcolor" xmlns="" val="tx"/>
+                      <ahyp:hlinkClr xmlns:ahyp="http://schemas.microsoft.com/office/drawing/2018/hyperlinkcolor" val="tx"/>
                     </a:ext>
                   </a:extLst>
                 </a:hlinkClick>
@@ -12737,7 +12803,7 @@
                 <a:hlinkClick r:id="rId8">
                   <a:extLst>
                     <a:ext uri="{A12FA001-AC4F-418D-AE19-62706E023703}">
-                      <ahyp:hlinkClr xmlns:ahyp="http://schemas.microsoft.com/office/drawing/2018/hyperlinkcolor" xmlns="" val="tx"/>
+                      <ahyp:hlinkClr xmlns:ahyp="http://schemas.microsoft.com/office/drawing/2018/hyperlinkcolor" val="tx"/>
                     </a:ext>
                   </a:extLst>
                 </a:hlinkClick>
@@ -13191,7 +13257,7 @@
                 <a:hlinkClick r:id="rId9">
                   <a:extLst>
                     <a:ext uri="{A12FA001-AC4F-418D-AE19-62706E023703}">
-                      <ahyp:hlinkClr xmlns:ahyp="http://schemas.microsoft.com/office/drawing/2018/hyperlinkcolor" xmlns="" val="tx"/>
+                      <ahyp:hlinkClr xmlns:ahyp="http://schemas.microsoft.com/office/drawing/2018/hyperlinkcolor" val="tx"/>
                     </a:ext>
                   </a:extLst>
                 </a:hlinkClick>
@@ -13343,7 +13409,7 @@
                 <a:hlinkClick r:id="rId10">
                   <a:extLst>
                     <a:ext uri="{A12FA001-AC4F-418D-AE19-62706E023703}">
-                      <ahyp:hlinkClr xmlns:ahyp="http://schemas.microsoft.com/office/drawing/2018/hyperlinkcolor" xmlns="" val="tx"/>
+                      <ahyp:hlinkClr xmlns:ahyp="http://schemas.microsoft.com/office/drawing/2018/hyperlinkcolor" val="tx"/>
                     </a:ext>
                   </a:extLst>
                 </a:hlinkClick>
@@ -13499,7 +13565,7 @@
                 <a:hlinkClick r:id="rId11">
                   <a:extLst>
                     <a:ext uri="{A12FA001-AC4F-418D-AE19-62706E023703}">
-                      <ahyp:hlinkClr xmlns:ahyp="http://schemas.microsoft.com/office/drawing/2018/hyperlinkcolor" xmlns="" val="tx"/>
+                      <ahyp:hlinkClr xmlns:ahyp="http://schemas.microsoft.com/office/drawing/2018/hyperlinkcolor" val="tx"/>
                     </a:ext>
                   </a:extLst>
                 </a:hlinkClick>
@@ -13687,7 +13753,7 @@
                 <a:hlinkClick r:id="rId13">
                   <a:extLst>
                     <a:ext uri="{A12FA001-AC4F-418D-AE19-62706E023703}">
-                      <ahyp:hlinkClr xmlns:ahyp="http://schemas.microsoft.com/office/drawing/2018/hyperlinkcolor" xmlns="" val="tx"/>
+                      <ahyp:hlinkClr xmlns:ahyp="http://schemas.microsoft.com/office/drawing/2018/hyperlinkcolor" val="tx"/>
                     </a:ext>
                   </a:extLst>
                 </a:hlinkClick>
@@ -13987,7 +14053,7 @@
                 <a:hlinkClick r:id="rId14">
                   <a:extLst>
                     <a:ext uri="{A12FA001-AC4F-418D-AE19-62706E023703}">
-                      <ahyp:hlinkClr xmlns:ahyp="http://schemas.microsoft.com/office/drawing/2018/hyperlinkcolor" xmlns="" val="tx"/>
+                      <ahyp:hlinkClr xmlns:ahyp="http://schemas.microsoft.com/office/drawing/2018/hyperlinkcolor" val="tx"/>
                     </a:ext>
                   </a:extLst>
                 </a:hlinkClick>
@@ -14397,7 +14463,7 @@
                 <a:hlinkClick r:id="rId18">
                   <a:extLst>
                     <a:ext uri="{A12FA001-AC4F-418D-AE19-62706E023703}">
-                      <ahyp:hlinkClr xmlns:ahyp="http://schemas.microsoft.com/office/drawing/2018/hyperlinkcolor" xmlns="" val="tx"/>
+                      <ahyp:hlinkClr xmlns:ahyp="http://schemas.microsoft.com/office/drawing/2018/hyperlinkcolor" val="tx"/>
                     </a:ext>
                   </a:extLst>
                 </a:hlinkClick>
@@ -14529,7 +14595,7 @@
                 <a:hlinkClick r:id="rId19">
                   <a:extLst>
                     <a:ext uri="{A12FA001-AC4F-418D-AE19-62706E023703}">
-                      <ahyp:hlinkClr xmlns:ahyp="http://schemas.microsoft.com/office/drawing/2018/hyperlinkcolor" xmlns="" val="tx"/>
+                      <ahyp:hlinkClr xmlns:ahyp="http://schemas.microsoft.com/office/drawing/2018/hyperlinkcolor" val="tx"/>
                     </a:ext>
                   </a:extLst>
                 </a:hlinkClick>
@@ -14653,7 +14719,7 @@
                 <a:hlinkClick r:id="rId20">
                   <a:extLst>
                     <a:ext uri="{A12FA001-AC4F-418D-AE19-62706E023703}">
-                      <ahyp:hlinkClr xmlns:ahyp="http://schemas.microsoft.com/office/drawing/2018/hyperlinkcolor" xmlns="" val="tx"/>
+                      <ahyp:hlinkClr xmlns:ahyp="http://schemas.microsoft.com/office/drawing/2018/hyperlinkcolor" val="tx"/>
                     </a:ext>
                   </a:extLst>
                 </a:hlinkClick>
@@ -14745,7 +14811,7 @@
                 <a:hlinkClick r:id="rId21">
                   <a:extLst>
                     <a:ext uri="{A12FA001-AC4F-418D-AE19-62706E023703}">
-                      <ahyp:hlinkClr xmlns:ahyp="http://schemas.microsoft.com/office/drawing/2018/hyperlinkcolor" xmlns="" val="tx"/>
+                      <ahyp:hlinkClr xmlns:ahyp="http://schemas.microsoft.com/office/drawing/2018/hyperlinkcolor" val="tx"/>
                     </a:ext>
                   </a:extLst>
                 </a:hlinkClick>
@@ -14872,7 +14938,7 @@
                 <a:hlinkClick r:id="rId22">
                   <a:extLst>
                     <a:ext uri="{A12FA001-AC4F-418D-AE19-62706E023703}">
-                      <ahyp:hlinkClr xmlns:ahyp="http://schemas.microsoft.com/office/drawing/2018/hyperlinkcolor" xmlns="" val="tx"/>
+                      <ahyp:hlinkClr xmlns:ahyp="http://schemas.microsoft.com/office/drawing/2018/hyperlinkcolor" val="tx"/>
                     </a:ext>
                   </a:extLst>
                 </a:hlinkClick>
@@ -14984,7 +15050,7 @@
                 <a:hlinkClick r:id="rId23">
                   <a:extLst>
                     <a:ext uri="{A12FA001-AC4F-418D-AE19-62706E023703}">
-                      <ahyp:hlinkClr xmlns:ahyp="http://schemas.microsoft.com/office/drawing/2018/hyperlinkcolor" xmlns="" val="tx"/>
+                      <ahyp:hlinkClr xmlns:ahyp="http://schemas.microsoft.com/office/drawing/2018/hyperlinkcolor" val="tx"/>
                     </a:ext>
                   </a:extLst>
                 </a:hlinkClick>
@@ -15206,7 +15272,7 @@
                 <a:hlinkClick r:id="rId24">
                   <a:extLst>
                     <a:ext uri="{A12FA001-AC4F-418D-AE19-62706E023703}">
-                      <ahyp:hlinkClr xmlns:ahyp="http://schemas.microsoft.com/office/drawing/2018/hyperlinkcolor" xmlns="" val="tx"/>
+                      <ahyp:hlinkClr xmlns:ahyp="http://schemas.microsoft.com/office/drawing/2018/hyperlinkcolor" val="tx"/>
                     </a:ext>
                   </a:extLst>
                 </a:hlinkClick>
@@ -15350,7 +15416,7 @@
                 <a:hlinkClick r:id="rId25">
                   <a:extLst>
                     <a:ext uri="{A12FA001-AC4F-418D-AE19-62706E023703}">
-                      <ahyp:hlinkClr xmlns:ahyp="http://schemas.microsoft.com/office/drawing/2018/hyperlinkcolor" xmlns="" val="tx"/>
+                      <ahyp:hlinkClr xmlns:ahyp="http://schemas.microsoft.com/office/drawing/2018/hyperlinkcolor" val="tx"/>
                     </a:ext>
                   </a:extLst>
                 </a:hlinkClick>
@@ -15474,7 +15540,7 @@
                 <a:hlinkClick r:id="rId26">
                   <a:extLst>
                     <a:ext uri="{A12FA001-AC4F-418D-AE19-62706E023703}">
-                      <ahyp:hlinkClr xmlns:ahyp="http://schemas.microsoft.com/office/drawing/2018/hyperlinkcolor" xmlns="" val="tx"/>
+                      <ahyp:hlinkClr xmlns:ahyp="http://schemas.microsoft.com/office/drawing/2018/hyperlinkcolor" val="tx"/>
                     </a:ext>
                   </a:extLst>
                 </a:hlinkClick>
@@ -15586,7 +15652,7 @@
                 <a:hlinkClick r:id="rId27">
                   <a:extLst>
                     <a:ext uri="{A12FA001-AC4F-418D-AE19-62706E023703}">
-                      <ahyp:hlinkClr xmlns:ahyp="http://schemas.microsoft.com/office/drawing/2018/hyperlinkcolor" xmlns="" val="tx"/>
+                      <ahyp:hlinkClr xmlns:ahyp="http://schemas.microsoft.com/office/drawing/2018/hyperlinkcolor" val="tx"/>
                     </a:ext>
                   </a:extLst>
                 </a:hlinkClick>
@@ -15698,7 +15764,7 @@
                 <a:hlinkClick r:id="rId28">
                   <a:extLst>
                     <a:ext uri="{A12FA001-AC4F-418D-AE19-62706E023703}">
-                      <ahyp:hlinkClr xmlns:ahyp="http://schemas.microsoft.com/office/drawing/2018/hyperlinkcolor" xmlns="" val="tx"/>
+                      <ahyp:hlinkClr xmlns:ahyp="http://schemas.microsoft.com/office/drawing/2018/hyperlinkcolor" val="tx"/>
                     </a:ext>
                   </a:extLst>
                 </a:hlinkClick>
@@ -15953,8 +16019,8 @@
         </p:nvSpPr>
         <p:spPr>
           <a:xfrm>
-            <a:off x="3695350" y="7232044"/>
-            <a:ext cx="3209700" cy="317100"/>
+            <a:off x="3695350" y="7246458"/>
+            <a:ext cx="3209700" cy="288273"/>
           </a:xfrm>
           <a:prstGeom prst="rect">
             <a:avLst/>
@@ -16112,7 +16178,7 @@
                 <a:hlinkClick r:id="rId33">
                   <a:extLst>
                     <a:ext uri="{A12FA001-AC4F-418D-AE19-62706E023703}">
-                      <ahyp:hlinkClr xmlns:ahyp="http://schemas.microsoft.com/office/drawing/2018/hyperlinkcolor" xmlns="" val="tx"/>
+                      <ahyp:hlinkClr xmlns:ahyp="http://schemas.microsoft.com/office/drawing/2018/hyperlinkcolor" val="tx"/>
                     </a:ext>
                   </a:extLst>
                 </a:hlinkClick>
@@ -16238,7 +16304,7 @@
                 <a:hlinkClick r:id="rId34">
                   <a:extLst>
                     <a:ext uri="{A12FA001-AC4F-418D-AE19-62706E023703}">
-                      <ahyp:hlinkClr xmlns:ahyp="http://schemas.microsoft.com/office/drawing/2018/hyperlinkcolor" xmlns="" val="tx"/>
+                      <ahyp:hlinkClr xmlns:ahyp="http://schemas.microsoft.com/office/drawing/2018/hyperlinkcolor" val="tx"/>
                     </a:ext>
                   </a:extLst>
                 </a:hlinkClick>
@@ -16350,7 +16416,7 @@
                 <a:hlinkClick r:id="rId35">
                   <a:extLst>
                     <a:ext uri="{A12FA001-AC4F-418D-AE19-62706E023703}">
-                      <ahyp:hlinkClr xmlns:ahyp="http://schemas.microsoft.com/office/drawing/2018/hyperlinkcolor" xmlns="" val="tx"/>
+                      <ahyp:hlinkClr xmlns:ahyp="http://schemas.microsoft.com/office/drawing/2018/hyperlinkcolor" val="tx"/>
                     </a:ext>
                   </a:extLst>
                 </a:hlinkClick>
@@ -16958,19 +17024,7 @@
                 <a:cs typeface="Roboto"/>
                 <a:sym typeface="Roboto"/>
               </a:rPr>
-              <a:t>Derive criterion flag variables (CRITy, </a:t>
-            </a:r>
-            <a:r>
-              <a:rPr lang="en" sz="900" dirty="0" smtClean="0">
-                <a:solidFill>
-                  <a:schemeClr val="dk1"/>
-                </a:solidFill>
-                <a:latin typeface="Roboto"/>
-                <a:ea typeface="Roboto"/>
-                <a:cs typeface="Roboto"/>
-                <a:sym typeface="Roboto"/>
-              </a:rPr>
-              <a:t>CRITyF(L/N)).</a:t>
+              <a:t>Derive criterion flag variables (CRITy, CRITyF(L/N)).</a:t>
             </a:r>
             <a:endParaRPr sz="900" dirty="0">
               <a:solidFill>

</xml_diff>

<commit_message>
Closes #2758 cheatsheet updated for 1.3 (#2759)
#2758 cheatsheet updated for 1.3
</commit_message>
<xml_diff>
--- a/inst/cheatsheet/admiral_cheatsheet.pptx
+++ b/inst/cheatsheet/admiral_cheatsheet.pptx
@@ -15,14 +15,14 @@
   <p:notesSz cx="6858000" cy="9144000"/>
   <p:embeddedFontLst>
     <p:embeddedFont>
-      <p:font typeface="Roboto Mono Medium" panose="020B0604020202020204" charset="0"/>
+      <p:font typeface="Roboto" panose="02000000000000000000" pitchFamily="2" charset="0"/>
       <p:regular r:id="rId5"/>
       <p:bold r:id="rId6"/>
       <p:italic r:id="rId7"/>
       <p:boldItalic r:id="rId8"/>
     </p:embeddedFont>
     <p:embeddedFont>
-      <p:font typeface="Roboto" panose="02000000000000000000" pitchFamily="2" charset="0"/>
+      <p:font typeface="Roboto Mono Medium" panose="00000009000000000000" pitchFamily="49" charset="0"/>
       <p:regular r:id="rId9"/>
       <p:bold r:id="rId10"/>
       <p:italic r:id="rId11"/>
@@ -5751,7 +5751,7 @@
         <p:spPr>
           <a:xfrm>
             <a:off x="278725" y="1556250"/>
-            <a:ext cx="3227700" cy="638400"/>
+            <a:ext cx="3219225" cy="638400"/>
           </a:xfrm>
           <a:prstGeom prst="rect">
             <a:avLst/>
@@ -6148,7 +6148,7 @@
                 <a:hlinkClick r:id="rId3">
                   <a:extLst>
                     <a:ext uri="{A12FA001-AC4F-418D-AE19-62706E023703}">
-                      <ahyp:hlinkClr xmlns:ahyp="http://schemas.microsoft.com/office/drawing/2018/hyperlinkcolor" xmlns="" val="tx"/>
+                      <ahyp:hlinkClr xmlns:ahyp="http://schemas.microsoft.com/office/drawing/2018/hyperlinkcolor" val="tx"/>
                     </a:ext>
                   </a:extLst>
                 </a:hlinkClick>
@@ -6473,39 +6473,7 @@
                 <a:cs typeface="Roboto"/>
                 <a:sym typeface="Roboto"/>
               </a:rPr>
-              <a:t>  filter_add = VSTESTCD == "WEIGHT"</a:t>
-            </a:r>
-            <a:endParaRPr sz="900" i="1" dirty="0">
-              <a:solidFill>
-                <a:schemeClr val="dk1"/>
-              </a:solidFill>
-              <a:latin typeface="Roboto"/>
-              <a:ea typeface="Roboto"/>
-              <a:cs typeface="Roboto"/>
-              <a:sym typeface="Roboto"/>
-            </a:endParaRPr>
-          </a:p>
-          <a:p>
-            <a:pPr marL="0" lvl="0" indent="0" algn="l" rtl="0">
-              <a:spcBef>
-                <a:spcPts val="0"/>
-              </a:spcBef>
-              <a:spcAft>
-                <a:spcPts val="0"/>
-              </a:spcAft>
-              <a:buNone/>
-            </a:pPr>
-            <a:r>
-              <a:rPr lang="en" sz="900" i="1" dirty="0">
-                <a:solidFill>
-                  <a:schemeClr val="dk1"/>
-                </a:solidFill>
-                <a:latin typeface="Roboto"/>
-                <a:ea typeface="Roboto"/>
-                <a:cs typeface="Roboto"/>
-                <a:sym typeface="Roboto"/>
-              </a:rPr>
-              <a:t>)</a:t>
+              <a:t>  filter_add = VSTESTCD == "WEIGHT")</a:t>
             </a:r>
             <a:endParaRPr sz="900" i="1" dirty="0">
               <a:solidFill>
@@ -6592,7 +6560,7 @@
         </p:nvSpPr>
         <p:spPr>
           <a:xfrm>
-            <a:off x="1031050" y="4851123"/>
+            <a:off x="1031050" y="4711015"/>
             <a:ext cx="2466900" cy="2084100"/>
           </a:xfrm>
           <a:prstGeom prst="rect">
@@ -6633,7 +6601,7 @@
                 <a:hlinkClick r:id="rId4">
                   <a:extLst>
                     <a:ext uri="{A12FA001-AC4F-418D-AE19-62706E023703}">
-                      <ahyp:hlinkClr xmlns:ahyp="http://schemas.microsoft.com/office/drawing/2018/hyperlinkcolor" xmlns="" val="tx"/>
+                      <ahyp:hlinkClr xmlns:ahyp="http://schemas.microsoft.com/office/drawing/2018/hyperlinkcolor" val="tx"/>
                     </a:ext>
                   </a:extLst>
                 </a:hlinkClick>
@@ -7157,7 +7125,7 @@
                 <a:hlinkClick r:id="rId5">
                   <a:extLst>
                     <a:ext uri="{A12FA001-AC4F-418D-AE19-62706E023703}">
-                      <ahyp:hlinkClr xmlns:ahyp="http://schemas.microsoft.com/office/drawing/2018/hyperlinkcolor" xmlns="" val="tx"/>
+                      <ahyp:hlinkClr xmlns:ahyp="http://schemas.microsoft.com/office/drawing/2018/hyperlinkcolor" val="tx"/>
                     </a:ext>
                   </a:extLst>
                 </a:hlinkClick>
@@ -7787,7 +7755,7 @@
                 <a:hlinkClick r:id="rId6">
                   <a:extLst>
                     <a:ext uri="{A12FA001-AC4F-418D-AE19-62706E023703}">
-                      <ahyp:hlinkClr xmlns:ahyp="http://schemas.microsoft.com/office/drawing/2018/hyperlinkcolor" xmlns="" val="tx"/>
+                      <ahyp:hlinkClr xmlns:ahyp="http://schemas.microsoft.com/office/drawing/2018/hyperlinkcolor" val="tx"/>
                     </a:ext>
                   </a:extLst>
                 </a:hlinkClick>
@@ -8279,7 +8247,7 @@
                 <a:hlinkClick r:id="rId7">
                   <a:extLst>
                     <a:ext uri="{A12FA001-AC4F-418D-AE19-62706E023703}">
-                      <ahyp:hlinkClr xmlns:ahyp="http://schemas.microsoft.com/office/drawing/2018/hyperlinkcolor" xmlns="" val="tx"/>
+                      <ahyp:hlinkClr xmlns:ahyp="http://schemas.microsoft.com/office/drawing/2018/hyperlinkcolor" val="tx"/>
                     </a:ext>
                   </a:extLst>
                 </a:hlinkClick>
@@ -8301,7 +8269,7 @@
                 <a:hlinkClick r:id="rId7">
                   <a:extLst>
                     <a:ext uri="{A12FA001-AC4F-418D-AE19-62706E023703}">
-                      <ahyp:hlinkClr xmlns:ahyp="http://schemas.microsoft.com/office/drawing/2018/hyperlinkcolor" xmlns="" val="tx"/>
+                      <ahyp:hlinkClr xmlns:ahyp="http://schemas.microsoft.com/office/drawing/2018/hyperlinkcolor" val="tx"/>
                     </a:ext>
                   </a:extLst>
                 </a:hlinkClick>
@@ -8349,7 +8317,7 @@
                 <a:hlinkClick r:id="rId8">
                   <a:extLst>
                     <a:ext uri="{A12FA001-AC4F-418D-AE19-62706E023703}">
-                      <ahyp:hlinkClr xmlns:ahyp="http://schemas.microsoft.com/office/drawing/2018/hyperlinkcolor" xmlns="" val="tx"/>
+                      <ahyp:hlinkClr xmlns:ahyp="http://schemas.microsoft.com/office/drawing/2018/hyperlinkcolor" val="tx"/>
                     </a:ext>
                   </a:extLst>
                 </a:hlinkClick>
@@ -8407,7 +8375,7 @@
                 <a:hlinkClick r:id="rId9">
                   <a:extLst>
                     <a:ext uri="{A12FA001-AC4F-418D-AE19-62706E023703}">
-                      <ahyp:hlinkClr xmlns:ahyp="http://schemas.microsoft.com/office/drawing/2018/hyperlinkcolor" xmlns="" val="tx"/>
+                      <ahyp:hlinkClr xmlns:ahyp="http://schemas.microsoft.com/office/drawing/2018/hyperlinkcolor" val="tx"/>
                     </a:ext>
                   </a:extLst>
                 </a:hlinkClick>
@@ -8455,7 +8423,7 @@
                 <a:hlinkClick r:id="rId10">
                   <a:extLst>
                     <a:ext uri="{A12FA001-AC4F-418D-AE19-62706E023703}">
-                      <ahyp:hlinkClr xmlns:ahyp="http://schemas.microsoft.com/office/drawing/2018/hyperlinkcolor" xmlns="" val="tx"/>
+                      <ahyp:hlinkClr xmlns:ahyp="http://schemas.microsoft.com/office/drawing/2018/hyperlinkcolor" val="tx"/>
                     </a:ext>
                   </a:extLst>
                 </a:hlinkClick>
@@ -8516,7 +8484,7 @@
                 <a:hlinkClick r:id="rId11">
                   <a:extLst>
                     <a:ext uri="{A12FA001-AC4F-418D-AE19-62706E023703}">
-                      <ahyp:hlinkClr xmlns:ahyp="http://schemas.microsoft.com/office/drawing/2018/hyperlinkcolor" xmlns="" val="tx"/>
+                      <ahyp:hlinkClr xmlns:ahyp="http://schemas.microsoft.com/office/drawing/2018/hyperlinkcolor" val="tx"/>
                     </a:ext>
                   </a:extLst>
                 </a:hlinkClick>
@@ -8639,8 +8607,8 @@
         </p:nvSpPr>
         <p:spPr>
           <a:xfrm>
-            <a:off x="454250" y="6644948"/>
-            <a:ext cx="3245100" cy="846355"/>
+            <a:off x="454250" y="6504840"/>
+            <a:ext cx="3245100" cy="977160"/>
           </a:xfrm>
           <a:prstGeom prst="rect">
             <a:avLst/>
@@ -8712,7 +8680,7 @@
                 <a:hlinkClick r:id="rId12">
                   <a:extLst>
                     <a:ext uri="{A12FA001-AC4F-418D-AE19-62706E023703}">
-                      <ahyp:hlinkClr xmlns:ahyp="http://schemas.microsoft.com/office/drawing/2018/hyperlinkcolor" xmlns="" val="tx"/>
+                      <ahyp:hlinkClr xmlns:ahyp="http://schemas.microsoft.com/office/drawing/2018/hyperlinkcolor" val="tx"/>
                     </a:ext>
                   </a:extLst>
                 </a:hlinkClick>
@@ -8760,7 +8728,7 @@
                 <a:hlinkClick r:id="rId13">
                   <a:extLst>
                     <a:ext uri="{A12FA001-AC4F-418D-AE19-62706E023703}">
-                      <ahyp:hlinkClr xmlns:ahyp="http://schemas.microsoft.com/office/drawing/2018/hyperlinkcolor" xmlns="" val="tx"/>
+                      <ahyp:hlinkClr xmlns:ahyp="http://schemas.microsoft.com/office/drawing/2018/hyperlinkcolor" val="tx"/>
                     </a:ext>
                   </a:extLst>
                 </a:hlinkClick>
@@ -8818,7 +8786,7 @@
                 <a:hlinkClick r:id="rId14">
                   <a:extLst>
                     <a:ext uri="{A12FA001-AC4F-418D-AE19-62706E023703}">
-                      <ahyp:hlinkClr xmlns:ahyp="http://schemas.microsoft.com/office/drawing/2018/hyperlinkcolor" xmlns="" val="tx"/>
+                      <ahyp:hlinkClr xmlns:ahyp="http://schemas.microsoft.com/office/drawing/2018/hyperlinkcolor" val="tx"/>
                     </a:ext>
                   </a:extLst>
                 </a:hlinkClick>
@@ -8866,7 +8834,7 @@
                 <a:hlinkClick r:id="rId15">
                   <a:extLst>
                     <a:ext uri="{A12FA001-AC4F-418D-AE19-62706E023703}">
-                      <ahyp:hlinkClr xmlns:ahyp="http://schemas.microsoft.com/office/drawing/2018/hyperlinkcolor" xmlns="" val="tx"/>
+                      <ahyp:hlinkClr xmlns:ahyp="http://schemas.microsoft.com/office/drawing/2018/hyperlinkcolor" val="tx"/>
                     </a:ext>
                   </a:extLst>
                 </a:hlinkClick>
@@ -8924,7 +8892,7 @@
                 <a:hlinkClick r:id="rId16">
                   <a:extLst>
                     <a:ext uri="{A12FA001-AC4F-418D-AE19-62706E023703}">
-                      <ahyp:hlinkClr xmlns:ahyp="http://schemas.microsoft.com/office/drawing/2018/hyperlinkcolor" xmlns="" val="tx"/>
+                      <ahyp:hlinkClr xmlns:ahyp="http://schemas.microsoft.com/office/drawing/2018/hyperlinkcolor" val="tx"/>
                     </a:ext>
                   </a:extLst>
                 </a:hlinkClick>
@@ -8972,7 +8940,7 @@
                 <a:hlinkClick r:id="rId17">
                   <a:extLst>
                     <a:ext uri="{A12FA001-AC4F-418D-AE19-62706E023703}">
-                      <ahyp:hlinkClr xmlns:ahyp="http://schemas.microsoft.com/office/drawing/2018/hyperlinkcolor" xmlns="" val="tx"/>
+                      <ahyp:hlinkClr xmlns:ahyp="http://schemas.microsoft.com/office/drawing/2018/hyperlinkcolor" val="tx"/>
                     </a:ext>
                   </a:extLst>
                 </a:hlinkClick>
@@ -9016,9 +8984,30 @@
                 <a:ea typeface="Roboto"/>
                 <a:cs typeface="Roboto"/>
                 <a:sym typeface="Roboto"/>
-                <a:hlinkClick r:id="rId18"/>
-              </a:rPr>
-              <a:t>derive_vars_cat</a:t>
+                <a:hlinkClick r:id="rId18">
+                  <a:extLst>
+                    <a:ext uri="{A12FA001-AC4F-418D-AE19-62706E023703}">
+                      <ahyp:hlinkClr xmlns:ahyp="http://schemas.microsoft.com/office/drawing/2018/hyperlinkcolor" val="tx"/>
+                    </a:ext>
+                  </a:extLst>
+                </a:hlinkClick>
+              </a:rPr>
+              <a:t>derive_</a:t>
+            </a:r>
+            <a:r>
+              <a:rPr lang="en" sz="850" b="1" dirty="0">
+                <a:solidFill>
+                  <a:schemeClr val="accent5"/>
+                </a:solidFill>
+                <a:uFill>
+                  <a:noFill/>
+                </a:uFill>
+                <a:latin typeface="Roboto"/>
+                <a:ea typeface="Roboto"/>
+                <a:cs typeface="Roboto"/>
+                <a:sym typeface="Roboto"/>
+              </a:rPr>
+              <a:t>var_extreme_flag</a:t>
             </a:r>
             <a:r>
               <a:rPr lang="en" sz="850" b="1" dirty="0">
@@ -9032,19 +9021,7 @@
                 <a:cs typeface="Roboto"/>
                 <a:sym typeface="Roboto"/>
               </a:rPr>
-              <a:t>()</a:t>
-            </a:r>
-            <a:r>
-              <a:rPr lang="en" sz="850" b="1" dirty="0">
-                <a:solidFill>
-                  <a:schemeClr val="dk1"/>
-                </a:solidFill>
-                <a:latin typeface="Roboto"/>
-                <a:ea typeface="Roboto"/>
-                <a:cs typeface="Roboto"/>
-                <a:sym typeface="Roboto"/>
-              </a:rPr>
-              <a:t> </a:t>
+              <a:t>() </a:t>
             </a:r>
             <a:r>
               <a:rPr lang="en" sz="850" b="1" dirty="0">
@@ -9058,7 +9035,96 @@
                 <a:ea typeface="Roboto"/>
                 <a:cs typeface="Roboto"/>
                 <a:sym typeface="Roboto"/>
-                <a:hlinkClick r:id="rId19"/>
+                <a:hlinkClick r:id="rId19">
+                  <a:extLst>
+                    <a:ext uri="{A12FA001-AC4F-418D-AE19-62706E023703}">
+                      <ahyp:hlinkClr xmlns:ahyp="http://schemas.microsoft.com/office/drawing/2018/hyperlinkcolor" val="tx"/>
+                    </a:ext>
+                  </a:extLst>
+                </a:hlinkClick>
+              </a:rPr>
+              <a:t>derive_vars_joined_summary</a:t>
+            </a:r>
+            <a:r>
+              <a:rPr lang="en" sz="850" b="1" dirty="0">
+                <a:solidFill>
+                  <a:schemeClr val="bg1">
+                    <a:lumMod val="50000"/>
+                  </a:schemeClr>
+                </a:solidFill>
+                <a:latin typeface="Roboto"/>
+                <a:ea typeface="Roboto"/>
+                <a:cs typeface="Roboto"/>
+                <a:sym typeface="Roboto"/>
+              </a:rPr>
+              <a:t>()</a:t>
+            </a:r>
+          </a:p>
+          <a:p>
+            <a:pPr marL="0" lvl="0" indent="0" algn="l" rtl="0">
+              <a:spcBef>
+                <a:spcPts val="0"/>
+              </a:spcBef>
+              <a:spcAft>
+                <a:spcPts val="0"/>
+              </a:spcAft>
+              <a:buNone/>
+            </a:pPr>
+            <a:r>
+              <a:rPr lang="en" sz="850" b="1" dirty="0">
+                <a:solidFill>
+                  <a:schemeClr val="accent5"/>
+                </a:solidFill>
+                <a:uFill>
+                  <a:noFill/>
+                </a:uFill>
+                <a:latin typeface="Roboto"/>
+                <a:ea typeface="Roboto"/>
+                <a:cs typeface="Roboto"/>
+                <a:sym typeface="Roboto"/>
+                <a:hlinkClick r:id="rId20"/>
+              </a:rPr>
+              <a:t>derive_vars_cat</a:t>
+            </a:r>
+            <a:r>
+              <a:rPr lang="en" sz="850" b="1" dirty="0">
+                <a:solidFill>
+                  <a:schemeClr val="bg1">
+                    <a:lumMod val="50000"/>
+                  </a:schemeClr>
+                </a:solidFill>
+                <a:latin typeface="Roboto"/>
+                <a:ea typeface="Roboto"/>
+                <a:cs typeface="Roboto"/>
+                <a:sym typeface="Roboto"/>
+              </a:rPr>
+              <a:t>()</a:t>
+            </a:r>
+            <a:r>
+              <a:rPr lang="en" sz="850" b="1" dirty="0">
+                <a:solidFill>
+                  <a:schemeClr val="dk1"/>
+                </a:solidFill>
+                <a:latin typeface="Roboto"/>
+                <a:ea typeface="Roboto"/>
+                <a:cs typeface="Roboto"/>
+                <a:sym typeface="Roboto"/>
+              </a:rPr>
+              <a:t> </a:t>
+            </a:r>
+            <a:r>
+              <a:rPr lang="en" sz="850" b="1" dirty="0">
+                <a:solidFill>
+                  <a:schemeClr val="accent5"/>
+                </a:solidFill>
+                <a:uFill>
+                  <a:noFill/>
+                </a:uFill>
+                <a:latin typeface="Roboto"/>
+                <a:ea typeface="Roboto"/>
+                <a:cs typeface="Roboto"/>
+                <a:sym typeface="Roboto"/>
+                <a:hlinkClick r:id="rId21"/>
               </a:rPr>
               <a:t>derive_vars_crit_flag</a:t>
             </a:r>
@@ -9086,7 +9152,7 @@
           <p:nvPr/>
         </p:nvPicPr>
         <p:blipFill>
-          <a:blip r:embed="rId20">
+          <a:blip r:embed="rId22">
             <a:alphaModFix/>
           </a:blip>
           <a:stretch>
@@ -9114,7 +9180,7 @@
           <p:nvPr/>
         </p:nvPicPr>
         <p:blipFill>
-          <a:blip r:embed="rId21">
+          <a:blip r:embed="rId23">
             <a:alphaModFix/>
           </a:blip>
           <a:stretch>
@@ -9142,7 +9208,7 @@
           <p:nvPr/>
         </p:nvPicPr>
         <p:blipFill>
-          <a:blip r:embed="rId22">
+          <a:blip r:embed="rId24">
             <a:alphaModFix/>
           </a:blip>
           <a:stretch>
@@ -9215,7 +9281,7 @@
                 <a:ea typeface="Roboto"/>
                 <a:cs typeface="Roboto"/>
                 <a:sym typeface="Roboto"/>
-                <a:hlinkClick r:id="rId23"/>
+                <a:hlinkClick r:id="rId25"/>
               </a:rPr>
               <a:t>Github Repo</a:t>
             </a:r>
@@ -9237,7 +9303,7 @@
                 <a:ea typeface="Roboto"/>
                 <a:cs typeface="Roboto"/>
                 <a:sym typeface="Roboto"/>
-                <a:hlinkClick r:id="rId24"/>
+                <a:hlinkClick r:id="rId26"/>
               </a:rPr>
               <a:t>Documentation</a:t>
             </a:r>
@@ -9259,7 +9325,7 @@
                 <a:ea typeface="Roboto"/>
                 <a:cs typeface="Roboto"/>
                 <a:sym typeface="Roboto"/>
-                <a:hlinkClick r:id="rId25"/>
+                <a:hlinkClick r:id="rId27"/>
               </a:rPr>
               <a:t>Join the Pharmaverse Slack</a:t>
             </a:r>
@@ -9288,7 +9354,7 @@
           <p:nvPr/>
         </p:nvPicPr>
         <p:blipFill>
-          <a:blip r:embed="rId26">
+          <a:blip r:embed="rId28">
             <a:alphaModFix/>
           </a:blip>
           <a:stretch>
@@ -9297,7 +9363,7 @@
         </p:blipFill>
         <p:spPr>
           <a:xfrm>
-            <a:off x="354550" y="4944100"/>
+            <a:off x="354550" y="4803992"/>
             <a:ext cx="708750" cy="1609599"/>
           </a:xfrm>
           <a:prstGeom prst="rect">
@@ -9507,10 +9573,10 @@
                 <a:ea typeface="Roboto"/>
                 <a:cs typeface="Roboto"/>
                 <a:sym typeface="Roboto"/>
-                <a:hlinkClick r:id="rId27">
+                <a:hlinkClick r:id="rId29">
                   <a:extLst>
                     <a:ext uri="{A12FA001-AC4F-418D-AE19-62706E023703}">
-                      <ahyp:hlinkClr xmlns:ahyp="http://schemas.microsoft.com/office/drawing/2018/hyperlinkcolor" xmlns="" val="tx"/>
+                      <ahyp:hlinkClr xmlns:ahyp="http://schemas.microsoft.com/office/drawing/2018/hyperlinkcolor" val="tx"/>
                     </a:ext>
                   </a:extLst>
                 </a:hlinkClick>
@@ -9736,10 +9802,10 @@
                 <a:ea typeface="Roboto"/>
                 <a:cs typeface="Roboto"/>
                 <a:sym typeface="Roboto"/>
-                <a:hlinkClick r:id="rId28">
+                <a:hlinkClick r:id="rId30">
                   <a:extLst>
                     <a:ext uri="{A12FA001-AC4F-418D-AE19-62706E023703}">
-                      <ahyp:hlinkClr xmlns:ahyp="http://schemas.microsoft.com/office/drawing/2018/hyperlinkcolor" xmlns="" val="tx"/>
+                      <ahyp:hlinkClr xmlns:ahyp="http://schemas.microsoft.com/office/drawing/2018/hyperlinkcolor" val="tx"/>
                     </a:ext>
                   </a:extLst>
                 </a:hlinkClick>
@@ -10056,10 +10122,10 @@
                 <a:ea typeface="Roboto"/>
                 <a:cs typeface="Roboto"/>
                 <a:sym typeface="Roboto"/>
-                <a:hlinkClick r:id="rId29">
+                <a:hlinkClick r:id="rId31">
                   <a:extLst>
                     <a:ext uri="{A12FA001-AC4F-418D-AE19-62706E023703}">
-                      <ahyp:hlinkClr xmlns:ahyp="http://schemas.microsoft.com/office/drawing/2018/hyperlinkcolor" xmlns="" val="tx"/>
+                      <ahyp:hlinkClr xmlns:ahyp="http://schemas.microsoft.com/office/drawing/2018/hyperlinkcolor" val="tx"/>
                     </a:ext>
                   </a:extLst>
                 </a:hlinkClick>
@@ -10398,10 +10464,10 @@
                 <a:ea typeface="Roboto"/>
                 <a:cs typeface="Roboto"/>
                 <a:sym typeface="Roboto"/>
-                <a:hlinkClick r:id="rId30">
+                <a:hlinkClick r:id="rId32">
                   <a:extLst>
                     <a:ext uri="{A12FA001-AC4F-418D-AE19-62706E023703}">
-                      <ahyp:hlinkClr xmlns:ahyp="http://schemas.microsoft.com/office/drawing/2018/hyperlinkcolor" xmlns="" val="tx"/>
+                      <ahyp:hlinkClr xmlns:ahyp="http://schemas.microsoft.com/office/drawing/2018/hyperlinkcolor" val="tx"/>
                     </a:ext>
                   </a:extLst>
                 </a:hlinkClick>
@@ -10661,7 +10727,7 @@
           <p:nvPr/>
         </p:nvPicPr>
         <p:blipFill>
-          <a:blip r:embed="rId31">
+          <a:blip r:embed="rId33">
             <a:alphaModFix/>
           </a:blip>
           <a:stretch>
@@ -10717,7 +10783,7 @@
               <a:buNone/>
             </a:pPr>
             <a:r>
-              <a:rPr lang="en">
+              <a:rPr lang="en" dirty="0">
                 <a:solidFill>
                   <a:srgbClr val="FF0000"/>
                 </a:solidFill>
@@ -10728,7 +10794,7 @@
               </a:rPr>
               <a:t>Computation Functions for Vectors</a:t>
             </a:r>
-            <a:endParaRPr>
+            <a:endParaRPr dirty="0">
               <a:solidFill>
                 <a:srgbClr val="FF0000"/>
               </a:solidFill>
@@ -10748,7 +10814,7 @@
               </a:spcAft>
               <a:buNone/>
             </a:pPr>
-            <a:endParaRPr sz="1200">
+            <a:endParaRPr sz="1200" dirty="0">
               <a:solidFill>
                 <a:schemeClr val="dk1"/>
               </a:solidFill>
@@ -10768,7 +10834,7 @@
               </a:spcAft>
               <a:buNone/>
             </a:pPr>
-            <a:endParaRPr sz="1200" b="1">
+            <a:endParaRPr sz="1200" b="1" dirty="0">
               <a:solidFill>
                 <a:schemeClr val="dk1"/>
               </a:solidFill>
@@ -10815,7 +10881,7 @@
               <a:buNone/>
             </a:pPr>
             <a:r>
-              <a:rPr lang="en" sz="900" b="1">
+              <a:rPr lang="en" sz="900" b="1" dirty="0">
                 <a:solidFill>
                   <a:srgbClr val="FF0000"/>
                 </a:solidFill>
@@ -10826,7 +10892,7 @@
               </a:rPr>
               <a:t>These functions do what their names suggest and can be  used inside dplyr:: mutate() or other {admiral} functions.</a:t>
             </a:r>
-            <a:endParaRPr sz="900" b="1" i="1">
+            <a:endParaRPr sz="900" b="1" i="1" dirty="0">
               <a:solidFill>
                 <a:srgbClr val="FF0000"/>
               </a:solidFill>
@@ -10884,10 +10950,10 @@
                 <a:ea typeface="Roboto"/>
                 <a:cs typeface="Roboto"/>
                 <a:sym typeface="Roboto"/>
-                <a:hlinkClick r:id="rId32">
+                <a:hlinkClick r:id="rId34">
                   <a:extLst>
                     <a:ext uri="{A12FA001-AC4F-418D-AE19-62706E023703}">
-                      <ahyp:hlinkClr xmlns:ahyp="http://schemas.microsoft.com/office/drawing/2018/hyperlinkcolor" xmlns="" val="tx"/>
+                      <ahyp:hlinkClr xmlns:ahyp="http://schemas.microsoft.com/office/drawing/2018/hyperlinkcolor" val="tx"/>
                     </a:ext>
                   </a:extLst>
                 </a:hlinkClick>
@@ -10942,10 +11008,10 @@
                 <a:ea typeface="Roboto"/>
                 <a:cs typeface="Roboto"/>
                 <a:sym typeface="Roboto"/>
-                <a:hlinkClick r:id="rId33">
+                <a:hlinkClick r:id="rId35">
                   <a:extLst>
                     <a:ext uri="{A12FA001-AC4F-418D-AE19-62706E023703}">
-                      <ahyp:hlinkClr xmlns:ahyp="http://schemas.microsoft.com/office/drawing/2018/hyperlinkcolor" xmlns="" val="tx"/>
+                      <ahyp:hlinkClr xmlns:ahyp="http://schemas.microsoft.com/office/drawing/2018/hyperlinkcolor" val="tx"/>
                     </a:ext>
                   </a:extLst>
                 </a:hlinkClick>
@@ -11000,10 +11066,10 @@
                 <a:ea typeface="Roboto"/>
                 <a:cs typeface="Roboto"/>
                 <a:sym typeface="Roboto"/>
-                <a:hlinkClick r:id="rId34">
+                <a:hlinkClick r:id="rId36">
                   <a:extLst>
                     <a:ext uri="{A12FA001-AC4F-418D-AE19-62706E023703}">
-                      <ahyp:hlinkClr xmlns:ahyp="http://schemas.microsoft.com/office/drawing/2018/hyperlinkcolor" xmlns="" val="tx"/>
+                      <ahyp:hlinkClr xmlns:ahyp="http://schemas.microsoft.com/office/drawing/2018/hyperlinkcolor" val="tx"/>
                     </a:ext>
                   </a:extLst>
                 </a:hlinkClick>
@@ -11058,10 +11124,10 @@
                 <a:ea typeface="Roboto"/>
                 <a:cs typeface="Roboto"/>
                 <a:sym typeface="Roboto"/>
-                <a:hlinkClick r:id="rId35">
+                <a:hlinkClick r:id="rId37">
                   <a:extLst>
                     <a:ext uri="{A12FA001-AC4F-418D-AE19-62706E023703}">
-                      <ahyp:hlinkClr xmlns:ahyp="http://schemas.microsoft.com/office/drawing/2018/hyperlinkcolor" xmlns="" val="tx"/>
+                      <ahyp:hlinkClr xmlns:ahyp="http://schemas.microsoft.com/office/drawing/2018/hyperlinkcolor" val="tx"/>
                     </a:ext>
                   </a:extLst>
                 </a:hlinkClick>
@@ -11105,7 +11171,7 @@
                 <a:ea typeface="Roboto"/>
                 <a:cs typeface="Roboto"/>
                 <a:sym typeface="Roboto"/>
-                <a:hlinkClick r:id="rId36"/>
+                <a:hlinkClick r:id="rId38"/>
               </a:rPr>
               <a:t>compute_scale</a:t>
             </a:r>
@@ -11212,10 +11278,10 @@
                 <a:ea typeface="Roboto"/>
                 <a:cs typeface="Roboto"/>
                 <a:sym typeface="Roboto"/>
-                <a:hlinkClick r:id="rId37">
+                <a:hlinkClick r:id="rId39">
                   <a:extLst>
                     <a:ext uri="{A12FA001-AC4F-418D-AE19-62706E023703}">
-                      <ahyp:hlinkClr xmlns:ahyp="http://schemas.microsoft.com/office/drawing/2018/hyperlinkcolor" xmlns="" val="tx"/>
+                      <ahyp:hlinkClr xmlns:ahyp="http://schemas.microsoft.com/office/drawing/2018/hyperlinkcolor" val="tx"/>
                     </a:ext>
                   </a:extLst>
                 </a:hlinkClick>
@@ -11249,10 +11315,10 @@
               <a:ea typeface="Roboto"/>
               <a:cs typeface="Roboto"/>
               <a:sym typeface="Roboto"/>
-              <a:hlinkClick r:id="rId38">
+              <a:hlinkClick r:id="rId40">
                 <a:extLst>
                   <a:ext uri="{A12FA001-AC4F-418D-AE19-62706E023703}">
-                    <ahyp:hlinkClr xmlns:ahyp="http://schemas.microsoft.com/office/drawing/2018/hyperlinkcolor" xmlns="" val="tx"/>
+                    <ahyp:hlinkClr xmlns:ahyp="http://schemas.microsoft.com/office/drawing/2018/hyperlinkcolor" val="tx"/>
                   </a:ext>
                 </a:extLst>
               </a:hlinkClick>
@@ -11280,10 +11346,10 @@
                 <a:ea typeface="Roboto"/>
                 <a:cs typeface="Roboto"/>
                 <a:sym typeface="Roboto"/>
-                <a:hlinkClick r:id="rId38">
+                <a:hlinkClick r:id="rId40">
                   <a:extLst>
                     <a:ext uri="{A12FA001-AC4F-418D-AE19-62706E023703}">
-                      <ahyp:hlinkClr xmlns:ahyp="http://schemas.microsoft.com/office/drawing/2018/hyperlinkcolor" xmlns="" val="tx"/>
+                      <ahyp:hlinkClr xmlns:ahyp="http://schemas.microsoft.com/office/drawing/2018/hyperlinkcolor" val="tx"/>
                     </a:ext>
                   </a:extLst>
                 </a:hlinkClick>
@@ -11302,10 +11368,10 @@
                 <a:ea typeface="Roboto"/>
                 <a:cs typeface="Roboto"/>
                 <a:sym typeface="Roboto"/>
-                <a:hlinkClick r:id="rId38">
+                <a:hlinkClick r:id="rId40">
                   <a:extLst>
                     <a:ext uri="{A12FA001-AC4F-418D-AE19-62706E023703}">
-                      <ahyp:hlinkClr xmlns:ahyp="http://schemas.microsoft.com/office/drawing/2018/hyperlinkcolor" xmlns="" val="tx"/>
+                      <ahyp:hlinkClr xmlns:ahyp="http://schemas.microsoft.com/office/drawing/2018/hyperlinkcolor" val="tx"/>
                     </a:ext>
                   </a:extLst>
                 </a:hlinkClick>
@@ -11326,10 +11392,10 @@
                 <a:ea typeface="Roboto"/>
                 <a:cs typeface="Roboto"/>
                 <a:sym typeface="Roboto"/>
-                <a:hlinkClick r:id="rId39">
+                <a:hlinkClick r:id="rId41">
                   <a:extLst>
                     <a:ext uri="{A12FA001-AC4F-418D-AE19-62706E023703}">
-                      <ahyp:hlinkClr xmlns:ahyp="http://schemas.microsoft.com/office/drawing/2018/hyperlinkcolor" xmlns="" val="tx"/>
+                      <ahyp:hlinkClr xmlns:ahyp="http://schemas.microsoft.com/office/drawing/2018/hyperlinkcolor" val="tx"/>
                     </a:ext>
                   </a:extLst>
                 </a:hlinkClick>
@@ -11359,10 +11425,10 @@
                 <a:ea typeface="Roboto"/>
                 <a:cs typeface="Roboto"/>
                 <a:sym typeface="Roboto"/>
-                <a:hlinkClick r:id="rId39">
+                <a:hlinkClick r:id="rId41">
                   <a:extLst>
                     <a:ext uri="{A12FA001-AC4F-418D-AE19-62706E023703}">
-                      <ahyp:hlinkClr xmlns:ahyp="http://schemas.microsoft.com/office/drawing/2018/hyperlinkcolor" xmlns="" val="tx"/>
+                      <ahyp:hlinkClr xmlns:ahyp="http://schemas.microsoft.com/office/drawing/2018/hyperlinkcolor" val="tx"/>
                     </a:ext>
                   </a:extLst>
                 </a:hlinkClick>
@@ -11417,10 +11483,10 @@
                 <a:ea typeface="Roboto"/>
                 <a:cs typeface="Roboto"/>
                 <a:sym typeface="Roboto"/>
-                <a:hlinkClick r:id="rId40">
+                <a:hlinkClick r:id="rId42">
                   <a:extLst>
                     <a:ext uri="{A12FA001-AC4F-418D-AE19-62706E023703}">
-                      <ahyp:hlinkClr xmlns:ahyp="http://schemas.microsoft.com/office/drawing/2018/hyperlinkcolor" xmlns="" val="tx"/>
+                      <ahyp:hlinkClr xmlns:ahyp="http://schemas.microsoft.com/office/drawing/2018/hyperlinkcolor" val="tx"/>
                     </a:ext>
                   </a:extLst>
                 </a:hlinkClick>
@@ -11547,7 +11613,7 @@
                 <a:ea typeface="Roboto"/>
                 <a:cs typeface="Roboto"/>
                 <a:sym typeface="Roboto"/>
-                <a:hlinkClick r:id="rId41"/>
+                <a:hlinkClick r:id="rId43"/>
               </a:rPr>
               <a:t>reference page</a:t>
             </a:r>
@@ -11961,7 +12027,7 @@
                 <a:hlinkClick r:id="rId4">
                   <a:extLst>
                     <a:ext uri="{A12FA001-AC4F-418D-AE19-62706E023703}">
-                      <ahyp:hlinkClr xmlns:ahyp="http://schemas.microsoft.com/office/drawing/2018/hyperlinkcolor" xmlns="" val="tx"/>
+                      <ahyp:hlinkClr xmlns:ahyp="http://schemas.microsoft.com/office/drawing/2018/hyperlinkcolor" val="tx"/>
                     </a:ext>
                   </a:extLst>
                 </a:hlinkClick>
@@ -12305,7 +12371,7 @@
                 <a:hlinkClick r:id="rId5">
                   <a:extLst>
                     <a:ext uri="{A12FA001-AC4F-418D-AE19-62706E023703}">
-                      <ahyp:hlinkClr xmlns:ahyp="http://schemas.microsoft.com/office/drawing/2018/hyperlinkcolor" xmlns="" val="tx"/>
+                      <ahyp:hlinkClr xmlns:ahyp="http://schemas.microsoft.com/office/drawing/2018/hyperlinkcolor" val="tx"/>
                     </a:ext>
                   </a:extLst>
                 </a:hlinkClick>
@@ -12737,7 +12803,7 @@
                 <a:hlinkClick r:id="rId8">
                   <a:extLst>
                     <a:ext uri="{A12FA001-AC4F-418D-AE19-62706E023703}">
-                      <ahyp:hlinkClr xmlns:ahyp="http://schemas.microsoft.com/office/drawing/2018/hyperlinkcolor" xmlns="" val="tx"/>
+                      <ahyp:hlinkClr xmlns:ahyp="http://schemas.microsoft.com/office/drawing/2018/hyperlinkcolor" val="tx"/>
                     </a:ext>
                   </a:extLst>
                 </a:hlinkClick>
@@ -13191,7 +13257,7 @@
                 <a:hlinkClick r:id="rId9">
                   <a:extLst>
                     <a:ext uri="{A12FA001-AC4F-418D-AE19-62706E023703}">
-                      <ahyp:hlinkClr xmlns:ahyp="http://schemas.microsoft.com/office/drawing/2018/hyperlinkcolor" xmlns="" val="tx"/>
+                      <ahyp:hlinkClr xmlns:ahyp="http://schemas.microsoft.com/office/drawing/2018/hyperlinkcolor" val="tx"/>
                     </a:ext>
                   </a:extLst>
                 </a:hlinkClick>
@@ -13343,7 +13409,7 @@
                 <a:hlinkClick r:id="rId10">
                   <a:extLst>
                     <a:ext uri="{A12FA001-AC4F-418D-AE19-62706E023703}">
-                      <ahyp:hlinkClr xmlns:ahyp="http://schemas.microsoft.com/office/drawing/2018/hyperlinkcolor" xmlns="" val="tx"/>
+                      <ahyp:hlinkClr xmlns:ahyp="http://schemas.microsoft.com/office/drawing/2018/hyperlinkcolor" val="tx"/>
                     </a:ext>
                   </a:extLst>
                 </a:hlinkClick>
@@ -13499,7 +13565,7 @@
                 <a:hlinkClick r:id="rId11">
                   <a:extLst>
                     <a:ext uri="{A12FA001-AC4F-418D-AE19-62706E023703}">
-                      <ahyp:hlinkClr xmlns:ahyp="http://schemas.microsoft.com/office/drawing/2018/hyperlinkcolor" xmlns="" val="tx"/>
+                      <ahyp:hlinkClr xmlns:ahyp="http://schemas.microsoft.com/office/drawing/2018/hyperlinkcolor" val="tx"/>
                     </a:ext>
                   </a:extLst>
                 </a:hlinkClick>
@@ -13687,7 +13753,7 @@
                 <a:hlinkClick r:id="rId13">
                   <a:extLst>
                     <a:ext uri="{A12FA001-AC4F-418D-AE19-62706E023703}">
-                      <ahyp:hlinkClr xmlns:ahyp="http://schemas.microsoft.com/office/drawing/2018/hyperlinkcolor" xmlns="" val="tx"/>
+                      <ahyp:hlinkClr xmlns:ahyp="http://schemas.microsoft.com/office/drawing/2018/hyperlinkcolor" val="tx"/>
                     </a:ext>
                   </a:extLst>
                 </a:hlinkClick>
@@ -13987,7 +14053,7 @@
                 <a:hlinkClick r:id="rId14">
                   <a:extLst>
                     <a:ext uri="{A12FA001-AC4F-418D-AE19-62706E023703}">
-                      <ahyp:hlinkClr xmlns:ahyp="http://schemas.microsoft.com/office/drawing/2018/hyperlinkcolor" xmlns="" val="tx"/>
+                      <ahyp:hlinkClr xmlns:ahyp="http://schemas.microsoft.com/office/drawing/2018/hyperlinkcolor" val="tx"/>
                     </a:ext>
                   </a:extLst>
                 </a:hlinkClick>
@@ -14397,7 +14463,7 @@
                 <a:hlinkClick r:id="rId18">
                   <a:extLst>
                     <a:ext uri="{A12FA001-AC4F-418D-AE19-62706E023703}">
-                      <ahyp:hlinkClr xmlns:ahyp="http://schemas.microsoft.com/office/drawing/2018/hyperlinkcolor" xmlns="" val="tx"/>
+                      <ahyp:hlinkClr xmlns:ahyp="http://schemas.microsoft.com/office/drawing/2018/hyperlinkcolor" val="tx"/>
                     </a:ext>
                   </a:extLst>
                 </a:hlinkClick>
@@ -14529,7 +14595,7 @@
                 <a:hlinkClick r:id="rId19">
                   <a:extLst>
                     <a:ext uri="{A12FA001-AC4F-418D-AE19-62706E023703}">
-                      <ahyp:hlinkClr xmlns:ahyp="http://schemas.microsoft.com/office/drawing/2018/hyperlinkcolor" xmlns="" val="tx"/>
+                      <ahyp:hlinkClr xmlns:ahyp="http://schemas.microsoft.com/office/drawing/2018/hyperlinkcolor" val="tx"/>
                     </a:ext>
                   </a:extLst>
                 </a:hlinkClick>
@@ -14653,7 +14719,7 @@
                 <a:hlinkClick r:id="rId20">
                   <a:extLst>
                     <a:ext uri="{A12FA001-AC4F-418D-AE19-62706E023703}">
-                      <ahyp:hlinkClr xmlns:ahyp="http://schemas.microsoft.com/office/drawing/2018/hyperlinkcolor" xmlns="" val="tx"/>
+                      <ahyp:hlinkClr xmlns:ahyp="http://schemas.microsoft.com/office/drawing/2018/hyperlinkcolor" val="tx"/>
                     </a:ext>
                   </a:extLst>
                 </a:hlinkClick>
@@ -14745,7 +14811,7 @@
                 <a:hlinkClick r:id="rId21">
                   <a:extLst>
                     <a:ext uri="{A12FA001-AC4F-418D-AE19-62706E023703}">
-                      <ahyp:hlinkClr xmlns:ahyp="http://schemas.microsoft.com/office/drawing/2018/hyperlinkcolor" xmlns="" val="tx"/>
+                      <ahyp:hlinkClr xmlns:ahyp="http://schemas.microsoft.com/office/drawing/2018/hyperlinkcolor" val="tx"/>
                     </a:ext>
                   </a:extLst>
                 </a:hlinkClick>
@@ -14872,7 +14938,7 @@
                 <a:hlinkClick r:id="rId22">
                   <a:extLst>
                     <a:ext uri="{A12FA001-AC4F-418D-AE19-62706E023703}">
-                      <ahyp:hlinkClr xmlns:ahyp="http://schemas.microsoft.com/office/drawing/2018/hyperlinkcolor" xmlns="" val="tx"/>
+                      <ahyp:hlinkClr xmlns:ahyp="http://schemas.microsoft.com/office/drawing/2018/hyperlinkcolor" val="tx"/>
                     </a:ext>
                   </a:extLst>
                 </a:hlinkClick>
@@ -14984,7 +15050,7 @@
                 <a:hlinkClick r:id="rId23">
                   <a:extLst>
                     <a:ext uri="{A12FA001-AC4F-418D-AE19-62706E023703}">
-                      <ahyp:hlinkClr xmlns:ahyp="http://schemas.microsoft.com/office/drawing/2018/hyperlinkcolor" xmlns="" val="tx"/>
+                      <ahyp:hlinkClr xmlns:ahyp="http://schemas.microsoft.com/office/drawing/2018/hyperlinkcolor" val="tx"/>
                     </a:ext>
                   </a:extLst>
                 </a:hlinkClick>
@@ -15206,7 +15272,7 @@
                 <a:hlinkClick r:id="rId24">
                   <a:extLst>
                     <a:ext uri="{A12FA001-AC4F-418D-AE19-62706E023703}">
-                      <ahyp:hlinkClr xmlns:ahyp="http://schemas.microsoft.com/office/drawing/2018/hyperlinkcolor" xmlns="" val="tx"/>
+                      <ahyp:hlinkClr xmlns:ahyp="http://schemas.microsoft.com/office/drawing/2018/hyperlinkcolor" val="tx"/>
                     </a:ext>
                   </a:extLst>
                 </a:hlinkClick>
@@ -15350,7 +15416,7 @@
                 <a:hlinkClick r:id="rId25">
                   <a:extLst>
                     <a:ext uri="{A12FA001-AC4F-418D-AE19-62706E023703}">
-                      <ahyp:hlinkClr xmlns:ahyp="http://schemas.microsoft.com/office/drawing/2018/hyperlinkcolor" xmlns="" val="tx"/>
+                      <ahyp:hlinkClr xmlns:ahyp="http://schemas.microsoft.com/office/drawing/2018/hyperlinkcolor" val="tx"/>
                     </a:ext>
                   </a:extLst>
                 </a:hlinkClick>
@@ -15474,7 +15540,7 @@
                 <a:hlinkClick r:id="rId26">
                   <a:extLst>
                     <a:ext uri="{A12FA001-AC4F-418D-AE19-62706E023703}">
-                      <ahyp:hlinkClr xmlns:ahyp="http://schemas.microsoft.com/office/drawing/2018/hyperlinkcolor" xmlns="" val="tx"/>
+                      <ahyp:hlinkClr xmlns:ahyp="http://schemas.microsoft.com/office/drawing/2018/hyperlinkcolor" val="tx"/>
                     </a:ext>
                   </a:extLst>
                 </a:hlinkClick>
@@ -15586,7 +15652,7 @@
                 <a:hlinkClick r:id="rId27">
                   <a:extLst>
                     <a:ext uri="{A12FA001-AC4F-418D-AE19-62706E023703}">
-                      <ahyp:hlinkClr xmlns:ahyp="http://schemas.microsoft.com/office/drawing/2018/hyperlinkcolor" xmlns="" val="tx"/>
+                      <ahyp:hlinkClr xmlns:ahyp="http://schemas.microsoft.com/office/drawing/2018/hyperlinkcolor" val="tx"/>
                     </a:ext>
                   </a:extLst>
                 </a:hlinkClick>
@@ -15698,7 +15764,7 @@
                 <a:hlinkClick r:id="rId28">
                   <a:extLst>
                     <a:ext uri="{A12FA001-AC4F-418D-AE19-62706E023703}">
-                      <ahyp:hlinkClr xmlns:ahyp="http://schemas.microsoft.com/office/drawing/2018/hyperlinkcolor" xmlns="" val="tx"/>
+                      <ahyp:hlinkClr xmlns:ahyp="http://schemas.microsoft.com/office/drawing/2018/hyperlinkcolor" val="tx"/>
                     </a:ext>
                   </a:extLst>
                 </a:hlinkClick>
@@ -15953,8 +16019,8 @@
         </p:nvSpPr>
         <p:spPr>
           <a:xfrm>
-            <a:off x="3695350" y="7232044"/>
-            <a:ext cx="3209700" cy="317100"/>
+            <a:off x="3695350" y="7246458"/>
+            <a:ext cx="3209700" cy="288273"/>
           </a:xfrm>
           <a:prstGeom prst="rect">
             <a:avLst/>
@@ -16112,7 +16178,7 @@
                 <a:hlinkClick r:id="rId33">
                   <a:extLst>
                     <a:ext uri="{A12FA001-AC4F-418D-AE19-62706E023703}">
-                      <ahyp:hlinkClr xmlns:ahyp="http://schemas.microsoft.com/office/drawing/2018/hyperlinkcolor" xmlns="" val="tx"/>
+                      <ahyp:hlinkClr xmlns:ahyp="http://schemas.microsoft.com/office/drawing/2018/hyperlinkcolor" val="tx"/>
                     </a:ext>
                   </a:extLst>
                 </a:hlinkClick>
@@ -16238,7 +16304,7 @@
                 <a:hlinkClick r:id="rId34">
                   <a:extLst>
                     <a:ext uri="{A12FA001-AC4F-418D-AE19-62706E023703}">
-                      <ahyp:hlinkClr xmlns:ahyp="http://schemas.microsoft.com/office/drawing/2018/hyperlinkcolor" xmlns="" val="tx"/>
+                      <ahyp:hlinkClr xmlns:ahyp="http://schemas.microsoft.com/office/drawing/2018/hyperlinkcolor" val="tx"/>
                     </a:ext>
                   </a:extLst>
                 </a:hlinkClick>
@@ -16350,7 +16416,7 @@
                 <a:hlinkClick r:id="rId35">
                   <a:extLst>
                     <a:ext uri="{A12FA001-AC4F-418D-AE19-62706E023703}">
-                      <ahyp:hlinkClr xmlns:ahyp="http://schemas.microsoft.com/office/drawing/2018/hyperlinkcolor" xmlns="" val="tx"/>
+                      <ahyp:hlinkClr xmlns:ahyp="http://schemas.microsoft.com/office/drawing/2018/hyperlinkcolor" val="tx"/>
                     </a:ext>
                   </a:extLst>
                 </a:hlinkClick>
@@ -16958,19 +17024,7 @@
                 <a:cs typeface="Roboto"/>
                 <a:sym typeface="Roboto"/>
               </a:rPr>
-              <a:t>Derive criterion flag variables (CRITy, </a:t>
-            </a:r>
-            <a:r>
-              <a:rPr lang="en" sz="900" dirty="0" smtClean="0">
-                <a:solidFill>
-                  <a:schemeClr val="dk1"/>
-                </a:solidFill>
-                <a:latin typeface="Roboto"/>
-                <a:ea typeface="Roboto"/>
-                <a:cs typeface="Roboto"/>
-                <a:sym typeface="Roboto"/>
-              </a:rPr>
-              <a:t>CRITyF(L/N)).</a:t>
+              <a:t>Derive criterion flag variables (CRITy, CRITyF(L/N)).</a:t>
             </a:r>
             <a:endParaRPr sz="900" dirty="0">
               <a:solidFill>

</xml_diff>

<commit_message>
#2848 update text box for derive_vars_duration()
</commit_message>
<xml_diff>
--- a/inst/cheatsheet/admiral_cheatsheet.pptx
+++ b/inst/cheatsheet/admiral_cheatsheet.pptx
@@ -10051,348 +10051,6 @@
       </p:sp>
       <p:sp>
         <p:nvSpPr>
-          <p:cNvPr id="78" name="Google Shape;78;p13"/>
-          <p:cNvSpPr txBox="1"/>
-          <p:nvPr/>
-        </p:nvSpPr>
-        <p:spPr>
-          <a:xfrm>
-            <a:off x="7222450" y="4416197"/>
-            <a:ext cx="3209700" cy="1413600"/>
-          </a:xfrm>
-          <a:prstGeom prst="rect">
-            <a:avLst/>
-          </a:prstGeom>
-          <a:noFill/>
-          <a:ln>
-            <a:noFill/>
-          </a:ln>
-        </p:spPr>
-        <p:txBody>
-          <a:bodyPr spcFirstLastPara="1" wrap="square" lIns="91425" tIns="91425" rIns="91425" bIns="91425" anchor="t" anchorCtr="0">
-            <a:noAutofit/>
-          </a:bodyPr>
-          <a:lstStyle/>
-          <a:p>
-            <a:pPr marL="0" lvl="0" indent="0" algn="l" rtl="0">
-              <a:spcBef>
-                <a:spcPts val="0"/>
-              </a:spcBef>
-              <a:spcAft>
-                <a:spcPts val="0"/>
-              </a:spcAft>
-              <a:buNone/>
-            </a:pPr>
-            <a:r>
-              <a:rPr lang="en" sz="900" b="1" dirty="0">
-                <a:solidFill>
-                  <a:schemeClr val="accent5"/>
-                </a:solidFill>
-                <a:uFill>
-                  <a:noFill/>
-                </a:uFill>
-                <a:latin typeface="Roboto"/>
-                <a:ea typeface="Roboto"/>
-                <a:cs typeface="Roboto"/>
-                <a:sym typeface="Roboto"/>
-                <a:hlinkClick r:id="rId31">
-                  <a:extLst>
-                    <a:ext uri="{A12FA001-AC4F-418D-AE19-62706E023703}">
-                      <ahyp:hlinkClr xmlns:ahyp="http://schemas.microsoft.com/office/drawing/2018/hyperlinkcolor" val="tx"/>
-                    </a:ext>
-                  </a:extLst>
-                </a:hlinkClick>
-              </a:rPr>
-              <a:t>derive_vars_duration</a:t>
-            </a:r>
-            <a:r>
-              <a:rPr lang="en" sz="900" dirty="0">
-                <a:solidFill>
-                  <a:srgbClr val="9E9E9E"/>
-                </a:solidFill>
-                <a:latin typeface="Roboto"/>
-                <a:ea typeface="Roboto"/>
-                <a:cs typeface="Roboto"/>
-                <a:sym typeface="Roboto"/>
-              </a:rPr>
-              <a:t>(dataset,</a:t>
-            </a:r>
-            <a:r>
-              <a:rPr lang="en" sz="900" b="1" dirty="0">
-                <a:solidFill>
-                  <a:srgbClr val="9E9E9E"/>
-                </a:solidFill>
-                <a:latin typeface="Roboto"/>
-                <a:ea typeface="Roboto"/>
-                <a:cs typeface="Roboto"/>
-                <a:sym typeface="Roboto"/>
-              </a:rPr>
-              <a:t> </a:t>
-            </a:r>
-            <a:r>
-              <a:rPr lang="en" sz="900" dirty="0">
-                <a:solidFill>
-                  <a:srgbClr val="9E9E9E"/>
-                </a:solidFill>
-                <a:latin typeface="Roboto"/>
-                <a:ea typeface="Roboto"/>
-                <a:cs typeface="Roboto"/>
-                <a:sym typeface="Roboto"/>
-              </a:rPr>
-              <a:t>new_var, new_var_unit,  start_date, end_date)</a:t>
-            </a:r>
-            <a:r>
-              <a:rPr lang="en" sz="900" dirty="0">
-                <a:solidFill>
-                  <a:schemeClr val="dk1"/>
-                </a:solidFill>
-                <a:latin typeface="Roboto"/>
-                <a:ea typeface="Roboto"/>
-                <a:cs typeface="Roboto"/>
-                <a:sym typeface="Roboto"/>
-              </a:rPr>
-              <a:t>.</a:t>
-            </a:r>
-            <a:endParaRPr sz="900" dirty="0">
-              <a:solidFill>
-                <a:schemeClr val="dk1"/>
-              </a:solidFill>
-              <a:latin typeface="Roboto"/>
-              <a:ea typeface="Roboto"/>
-              <a:cs typeface="Roboto"/>
-              <a:sym typeface="Roboto"/>
-            </a:endParaRPr>
-          </a:p>
-          <a:p>
-            <a:pPr marL="0" lvl="0" indent="0" algn="l" rtl="0">
-              <a:spcBef>
-                <a:spcPts val="0"/>
-              </a:spcBef>
-              <a:spcAft>
-                <a:spcPts val="0"/>
-              </a:spcAft>
-              <a:buNone/>
-            </a:pPr>
-            <a:r>
-              <a:rPr lang="en" sz="900" dirty="0">
-                <a:solidFill>
-                  <a:schemeClr val="dk1"/>
-                </a:solidFill>
-                <a:latin typeface="Roboto"/>
-                <a:ea typeface="Roboto"/>
-                <a:cs typeface="Roboto"/>
-                <a:sym typeface="Roboto"/>
-              </a:rPr>
-              <a:t>Derive duration between two dates.</a:t>
-            </a:r>
-            <a:endParaRPr sz="900" dirty="0">
-              <a:solidFill>
-                <a:schemeClr val="dk1"/>
-              </a:solidFill>
-              <a:latin typeface="Roboto"/>
-              <a:ea typeface="Roboto"/>
-              <a:cs typeface="Roboto"/>
-              <a:sym typeface="Roboto"/>
-            </a:endParaRPr>
-          </a:p>
-          <a:p>
-            <a:pPr marL="0" lvl="0" indent="0" algn="l" rtl="0">
-              <a:spcBef>
-                <a:spcPts val="0"/>
-              </a:spcBef>
-              <a:spcAft>
-                <a:spcPts val="0"/>
-              </a:spcAft>
-              <a:buClr>
-                <a:schemeClr val="dk1"/>
-              </a:buClr>
-              <a:buSzPts val="1100"/>
-              <a:buFont typeface="Arial"/>
-              <a:buNone/>
-            </a:pPr>
-            <a:r>
-              <a:rPr lang="en" sz="900" dirty="0">
-                <a:solidFill>
-                  <a:schemeClr val="dk1"/>
-                </a:solidFill>
-                <a:latin typeface="Roboto"/>
-                <a:ea typeface="Roboto"/>
-                <a:cs typeface="Roboto"/>
-                <a:sym typeface="Roboto"/>
-              </a:rPr>
-              <a:t> </a:t>
-            </a:r>
-            <a:endParaRPr sz="900" dirty="0">
-              <a:solidFill>
-                <a:schemeClr val="dk1"/>
-              </a:solidFill>
-              <a:latin typeface="Roboto"/>
-              <a:ea typeface="Roboto"/>
-              <a:cs typeface="Roboto"/>
-              <a:sym typeface="Roboto"/>
-            </a:endParaRPr>
-          </a:p>
-          <a:p>
-            <a:pPr marL="0" lvl="0" indent="0" algn="l" rtl="0">
-              <a:spcBef>
-                <a:spcPts val="0"/>
-              </a:spcBef>
-              <a:spcAft>
-                <a:spcPts val="0"/>
-              </a:spcAft>
-              <a:buNone/>
-            </a:pPr>
-            <a:r>
-              <a:rPr lang="en" sz="900" i="1" dirty="0">
-                <a:solidFill>
-                  <a:schemeClr val="dk1"/>
-                </a:solidFill>
-                <a:latin typeface="Roboto"/>
-                <a:ea typeface="Roboto"/>
-                <a:cs typeface="Roboto"/>
-                <a:sym typeface="Roboto"/>
-              </a:rPr>
-              <a:t>derive_vars_duration(</a:t>
-            </a:r>
-            <a:endParaRPr sz="900" i="1" dirty="0">
-              <a:solidFill>
-                <a:schemeClr val="dk1"/>
-              </a:solidFill>
-              <a:latin typeface="Roboto"/>
-              <a:ea typeface="Roboto"/>
-              <a:cs typeface="Roboto"/>
-              <a:sym typeface="Roboto"/>
-            </a:endParaRPr>
-          </a:p>
-          <a:p>
-            <a:pPr marL="0" lvl="0" indent="0" algn="l" rtl="0">
-              <a:spcBef>
-                <a:spcPts val="0"/>
-              </a:spcBef>
-              <a:spcAft>
-                <a:spcPts val="0"/>
-              </a:spcAft>
-              <a:buClr>
-                <a:schemeClr val="dk1"/>
-              </a:buClr>
-              <a:buSzPts val="1100"/>
-              <a:buFont typeface="Arial"/>
-              <a:buNone/>
-            </a:pPr>
-            <a:r>
-              <a:rPr lang="en" sz="900" i="1" dirty="0">
-                <a:solidFill>
-                  <a:schemeClr val="dk1"/>
-                </a:solidFill>
-                <a:latin typeface="Roboto"/>
-                <a:ea typeface="Roboto"/>
-                <a:cs typeface="Roboto"/>
-                <a:sym typeface="Roboto"/>
-              </a:rPr>
-              <a:t>  dataset = adsl, new_var = AAGE, new_var_unit = AAGEU,</a:t>
-            </a:r>
-            <a:endParaRPr sz="900" i="1" dirty="0">
-              <a:solidFill>
-                <a:schemeClr val="dk1"/>
-              </a:solidFill>
-              <a:latin typeface="Roboto"/>
-              <a:ea typeface="Roboto"/>
-              <a:cs typeface="Roboto"/>
-              <a:sym typeface="Roboto"/>
-            </a:endParaRPr>
-          </a:p>
-          <a:p>
-            <a:pPr marL="0" lvl="0" indent="0" algn="l" rtl="0">
-              <a:spcBef>
-                <a:spcPts val="0"/>
-              </a:spcBef>
-              <a:spcAft>
-                <a:spcPts val="0"/>
-              </a:spcAft>
-              <a:buNone/>
-            </a:pPr>
-            <a:r>
-              <a:rPr lang="en" sz="900" i="1" dirty="0">
-                <a:solidFill>
-                  <a:schemeClr val="dk1"/>
-                </a:solidFill>
-                <a:latin typeface="Roboto"/>
-                <a:ea typeface="Roboto"/>
-                <a:cs typeface="Roboto"/>
-                <a:sym typeface="Roboto"/>
-              </a:rPr>
-              <a:t>  start_date = BRTHDT, end_date = RANDDT, </a:t>
-            </a:r>
-            <a:endParaRPr sz="900" i="1" dirty="0">
-              <a:solidFill>
-                <a:schemeClr val="dk1"/>
-              </a:solidFill>
-              <a:latin typeface="Roboto"/>
-              <a:ea typeface="Roboto"/>
-              <a:cs typeface="Roboto"/>
-              <a:sym typeface="Roboto"/>
-            </a:endParaRPr>
-          </a:p>
-          <a:p>
-            <a:pPr lvl="0"/>
-            <a:r>
-              <a:rPr lang="en" sz="900" i="1" dirty="0">
-                <a:solidFill>
-                  <a:schemeClr val="dk1"/>
-                </a:solidFill>
-                <a:latin typeface="Roboto"/>
-                <a:ea typeface="Roboto"/>
-                <a:cs typeface="Roboto"/>
-                <a:sym typeface="Roboto"/>
-              </a:rPr>
-              <a:t>  out_unit =  "years"</a:t>
-            </a:r>
-            <a:endParaRPr sz="900" i="1" dirty="0">
-              <a:solidFill>
-                <a:schemeClr val="dk1"/>
-              </a:solidFill>
-              <a:latin typeface="Roboto"/>
-              <a:ea typeface="Roboto"/>
-              <a:cs typeface="Roboto"/>
-              <a:sym typeface="Roboto"/>
-            </a:endParaRPr>
-          </a:p>
-          <a:p>
-            <a:pPr marL="0" lvl="0" indent="0" algn="l" rtl="0">
-              <a:spcBef>
-                <a:spcPts val="0"/>
-              </a:spcBef>
-              <a:spcAft>
-                <a:spcPts val="0"/>
-              </a:spcAft>
-              <a:buNone/>
-            </a:pPr>
-            <a:r>
-              <a:rPr lang="en" sz="900" i="1" dirty="0">
-                <a:solidFill>
-                  <a:schemeClr val="dk1"/>
-                </a:solidFill>
-                <a:latin typeface="Roboto"/>
-                <a:ea typeface="Roboto"/>
-                <a:cs typeface="Roboto"/>
-                <a:sym typeface="Roboto"/>
-              </a:rPr>
-              <a:t>)</a:t>
-            </a:r>
-            <a:endParaRPr sz="900" i="1" dirty="0">
-              <a:solidFill>
-                <a:schemeClr val="dk1"/>
-              </a:solidFill>
-              <a:latin typeface="Roboto"/>
-              <a:ea typeface="Roboto"/>
-              <a:cs typeface="Roboto"/>
-              <a:sym typeface="Roboto"/>
-            </a:endParaRPr>
-          </a:p>
-        </p:txBody>
-      </p:sp>
-      <p:sp>
-        <p:nvSpPr>
           <p:cNvPr id="79" name="Google Shape;79;p13"/>
           <p:cNvSpPr txBox="1"/>
           <p:nvPr/>
@@ -10437,7 +10095,7 @@
                 <a:ea typeface="Roboto"/>
                 <a:cs typeface="Roboto"/>
                 <a:sym typeface="Roboto"/>
-                <a:hlinkClick r:id="rId32">
+                <a:hlinkClick r:id="rId31">
                   <a:extLst>
                     <a:ext uri="{A12FA001-AC4F-418D-AE19-62706E023703}">
                       <ahyp:hlinkClr xmlns:ahyp="http://schemas.microsoft.com/office/drawing/2018/hyperlinkcolor" val="tx"/>
@@ -10700,7 +10358,7 @@
           <p:nvPr/>
         </p:nvPicPr>
         <p:blipFill>
-          <a:blip r:embed="rId33">
+          <a:blip r:embed="rId32">
             <a:alphaModFix/>
           </a:blip>
           <a:stretch>
@@ -10923,6 +10581,64 @@
                 <a:ea typeface="Roboto"/>
                 <a:cs typeface="Roboto"/>
                 <a:sym typeface="Roboto"/>
+                <a:hlinkClick r:id="rId33">
+                  <a:extLst>
+                    <a:ext uri="{A12FA001-AC4F-418D-AE19-62706E023703}">
+                      <ahyp:hlinkClr xmlns:ahyp="http://schemas.microsoft.com/office/drawing/2018/hyperlinkcolor" val="tx"/>
+                    </a:ext>
+                  </a:extLst>
+                </a:hlinkClick>
+              </a:rPr>
+              <a:t>compute_age_years</a:t>
+            </a:r>
+            <a:r>
+              <a:rPr lang="en" sz="900" b="1" dirty="0">
+                <a:solidFill>
+                  <a:schemeClr val="bg1">
+                    <a:lumMod val="50000"/>
+                  </a:schemeClr>
+                </a:solidFill>
+                <a:latin typeface="Roboto"/>
+                <a:ea typeface="Roboto"/>
+                <a:cs typeface="Roboto"/>
+                <a:sym typeface="Roboto"/>
+              </a:rPr>
+              <a:t>()</a:t>
+            </a:r>
+            <a:endParaRPr sz="900" b="1" dirty="0">
+              <a:solidFill>
+                <a:schemeClr val="bg1">
+                  <a:lumMod val="50000"/>
+                </a:schemeClr>
+              </a:solidFill>
+              <a:latin typeface="Roboto"/>
+              <a:ea typeface="Roboto"/>
+              <a:cs typeface="Roboto"/>
+              <a:sym typeface="Roboto"/>
+            </a:endParaRPr>
+          </a:p>
+          <a:p>
+            <a:pPr marL="0" lvl="0" indent="0" algn="l" rtl="0">
+              <a:spcBef>
+                <a:spcPts val="0"/>
+              </a:spcBef>
+              <a:spcAft>
+                <a:spcPts val="0"/>
+              </a:spcAft>
+              <a:buNone/>
+            </a:pPr>
+            <a:r>
+              <a:rPr lang="en" sz="900" b="1" dirty="0">
+                <a:solidFill>
+                  <a:schemeClr val="accent5"/>
+                </a:solidFill>
+                <a:uFill>
+                  <a:noFill/>
+                </a:uFill>
+                <a:latin typeface="Roboto"/>
+                <a:ea typeface="Roboto"/>
+                <a:cs typeface="Roboto"/>
+                <a:sym typeface="Roboto"/>
                 <a:hlinkClick r:id="rId34">
                   <a:extLst>
                     <a:ext uri="{A12FA001-AC4F-418D-AE19-62706E023703}">
@@ -10931,7 +10647,7 @@
                   </a:extLst>
                 </a:hlinkClick>
               </a:rPr>
-              <a:t>compute_age_years</a:t>
+              <a:t>compute_dtf</a:t>
             </a:r>
             <a:r>
               <a:rPr lang="en" sz="900" b="1" dirty="0">
@@ -10989,7 +10705,7 @@
                   </a:extLst>
                 </a:hlinkClick>
               </a:rPr>
-              <a:t>compute_dtf</a:t>
+              <a:t>compute_duration</a:t>
             </a:r>
             <a:r>
               <a:rPr lang="en" sz="900" b="1" dirty="0">
@@ -11047,7 +10763,7 @@
                   </a:extLst>
                 </a:hlinkClick>
               </a:rPr>
-              <a:t>compute_duration</a:t>
+              <a:t>compute_tmf</a:t>
             </a:r>
             <a:r>
               <a:rPr lang="en" sz="900" b="1" dirty="0">
@@ -11063,30 +10779,19 @@
               </a:rPr>
               <a:t>()</a:t>
             </a:r>
-            <a:endParaRPr sz="900" b="1" dirty="0">
-              <a:solidFill>
-                <a:schemeClr val="bg1">
-                  <a:lumMod val="50000"/>
-                </a:schemeClr>
-              </a:solidFill>
-              <a:latin typeface="Roboto"/>
-              <a:ea typeface="Roboto"/>
-              <a:cs typeface="Roboto"/>
-              <a:sym typeface="Roboto"/>
-            </a:endParaRPr>
-          </a:p>
-          <a:p>
-            <a:pPr marL="0" lvl="0" indent="0" algn="l" rtl="0">
-              <a:spcBef>
-                <a:spcPts val="0"/>
-              </a:spcBef>
-              <a:spcAft>
-                <a:spcPts val="0"/>
-              </a:spcAft>
-              <a:buNone/>
-            </a:pPr>
-            <a:r>
-              <a:rPr lang="en" sz="900" b="1" dirty="0">
+          </a:p>
+          <a:p>
+            <a:pPr marL="0" lvl="0" indent="0" algn="l" rtl="0">
+              <a:spcBef>
+                <a:spcPts val="0"/>
+              </a:spcBef>
+              <a:spcAft>
+                <a:spcPts val="0"/>
+              </a:spcAft>
+              <a:buNone/>
+            </a:pPr>
+            <a:r>
+              <a:rPr lang="en-US" sz="900" b="1" dirty="0">
                 <a:solidFill>
                   <a:schemeClr val="accent5"/>
                 </a:solidFill>
@@ -11097,54 +10802,7 @@
                 <a:ea typeface="Roboto"/>
                 <a:cs typeface="Roboto"/>
                 <a:sym typeface="Roboto"/>
-                <a:hlinkClick r:id="rId37">
-                  <a:extLst>
-                    <a:ext uri="{A12FA001-AC4F-418D-AE19-62706E023703}">
-                      <ahyp:hlinkClr xmlns:ahyp="http://schemas.microsoft.com/office/drawing/2018/hyperlinkcolor" val="tx"/>
-                    </a:ext>
-                  </a:extLst>
-                </a:hlinkClick>
-              </a:rPr>
-              <a:t>compute_tmf</a:t>
-            </a:r>
-            <a:r>
-              <a:rPr lang="en" sz="900" b="1" dirty="0">
-                <a:solidFill>
-                  <a:schemeClr val="bg1">
-                    <a:lumMod val="50000"/>
-                  </a:schemeClr>
-                </a:solidFill>
-                <a:latin typeface="Roboto"/>
-                <a:ea typeface="Roboto"/>
-                <a:cs typeface="Roboto"/>
-                <a:sym typeface="Roboto"/>
-              </a:rPr>
-              <a:t>()</a:t>
-            </a:r>
-          </a:p>
-          <a:p>
-            <a:pPr marL="0" lvl="0" indent="0" algn="l" rtl="0">
-              <a:spcBef>
-                <a:spcPts val="0"/>
-              </a:spcBef>
-              <a:spcAft>
-                <a:spcPts val="0"/>
-              </a:spcAft>
-              <a:buNone/>
-            </a:pPr>
-            <a:r>
-              <a:rPr lang="en-US" sz="900" b="1" dirty="0">
-                <a:solidFill>
-                  <a:schemeClr val="accent5"/>
-                </a:solidFill>
-                <a:uFill>
-                  <a:noFill/>
-                </a:uFill>
-                <a:latin typeface="Roboto"/>
-                <a:ea typeface="Roboto"/>
-                <a:cs typeface="Roboto"/>
-                <a:sym typeface="Roboto"/>
-                <a:hlinkClick r:id="rId38"/>
+                <a:hlinkClick r:id="rId37"/>
               </a:rPr>
               <a:t>compute_scale</a:t>
             </a:r>
@@ -11251,6 +10909,74 @@
                 <a:ea typeface="Roboto"/>
                 <a:cs typeface="Roboto"/>
                 <a:sym typeface="Roboto"/>
+                <a:hlinkClick r:id="rId38">
+                  <a:extLst>
+                    <a:ext uri="{A12FA001-AC4F-418D-AE19-62706E023703}">
+                      <ahyp:hlinkClr xmlns:ahyp="http://schemas.microsoft.com/office/drawing/2018/hyperlinkcolor" val="tx"/>
+                    </a:ext>
+                  </a:extLst>
+                </a:hlinkClick>
+              </a:rPr>
+              <a:t>convert_date_to_dtm</a:t>
+            </a:r>
+            <a:r>
+              <a:rPr lang="en-US" sz="900" b="1" dirty="0">
+                <a:solidFill>
+                  <a:schemeClr val="bg1">
+                    <a:lumMod val="50000"/>
+                  </a:schemeClr>
+                </a:solidFill>
+                <a:latin typeface="Roboto"/>
+                <a:ea typeface="Roboto"/>
+                <a:cs typeface="Roboto"/>
+                <a:sym typeface="Roboto"/>
+              </a:rPr>
+              <a:t>()</a:t>
+            </a:r>
+            <a:endParaRPr lang="en-US" sz="900" b="1" dirty="0">
+              <a:solidFill>
+                <a:schemeClr val="bg1">
+                  <a:lumMod val="50000"/>
+                </a:schemeClr>
+              </a:solidFill>
+              <a:uFill>
+                <a:noFill/>
+              </a:uFill>
+              <a:latin typeface="Roboto"/>
+              <a:ea typeface="Roboto"/>
+              <a:cs typeface="Roboto"/>
+              <a:sym typeface="Roboto"/>
+              <a:hlinkClick r:id="rId39">
+                <a:extLst>
+                  <a:ext uri="{A12FA001-AC4F-418D-AE19-62706E023703}">
+                    <ahyp:hlinkClr xmlns:ahyp="http://schemas.microsoft.com/office/drawing/2018/hyperlinkcolor" val="tx"/>
+                  </a:ext>
+                </a:extLst>
+              </a:hlinkClick>
+            </a:endParaRPr>
+          </a:p>
+          <a:p>
+            <a:pPr marL="0" lvl="0" indent="0" algn="l" rtl="0">
+              <a:spcBef>
+                <a:spcPts val="0"/>
+              </a:spcBef>
+              <a:spcAft>
+                <a:spcPts val="0"/>
+              </a:spcAft>
+              <a:buNone/>
+            </a:pPr>
+            <a:r>
+              <a:rPr lang="en-US" sz="900" b="1" dirty="0">
+                <a:solidFill>
+                  <a:schemeClr val="accent5"/>
+                </a:solidFill>
+                <a:uFill>
+                  <a:noFill/>
+                </a:uFill>
+                <a:latin typeface="Roboto"/>
+                <a:ea typeface="Roboto"/>
+                <a:cs typeface="Roboto"/>
+                <a:sym typeface="Roboto"/>
                 <a:hlinkClick r:id="rId39">
                   <a:extLst>
                     <a:ext uri="{A12FA001-AC4F-418D-AE19-62706E023703}">
@@ -11259,58 +10985,36 @@
                   </a:extLst>
                 </a:hlinkClick>
               </a:rPr>
-              <a:t>convert_date_to_dtm</a:t>
-            </a:r>
-            <a:r>
-              <a:rPr lang="en-US" sz="900" b="1" dirty="0">
+              <a:t>t</a:t>
+            </a:r>
+            <a:r>
+              <a:rPr lang="en" sz="900" b="1" dirty="0">
+                <a:solidFill>
+                  <a:schemeClr val="accent5"/>
+                </a:solidFill>
+                <a:uFill>
+                  <a:noFill/>
+                </a:uFill>
+                <a:latin typeface="Roboto"/>
+                <a:ea typeface="Roboto"/>
+                <a:cs typeface="Roboto"/>
+                <a:sym typeface="Roboto"/>
+                <a:hlinkClick r:id="rId39">
+                  <a:extLst>
+                    <a:ext uri="{A12FA001-AC4F-418D-AE19-62706E023703}">
+                      <ahyp:hlinkClr xmlns:ahyp="http://schemas.microsoft.com/office/drawing/2018/hyperlinkcolor" val="tx"/>
+                    </a:ext>
+                  </a:extLst>
+                </a:hlinkClick>
+              </a:rPr>
+              <a:t>ransform_range</a:t>
+            </a:r>
+            <a:r>
+              <a:rPr lang="en" sz="900" b="1" dirty="0">
                 <a:solidFill>
                   <a:schemeClr val="bg1">
                     <a:lumMod val="50000"/>
                   </a:schemeClr>
-                </a:solidFill>
-                <a:latin typeface="Roboto"/>
-                <a:ea typeface="Roboto"/>
-                <a:cs typeface="Roboto"/>
-                <a:sym typeface="Roboto"/>
-              </a:rPr>
-              <a:t>()</a:t>
-            </a:r>
-            <a:endParaRPr lang="en-US" sz="900" b="1" dirty="0">
-              <a:solidFill>
-                <a:schemeClr val="bg1">
-                  <a:lumMod val="50000"/>
-                </a:schemeClr>
-              </a:solidFill>
-              <a:uFill>
-                <a:noFill/>
-              </a:uFill>
-              <a:latin typeface="Roboto"/>
-              <a:ea typeface="Roboto"/>
-              <a:cs typeface="Roboto"/>
-              <a:sym typeface="Roboto"/>
-              <a:hlinkClick r:id="rId40">
-                <a:extLst>
-                  <a:ext uri="{A12FA001-AC4F-418D-AE19-62706E023703}">
-                    <ahyp:hlinkClr xmlns:ahyp="http://schemas.microsoft.com/office/drawing/2018/hyperlinkcolor" val="tx"/>
-                  </a:ext>
-                </a:extLst>
-              </a:hlinkClick>
-            </a:endParaRPr>
-          </a:p>
-          <a:p>
-            <a:pPr marL="0" lvl="0" indent="0" algn="l" rtl="0">
-              <a:spcBef>
-                <a:spcPts val="0"/>
-              </a:spcBef>
-              <a:spcAft>
-                <a:spcPts val="0"/>
-              </a:spcAft>
-              <a:buNone/>
-            </a:pPr>
-            <a:r>
-              <a:rPr lang="en-US" sz="900" b="1" dirty="0">
-                <a:solidFill>
-                  <a:schemeClr val="accent5"/>
                 </a:solidFill>
                 <a:uFill>
                   <a:noFill/>
@@ -11327,8 +11031,19 @@
                   </a:extLst>
                 </a:hlinkClick>
               </a:rPr>
-              <a:t>t</a:t>
-            </a:r>
+              <a:t>()</a:t>
+            </a:r>
+          </a:p>
+          <a:p>
+            <a:pPr marL="0" lvl="0" indent="0" algn="l" rtl="0">
+              <a:spcBef>
+                <a:spcPts val="0"/>
+              </a:spcBef>
+              <a:spcAft>
+                <a:spcPts val="0"/>
+              </a:spcAft>
+              <a:buNone/>
+            </a:pPr>
             <a:r>
               <a:rPr lang="en" sz="900" b="1" dirty="0">
                 <a:solidFill>
@@ -11349,7 +11064,7 @@
                   </a:extLst>
                 </a:hlinkClick>
               </a:rPr>
-              <a:t>ransform_range</a:t>
+              <a:t>convert_dtc_to_dt</a:t>
             </a:r>
             <a:r>
               <a:rPr lang="en" sz="900" b="1" dirty="0">
@@ -11358,6 +11073,40 @@
                     <a:lumMod val="50000"/>
                   </a:schemeClr>
                 </a:solidFill>
+                <a:latin typeface="Roboto"/>
+                <a:ea typeface="Roboto"/>
+                <a:cs typeface="Roboto"/>
+                <a:sym typeface="Roboto"/>
+              </a:rPr>
+              <a:t>()</a:t>
+            </a:r>
+            <a:endParaRPr sz="900" b="1" dirty="0">
+              <a:solidFill>
+                <a:schemeClr val="bg1">
+                  <a:lumMod val="50000"/>
+                </a:schemeClr>
+              </a:solidFill>
+              <a:latin typeface="Roboto"/>
+              <a:ea typeface="Roboto"/>
+              <a:cs typeface="Roboto"/>
+              <a:sym typeface="Roboto"/>
+            </a:endParaRPr>
+          </a:p>
+          <a:p>
+            <a:pPr marL="0" lvl="0" indent="0" algn="l" rtl="0">
+              <a:spcBef>
+                <a:spcPts val="0"/>
+              </a:spcBef>
+              <a:spcAft>
+                <a:spcPts val="0"/>
+              </a:spcAft>
+              <a:buNone/>
+            </a:pPr>
+            <a:r>
+              <a:rPr lang="en" sz="900" b="1" dirty="0">
+                <a:solidFill>
+                  <a:schemeClr val="accent5"/>
+                </a:solidFill>
                 <a:uFill>
                   <a:noFill/>
                 </a:uFill>
@@ -11366,97 +11115,6 @@
                 <a:cs typeface="Roboto"/>
                 <a:sym typeface="Roboto"/>
                 <a:hlinkClick r:id="rId41">
-                  <a:extLst>
-                    <a:ext uri="{A12FA001-AC4F-418D-AE19-62706E023703}">
-                      <ahyp:hlinkClr xmlns:ahyp="http://schemas.microsoft.com/office/drawing/2018/hyperlinkcolor" val="tx"/>
-                    </a:ext>
-                  </a:extLst>
-                </a:hlinkClick>
-              </a:rPr>
-              <a:t>()</a:t>
-            </a:r>
-          </a:p>
-          <a:p>
-            <a:pPr marL="0" lvl="0" indent="0" algn="l" rtl="0">
-              <a:spcBef>
-                <a:spcPts val="0"/>
-              </a:spcBef>
-              <a:spcAft>
-                <a:spcPts val="0"/>
-              </a:spcAft>
-              <a:buNone/>
-            </a:pPr>
-            <a:r>
-              <a:rPr lang="en" sz="900" b="1" dirty="0">
-                <a:solidFill>
-                  <a:schemeClr val="accent5"/>
-                </a:solidFill>
-                <a:uFill>
-                  <a:noFill/>
-                </a:uFill>
-                <a:latin typeface="Roboto"/>
-                <a:ea typeface="Roboto"/>
-                <a:cs typeface="Roboto"/>
-                <a:sym typeface="Roboto"/>
-                <a:hlinkClick r:id="rId41">
-                  <a:extLst>
-                    <a:ext uri="{A12FA001-AC4F-418D-AE19-62706E023703}">
-                      <ahyp:hlinkClr xmlns:ahyp="http://schemas.microsoft.com/office/drawing/2018/hyperlinkcolor" val="tx"/>
-                    </a:ext>
-                  </a:extLst>
-                </a:hlinkClick>
-              </a:rPr>
-              <a:t>convert_dtc_to_dt</a:t>
-            </a:r>
-            <a:r>
-              <a:rPr lang="en" sz="900" b="1" dirty="0">
-                <a:solidFill>
-                  <a:schemeClr val="bg1">
-                    <a:lumMod val="50000"/>
-                  </a:schemeClr>
-                </a:solidFill>
-                <a:latin typeface="Roboto"/>
-                <a:ea typeface="Roboto"/>
-                <a:cs typeface="Roboto"/>
-                <a:sym typeface="Roboto"/>
-              </a:rPr>
-              <a:t>()</a:t>
-            </a:r>
-            <a:endParaRPr sz="900" b="1" dirty="0">
-              <a:solidFill>
-                <a:schemeClr val="bg1">
-                  <a:lumMod val="50000"/>
-                </a:schemeClr>
-              </a:solidFill>
-              <a:latin typeface="Roboto"/>
-              <a:ea typeface="Roboto"/>
-              <a:cs typeface="Roboto"/>
-              <a:sym typeface="Roboto"/>
-            </a:endParaRPr>
-          </a:p>
-          <a:p>
-            <a:pPr marL="0" lvl="0" indent="0" algn="l" rtl="0">
-              <a:spcBef>
-                <a:spcPts val="0"/>
-              </a:spcBef>
-              <a:spcAft>
-                <a:spcPts val="0"/>
-              </a:spcAft>
-              <a:buNone/>
-            </a:pPr>
-            <a:r>
-              <a:rPr lang="en" sz="900" b="1" dirty="0">
-                <a:solidFill>
-                  <a:schemeClr val="accent5"/>
-                </a:solidFill>
-                <a:uFill>
-                  <a:noFill/>
-                </a:uFill>
-                <a:latin typeface="Roboto"/>
-                <a:ea typeface="Roboto"/>
-                <a:cs typeface="Roboto"/>
-                <a:sym typeface="Roboto"/>
-                <a:hlinkClick r:id="rId42">
                   <a:extLst>
                     <a:ext uri="{A12FA001-AC4F-418D-AE19-62706E023703}">
                       <ahyp:hlinkClr xmlns:ahyp="http://schemas.microsoft.com/office/drawing/2018/hyperlinkcolor" val="tx"/>
@@ -11586,7 +11244,7 @@
                 <a:ea typeface="Roboto"/>
                 <a:cs typeface="Roboto"/>
                 <a:sym typeface="Roboto"/>
-                <a:hlinkClick r:id="rId43"/>
+                <a:hlinkClick r:id="rId42"/>
               </a:rPr>
               <a:t>reference page</a:t>
             </a:r>
@@ -11605,6 +11263,226 @@
               <a:cs typeface="Roboto"/>
               <a:sym typeface="Roboto"/>
             </a:endParaRPr>
+          </a:p>
+        </p:txBody>
+      </p:sp>
+      <p:sp>
+        <p:nvSpPr>
+          <p:cNvPr id="2" name="TextBox 1">
+            <a:extLst>
+              <a:ext uri="{FF2B5EF4-FFF2-40B4-BE49-F238E27FC236}">
+                <a16:creationId xmlns:a16="http://schemas.microsoft.com/office/drawing/2014/main" id="{6B2EE229-292C-BB0C-7636-91DD50FC0382}"/>
+              </a:ext>
+            </a:extLst>
+          </p:cNvPr>
+          <p:cNvSpPr txBox="1"/>
+          <p:nvPr/>
+        </p:nvSpPr>
+        <p:spPr>
+          <a:xfrm>
+            <a:off x="7224768" y="4445838"/>
+            <a:ext cx="3171132" cy="1477328"/>
+          </a:xfrm>
+          <a:prstGeom prst="rect">
+            <a:avLst/>
+          </a:prstGeom>
+          <a:noFill/>
+        </p:spPr>
+        <p:txBody>
+          <a:bodyPr wrap="square" rtlCol="0">
+            <a:spAutoFit/>
+          </a:bodyPr>
+          <a:lstStyle/>
+          <a:p>
+            <a:pPr lvl="0"/>
+            <a:r>
+              <a:rPr lang="en-US" sz="900" b="1" dirty="0">
+                <a:solidFill>
+                  <a:schemeClr val="accent5"/>
+                </a:solidFill>
+                <a:uFill>
+                  <a:noFill/>
+                </a:uFill>
+                <a:latin typeface="Roboto"/>
+                <a:ea typeface="Roboto"/>
+                <a:cs typeface="Roboto"/>
+                <a:sym typeface="Roboto"/>
+                <a:hlinkClick r:id="rId43">
+                  <a:extLst>
+                    <a:ext uri="{A12FA001-AC4F-418D-AE19-62706E023703}">
+                      <ahyp:hlinkClr xmlns:ahyp="http://schemas.microsoft.com/office/drawing/2018/hyperlinkcolor" val="tx"/>
+                    </a:ext>
+                  </a:extLst>
+                </a:hlinkClick>
+              </a:rPr>
+              <a:t>derive_vars_duration</a:t>
+            </a:r>
+            <a:r>
+              <a:rPr lang="en-US" sz="900" dirty="0">
+                <a:solidFill>
+                  <a:srgbClr val="9E9E9E"/>
+                </a:solidFill>
+                <a:latin typeface="Roboto"/>
+                <a:ea typeface="Roboto"/>
+                <a:cs typeface="Roboto"/>
+                <a:sym typeface="Roboto"/>
+              </a:rPr>
+              <a:t>(dataset,</a:t>
+            </a:r>
+            <a:r>
+              <a:rPr lang="en-US" sz="900" b="1" dirty="0">
+                <a:solidFill>
+                  <a:srgbClr val="9E9E9E"/>
+                </a:solidFill>
+                <a:latin typeface="Roboto"/>
+                <a:ea typeface="Roboto"/>
+                <a:cs typeface="Roboto"/>
+                <a:sym typeface="Roboto"/>
+              </a:rPr>
+              <a:t> </a:t>
+            </a:r>
+            <a:r>
+              <a:rPr lang="en-US" sz="900" dirty="0">
+                <a:solidFill>
+                  <a:srgbClr val="9E9E9E"/>
+                </a:solidFill>
+                <a:latin typeface="Roboto"/>
+                <a:ea typeface="Roboto"/>
+                <a:cs typeface="Roboto"/>
+                <a:sym typeface="Roboto"/>
+              </a:rPr>
+              <a:t>new_var, new_var_unit,  start_date, end_date)</a:t>
+            </a:r>
+            <a:r>
+              <a:rPr lang="en-US" sz="900" dirty="0">
+                <a:solidFill>
+                  <a:schemeClr val="dk1"/>
+                </a:solidFill>
+                <a:latin typeface="Roboto"/>
+                <a:ea typeface="Roboto"/>
+                <a:cs typeface="Roboto"/>
+                <a:sym typeface="Roboto"/>
+              </a:rPr>
+              <a:t>.</a:t>
+            </a:r>
+          </a:p>
+          <a:p>
+            <a:pPr lvl="0"/>
+            <a:r>
+              <a:rPr lang="en-US" sz="900" dirty="0">
+                <a:solidFill>
+                  <a:schemeClr val="dk1"/>
+                </a:solidFill>
+                <a:latin typeface="Roboto"/>
+                <a:ea typeface="Roboto"/>
+                <a:cs typeface="Roboto"/>
+                <a:sym typeface="Roboto"/>
+              </a:rPr>
+              <a:t>Derive duration between two dates.</a:t>
+            </a:r>
+          </a:p>
+          <a:p>
+            <a:pPr lvl="0">
+              <a:buClr>
+                <a:schemeClr val="dk1"/>
+              </a:buClr>
+              <a:buSzPts val="1100"/>
+            </a:pPr>
+            <a:r>
+              <a:rPr lang="en-US" sz="900" dirty="0">
+                <a:solidFill>
+                  <a:schemeClr val="dk1"/>
+                </a:solidFill>
+                <a:latin typeface="Roboto"/>
+                <a:ea typeface="Roboto"/>
+                <a:cs typeface="Roboto"/>
+                <a:sym typeface="Roboto"/>
+              </a:rPr>
+              <a:t> </a:t>
+            </a:r>
+          </a:p>
+          <a:p>
+            <a:pPr lvl="0"/>
+            <a:r>
+              <a:rPr lang="en-US" sz="900" i="1" dirty="0">
+                <a:solidFill>
+                  <a:schemeClr val="dk1"/>
+                </a:solidFill>
+                <a:latin typeface="Roboto"/>
+                <a:ea typeface="Roboto"/>
+                <a:cs typeface="Roboto"/>
+                <a:sym typeface="Roboto"/>
+              </a:rPr>
+              <a:t>derive_vars_duration(</a:t>
+            </a:r>
+          </a:p>
+          <a:p>
+            <a:pPr lvl="0">
+              <a:buClr>
+                <a:schemeClr val="dk1"/>
+              </a:buClr>
+              <a:buSzPts val="1100"/>
+            </a:pPr>
+            <a:r>
+              <a:rPr lang="en-US" sz="900" i="1" dirty="0">
+                <a:solidFill>
+                  <a:schemeClr val="dk1"/>
+                </a:solidFill>
+                <a:latin typeface="Roboto"/>
+                <a:ea typeface="Roboto"/>
+                <a:cs typeface="Roboto"/>
+                <a:sym typeface="Roboto"/>
+              </a:rPr>
+              <a:t>  dataset = adsl, new_var = AAGE, new_var_unit = AAGEU,</a:t>
+            </a:r>
+          </a:p>
+          <a:p>
+            <a:pPr lvl="0"/>
+            <a:r>
+              <a:rPr lang="en-US" sz="900" i="1" dirty="0">
+                <a:solidFill>
+                  <a:schemeClr val="dk1"/>
+                </a:solidFill>
+                <a:latin typeface="Roboto"/>
+                <a:ea typeface="Roboto"/>
+                <a:cs typeface="Roboto"/>
+                <a:sym typeface="Roboto"/>
+              </a:rPr>
+              <a:t>  start_date = BRTHDT, end_date = RANDDT, </a:t>
+            </a:r>
+          </a:p>
+          <a:p>
+            <a:pPr lvl="0"/>
+            <a:r>
+              <a:rPr lang="en-US" sz="900" i="1" dirty="0">
+                <a:solidFill>
+                  <a:schemeClr val="dk1"/>
+                </a:solidFill>
+                <a:latin typeface="Roboto"/>
+                <a:ea typeface="Roboto"/>
+                <a:cs typeface="Roboto"/>
+                <a:sym typeface="Roboto"/>
+              </a:rPr>
+              <a:t>  out_unit =  "years"</a:t>
+            </a:r>
+          </a:p>
+          <a:p>
+            <a:pPr lvl="0"/>
+            <a:r>
+              <a:rPr lang="en-US" sz="900" i="1" dirty="0">
+                <a:solidFill>
+                  <a:schemeClr val="dk1"/>
+                </a:solidFill>
+                <a:latin typeface="Roboto"/>
+                <a:ea typeface="Roboto"/>
+                <a:cs typeface="Roboto"/>
+                <a:sym typeface="Roboto"/>
+              </a:rPr>
+              <a:t>)</a:t>
+            </a:r>
+          </a:p>
+          <a:p>
+            <a:endParaRPr lang="en-US" sz="900" dirty="0"/>
           </a:p>
         </p:txBody>
       </p:sp>

</xml_diff>